<commit_message>
Changed first slide image, still not very happy
</commit_message>
<xml_diff>
--- a/presentations/jgradim-presentation.pptx
+++ b/presentations/jgradim-presentation.pptx
@@ -215,7 +215,7 @@
             <a:fld id="{A4A9652A-D4BF-41F5-B3CF-F03C6BFD8852}" type="datetimeFigureOut">
               <a:rPr lang="pt-PT" smtClean="0"/>
               <a:pPr/>
-              <a:t>30-01-2011</a:t>
+              <a:t>02-02-2011</a:t>
             </a:fld>
             <a:endParaRPr lang="pt-PT"/>
           </a:p>
@@ -671,7 +671,7 @@
             <a:fld id="{B21DA5EC-CDBD-4BE5-AFEC-D05D842E9DCA}" type="datetime1">
               <a:rPr lang="pt-PT" smtClean="0"/>
               <a:pPr/>
-              <a:t>30-01-2011</a:t>
+              <a:t>02-02-2011</a:t>
             </a:fld>
             <a:endParaRPr lang="pt-PT"/>
           </a:p>
@@ -846,7 +846,7 @@
             <a:fld id="{265ABC6D-62B8-444F-8CBB-55DA24843F08}" type="datetime1">
               <a:rPr lang="pt-PT" smtClean="0"/>
               <a:pPr/>
-              <a:t>30-01-2011</a:t>
+              <a:t>02-02-2011</a:t>
             </a:fld>
             <a:endParaRPr lang="pt-PT"/>
           </a:p>
@@ -1031,7 +1031,7 @@
             <a:fld id="{642BB447-BC74-408D-87E2-151F2C4E6D5C}" type="datetime1">
               <a:rPr lang="pt-PT" smtClean="0"/>
               <a:pPr/>
-              <a:t>30-01-2011</a:t>
+              <a:t>02-02-2011</a:t>
             </a:fld>
             <a:endParaRPr lang="pt-PT"/>
           </a:p>
@@ -1259,7 +1259,7 @@
             <a:fld id="{1AE16238-79D5-4CE1-9F7C-9EB0DB09B684}" type="datetime1">
               <a:rPr lang="pt-PT" smtClean="0"/>
               <a:pPr/>
-              <a:t>30-01-2011</a:t>
+              <a:t>02-02-2011</a:t>
             </a:fld>
             <a:endParaRPr lang="pt-PT"/>
           </a:p>
@@ -1517,7 +1517,7 @@
             <a:fld id="{29EC9118-B484-4893-9D08-9848F3CE7FF2}" type="datetime1">
               <a:rPr lang="pt-PT" smtClean="0"/>
               <a:pPr/>
-              <a:t>30-01-2011</a:t>
+              <a:t>02-02-2011</a:t>
             </a:fld>
             <a:endParaRPr lang="pt-PT"/>
           </a:p>
@@ -1810,7 +1810,7 @@
             <a:fld id="{93295FF2-CB18-49BE-8735-588EA2A78858}" type="datetime1">
               <a:rPr lang="pt-PT" smtClean="0"/>
               <a:pPr/>
-              <a:t>30-01-2011</a:t>
+              <a:t>02-02-2011</a:t>
             </a:fld>
             <a:endParaRPr lang="pt-PT"/>
           </a:p>
@@ -2237,7 +2237,7 @@
             <a:fld id="{50896DA6-8084-488D-9E6B-45E32377C613}" type="datetime1">
               <a:rPr lang="pt-PT" smtClean="0"/>
               <a:pPr/>
-              <a:t>30-01-2011</a:t>
+              <a:t>02-02-2011</a:t>
             </a:fld>
             <a:endParaRPr lang="pt-PT"/>
           </a:p>
@@ -2360,7 +2360,7 @@
             <a:fld id="{40926C83-C8D3-48F0-B08F-F8259B57109C}" type="datetime1">
               <a:rPr lang="pt-PT" smtClean="0"/>
               <a:pPr/>
-              <a:t>30-01-2011</a:t>
+              <a:t>02-02-2011</a:t>
             </a:fld>
             <a:endParaRPr lang="pt-PT"/>
           </a:p>
@@ -2460,7 +2460,7 @@
             <a:fld id="{379D2EB6-009D-45E0-886C-0BF1B142AD62}" type="datetime1">
               <a:rPr lang="pt-PT" smtClean="0"/>
               <a:pPr/>
-              <a:t>30-01-2011</a:t>
+              <a:t>02-02-2011</a:t>
             </a:fld>
             <a:endParaRPr lang="pt-PT"/>
           </a:p>
@@ -2742,7 +2742,7 @@
             <a:fld id="{D9720365-511F-43DE-9BF0-D286DA1D7131}" type="datetime1">
               <a:rPr lang="pt-PT" smtClean="0"/>
               <a:pPr/>
-              <a:t>30-01-2011</a:t>
+              <a:t>02-02-2011</a:t>
             </a:fld>
             <a:endParaRPr lang="pt-PT"/>
           </a:p>
@@ -3000,7 +3000,7 @@
             <a:fld id="{E9DCFC39-BBD6-4CEF-9802-34CE70E119D6}" type="datetime1">
               <a:rPr lang="pt-PT" smtClean="0"/>
               <a:pPr/>
-              <a:t>30-01-2011</a:t>
+              <a:t>02-02-2011</a:t>
             </a:fld>
             <a:endParaRPr lang="pt-PT"/>
           </a:p>
@@ -3604,6 +3604,32 @@
           <a:noFill/>
         </p:spPr>
       </p:pic>
+      <p:pic>
+        <p:nvPicPr>
+          <p:cNvPr id="3" name="Picture 2" descr="C:\Users\jgradim\Documents\thesis\presentations\5240870412_e232700d45_b.jpg"/>
+          <p:cNvPicPr>
+            <a:picLocks noChangeAspect="1" noChangeArrowheads="1"/>
+          </p:cNvPicPr>
+          <p:nvPr/>
+        </p:nvPicPr>
+        <p:blipFill>
+          <a:blip r:embed="rId4" cstate="print"/>
+          <a:srcRect r="6250" b="9320"/>
+          <a:stretch>
+            <a:fillRect/>
+          </a:stretch>
+        </p:blipFill>
+        <p:spPr bwMode="auto">
+          <a:xfrm>
+            <a:off x="0" y="0"/>
+            <a:ext cx="9144000" cy="6858000"/>
+          </a:xfrm>
+          <a:prstGeom prst="rect">
+            <a:avLst/>
+          </a:prstGeom>
+          <a:noFill/>
+        </p:spPr>
+      </p:pic>
       <p:sp>
         <p:nvSpPr>
           <p:cNvPr id="2" name="Title 1"/>
@@ -3849,6 +3875,77 @@
           </a:p>
         </p:txBody>
       </p:sp>
+      <p:sp>
+        <p:nvSpPr>
+          <p:cNvPr id="13" name="TextBox 12"/>
+          <p:cNvSpPr txBox="1"/>
+          <p:nvPr/>
+        </p:nvSpPr>
+        <p:spPr>
+          <a:xfrm>
+            <a:off x="0" y="0"/>
+            <a:ext cx="9144000" cy="246221"/>
+          </a:xfrm>
+          <a:prstGeom prst="rect">
+            <a:avLst/>
+          </a:prstGeom>
+          <a:noFill/>
+        </p:spPr>
+        <p:txBody>
+          <a:bodyPr wrap="square" rtlCol="0">
+            <a:spAutoFit/>
+          </a:bodyPr>
+          <a:lstStyle/>
+          <a:p>
+            <a:pPr algn="r"/>
+            <a:r>
+              <a:rPr lang="pt-PT" sz="1000" dirty="0" smtClean="0">
+                <a:solidFill>
+                  <a:schemeClr val="bg1"/>
+                </a:solidFill>
+                <a:effectLst>
+                  <a:outerShdw blurRad="38100" dist="38100" dir="2700000" algn="tl">
+                    <a:srgbClr val="000000">
+                      <a:alpha val="43137"/>
+                    </a:srgbClr>
+                  </a:outerShdw>
+                </a:effectLst>
+                <a:latin typeface="MetaSerif-Book" pitchFamily="34" charset="0"/>
+              </a:rPr>
+              <a:t>http://</a:t>
+            </a:r>
+            <a:r>
+              <a:rPr lang="pt-PT" sz="1000" dirty="0" smtClean="0">
+                <a:solidFill>
+                  <a:schemeClr val="bg1"/>
+                </a:solidFill>
+                <a:effectLst>
+                  <a:outerShdw blurRad="38100" dist="38100" dir="2700000" algn="tl">
+                    <a:srgbClr val="000000">
+                      <a:alpha val="43137"/>
+                    </a:srgbClr>
+                  </a:outerShdw>
+                </a:effectLst>
+                <a:latin typeface="MetaSerif-Book" pitchFamily="34" charset="0"/>
+              </a:rPr>
+              <a:t>www.flickr.com/photos/8095451@N08/</a:t>
+            </a:r>
+            <a:endParaRPr lang="pt-PT" sz="1000" dirty="0">
+              <a:solidFill>
+                <a:schemeClr val="bg1"/>
+              </a:solidFill>
+              <a:effectLst>
+                <a:outerShdw blurRad="38100" dist="38100" dir="2700000" algn="tl">
+                  <a:srgbClr val="000000">
+                    <a:alpha val="43137"/>
+                  </a:srgbClr>
+                </a:outerShdw>
+              </a:effectLst>
+              <a:latin typeface="MetaSerif-Book" pitchFamily="34" charset="0"/>
+            </a:endParaRPr>
+          </a:p>
+        </p:txBody>
+      </p:sp>
     </p:spTree>
   </p:cSld>
   <p:clrMapOvr>
@@ -6794,7 +6891,7 @@
                 </a:solidFill>
                 <a:latin typeface="League Gothic" pitchFamily="50" charset="0"/>
               </a:rPr>
-              <a:t>Motivation</a:t>
+              <a:t>Motivation &amp; Objectives</a:t>
             </a:r>
             <a:endParaRPr lang="pt-PT" sz="3200" dirty="0">
               <a:solidFill>
@@ -6876,15 +6973,6 @@
               </a:rPr>
               <a:t> systems, making Rails development even more agile and adaptable to change</a:t>
             </a:r>
-            <a:endParaRPr lang="pt-PT" sz="3600" dirty="0" smtClean="0">
-              <a:solidFill>
-                <a:schemeClr val="tx1">
-                  <a:lumMod val="85000"/>
-                  <a:lumOff val="15000"/>
-                </a:schemeClr>
-              </a:solidFill>
-              <a:latin typeface="MetaSerif-Book" pitchFamily="34" charset="0"/>
-            </a:endParaRPr>
           </a:p>
         </p:txBody>
       </p:sp>

</xml_diff>

<commit_message>
Intro to each study area
</commit_message>
<xml_diff>
--- a/presentations/jgradim-presentation.pptx
+++ b/presentations/jgradim-presentation.pptx
@@ -5,7 +5,7 @@
     <p:sldMasterId id="2147483648" r:id="rId1"/>
   </p:sldMasterIdLst>
   <p:notesMasterIdLst>
-    <p:notesMasterId r:id="rId25"/>
+    <p:notesMasterId r:id="rId30"/>
   </p:notesMasterIdLst>
   <p:sldIdLst>
     <p:sldId id="256" r:id="rId2"/>
@@ -23,14 +23,19 @@
     <p:sldId id="271" r:id="rId14"/>
     <p:sldId id="263" r:id="rId15"/>
     <p:sldId id="280" r:id="rId16"/>
-    <p:sldId id="259" r:id="rId17"/>
-    <p:sldId id="279" r:id="rId18"/>
-    <p:sldId id="264" r:id="rId19"/>
-    <p:sldId id="269" r:id="rId20"/>
-    <p:sldId id="270" r:id="rId21"/>
-    <p:sldId id="266" r:id="rId22"/>
-    <p:sldId id="267" r:id="rId23"/>
-    <p:sldId id="268" r:id="rId24"/>
+    <p:sldId id="282" r:id="rId17"/>
+    <p:sldId id="283" r:id="rId18"/>
+    <p:sldId id="285" r:id="rId19"/>
+    <p:sldId id="284" r:id="rId20"/>
+    <p:sldId id="286" r:id="rId21"/>
+    <p:sldId id="259" r:id="rId22"/>
+    <p:sldId id="279" r:id="rId23"/>
+    <p:sldId id="264" r:id="rId24"/>
+    <p:sldId id="269" r:id="rId25"/>
+    <p:sldId id="270" r:id="rId26"/>
+    <p:sldId id="266" r:id="rId27"/>
+    <p:sldId id="267" r:id="rId28"/>
+    <p:sldId id="268" r:id="rId29"/>
   </p:sldIdLst>
   <p:sldSz cx="9144000" cy="6858000" type="screen4x3"/>
   <p:notesSz cx="6858000" cy="9144000"/>
@@ -215,7 +220,7 @@
             <a:fld id="{A4A9652A-D4BF-41F5-B3CF-F03C6BFD8852}" type="datetimeFigureOut">
               <a:rPr lang="pt-PT" smtClean="0"/>
               <a:pPr/>
-              <a:t>02-02-2011</a:t>
+              <a:t>06-02-2011</a:t>
             </a:fld>
             <a:endParaRPr lang="pt-PT"/>
           </a:p>
@@ -671,7 +676,7 @@
             <a:fld id="{B21DA5EC-CDBD-4BE5-AFEC-D05D842E9DCA}" type="datetime1">
               <a:rPr lang="pt-PT" smtClean="0"/>
               <a:pPr/>
-              <a:t>02-02-2011</a:t>
+              <a:t>06-02-2011</a:t>
             </a:fld>
             <a:endParaRPr lang="pt-PT"/>
           </a:p>
@@ -846,7 +851,7 @@
             <a:fld id="{265ABC6D-62B8-444F-8CBB-55DA24843F08}" type="datetime1">
               <a:rPr lang="pt-PT" smtClean="0"/>
               <a:pPr/>
-              <a:t>02-02-2011</a:t>
+              <a:t>06-02-2011</a:t>
             </a:fld>
             <a:endParaRPr lang="pt-PT"/>
           </a:p>
@@ -1031,7 +1036,7 @@
             <a:fld id="{642BB447-BC74-408D-87E2-151F2C4E6D5C}" type="datetime1">
               <a:rPr lang="pt-PT" smtClean="0"/>
               <a:pPr/>
-              <a:t>02-02-2011</a:t>
+              <a:t>06-02-2011</a:t>
             </a:fld>
             <a:endParaRPr lang="pt-PT"/>
           </a:p>
@@ -1259,7 +1264,7 @@
             <a:fld id="{1AE16238-79D5-4CE1-9F7C-9EB0DB09B684}" type="datetime1">
               <a:rPr lang="pt-PT" smtClean="0"/>
               <a:pPr/>
-              <a:t>02-02-2011</a:t>
+              <a:t>06-02-2011</a:t>
             </a:fld>
             <a:endParaRPr lang="pt-PT"/>
           </a:p>
@@ -1517,7 +1522,7 @@
             <a:fld id="{29EC9118-B484-4893-9D08-9848F3CE7FF2}" type="datetime1">
               <a:rPr lang="pt-PT" smtClean="0"/>
               <a:pPr/>
-              <a:t>02-02-2011</a:t>
+              <a:t>06-02-2011</a:t>
             </a:fld>
             <a:endParaRPr lang="pt-PT"/>
           </a:p>
@@ -1810,7 +1815,7 @@
             <a:fld id="{93295FF2-CB18-49BE-8735-588EA2A78858}" type="datetime1">
               <a:rPr lang="pt-PT" smtClean="0"/>
               <a:pPr/>
-              <a:t>02-02-2011</a:t>
+              <a:t>06-02-2011</a:t>
             </a:fld>
             <a:endParaRPr lang="pt-PT"/>
           </a:p>
@@ -2237,7 +2242,7 @@
             <a:fld id="{50896DA6-8084-488D-9E6B-45E32377C613}" type="datetime1">
               <a:rPr lang="pt-PT" smtClean="0"/>
               <a:pPr/>
-              <a:t>02-02-2011</a:t>
+              <a:t>06-02-2011</a:t>
             </a:fld>
             <a:endParaRPr lang="pt-PT"/>
           </a:p>
@@ -2360,7 +2365,7 @@
             <a:fld id="{40926C83-C8D3-48F0-B08F-F8259B57109C}" type="datetime1">
               <a:rPr lang="pt-PT" smtClean="0"/>
               <a:pPr/>
-              <a:t>02-02-2011</a:t>
+              <a:t>06-02-2011</a:t>
             </a:fld>
             <a:endParaRPr lang="pt-PT"/>
           </a:p>
@@ -2460,7 +2465,7 @@
             <a:fld id="{379D2EB6-009D-45E0-886C-0BF1B142AD62}" type="datetime1">
               <a:rPr lang="pt-PT" smtClean="0"/>
               <a:pPr/>
-              <a:t>02-02-2011</a:t>
+              <a:t>06-02-2011</a:t>
             </a:fld>
             <a:endParaRPr lang="pt-PT"/>
           </a:p>
@@ -2742,7 +2747,7 @@
             <a:fld id="{D9720365-511F-43DE-9BF0-D286DA1D7131}" type="datetime1">
               <a:rPr lang="pt-PT" smtClean="0"/>
               <a:pPr/>
-              <a:t>02-02-2011</a:t>
+              <a:t>06-02-2011</a:t>
             </a:fld>
             <a:endParaRPr lang="pt-PT"/>
           </a:p>
@@ -3000,7 +3005,7 @@
             <a:fld id="{E9DCFC39-BBD6-4CEF-9802-34CE70E119D6}" type="datetime1">
               <a:rPr lang="pt-PT" smtClean="0"/>
               <a:pPr/>
-              <a:t>02-02-2011</a:t>
+              <a:t>06-02-2011</a:t>
             </a:fld>
             <a:endParaRPr lang="pt-PT"/>
           </a:p>
@@ -3912,23 +3917,7 @@
                 </a:effectLst>
                 <a:latin typeface="MetaSerif-Book" pitchFamily="34" charset="0"/>
               </a:rPr>
-              <a:t>http://</a:t>
-            </a:r>
-            <a:r>
-              <a:rPr lang="pt-PT" sz="1000" dirty="0" smtClean="0">
-                <a:solidFill>
-                  <a:schemeClr val="bg1"/>
-                </a:solidFill>
-                <a:effectLst>
-                  <a:outerShdw blurRad="38100" dist="38100" dir="2700000" algn="tl">
-                    <a:srgbClr val="000000">
-                      <a:alpha val="43137"/>
-                    </a:srgbClr>
-                  </a:outerShdw>
-                </a:effectLst>
-                <a:latin typeface="MetaSerif-Book" pitchFamily="34" charset="0"/>
-              </a:rPr>
-              <a:t>www.flickr.com/photos/8095451@N08/</a:t>
+              <a:t>http://www.flickr.com/photos/8095451@N08/</a:t>
             </a:r>
             <a:endParaRPr lang="pt-PT" sz="1000" dirty="0">
               <a:solidFill>
@@ -4989,6 +4978,29 @@
               </a:spcBef>
               <a:buNone/>
             </a:pPr>
+            <a:r>
+              <a:rPr lang="pt-PT" sz="3600" dirty="0" smtClean="0">
+                <a:solidFill>
+                  <a:schemeClr val="tx1">
+                    <a:lumMod val="85000"/>
+                    <a:lumOff val="15000"/>
+                  </a:schemeClr>
+                </a:solidFill>
+                <a:latin typeface="MetaSerif-Book" pitchFamily="34" charset="0"/>
+              </a:rPr>
+              <a:t>Provide authorization</a:t>
+            </a:r>
+          </a:p>
+          <a:p>
+            <a:pPr indent="0" algn="ctr">
+              <a:lnSpc>
+                <a:spcPct val="110000"/>
+              </a:lnSpc>
+              <a:spcBef>
+                <a:spcPts val="0"/>
+              </a:spcBef>
+              <a:buNone/>
+            </a:pPr>
             <a:endParaRPr lang="pt-PT" sz="3600" dirty="0" smtClean="0">
               <a:solidFill>
                 <a:schemeClr val="tx1">
@@ -4998,6 +5010,72 @@
               </a:solidFill>
               <a:latin typeface="MetaSerif-Book" pitchFamily="34" charset="0"/>
             </a:endParaRPr>
+          </a:p>
+          <a:p>
+            <a:pPr indent="0" algn="ctr">
+              <a:lnSpc>
+                <a:spcPct val="110000"/>
+              </a:lnSpc>
+              <a:spcBef>
+                <a:spcPts val="0"/>
+              </a:spcBef>
+              <a:buNone/>
+            </a:pPr>
+            <a:r>
+              <a:rPr lang="pt-PT" sz="3600" dirty="0" smtClean="0">
+                <a:solidFill>
+                  <a:schemeClr val="tx1">
+                    <a:lumMod val="85000"/>
+                    <a:lumOff val="15000"/>
+                  </a:schemeClr>
+                </a:solidFill>
+                <a:latin typeface="MetaSerif-Book" pitchFamily="34" charset="0"/>
+              </a:rPr>
+              <a:t>Declarative authorization (CanCan)</a:t>
+            </a:r>
+          </a:p>
+          <a:p>
+            <a:pPr indent="0" algn="ctr">
+              <a:lnSpc>
+                <a:spcPct val="110000"/>
+              </a:lnSpc>
+              <a:spcBef>
+                <a:spcPts val="0"/>
+              </a:spcBef>
+              <a:buNone/>
+            </a:pPr>
+            <a:endParaRPr lang="pt-PT" sz="3600" dirty="0" smtClean="0">
+              <a:solidFill>
+                <a:schemeClr val="tx1">
+                  <a:lumMod val="85000"/>
+                  <a:lumOff val="15000"/>
+                </a:schemeClr>
+              </a:solidFill>
+              <a:latin typeface="MetaSerif-Book" pitchFamily="34" charset="0"/>
+            </a:endParaRPr>
+          </a:p>
+          <a:p>
+            <a:pPr indent="0" algn="ctr">
+              <a:lnSpc>
+                <a:spcPct val="110000"/>
+              </a:lnSpc>
+              <a:spcBef>
+                <a:spcPts val="0"/>
+              </a:spcBef>
+              <a:buNone/>
+            </a:pPr>
+            <a:r>
+              <a:rPr lang="pt-PT" sz="3600" dirty="0" smtClean="0">
+                <a:solidFill>
+                  <a:schemeClr val="tx1">
+                    <a:lumMod val="85000"/>
+                    <a:lumOff val="15000"/>
+                  </a:schemeClr>
+                </a:solidFill>
+                <a:latin typeface="MetaSerif-Book" pitchFamily="34" charset="0"/>
+              </a:rPr>
+              <a:t>Not very flexible...</a:t>
+            </a:r>
           </a:p>
         </p:txBody>
       </p:sp>
@@ -5057,32 +5135,6 @@
           <a:chExt cx="0" cy="0"/>
         </a:xfrm>
       </p:grpSpPr>
-      <p:pic>
-        <p:nvPicPr>
-          <p:cNvPr id="3074" name="Picture 2" descr="C:\Users\jgradim\Documents\thesis\presentations\old_books.jpg"/>
-          <p:cNvPicPr>
-            <a:picLocks noChangeAspect="1" noChangeArrowheads="1"/>
-          </p:cNvPicPr>
-          <p:nvPr/>
-        </p:nvPicPr>
-        <p:blipFill>
-          <a:blip r:embed="rId2" cstate="print"/>
-          <a:srcRect r="11066"/>
-          <a:stretch>
-            <a:fillRect/>
-          </a:stretch>
-        </p:blipFill>
-        <p:spPr bwMode="auto">
-          <a:xfrm>
-            <a:off x="0" y="0"/>
-            <a:ext cx="9144000" cy="6858000"/>
-          </a:xfrm>
-          <a:prstGeom prst="rect">
-            <a:avLst/>
-          </a:prstGeom>
-          <a:noFill/>
-        </p:spPr>
-      </p:pic>
       <p:sp>
         <p:nvSpPr>
           <p:cNvPr id="2" name="Title 1"/>
@@ -5095,8 +5147,8 @@
         </p:nvSpPr>
         <p:spPr>
           <a:xfrm>
-            <a:off x="0" y="2941730"/>
-            <a:ext cx="4644008" cy="974540"/>
+            <a:off x="5868144" y="188640"/>
+            <a:ext cx="3275856" cy="706090"/>
           </a:xfrm>
           <a:solidFill>
             <a:schemeClr val="tx1">
@@ -5105,22 +5157,22 @@
           </a:solidFill>
         </p:spPr>
         <p:txBody>
-          <a:bodyPr lIns="360000">
-            <a:noAutofit/>
+          <a:bodyPr rIns="144000">
+            <a:normAutofit/>
           </a:bodyPr>
           <a:lstStyle/>
           <a:p>
-            <a:pPr algn="l"/>
-            <a:r>
-              <a:rPr lang="pt-PT" sz="5400" dirty="0" smtClean="0">
+            <a:pPr algn="r"/>
+            <a:r>
+              <a:rPr lang="pt-PT" sz="3200" dirty="0" smtClean="0">
                 <a:solidFill>
                   <a:schemeClr val="bg1"/>
                 </a:solidFill>
                 <a:latin typeface="League Gothic" pitchFamily="50" charset="0"/>
               </a:rPr>
-              <a:t>Conclusions</a:t>
-            </a:r>
-            <a:endParaRPr lang="pt-PT" sz="5400" dirty="0">
+              <a:t>User Roles</a:t>
+            </a:r>
+            <a:endParaRPr lang="pt-PT" sz="1800" dirty="0">
               <a:solidFill>
                 <a:schemeClr val="bg1"/>
               </a:solidFill>
@@ -5131,56 +5183,25 @@
       </p:sp>
       <p:sp>
         <p:nvSpPr>
-          <p:cNvPr id="4" name="TextBox 3"/>
-          <p:cNvSpPr txBox="1"/>
-          <p:nvPr/>
-        </p:nvSpPr>
-        <p:spPr>
-          <a:xfrm>
-            <a:off x="1" y="6599813"/>
-            <a:ext cx="9144000" cy="246221"/>
-          </a:xfrm>
-          <a:prstGeom prst="rect">
-            <a:avLst/>
-          </a:prstGeom>
-          <a:noFill/>
-        </p:spPr>
-        <p:txBody>
-          <a:bodyPr wrap="square" rtlCol="0">
-            <a:spAutoFit/>
-          </a:bodyPr>
-          <a:lstStyle/>
-          <a:p>
-            <a:pPr algn="r"/>
-            <a:r>
-              <a:rPr lang="pt-PT" sz="1000" dirty="0" smtClean="0">
-                <a:solidFill>
-                  <a:schemeClr val="bg1"/>
-                </a:solidFill>
-                <a:effectLst>
-                  <a:outerShdw blurRad="38100" dist="38100" dir="2700000" algn="tl">
-                    <a:srgbClr val="000000">
-                      <a:alpha val="43137"/>
-                    </a:srgbClr>
-                  </a:outerShdw>
-                </a:effectLst>
-                <a:latin typeface="MetaSerif-Book" pitchFamily="34" charset="0"/>
-              </a:rPr>
-              <a:t>http://www.flickr.com/photos/ dklimke /</a:t>
-            </a:r>
-            <a:endParaRPr lang="pt-PT" sz="1000" dirty="0">
-              <a:solidFill>
-                <a:schemeClr val="bg1"/>
-              </a:solidFill>
-              <a:effectLst>
-                <a:outerShdw blurRad="38100" dist="38100" dir="2700000" algn="tl">
-                  <a:srgbClr val="000000">
-                    <a:alpha val="43137"/>
-                  </a:srgbClr>
-                </a:outerShdw>
-              </a:effectLst>
-              <a:latin typeface="MetaSerif-Book" pitchFamily="34" charset="0"/>
-            </a:endParaRPr>
+          <p:cNvPr id="4" name="Slide Number Placeholder 3"/>
+          <p:cNvSpPr>
+            <a:spLocks noGrp="1"/>
+          </p:cNvSpPr>
+          <p:nvPr>
+            <p:ph type="sldNum" sz="quarter" idx="12"/>
+          </p:nvPr>
+        </p:nvSpPr>
+        <p:spPr/>
+        <p:txBody>
+          <a:bodyPr/>
+          <a:lstStyle/>
+          <a:p>
+            <a:fld id="{AF2DD60D-AE1E-4B35-90D2-0ABAEDD7A6F5}" type="slidenum">
+              <a:rPr lang="pt-PT" smtClean="0"/>
+              <a:pPr/>
+              <a:t>16</a:t>
+            </a:fld>
+            <a:endParaRPr lang="pt-PT" dirty="0"/>
           </a:p>
         </p:txBody>
       </p:sp>
@@ -5251,9 +5272,9 @@
                 </a:solidFill>
                 <a:latin typeface="League Gothic" pitchFamily="50" charset="0"/>
               </a:rPr>
-              <a:t>AOMs</a:t>
-            </a:r>
-            <a:endParaRPr lang="pt-PT" sz="3200" dirty="0">
+              <a:t>Social Network</a:t>
+            </a:r>
+            <a:endParaRPr lang="pt-PT" sz="1800" dirty="0">
               <a:solidFill>
                 <a:schemeClr val="bg1"/>
               </a:solidFill>
@@ -5291,7 +5312,7 @@
           </a:bodyPr>
           <a:lstStyle/>
           <a:p>
-            <a:pPr indent="0">
+            <a:pPr indent="0" algn="ctr">
               <a:lnSpc>
                 <a:spcPct val="110000"/>
               </a:lnSpc>
@@ -5310,8 +5331,103 @@
                 </a:solidFill>
                 <a:latin typeface="MetaSerif-Book" pitchFamily="34" charset="0"/>
               </a:rPr>
-              <a:t>AOM architectures provide the best framework for building adaptable software systems</a:t>
-            </a:r>
+              <a:t>Completely dynamic</a:t>
+            </a:r>
+          </a:p>
+          <a:p>
+            <a:pPr indent="0" algn="ctr">
+              <a:lnSpc>
+                <a:spcPct val="110000"/>
+              </a:lnSpc>
+              <a:spcBef>
+                <a:spcPts val="0"/>
+              </a:spcBef>
+              <a:buNone/>
+            </a:pPr>
+            <a:endParaRPr lang="pt-PT" sz="3600" dirty="0" smtClean="0">
+              <a:solidFill>
+                <a:schemeClr val="tx1">
+                  <a:lumMod val="85000"/>
+                  <a:lumOff val="15000"/>
+                </a:schemeClr>
+              </a:solidFill>
+              <a:latin typeface="MetaSerif-Book" pitchFamily="34" charset="0"/>
+            </a:endParaRPr>
+          </a:p>
+          <a:p>
+            <a:pPr indent="0" algn="ctr">
+              <a:lnSpc>
+                <a:spcPct val="110000"/>
+              </a:lnSpc>
+              <a:spcBef>
+                <a:spcPts val="0"/>
+              </a:spcBef>
+              <a:buNone/>
+            </a:pPr>
+            <a:r>
+              <a:rPr lang="pt-PT" sz="3600" dirty="0" smtClean="0">
+                <a:solidFill>
+                  <a:schemeClr val="tx1">
+                    <a:lumMod val="85000"/>
+                    <a:lumOff val="15000"/>
+                  </a:schemeClr>
+                </a:solidFill>
+                <a:latin typeface="MetaSerif-Book" pitchFamily="34" charset="0"/>
+              </a:rPr>
+              <a:t>Built upon request, on runtime</a:t>
+            </a:r>
+          </a:p>
+          <a:p>
+            <a:pPr indent="0" algn="ctr">
+              <a:lnSpc>
+                <a:spcPct val="110000"/>
+              </a:lnSpc>
+              <a:spcBef>
+                <a:spcPts val="0"/>
+              </a:spcBef>
+              <a:buNone/>
+            </a:pPr>
+            <a:endParaRPr lang="pt-PT" sz="3600" dirty="0" smtClean="0">
+              <a:solidFill>
+                <a:schemeClr val="tx1">
+                  <a:lumMod val="85000"/>
+                  <a:lumOff val="15000"/>
+                </a:schemeClr>
+              </a:solidFill>
+              <a:latin typeface="MetaSerif-Book" pitchFamily="34" charset="0"/>
+            </a:endParaRPr>
+          </a:p>
+          <a:p>
+            <a:pPr indent="0" algn="ctr">
+              <a:lnSpc>
+                <a:spcPct val="110000"/>
+              </a:lnSpc>
+              <a:spcBef>
+                <a:spcPts val="0"/>
+              </a:spcBef>
+              <a:buNone/>
+            </a:pPr>
+            <a:r>
+              <a:rPr lang="pt-PT" sz="3600" dirty="0" smtClean="0">
+                <a:solidFill>
+                  <a:schemeClr val="tx1">
+                    <a:lumMod val="85000"/>
+                    <a:lumOff val="15000"/>
+                  </a:schemeClr>
+                </a:solidFill>
+                <a:latin typeface="MetaSerif-Book" pitchFamily="34" charset="0"/>
+              </a:rPr>
+              <a:t>Not very flexible...</a:t>
+            </a:r>
+            <a:endParaRPr lang="pt-PT" sz="3600" dirty="0" smtClean="0">
+              <a:solidFill>
+                <a:schemeClr val="tx1">
+                  <a:lumMod val="85000"/>
+                  <a:lumOff val="15000"/>
+                </a:schemeClr>
+              </a:solidFill>
+              <a:latin typeface="MetaSerif-Book" pitchFamily="34" charset="0"/>
+            </a:endParaRPr>
           </a:p>
         </p:txBody>
       </p:sp>
@@ -5406,9 +5522,9 @@
                 </a:solidFill>
                 <a:latin typeface="League Gothic" pitchFamily="50" charset="0"/>
               </a:rPr>
-              <a:t>Rails &amp; MVC</a:t>
-            </a:r>
-            <a:endParaRPr lang="pt-PT" sz="3200" dirty="0">
+              <a:t>Social Network</a:t>
+            </a:r>
+            <a:endParaRPr lang="pt-PT" sz="1800" dirty="0">
               <a:solidFill>
                 <a:schemeClr val="bg1"/>
               </a:solidFill>
@@ -5441,12 +5557,12 @@
           </a:effectLst>
         </p:spPr>
         <p:txBody>
-          <a:bodyPr anchor="ctr" anchorCtr="1">
+          <a:bodyPr vert="horz" anchor="ctr" anchorCtr="1">
             <a:normAutofit/>
           </a:bodyPr>
           <a:lstStyle/>
           <a:p>
-            <a:pPr indent="0">
+            <a:pPr indent="0" algn="ctr">
               <a:lnSpc>
                 <a:spcPct val="110000"/>
               </a:lnSpc>
@@ -5455,18 +5571,15 @@
               </a:spcBef>
               <a:buNone/>
             </a:pPr>
-            <a:r>
-              <a:rPr lang="pt-PT" sz="3600" dirty="0" smtClean="0">
-                <a:solidFill>
-                  <a:schemeClr val="tx1">
-                    <a:lumMod val="85000"/>
-                    <a:lumOff val="15000"/>
-                  </a:schemeClr>
-                </a:solidFill>
-                <a:latin typeface="MetaSerif-Book" pitchFamily="34" charset="0"/>
-              </a:rPr>
-              <a:t>MVC architecture used by Rails can coexist harmoniously with AOM design patterns, especially with the AR engine</a:t>
-            </a:r>
+            <a:endParaRPr lang="pt-PT" sz="3600" dirty="0" smtClean="0">
+              <a:solidFill>
+                <a:schemeClr val="tx1">
+                  <a:lumMod val="85000"/>
+                  <a:lumOff val="15000"/>
+                </a:schemeClr>
+              </a:solidFill>
+              <a:latin typeface="MetaSerif-Book" pitchFamily="34" charset="0"/>
+            </a:endParaRPr>
           </a:p>
         </p:txBody>
       </p:sp>
@@ -5561,9 +5674,9 @@
                 </a:solidFill>
                 <a:latin typeface="League Gothic" pitchFamily="50" charset="0"/>
               </a:rPr>
-              <a:t>Variability</a:t>
-            </a:r>
-            <a:endParaRPr lang="pt-PT" sz="3200" dirty="0">
+              <a:t>Document Editor</a:t>
+            </a:r>
+            <a:endParaRPr lang="pt-PT" sz="1800" dirty="0">
               <a:solidFill>
                 <a:schemeClr val="bg1"/>
               </a:solidFill>
@@ -5596,12 +5709,12 @@
           </a:effectLst>
         </p:spPr>
         <p:txBody>
-          <a:bodyPr anchor="ctr" anchorCtr="1">
+          <a:bodyPr vert="horz" anchor="ctr" anchorCtr="1">
             <a:normAutofit/>
           </a:bodyPr>
           <a:lstStyle/>
           <a:p>
-            <a:pPr indent="0">
+            <a:pPr indent="0" algn="ctr">
               <a:lnSpc>
                 <a:spcPct val="110000"/>
               </a:lnSpc>
@@ -5610,6 +5723,104 @@
               </a:spcBef>
               <a:buNone/>
             </a:pPr>
+            <a:r>
+              <a:rPr lang="pt-PT" sz="3600" dirty="0" smtClean="0">
+                <a:solidFill>
+                  <a:schemeClr val="tx1">
+                    <a:lumMod val="85000"/>
+                    <a:lumOff val="15000"/>
+                  </a:schemeClr>
+                </a:solidFill>
+                <a:latin typeface="MetaSerif-Book" pitchFamily="34" charset="0"/>
+              </a:rPr>
+              <a:t>One of the most used features</a:t>
+            </a:r>
+          </a:p>
+          <a:p>
+            <a:pPr indent="0" algn="ctr">
+              <a:lnSpc>
+                <a:spcPct val="110000"/>
+              </a:lnSpc>
+              <a:spcBef>
+                <a:spcPts val="0"/>
+              </a:spcBef>
+              <a:buNone/>
+            </a:pPr>
+            <a:endParaRPr lang="pt-PT" sz="3600" dirty="0" smtClean="0">
+              <a:solidFill>
+                <a:schemeClr val="tx1">
+                  <a:lumMod val="85000"/>
+                  <a:lumOff val="15000"/>
+                </a:schemeClr>
+              </a:solidFill>
+              <a:latin typeface="MetaSerif-Book" pitchFamily="34" charset="0"/>
+            </a:endParaRPr>
+          </a:p>
+          <a:p>
+            <a:pPr indent="0" algn="ctr">
+              <a:lnSpc>
+                <a:spcPct val="110000"/>
+              </a:lnSpc>
+              <a:spcBef>
+                <a:spcPts val="0"/>
+              </a:spcBef>
+              <a:buNone/>
+            </a:pPr>
+            <a:r>
+              <a:rPr lang="pt-PT" sz="3600" dirty="0" smtClean="0">
+                <a:solidFill>
+                  <a:schemeClr val="tx1">
+                    <a:lumMod val="85000"/>
+                    <a:lumOff val="15000"/>
+                  </a:schemeClr>
+                </a:solidFill>
+                <a:latin typeface="MetaSerif-Book" pitchFamily="34" charset="0"/>
+              </a:rPr>
+              <a:t>Many different types of content</a:t>
+            </a:r>
+          </a:p>
+          <a:p>
+            <a:pPr indent="0" algn="ctr">
+              <a:lnSpc>
+                <a:spcPct val="110000"/>
+              </a:lnSpc>
+              <a:spcBef>
+                <a:spcPts val="0"/>
+              </a:spcBef>
+              <a:buNone/>
+            </a:pPr>
+            <a:endParaRPr lang="pt-PT" sz="3600" dirty="0" smtClean="0">
+              <a:solidFill>
+                <a:schemeClr val="tx1">
+                  <a:lumMod val="85000"/>
+                  <a:lumOff val="15000"/>
+                </a:schemeClr>
+              </a:solidFill>
+              <a:latin typeface="MetaSerif-Book" pitchFamily="34" charset="0"/>
+            </a:endParaRPr>
+          </a:p>
+          <a:p>
+            <a:pPr indent="0" algn="ctr">
+              <a:lnSpc>
+                <a:spcPct val="110000"/>
+              </a:lnSpc>
+              <a:spcBef>
+                <a:spcPts val="0"/>
+              </a:spcBef>
+              <a:buNone/>
+            </a:pPr>
+            <a:r>
+              <a:rPr lang="pt-PT" sz="3600" dirty="0" smtClean="0">
+                <a:solidFill>
+                  <a:schemeClr val="tx1">
+                    <a:lumMod val="85000"/>
+                    <a:lumOff val="15000"/>
+                  </a:schemeClr>
+                </a:solidFill>
+                <a:latin typeface="MetaSerif-Book" pitchFamily="34" charset="0"/>
+              </a:rPr>
+              <a:t>Flexible, but too complex...</a:t>
+            </a:r>
             <a:endParaRPr lang="pt-PT" sz="3600" dirty="0" smtClean="0">
               <a:solidFill>
                 <a:schemeClr val="tx1">
@@ -5872,9 +6083,9 @@
                 </a:solidFill>
                 <a:latin typeface="League Gothic" pitchFamily="50" charset="0"/>
               </a:rPr>
-              <a:t>Performance</a:t>
-            </a:r>
-            <a:endParaRPr lang="pt-PT" sz="3200" dirty="0">
+              <a:t>Document Editor</a:t>
+            </a:r>
+            <a:endParaRPr lang="pt-PT" sz="1800" dirty="0">
               <a:solidFill>
                 <a:schemeClr val="bg1"/>
               </a:solidFill>
@@ -5907,12 +6118,12 @@
           </a:effectLst>
         </p:spPr>
         <p:txBody>
-          <a:bodyPr anchor="ctr" anchorCtr="1">
+          <a:bodyPr vert="horz" anchor="ctr" anchorCtr="1">
             <a:normAutofit/>
           </a:bodyPr>
           <a:lstStyle/>
           <a:p>
-            <a:pPr indent="0">
+            <a:pPr indent="0" algn="ctr">
               <a:lnSpc>
                 <a:spcPct val="110000"/>
               </a:lnSpc>
@@ -5921,18 +6132,15 @@
               </a:spcBef>
               <a:buNone/>
             </a:pPr>
-            <a:r>
-              <a:rPr lang="pt-PT" sz="3600" dirty="0" smtClean="0">
-                <a:solidFill>
-                  <a:schemeClr val="tx1">
-                    <a:lumMod val="85000"/>
-                    <a:lumOff val="15000"/>
-                  </a:schemeClr>
-                </a:solidFill>
-                <a:latin typeface="MetaSerif-Book" pitchFamily="34" charset="0"/>
-              </a:rPr>
-              <a:t>Performance can be increased</a:t>
-            </a:r>
+            <a:endParaRPr lang="pt-PT" sz="3600" dirty="0" smtClean="0">
+              <a:solidFill>
+                <a:schemeClr val="tx1">
+                  <a:lumMod val="85000"/>
+                  <a:lumOff val="15000"/>
+                </a:schemeClr>
+              </a:solidFill>
+              <a:latin typeface="MetaSerif-Book" pitchFamily="34" charset="0"/>
+            </a:endParaRPr>
           </a:p>
         </p:txBody>
       </p:sp>
@@ -5994,7 +6202,7 @@
       </p:grpSpPr>
       <p:pic>
         <p:nvPicPr>
-          <p:cNvPr id="3076" name="Picture 4" descr="C:\Users\jgradim\Documents\thesis\presentations\death_star.jpg"/>
+          <p:cNvPr id="3074" name="Picture 2" descr="C:\Users\jgradim\Documents\thesis\presentations\old_books.jpg"/>
           <p:cNvPicPr>
             <a:picLocks noChangeAspect="1" noChangeArrowheads="1"/>
           </p:cNvPicPr>
@@ -6002,7 +6210,7 @@
         </p:nvPicPr>
         <p:blipFill>
           <a:blip r:embed="rId2" cstate="print"/>
-          <a:srcRect r="2083"/>
+          <a:srcRect r="11066"/>
           <a:stretch>
             <a:fillRect/>
           </a:stretch>
@@ -6053,13 +6261,68 @@
                 </a:solidFill>
                 <a:latin typeface="League Gothic" pitchFamily="50" charset="0"/>
               </a:rPr>
-              <a:t>Further Work</a:t>
+              <a:t>Conclusions</a:t>
             </a:r>
             <a:endParaRPr lang="pt-PT" sz="5400" dirty="0">
               <a:solidFill>
                 <a:schemeClr val="bg1"/>
               </a:solidFill>
               <a:latin typeface="League Gothic" pitchFamily="50" charset="0"/>
+            </a:endParaRPr>
+          </a:p>
+        </p:txBody>
+      </p:sp>
+      <p:sp>
+        <p:nvSpPr>
+          <p:cNvPr id="4" name="TextBox 3"/>
+          <p:cNvSpPr txBox="1"/>
+          <p:nvPr/>
+        </p:nvSpPr>
+        <p:spPr>
+          <a:xfrm>
+            <a:off x="1" y="6599813"/>
+            <a:ext cx="9144000" cy="246221"/>
+          </a:xfrm>
+          <a:prstGeom prst="rect">
+            <a:avLst/>
+          </a:prstGeom>
+          <a:noFill/>
+        </p:spPr>
+        <p:txBody>
+          <a:bodyPr wrap="square" rtlCol="0">
+            <a:spAutoFit/>
+          </a:bodyPr>
+          <a:lstStyle/>
+          <a:p>
+            <a:pPr algn="r"/>
+            <a:r>
+              <a:rPr lang="pt-PT" sz="1000" dirty="0" smtClean="0">
+                <a:solidFill>
+                  <a:schemeClr val="bg1"/>
+                </a:solidFill>
+                <a:effectLst>
+                  <a:outerShdw blurRad="38100" dist="38100" dir="2700000" algn="tl">
+                    <a:srgbClr val="000000">
+                      <a:alpha val="43137"/>
+                    </a:srgbClr>
+                  </a:outerShdw>
+                </a:effectLst>
+                <a:latin typeface="MetaSerif-Book" pitchFamily="34" charset="0"/>
+              </a:rPr>
+              <a:t>http://www.flickr.com/photos/ dklimke /</a:t>
+            </a:r>
+            <a:endParaRPr lang="pt-PT" sz="1000" dirty="0">
+              <a:solidFill>
+                <a:schemeClr val="bg1"/>
+              </a:solidFill>
+              <a:effectLst>
+                <a:outerShdw blurRad="38100" dist="38100" dir="2700000" algn="tl">
+                  <a:srgbClr val="000000">
+                    <a:alpha val="43137"/>
+                  </a:srgbClr>
+                </a:outerShdw>
+              </a:effectLst>
+              <a:latin typeface="MetaSerif-Book" pitchFamily="34" charset="0"/>
             </a:endParaRPr>
           </a:p>
         </p:txBody>
@@ -6131,7 +6394,7 @@
                 </a:solidFill>
                 <a:latin typeface="League Gothic" pitchFamily="50" charset="0"/>
               </a:rPr>
-              <a:t>Implementation</a:t>
+              <a:t>AOMs</a:t>
             </a:r>
             <a:endParaRPr lang="pt-PT" sz="3200" dirty="0">
               <a:solidFill>
@@ -6166,7 +6429,7 @@
           </a:effectLst>
         </p:spPr>
         <p:txBody>
-          <a:bodyPr anchor="ctr" anchorCtr="1">
+          <a:bodyPr vert="horz" anchor="ctr" anchorCtr="1">
             <a:normAutofit/>
           </a:bodyPr>
           <a:lstStyle/>
@@ -6180,15 +6443,18 @@
               </a:spcBef>
               <a:buNone/>
             </a:pPr>
-            <a:endParaRPr lang="pt-PT" sz="3600" dirty="0" smtClean="0">
-              <a:solidFill>
-                <a:schemeClr val="tx1">
-                  <a:lumMod val="85000"/>
-                  <a:lumOff val="15000"/>
-                </a:schemeClr>
-              </a:solidFill>
-              <a:latin typeface="MetaSerif-Book" pitchFamily="34" charset="0"/>
-            </a:endParaRPr>
+            <a:r>
+              <a:rPr lang="pt-PT" sz="3600" dirty="0" smtClean="0">
+                <a:solidFill>
+                  <a:schemeClr val="tx1">
+                    <a:lumMod val="85000"/>
+                    <a:lumOff val="15000"/>
+                  </a:schemeClr>
+                </a:solidFill>
+                <a:latin typeface="MetaSerif-Book" pitchFamily="34" charset="0"/>
+              </a:rPr>
+              <a:t>AOM architectures provide the best framework for building adaptable software systems</a:t>
+            </a:r>
           </a:p>
         </p:txBody>
       </p:sp>
@@ -6283,7 +6549,162 @@
                 </a:solidFill>
                 <a:latin typeface="League Gothic" pitchFamily="50" charset="0"/>
               </a:rPr>
-              <a:t>Performance</a:t>
+              <a:t>Rails &amp; MVC</a:t>
+            </a:r>
+            <a:endParaRPr lang="pt-PT" sz="3200" dirty="0">
+              <a:solidFill>
+                <a:schemeClr val="bg1"/>
+              </a:solidFill>
+              <a:latin typeface="League Gothic" pitchFamily="50" charset="0"/>
+            </a:endParaRPr>
+          </a:p>
+        </p:txBody>
+      </p:sp>
+      <p:sp>
+        <p:nvSpPr>
+          <p:cNvPr id="3" name="Content Placeholder 2"/>
+          <p:cNvSpPr>
+            <a:spLocks noGrp="1"/>
+          </p:cNvSpPr>
+          <p:nvPr>
+            <p:ph idx="1"/>
+          </p:nvPr>
+        </p:nvSpPr>
+        <p:spPr>
+          <a:xfrm>
+            <a:off x="457200" y="1124744"/>
+            <a:ext cx="8229600" cy="5040560"/>
+          </a:xfrm>
+          <a:effectLst>
+            <a:outerShdw blurRad="50800" dist="25400" dir="2700000" algn="tl" rotWithShape="0">
+              <a:prstClr val="black">
+                <a:alpha val="15000"/>
+              </a:prstClr>
+            </a:outerShdw>
+          </a:effectLst>
+        </p:spPr>
+        <p:txBody>
+          <a:bodyPr anchor="ctr" anchorCtr="1">
+            <a:normAutofit/>
+          </a:bodyPr>
+          <a:lstStyle/>
+          <a:p>
+            <a:pPr indent="0">
+              <a:lnSpc>
+                <a:spcPct val="110000"/>
+              </a:lnSpc>
+              <a:spcBef>
+                <a:spcPts val="0"/>
+              </a:spcBef>
+              <a:buNone/>
+            </a:pPr>
+            <a:r>
+              <a:rPr lang="pt-PT" sz="3600" dirty="0" smtClean="0">
+                <a:solidFill>
+                  <a:schemeClr val="tx1">
+                    <a:lumMod val="85000"/>
+                    <a:lumOff val="15000"/>
+                  </a:schemeClr>
+                </a:solidFill>
+                <a:latin typeface="MetaSerif-Book" pitchFamily="34" charset="0"/>
+              </a:rPr>
+              <a:t>MVC architecture used by Rails can coexist harmoniously with AOM design patterns, especially with the AR engine</a:t>
+            </a:r>
+          </a:p>
+        </p:txBody>
+      </p:sp>
+      <p:sp>
+        <p:nvSpPr>
+          <p:cNvPr id="4" name="Slide Number Placeholder 3"/>
+          <p:cNvSpPr>
+            <a:spLocks noGrp="1"/>
+          </p:cNvSpPr>
+          <p:nvPr>
+            <p:ph type="sldNum" sz="quarter" idx="12"/>
+          </p:nvPr>
+        </p:nvSpPr>
+        <p:spPr/>
+        <p:txBody>
+          <a:bodyPr/>
+          <a:lstStyle/>
+          <a:p>
+            <a:fld id="{AF2DD60D-AE1E-4B35-90D2-0ABAEDD7A6F5}" type="slidenum">
+              <a:rPr lang="pt-PT" smtClean="0"/>
+              <a:pPr/>
+              <a:t>23</a:t>
+            </a:fld>
+            <a:endParaRPr lang="pt-PT" dirty="0"/>
+          </a:p>
+        </p:txBody>
+      </p:sp>
+    </p:spTree>
+  </p:cSld>
+  <p:clrMapOvr>
+    <a:masterClrMapping/>
+  </p:clrMapOvr>
+  <p:timing>
+    <p:tnLst>
+      <p:par>
+        <p:cTn id="1" dur="indefinite" restart="never" nodeType="tmRoot"/>
+      </p:par>
+    </p:tnLst>
+  </p:timing>
+</p:sld>
+</file>
+
+<file path=ppt/slides/slide24.xml><?xml version="1.0" encoding="utf-8"?>
+<p:sld xmlns:a="http://schemas.openxmlformats.org/drawingml/2006/main" xmlns:r="http://schemas.openxmlformats.org/officeDocument/2006/relationships" xmlns:p="http://schemas.openxmlformats.org/presentationml/2006/main">
+  <p:cSld>
+    <p:spTree>
+      <p:nvGrpSpPr>
+        <p:cNvPr id="1" name=""/>
+        <p:cNvGrpSpPr/>
+        <p:nvPr/>
+      </p:nvGrpSpPr>
+      <p:grpSpPr>
+        <a:xfrm>
+          <a:off x="0" y="0"/>
+          <a:ext cx="0" cy="0"/>
+          <a:chOff x="0" y="0"/>
+          <a:chExt cx="0" cy="0"/>
+        </a:xfrm>
+      </p:grpSpPr>
+      <p:sp>
+        <p:nvSpPr>
+          <p:cNvPr id="2" name="Title 1"/>
+          <p:cNvSpPr>
+            <a:spLocks noGrp="1"/>
+          </p:cNvSpPr>
+          <p:nvPr>
+            <p:ph type="title"/>
+          </p:nvPr>
+        </p:nvSpPr>
+        <p:spPr>
+          <a:xfrm>
+            <a:off x="5868144" y="188640"/>
+            <a:ext cx="3275856" cy="706090"/>
+          </a:xfrm>
+          <a:solidFill>
+            <a:schemeClr val="tx1">
+              <a:alpha val="90000"/>
+            </a:schemeClr>
+          </a:solidFill>
+        </p:spPr>
+        <p:txBody>
+          <a:bodyPr rIns="144000">
+            <a:normAutofit/>
+          </a:bodyPr>
+          <a:lstStyle/>
+          <a:p>
+            <a:pPr algn="r"/>
+            <a:r>
+              <a:rPr lang="pt-PT" sz="3200" dirty="0" smtClean="0">
+                <a:solidFill>
+                  <a:schemeClr val="bg1"/>
+                </a:solidFill>
+                <a:latin typeface="League Gothic" pitchFamily="50" charset="0"/>
+              </a:rPr>
+              <a:t>Variability</a:t>
             </a:r>
             <a:endParaRPr lang="pt-PT" sz="3200" dirty="0">
               <a:solidFill>
@@ -6362,7 +6783,570 @@
             <a:fld id="{AF2DD60D-AE1E-4B35-90D2-0ABAEDD7A6F5}" type="slidenum">
               <a:rPr lang="pt-PT" smtClean="0"/>
               <a:pPr/>
-              <a:t>23</a:t>
+              <a:t>24</a:t>
+            </a:fld>
+            <a:endParaRPr lang="pt-PT" dirty="0"/>
+          </a:p>
+        </p:txBody>
+      </p:sp>
+    </p:spTree>
+  </p:cSld>
+  <p:clrMapOvr>
+    <a:masterClrMapping/>
+  </p:clrMapOvr>
+  <p:timing>
+    <p:tnLst>
+      <p:par>
+        <p:cTn id="1" dur="indefinite" restart="never" nodeType="tmRoot"/>
+      </p:par>
+    </p:tnLst>
+  </p:timing>
+</p:sld>
+</file>
+
+<file path=ppt/slides/slide25.xml><?xml version="1.0" encoding="utf-8"?>
+<p:sld xmlns:a="http://schemas.openxmlformats.org/drawingml/2006/main" xmlns:r="http://schemas.openxmlformats.org/officeDocument/2006/relationships" xmlns:p="http://schemas.openxmlformats.org/presentationml/2006/main">
+  <p:cSld>
+    <p:spTree>
+      <p:nvGrpSpPr>
+        <p:cNvPr id="1" name=""/>
+        <p:cNvGrpSpPr/>
+        <p:nvPr/>
+      </p:nvGrpSpPr>
+      <p:grpSpPr>
+        <a:xfrm>
+          <a:off x="0" y="0"/>
+          <a:ext cx="0" cy="0"/>
+          <a:chOff x="0" y="0"/>
+          <a:chExt cx="0" cy="0"/>
+        </a:xfrm>
+      </p:grpSpPr>
+      <p:sp>
+        <p:nvSpPr>
+          <p:cNvPr id="2" name="Title 1"/>
+          <p:cNvSpPr>
+            <a:spLocks noGrp="1"/>
+          </p:cNvSpPr>
+          <p:nvPr>
+            <p:ph type="title"/>
+          </p:nvPr>
+        </p:nvSpPr>
+        <p:spPr>
+          <a:xfrm>
+            <a:off x="5868144" y="188640"/>
+            <a:ext cx="3275856" cy="706090"/>
+          </a:xfrm>
+          <a:solidFill>
+            <a:schemeClr val="tx1">
+              <a:alpha val="90000"/>
+            </a:schemeClr>
+          </a:solidFill>
+        </p:spPr>
+        <p:txBody>
+          <a:bodyPr rIns="144000">
+            <a:normAutofit/>
+          </a:bodyPr>
+          <a:lstStyle/>
+          <a:p>
+            <a:pPr algn="r"/>
+            <a:r>
+              <a:rPr lang="pt-PT" sz="3200" dirty="0" smtClean="0">
+                <a:solidFill>
+                  <a:schemeClr val="bg1"/>
+                </a:solidFill>
+                <a:latin typeface="League Gothic" pitchFamily="50" charset="0"/>
+              </a:rPr>
+              <a:t>Performance</a:t>
+            </a:r>
+            <a:endParaRPr lang="pt-PT" sz="3200" dirty="0">
+              <a:solidFill>
+                <a:schemeClr val="bg1"/>
+              </a:solidFill>
+              <a:latin typeface="League Gothic" pitchFamily="50" charset="0"/>
+            </a:endParaRPr>
+          </a:p>
+        </p:txBody>
+      </p:sp>
+      <p:sp>
+        <p:nvSpPr>
+          <p:cNvPr id="3" name="Content Placeholder 2"/>
+          <p:cNvSpPr>
+            <a:spLocks noGrp="1"/>
+          </p:cNvSpPr>
+          <p:nvPr>
+            <p:ph idx="1"/>
+          </p:nvPr>
+        </p:nvSpPr>
+        <p:spPr>
+          <a:xfrm>
+            <a:off x="457200" y="1124744"/>
+            <a:ext cx="8229600" cy="5040560"/>
+          </a:xfrm>
+          <a:effectLst>
+            <a:outerShdw blurRad="50800" dist="25400" dir="2700000" algn="tl" rotWithShape="0">
+              <a:prstClr val="black">
+                <a:alpha val="15000"/>
+              </a:prstClr>
+            </a:outerShdw>
+          </a:effectLst>
+        </p:spPr>
+        <p:txBody>
+          <a:bodyPr anchor="ctr" anchorCtr="1">
+            <a:normAutofit/>
+          </a:bodyPr>
+          <a:lstStyle/>
+          <a:p>
+            <a:pPr indent="0">
+              <a:lnSpc>
+                <a:spcPct val="110000"/>
+              </a:lnSpc>
+              <a:spcBef>
+                <a:spcPts val="0"/>
+              </a:spcBef>
+              <a:buNone/>
+            </a:pPr>
+            <a:r>
+              <a:rPr lang="pt-PT" sz="3600" dirty="0" smtClean="0">
+                <a:solidFill>
+                  <a:schemeClr val="tx1">
+                    <a:lumMod val="85000"/>
+                    <a:lumOff val="15000"/>
+                  </a:schemeClr>
+                </a:solidFill>
+                <a:latin typeface="MetaSerif-Book" pitchFamily="34" charset="0"/>
+              </a:rPr>
+              <a:t>Performance can be increased</a:t>
+            </a:r>
+          </a:p>
+        </p:txBody>
+      </p:sp>
+      <p:sp>
+        <p:nvSpPr>
+          <p:cNvPr id="4" name="Slide Number Placeholder 3"/>
+          <p:cNvSpPr>
+            <a:spLocks noGrp="1"/>
+          </p:cNvSpPr>
+          <p:nvPr>
+            <p:ph type="sldNum" sz="quarter" idx="12"/>
+          </p:nvPr>
+        </p:nvSpPr>
+        <p:spPr/>
+        <p:txBody>
+          <a:bodyPr/>
+          <a:lstStyle/>
+          <a:p>
+            <a:fld id="{AF2DD60D-AE1E-4B35-90D2-0ABAEDD7A6F5}" type="slidenum">
+              <a:rPr lang="pt-PT" smtClean="0"/>
+              <a:pPr/>
+              <a:t>25</a:t>
+            </a:fld>
+            <a:endParaRPr lang="pt-PT" dirty="0"/>
+          </a:p>
+        </p:txBody>
+      </p:sp>
+    </p:spTree>
+  </p:cSld>
+  <p:clrMapOvr>
+    <a:masterClrMapping/>
+  </p:clrMapOvr>
+  <p:timing>
+    <p:tnLst>
+      <p:par>
+        <p:cTn id="1" dur="indefinite" restart="never" nodeType="tmRoot"/>
+      </p:par>
+    </p:tnLst>
+  </p:timing>
+</p:sld>
+</file>
+
+<file path=ppt/slides/slide26.xml><?xml version="1.0" encoding="utf-8"?>
+<p:sld xmlns:a="http://schemas.openxmlformats.org/drawingml/2006/main" xmlns:r="http://schemas.openxmlformats.org/officeDocument/2006/relationships" xmlns:p="http://schemas.openxmlformats.org/presentationml/2006/main">
+  <p:cSld>
+    <p:spTree>
+      <p:nvGrpSpPr>
+        <p:cNvPr id="1" name=""/>
+        <p:cNvGrpSpPr/>
+        <p:nvPr/>
+      </p:nvGrpSpPr>
+      <p:grpSpPr>
+        <a:xfrm>
+          <a:off x="0" y="0"/>
+          <a:ext cx="0" cy="0"/>
+          <a:chOff x="0" y="0"/>
+          <a:chExt cx="0" cy="0"/>
+        </a:xfrm>
+      </p:grpSpPr>
+      <p:pic>
+        <p:nvPicPr>
+          <p:cNvPr id="3076" name="Picture 4" descr="C:\Users\jgradim\Documents\thesis\presentations\death_star.jpg"/>
+          <p:cNvPicPr>
+            <a:picLocks noChangeAspect="1" noChangeArrowheads="1"/>
+          </p:cNvPicPr>
+          <p:nvPr/>
+        </p:nvPicPr>
+        <p:blipFill>
+          <a:blip r:embed="rId2" cstate="print"/>
+          <a:srcRect r="2083"/>
+          <a:stretch>
+            <a:fillRect/>
+          </a:stretch>
+        </p:blipFill>
+        <p:spPr bwMode="auto">
+          <a:xfrm>
+            <a:off x="0" y="0"/>
+            <a:ext cx="9144000" cy="6858000"/>
+          </a:xfrm>
+          <a:prstGeom prst="rect">
+            <a:avLst/>
+          </a:prstGeom>
+          <a:noFill/>
+        </p:spPr>
+      </p:pic>
+      <p:sp>
+        <p:nvSpPr>
+          <p:cNvPr id="2" name="Title 1"/>
+          <p:cNvSpPr>
+            <a:spLocks noGrp="1"/>
+          </p:cNvSpPr>
+          <p:nvPr>
+            <p:ph type="title"/>
+          </p:nvPr>
+        </p:nvSpPr>
+        <p:spPr>
+          <a:xfrm>
+            <a:off x="0" y="2941730"/>
+            <a:ext cx="4644008" cy="974540"/>
+          </a:xfrm>
+          <a:solidFill>
+            <a:schemeClr val="tx1">
+              <a:alpha val="90000"/>
+            </a:schemeClr>
+          </a:solidFill>
+        </p:spPr>
+        <p:txBody>
+          <a:bodyPr lIns="360000">
+            <a:noAutofit/>
+          </a:bodyPr>
+          <a:lstStyle/>
+          <a:p>
+            <a:pPr algn="l"/>
+            <a:r>
+              <a:rPr lang="pt-PT" sz="5400" dirty="0" smtClean="0">
+                <a:solidFill>
+                  <a:schemeClr val="bg1"/>
+                </a:solidFill>
+                <a:latin typeface="League Gothic" pitchFamily="50" charset="0"/>
+              </a:rPr>
+              <a:t>Further Work</a:t>
+            </a:r>
+            <a:endParaRPr lang="pt-PT" sz="5400" dirty="0">
+              <a:solidFill>
+                <a:schemeClr val="bg1"/>
+              </a:solidFill>
+              <a:latin typeface="League Gothic" pitchFamily="50" charset="0"/>
+            </a:endParaRPr>
+          </a:p>
+        </p:txBody>
+      </p:sp>
+    </p:spTree>
+  </p:cSld>
+  <p:clrMapOvr>
+    <a:masterClrMapping/>
+  </p:clrMapOvr>
+  <p:timing>
+    <p:tnLst>
+      <p:par>
+        <p:cTn id="1" dur="indefinite" restart="never" nodeType="tmRoot"/>
+      </p:par>
+    </p:tnLst>
+  </p:timing>
+</p:sld>
+</file>
+
+<file path=ppt/slides/slide27.xml><?xml version="1.0" encoding="utf-8"?>
+<p:sld xmlns:a="http://schemas.openxmlformats.org/drawingml/2006/main" xmlns:r="http://schemas.openxmlformats.org/officeDocument/2006/relationships" xmlns:p="http://schemas.openxmlformats.org/presentationml/2006/main">
+  <p:cSld>
+    <p:spTree>
+      <p:nvGrpSpPr>
+        <p:cNvPr id="1" name=""/>
+        <p:cNvGrpSpPr/>
+        <p:nvPr/>
+      </p:nvGrpSpPr>
+      <p:grpSpPr>
+        <a:xfrm>
+          <a:off x="0" y="0"/>
+          <a:ext cx="0" cy="0"/>
+          <a:chOff x="0" y="0"/>
+          <a:chExt cx="0" cy="0"/>
+        </a:xfrm>
+      </p:grpSpPr>
+      <p:sp>
+        <p:nvSpPr>
+          <p:cNvPr id="2" name="Title 1"/>
+          <p:cNvSpPr>
+            <a:spLocks noGrp="1"/>
+          </p:cNvSpPr>
+          <p:nvPr>
+            <p:ph type="title"/>
+          </p:nvPr>
+        </p:nvSpPr>
+        <p:spPr>
+          <a:xfrm>
+            <a:off x="5868144" y="188640"/>
+            <a:ext cx="3275856" cy="706090"/>
+          </a:xfrm>
+          <a:solidFill>
+            <a:schemeClr val="tx1">
+              <a:alpha val="90000"/>
+            </a:schemeClr>
+          </a:solidFill>
+        </p:spPr>
+        <p:txBody>
+          <a:bodyPr rIns="144000">
+            <a:normAutofit/>
+          </a:bodyPr>
+          <a:lstStyle/>
+          <a:p>
+            <a:pPr algn="r"/>
+            <a:r>
+              <a:rPr lang="pt-PT" sz="3200" dirty="0" smtClean="0">
+                <a:solidFill>
+                  <a:schemeClr val="bg1"/>
+                </a:solidFill>
+                <a:latin typeface="League Gothic" pitchFamily="50" charset="0"/>
+              </a:rPr>
+              <a:t>Implementation</a:t>
+            </a:r>
+            <a:endParaRPr lang="pt-PT" sz="3200" dirty="0">
+              <a:solidFill>
+                <a:schemeClr val="bg1"/>
+              </a:solidFill>
+              <a:latin typeface="League Gothic" pitchFamily="50" charset="0"/>
+            </a:endParaRPr>
+          </a:p>
+        </p:txBody>
+      </p:sp>
+      <p:sp>
+        <p:nvSpPr>
+          <p:cNvPr id="3" name="Content Placeholder 2"/>
+          <p:cNvSpPr>
+            <a:spLocks noGrp="1"/>
+          </p:cNvSpPr>
+          <p:nvPr>
+            <p:ph idx="1"/>
+          </p:nvPr>
+        </p:nvSpPr>
+        <p:spPr>
+          <a:xfrm>
+            <a:off x="457200" y="1124744"/>
+            <a:ext cx="8229600" cy="5040560"/>
+          </a:xfrm>
+          <a:effectLst>
+            <a:outerShdw blurRad="50800" dist="25400" dir="2700000" algn="tl" rotWithShape="0">
+              <a:prstClr val="black">
+                <a:alpha val="15000"/>
+              </a:prstClr>
+            </a:outerShdw>
+          </a:effectLst>
+        </p:spPr>
+        <p:txBody>
+          <a:bodyPr anchor="ctr" anchorCtr="1">
+            <a:normAutofit/>
+          </a:bodyPr>
+          <a:lstStyle/>
+          <a:p>
+            <a:pPr indent="0">
+              <a:lnSpc>
+                <a:spcPct val="110000"/>
+              </a:lnSpc>
+              <a:spcBef>
+                <a:spcPts val="0"/>
+              </a:spcBef>
+              <a:buNone/>
+            </a:pPr>
+            <a:endParaRPr lang="pt-PT" sz="3600" dirty="0" smtClean="0">
+              <a:solidFill>
+                <a:schemeClr val="tx1">
+                  <a:lumMod val="85000"/>
+                  <a:lumOff val="15000"/>
+                </a:schemeClr>
+              </a:solidFill>
+              <a:latin typeface="MetaSerif-Book" pitchFamily="34" charset="0"/>
+            </a:endParaRPr>
+          </a:p>
+        </p:txBody>
+      </p:sp>
+      <p:sp>
+        <p:nvSpPr>
+          <p:cNvPr id="4" name="Slide Number Placeholder 3"/>
+          <p:cNvSpPr>
+            <a:spLocks noGrp="1"/>
+          </p:cNvSpPr>
+          <p:nvPr>
+            <p:ph type="sldNum" sz="quarter" idx="12"/>
+          </p:nvPr>
+        </p:nvSpPr>
+        <p:spPr/>
+        <p:txBody>
+          <a:bodyPr/>
+          <a:lstStyle/>
+          <a:p>
+            <a:fld id="{AF2DD60D-AE1E-4B35-90D2-0ABAEDD7A6F5}" type="slidenum">
+              <a:rPr lang="pt-PT" smtClean="0"/>
+              <a:pPr/>
+              <a:t>27</a:t>
+            </a:fld>
+            <a:endParaRPr lang="pt-PT" dirty="0"/>
+          </a:p>
+        </p:txBody>
+      </p:sp>
+    </p:spTree>
+  </p:cSld>
+  <p:clrMapOvr>
+    <a:masterClrMapping/>
+  </p:clrMapOvr>
+  <p:timing>
+    <p:tnLst>
+      <p:par>
+        <p:cTn id="1" dur="indefinite" restart="never" nodeType="tmRoot"/>
+      </p:par>
+    </p:tnLst>
+  </p:timing>
+</p:sld>
+</file>
+
+<file path=ppt/slides/slide28.xml><?xml version="1.0" encoding="utf-8"?>
+<p:sld xmlns:a="http://schemas.openxmlformats.org/drawingml/2006/main" xmlns:r="http://schemas.openxmlformats.org/officeDocument/2006/relationships" xmlns:p="http://schemas.openxmlformats.org/presentationml/2006/main">
+  <p:cSld>
+    <p:spTree>
+      <p:nvGrpSpPr>
+        <p:cNvPr id="1" name=""/>
+        <p:cNvGrpSpPr/>
+        <p:nvPr/>
+      </p:nvGrpSpPr>
+      <p:grpSpPr>
+        <a:xfrm>
+          <a:off x="0" y="0"/>
+          <a:ext cx="0" cy="0"/>
+          <a:chOff x="0" y="0"/>
+          <a:chExt cx="0" cy="0"/>
+        </a:xfrm>
+      </p:grpSpPr>
+      <p:sp>
+        <p:nvSpPr>
+          <p:cNvPr id="2" name="Title 1"/>
+          <p:cNvSpPr>
+            <a:spLocks noGrp="1"/>
+          </p:cNvSpPr>
+          <p:nvPr>
+            <p:ph type="title"/>
+          </p:nvPr>
+        </p:nvSpPr>
+        <p:spPr>
+          <a:xfrm>
+            <a:off x="5868144" y="188640"/>
+            <a:ext cx="3275856" cy="706090"/>
+          </a:xfrm>
+          <a:solidFill>
+            <a:schemeClr val="tx1">
+              <a:alpha val="90000"/>
+            </a:schemeClr>
+          </a:solidFill>
+        </p:spPr>
+        <p:txBody>
+          <a:bodyPr rIns="144000">
+            <a:normAutofit/>
+          </a:bodyPr>
+          <a:lstStyle/>
+          <a:p>
+            <a:pPr algn="r"/>
+            <a:r>
+              <a:rPr lang="pt-PT" sz="3200" dirty="0" smtClean="0">
+                <a:solidFill>
+                  <a:schemeClr val="bg1"/>
+                </a:solidFill>
+                <a:latin typeface="League Gothic" pitchFamily="50" charset="0"/>
+              </a:rPr>
+              <a:t>Performance</a:t>
+            </a:r>
+            <a:endParaRPr lang="pt-PT" sz="3200" dirty="0">
+              <a:solidFill>
+                <a:schemeClr val="bg1"/>
+              </a:solidFill>
+              <a:latin typeface="League Gothic" pitchFamily="50" charset="0"/>
+            </a:endParaRPr>
+          </a:p>
+        </p:txBody>
+      </p:sp>
+      <p:sp>
+        <p:nvSpPr>
+          <p:cNvPr id="3" name="Content Placeholder 2"/>
+          <p:cNvSpPr>
+            <a:spLocks noGrp="1"/>
+          </p:cNvSpPr>
+          <p:nvPr>
+            <p:ph idx="1"/>
+          </p:nvPr>
+        </p:nvSpPr>
+        <p:spPr>
+          <a:xfrm>
+            <a:off x="457200" y="1124744"/>
+            <a:ext cx="8229600" cy="5040560"/>
+          </a:xfrm>
+          <a:effectLst>
+            <a:outerShdw blurRad="50800" dist="25400" dir="2700000" algn="tl" rotWithShape="0">
+              <a:prstClr val="black">
+                <a:alpha val="15000"/>
+              </a:prstClr>
+            </a:outerShdw>
+          </a:effectLst>
+        </p:spPr>
+        <p:txBody>
+          <a:bodyPr anchor="ctr" anchorCtr="1">
+            <a:normAutofit/>
+          </a:bodyPr>
+          <a:lstStyle/>
+          <a:p>
+            <a:pPr indent="0">
+              <a:lnSpc>
+                <a:spcPct val="110000"/>
+              </a:lnSpc>
+              <a:spcBef>
+                <a:spcPts val="0"/>
+              </a:spcBef>
+              <a:buNone/>
+            </a:pPr>
+            <a:endParaRPr lang="pt-PT" sz="3600" dirty="0" smtClean="0">
+              <a:solidFill>
+                <a:schemeClr val="tx1">
+                  <a:lumMod val="85000"/>
+                  <a:lumOff val="15000"/>
+                </a:schemeClr>
+              </a:solidFill>
+              <a:latin typeface="MetaSerif-Book" pitchFamily="34" charset="0"/>
+            </a:endParaRPr>
+          </a:p>
+        </p:txBody>
+      </p:sp>
+      <p:sp>
+        <p:nvSpPr>
+          <p:cNvPr id="4" name="Slide Number Placeholder 3"/>
+          <p:cNvSpPr>
+            <a:spLocks noGrp="1"/>
+          </p:cNvSpPr>
+          <p:nvPr>
+            <p:ph type="sldNum" sz="quarter" idx="12"/>
+          </p:nvPr>
+        </p:nvSpPr>
+        <p:spPr/>
+        <p:txBody>
+          <a:bodyPr/>
+          <a:lstStyle/>
+          <a:p>
+            <a:fld id="{AF2DD60D-AE1E-4B35-90D2-0ABAEDD7A6F5}" type="slidenum">
+              <a:rPr lang="pt-PT" smtClean="0"/>
+              <a:pPr/>
+              <a:t>28</a:t>
             </a:fld>
             <a:endParaRPr lang="pt-PT" dirty="0"/>
           </a:p>

</xml_diff>

<commit_message>
Added before/after diagrams figures
</commit_message>
<xml_diff>
--- a/presentations/jgradim-presentation.pptx
+++ b/presentations/jgradim-presentation.pptx
@@ -5,7 +5,7 @@
     <p:sldMasterId id="2147483648" r:id="rId1"/>
   </p:sldMasterIdLst>
   <p:notesMasterIdLst>
-    <p:notesMasterId r:id="rId30"/>
+    <p:notesMasterId r:id="rId33"/>
   </p:notesMasterIdLst>
   <p:sldIdLst>
     <p:sldId id="256" r:id="rId2"/>
@@ -24,18 +24,21 @@
     <p:sldId id="263" r:id="rId15"/>
     <p:sldId id="280" r:id="rId16"/>
     <p:sldId id="282" r:id="rId17"/>
-    <p:sldId id="283" r:id="rId18"/>
-    <p:sldId id="285" r:id="rId19"/>
-    <p:sldId id="284" r:id="rId20"/>
-    <p:sldId id="286" r:id="rId21"/>
-    <p:sldId id="259" r:id="rId22"/>
-    <p:sldId id="279" r:id="rId23"/>
-    <p:sldId id="264" r:id="rId24"/>
-    <p:sldId id="269" r:id="rId25"/>
-    <p:sldId id="270" r:id="rId26"/>
-    <p:sldId id="266" r:id="rId27"/>
-    <p:sldId id="267" r:id="rId28"/>
-    <p:sldId id="268" r:id="rId29"/>
+    <p:sldId id="287" r:id="rId18"/>
+    <p:sldId id="283" r:id="rId19"/>
+    <p:sldId id="285" r:id="rId20"/>
+    <p:sldId id="288" r:id="rId21"/>
+    <p:sldId id="284" r:id="rId22"/>
+    <p:sldId id="289" r:id="rId23"/>
+    <p:sldId id="286" r:id="rId24"/>
+    <p:sldId id="259" r:id="rId25"/>
+    <p:sldId id="279" r:id="rId26"/>
+    <p:sldId id="264" r:id="rId27"/>
+    <p:sldId id="269" r:id="rId28"/>
+    <p:sldId id="270" r:id="rId29"/>
+    <p:sldId id="266" r:id="rId30"/>
+    <p:sldId id="267" r:id="rId31"/>
+    <p:sldId id="268" r:id="rId32"/>
   </p:sldIdLst>
   <p:sldSz cx="9144000" cy="6858000" type="screen4x3"/>
   <p:notesSz cx="6858000" cy="9144000"/>
@@ -220,7 +223,7 @@
             <a:fld id="{A4A9652A-D4BF-41F5-B3CF-F03C6BFD8852}" type="datetimeFigureOut">
               <a:rPr lang="pt-PT" smtClean="0"/>
               <a:pPr/>
-              <a:t>06-02-2011</a:t>
+              <a:t>07-02-2011</a:t>
             </a:fld>
             <a:endParaRPr lang="pt-PT"/>
           </a:p>
@@ -676,7 +679,7 @@
             <a:fld id="{B21DA5EC-CDBD-4BE5-AFEC-D05D842E9DCA}" type="datetime1">
               <a:rPr lang="pt-PT" smtClean="0"/>
               <a:pPr/>
-              <a:t>06-02-2011</a:t>
+              <a:t>07-02-2011</a:t>
             </a:fld>
             <a:endParaRPr lang="pt-PT"/>
           </a:p>
@@ -851,7 +854,7 @@
             <a:fld id="{265ABC6D-62B8-444F-8CBB-55DA24843F08}" type="datetime1">
               <a:rPr lang="pt-PT" smtClean="0"/>
               <a:pPr/>
-              <a:t>06-02-2011</a:t>
+              <a:t>07-02-2011</a:t>
             </a:fld>
             <a:endParaRPr lang="pt-PT"/>
           </a:p>
@@ -1036,7 +1039,7 @@
             <a:fld id="{642BB447-BC74-408D-87E2-151F2C4E6D5C}" type="datetime1">
               <a:rPr lang="pt-PT" smtClean="0"/>
               <a:pPr/>
-              <a:t>06-02-2011</a:t>
+              <a:t>07-02-2011</a:t>
             </a:fld>
             <a:endParaRPr lang="pt-PT"/>
           </a:p>
@@ -1264,7 +1267,7 @@
             <a:fld id="{1AE16238-79D5-4CE1-9F7C-9EB0DB09B684}" type="datetime1">
               <a:rPr lang="pt-PT" smtClean="0"/>
               <a:pPr/>
-              <a:t>06-02-2011</a:t>
+              <a:t>07-02-2011</a:t>
             </a:fld>
             <a:endParaRPr lang="pt-PT"/>
           </a:p>
@@ -1522,7 +1525,7 @@
             <a:fld id="{29EC9118-B484-4893-9D08-9848F3CE7FF2}" type="datetime1">
               <a:rPr lang="pt-PT" smtClean="0"/>
               <a:pPr/>
-              <a:t>06-02-2011</a:t>
+              <a:t>07-02-2011</a:t>
             </a:fld>
             <a:endParaRPr lang="pt-PT"/>
           </a:p>
@@ -1815,7 +1818,7 @@
             <a:fld id="{93295FF2-CB18-49BE-8735-588EA2A78858}" type="datetime1">
               <a:rPr lang="pt-PT" smtClean="0"/>
               <a:pPr/>
-              <a:t>06-02-2011</a:t>
+              <a:t>07-02-2011</a:t>
             </a:fld>
             <a:endParaRPr lang="pt-PT"/>
           </a:p>
@@ -2242,7 +2245,7 @@
             <a:fld id="{50896DA6-8084-488D-9E6B-45E32377C613}" type="datetime1">
               <a:rPr lang="pt-PT" smtClean="0"/>
               <a:pPr/>
-              <a:t>06-02-2011</a:t>
+              <a:t>07-02-2011</a:t>
             </a:fld>
             <a:endParaRPr lang="pt-PT"/>
           </a:p>
@@ -2365,7 +2368,7 @@
             <a:fld id="{40926C83-C8D3-48F0-B08F-F8259B57109C}" type="datetime1">
               <a:rPr lang="pt-PT" smtClean="0"/>
               <a:pPr/>
-              <a:t>06-02-2011</a:t>
+              <a:t>07-02-2011</a:t>
             </a:fld>
             <a:endParaRPr lang="pt-PT"/>
           </a:p>
@@ -2465,7 +2468,7 @@
             <a:fld id="{379D2EB6-009D-45E0-886C-0BF1B142AD62}" type="datetime1">
               <a:rPr lang="pt-PT" smtClean="0"/>
               <a:pPr/>
-              <a:t>06-02-2011</a:t>
+              <a:t>07-02-2011</a:t>
             </a:fld>
             <a:endParaRPr lang="pt-PT"/>
           </a:p>
@@ -2747,7 +2750,7 @@
             <a:fld id="{D9720365-511F-43DE-9BF0-D286DA1D7131}" type="datetime1">
               <a:rPr lang="pt-PT" smtClean="0"/>
               <a:pPr/>
-              <a:t>06-02-2011</a:t>
+              <a:t>07-02-2011</a:t>
             </a:fld>
             <a:endParaRPr lang="pt-PT"/>
           </a:p>
@@ -3005,7 +3008,7 @@
             <a:fld id="{E9DCFC39-BBD6-4CEF-9802-34CE70E119D6}" type="datetime1">
               <a:rPr lang="pt-PT" smtClean="0"/>
               <a:pPr/>
-              <a:t>06-02-2011</a:t>
+              <a:t>07-02-2011</a:t>
             </a:fld>
             <a:endParaRPr lang="pt-PT"/>
           </a:p>
@@ -5205,6 +5208,39 @@
           </a:p>
         </p:txBody>
       </p:sp>
+      <p:pic>
+        <p:nvPicPr>
+          <p:cNvPr id="1026" name="Picture 2" descr="C:\Users\jgradim\Documents\thesis\presentations\images\user_roles_current.png"/>
+          <p:cNvPicPr>
+            <a:picLocks noChangeAspect="1" noChangeArrowheads="1"/>
+          </p:cNvPicPr>
+          <p:nvPr/>
+        </p:nvPicPr>
+        <p:blipFill>
+          <a:blip r:embed="rId2" cstate="print"/>
+          <a:srcRect/>
+          <a:stretch>
+            <a:fillRect/>
+          </a:stretch>
+        </p:blipFill>
+        <p:spPr bwMode="auto">
+          <a:xfrm>
+            <a:off x="328448" y="692696"/>
+            <a:ext cx="8276000" cy="5666259"/>
+          </a:xfrm>
+          <a:prstGeom prst="rect">
+            <a:avLst/>
+          </a:prstGeom>
+          <a:noFill/>
+          <a:effectLst>
+            <a:outerShdw blurRad="50800" dist="38100" dir="2700000" algn="tl" rotWithShape="0">
+              <a:prstClr val="black">
+                <a:alpha val="40000"/>
+              </a:prstClr>
+            </a:outerShdw>
+          </a:effectLst>
+        </p:spPr>
+      </p:pic>
     </p:spTree>
   </p:cSld>
   <p:clrMapOvr>
@@ -5272,7 +5308,7 @@
                 </a:solidFill>
                 <a:latin typeface="League Gothic" pitchFamily="50" charset="0"/>
               </a:rPr>
-              <a:t>Social Network</a:t>
+              <a:t>User Roles</a:t>
             </a:r>
             <a:endParaRPr lang="pt-PT" sz="1800" dirty="0">
               <a:solidFill>
@@ -5285,154 +5321,6 @@
       </p:sp>
       <p:sp>
         <p:nvSpPr>
-          <p:cNvPr id="3" name="Content Placeholder 2"/>
-          <p:cNvSpPr>
-            <a:spLocks noGrp="1"/>
-          </p:cNvSpPr>
-          <p:nvPr>
-            <p:ph idx="1"/>
-          </p:nvPr>
-        </p:nvSpPr>
-        <p:spPr>
-          <a:xfrm>
-            <a:off x="457200" y="1124744"/>
-            <a:ext cx="8229600" cy="5040560"/>
-          </a:xfrm>
-          <a:effectLst>
-            <a:outerShdw blurRad="50800" dist="25400" dir="2700000" algn="tl" rotWithShape="0">
-              <a:prstClr val="black">
-                <a:alpha val="15000"/>
-              </a:prstClr>
-            </a:outerShdw>
-          </a:effectLst>
-        </p:spPr>
-        <p:txBody>
-          <a:bodyPr vert="horz" anchor="ctr" anchorCtr="1">
-            <a:normAutofit/>
-          </a:bodyPr>
-          <a:lstStyle/>
-          <a:p>
-            <a:pPr indent="0" algn="ctr">
-              <a:lnSpc>
-                <a:spcPct val="110000"/>
-              </a:lnSpc>
-              <a:spcBef>
-                <a:spcPts val="0"/>
-              </a:spcBef>
-              <a:buNone/>
-            </a:pPr>
-            <a:r>
-              <a:rPr lang="pt-PT" sz="3600" dirty="0" smtClean="0">
-                <a:solidFill>
-                  <a:schemeClr val="tx1">
-                    <a:lumMod val="85000"/>
-                    <a:lumOff val="15000"/>
-                  </a:schemeClr>
-                </a:solidFill>
-                <a:latin typeface="MetaSerif-Book" pitchFamily="34" charset="0"/>
-              </a:rPr>
-              <a:t>Completely dynamic</a:t>
-            </a:r>
-          </a:p>
-          <a:p>
-            <a:pPr indent="0" algn="ctr">
-              <a:lnSpc>
-                <a:spcPct val="110000"/>
-              </a:lnSpc>
-              <a:spcBef>
-                <a:spcPts val="0"/>
-              </a:spcBef>
-              <a:buNone/>
-            </a:pPr>
-            <a:endParaRPr lang="pt-PT" sz="3600" dirty="0" smtClean="0">
-              <a:solidFill>
-                <a:schemeClr val="tx1">
-                  <a:lumMod val="85000"/>
-                  <a:lumOff val="15000"/>
-                </a:schemeClr>
-              </a:solidFill>
-              <a:latin typeface="MetaSerif-Book" pitchFamily="34" charset="0"/>
-            </a:endParaRPr>
-          </a:p>
-          <a:p>
-            <a:pPr indent="0" algn="ctr">
-              <a:lnSpc>
-                <a:spcPct val="110000"/>
-              </a:lnSpc>
-              <a:spcBef>
-                <a:spcPts val="0"/>
-              </a:spcBef>
-              <a:buNone/>
-            </a:pPr>
-            <a:r>
-              <a:rPr lang="pt-PT" sz="3600" dirty="0" smtClean="0">
-                <a:solidFill>
-                  <a:schemeClr val="tx1">
-                    <a:lumMod val="85000"/>
-                    <a:lumOff val="15000"/>
-                  </a:schemeClr>
-                </a:solidFill>
-                <a:latin typeface="MetaSerif-Book" pitchFamily="34" charset="0"/>
-              </a:rPr>
-              <a:t>Built upon request, on runtime</a:t>
-            </a:r>
-          </a:p>
-          <a:p>
-            <a:pPr indent="0" algn="ctr">
-              <a:lnSpc>
-                <a:spcPct val="110000"/>
-              </a:lnSpc>
-              <a:spcBef>
-                <a:spcPts val="0"/>
-              </a:spcBef>
-              <a:buNone/>
-            </a:pPr>
-            <a:endParaRPr lang="pt-PT" sz="3600" dirty="0" smtClean="0">
-              <a:solidFill>
-                <a:schemeClr val="tx1">
-                  <a:lumMod val="85000"/>
-                  <a:lumOff val="15000"/>
-                </a:schemeClr>
-              </a:solidFill>
-              <a:latin typeface="MetaSerif-Book" pitchFamily="34" charset="0"/>
-            </a:endParaRPr>
-          </a:p>
-          <a:p>
-            <a:pPr indent="0" algn="ctr">
-              <a:lnSpc>
-                <a:spcPct val="110000"/>
-              </a:lnSpc>
-              <a:spcBef>
-                <a:spcPts val="0"/>
-              </a:spcBef>
-              <a:buNone/>
-            </a:pPr>
-            <a:r>
-              <a:rPr lang="pt-PT" sz="3600" dirty="0" smtClean="0">
-                <a:solidFill>
-                  <a:schemeClr val="tx1">
-                    <a:lumMod val="85000"/>
-                    <a:lumOff val="15000"/>
-                  </a:schemeClr>
-                </a:solidFill>
-                <a:latin typeface="MetaSerif-Book" pitchFamily="34" charset="0"/>
-              </a:rPr>
-              <a:t>Not very flexible...</a:t>
-            </a:r>
-            <a:endParaRPr lang="pt-PT" sz="3600" dirty="0" smtClean="0">
-              <a:solidFill>
-                <a:schemeClr val="tx1">
-                  <a:lumMod val="85000"/>
-                  <a:lumOff val="15000"/>
-                </a:schemeClr>
-              </a:solidFill>
-              <a:latin typeface="MetaSerif-Book" pitchFamily="34" charset="0"/>
-            </a:endParaRPr>
-          </a:p>
-        </p:txBody>
-      </p:sp>
-      <p:sp>
-        <p:nvSpPr>
           <p:cNvPr id="4" name="Slide Number Placeholder 3"/>
           <p:cNvSpPr>
             <a:spLocks noGrp="1"/>
@@ -5455,6 +5343,39 @@
           </a:p>
         </p:txBody>
       </p:sp>
+      <p:pic>
+        <p:nvPicPr>
+          <p:cNvPr id="2050" name="Picture 2" descr="C:\Users\jgradim\Documents\thesis\presentations\images\user_roles_conceptual.png"/>
+          <p:cNvPicPr>
+            <a:picLocks noChangeAspect="1" noChangeArrowheads="1"/>
+          </p:cNvPicPr>
+          <p:nvPr/>
+        </p:nvPicPr>
+        <p:blipFill>
+          <a:blip r:embed="rId2" cstate="print"/>
+          <a:srcRect/>
+          <a:stretch>
+            <a:fillRect/>
+          </a:stretch>
+        </p:blipFill>
+        <p:spPr bwMode="auto">
+          <a:xfrm>
+            <a:off x="323528" y="1916832"/>
+            <a:ext cx="8587855" cy="3321672"/>
+          </a:xfrm>
+          <a:prstGeom prst="rect">
+            <a:avLst/>
+          </a:prstGeom>
+          <a:noFill/>
+          <a:effectLst>
+            <a:outerShdw blurRad="50800" dist="38100" dir="2700000" algn="tl" rotWithShape="0">
+              <a:prstClr val="black">
+                <a:alpha val="40000"/>
+              </a:prstClr>
+            </a:outerShdw>
+          </a:effectLst>
+        </p:spPr>
+      </p:pic>
     </p:spTree>
   </p:cSld>
   <p:clrMapOvr>
@@ -5571,6 +5492,29 @@
               </a:spcBef>
               <a:buNone/>
             </a:pPr>
+            <a:r>
+              <a:rPr lang="pt-PT" sz="3600" dirty="0" smtClean="0">
+                <a:solidFill>
+                  <a:schemeClr val="tx1">
+                    <a:lumMod val="85000"/>
+                    <a:lumOff val="15000"/>
+                  </a:schemeClr>
+                </a:solidFill>
+                <a:latin typeface="MetaSerif-Book" pitchFamily="34" charset="0"/>
+              </a:rPr>
+              <a:t>Completely dynamic</a:t>
+            </a:r>
+          </a:p>
+          <a:p>
+            <a:pPr indent="0" algn="ctr">
+              <a:lnSpc>
+                <a:spcPct val="110000"/>
+              </a:lnSpc>
+              <a:spcBef>
+                <a:spcPts val="0"/>
+              </a:spcBef>
+              <a:buNone/>
+            </a:pPr>
             <a:endParaRPr lang="pt-PT" sz="3600" dirty="0" smtClean="0">
               <a:solidFill>
                 <a:schemeClr val="tx1">
@@ -5580,6 +5524,72 @@
               </a:solidFill>
               <a:latin typeface="MetaSerif-Book" pitchFamily="34" charset="0"/>
             </a:endParaRPr>
+          </a:p>
+          <a:p>
+            <a:pPr indent="0" algn="ctr">
+              <a:lnSpc>
+                <a:spcPct val="110000"/>
+              </a:lnSpc>
+              <a:spcBef>
+                <a:spcPts val="0"/>
+              </a:spcBef>
+              <a:buNone/>
+            </a:pPr>
+            <a:r>
+              <a:rPr lang="pt-PT" sz="3600" dirty="0" smtClean="0">
+                <a:solidFill>
+                  <a:schemeClr val="tx1">
+                    <a:lumMod val="85000"/>
+                    <a:lumOff val="15000"/>
+                  </a:schemeClr>
+                </a:solidFill>
+                <a:latin typeface="MetaSerif-Book" pitchFamily="34" charset="0"/>
+              </a:rPr>
+              <a:t>Built upon request, on runtime</a:t>
+            </a:r>
+          </a:p>
+          <a:p>
+            <a:pPr indent="0" algn="ctr">
+              <a:lnSpc>
+                <a:spcPct val="110000"/>
+              </a:lnSpc>
+              <a:spcBef>
+                <a:spcPts val="0"/>
+              </a:spcBef>
+              <a:buNone/>
+            </a:pPr>
+            <a:endParaRPr lang="pt-PT" sz="3600" dirty="0" smtClean="0">
+              <a:solidFill>
+                <a:schemeClr val="tx1">
+                  <a:lumMod val="85000"/>
+                  <a:lumOff val="15000"/>
+                </a:schemeClr>
+              </a:solidFill>
+              <a:latin typeface="MetaSerif-Book" pitchFamily="34" charset="0"/>
+            </a:endParaRPr>
+          </a:p>
+          <a:p>
+            <a:pPr indent="0" algn="ctr">
+              <a:lnSpc>
+                <a:spcPct val="110000"/>
+              </a:lnSpc>
+              <a:spcBef>
+                <a:spcPts val="0"/>
+              </a:spcBef>
+              <a:buNone/>
+            </a:pPr>
+            <a:r>
+              <a:rPr lang="pt-PT" sz="3600" dirty="0" smtClean="0">
+                <a:solidFill>
+                  <a:schemeClr val="tx1">
+                    <a:lumMod val="85000"/>
+                    <a:lumOff val="15000"/>
+                  </a:schemeClr>
+                </a:solidFill>
+                <a:latin typeface="MetaSerif-Book" pitchFamily="34" charset="0"/>
+              </a:rPr>
+              <a:t>Not very flexible...</a:t>
+            </a:r>
           </a:p>
         </p:txBody>
       </p:sp>
@@ -5674,7 +5684,7 @@
                 </a:solidFill>
                 <a:latin typeface="League Gothic" pitchFamily="50" charset="0"/>
               </a:rPr>
-              <a:t>Document Editor</a:t>
+              <a:t>Social Network</a:t>
             </a:r>
             <a:endParaRPr lang="pt-PT" sz="1800" dirty="0">
               <a:solidFill>
@@ -5687,154 +5697,6 @@
       </p:sp>
       <p:sp>
         <p:nvSpPr>
-          <p:cNvPr id="3" name="Content Placeholder 2"/>
-          <p:cNvSpPr>
-            <a:spLocks noGrp="1"/>
-          </p:cNvSpPr>
-          <p:nvPr>
-            <p:ph idx="1"/>
-          </p:nvPr>
-        </p:nvSpPr>
-        <p:spPr>
-          <a:xfrm>
-            <a:off x="457200" y="1124744"/>
-            <a:ext cx="8229600" cy="5040560"/>
-          </a:xfrm>
-          <a:effectLst>
-            <a:outerShdw blurRad="50800" dist="25400" dir="2700000" algn="tl" rotWithShape="0">
-              <a:prstClr val="black">
-                <a:alpha val="15000"/>
-              </a:prstClr>
-            </a:outerShdw>
-          </a:effectLst>
-        </p:spPr>
-        <p:txBody>
-          <a:bodyPr vert="horz" anchor="ctr" anchorCtr="1">
-            <a:normAutofit/>
-          </a:bodyPr>
-          <a:lstStyle/>
-          <a:p>
-            <a:pPr indent="0" algn="ctr">
-              <a:lnSpc>
-                <a:spcPct val="110000"/>
-              </a:lnSpc>
-              <a:spcBef>
-                <a:spcPts val="0"/>
-              </a:spcBef>
-              <a:buNone/>
-            </a:pPr>
-            <a:r>
-              <a:rPr lang="pt-PT" sz="3600" dirty="0" smtClean="0">
-                <a:solidFill>
-                  <a:schemeClr val="tx1">
-                    <a:lumMod val="85000"/>
-                    <a:lumOff val="15000"/>
-                  </a:schemeClr>
-                </a:solidFill>
-                <a:latin typeface="MetaSerif-Book" pitchFamily="34" charset="0"/>
-              </a:rPr>
-              <a:t>One of the most used features</a:t>
-            </a:r>
-          </a:p>
-          <a:p>
-            <a:pPr indent="0" algn="ctr">
-              <a:lnSpc>
-                <a:spcPct val="110000"/>
-              </a:lnSpc>
-              <a:spcBef>
-                <a:spcPts val="0"/>
-              </a:spcBef>
-              <a:buNone/>
-            </a:pPr>
-            <a:endParaRPr lang="pt-PT" sz="3600" dirty="0" smtClean="0">
-              <a:solidFill>
-                <a:schemeClr val="tx1">
-                  <a:lumMod val="85000"/>
-                  <a:lumOff val="15000"/>
-                </a:schemeClr>
-              </a:solidFill>
-              <a:latin typeface="MetaSerif-Book" pitchFamily="34" charset="0"/>
-            </a:endParaRPr>
-          </a:p>
-          <a:p>
-            <a:pPr indent="0" algn="ctr">
-              <a:lnSpc>
-                <a:spcPct val="110000"/>
-              </a:lnSpc>
-              <a:spcBef>
-                <a:spcPts val="0"/>
-              </a:spcBef>
-              <a:buNone/>
-            </a:pPr>
-            <a:r>
-              <a:rPr lang="pt-PT" sz="3600" dirty="0" smtClean="0">
-                <a:solidFill>
-                  <a:schemeClr val="tx1">
-                    <a:lumMod val="85000"/>
-                    <a:lumOff val="15000"/>
-                  </a:schemeClr>
-                </a:solidFill>
-                <a:latin typeface="MetaSerif-Book" pitchFamily="34" charset="0"/>
-              </a:rPr>
-              <a:t>Many different types of content</a:t>
-            </a:r>
-          </a:p>
-          <a:p>
-            <a:pPr indent="0" algn="ctr">
-              <a:lnSpc>
-                <a:spcPct val="110000"/>
-              </a:lnSpc>
-              <a:spcBef>
-                <a:spcPts val="0"/>
-              </a:spcBef>
-              <a:buNone/>
-            </a:pPr>
-            <a:endParaRPr lang="pt-PT" sz="3600" dirty="0" smtClean="0">
-              <a:solidFill>
-                <a:schemeClr val="tx1">
-                  <a:lumMod val="85000"/>
-                  <a:lumOff val="15000"/>
-                </a:schemeClr>
-              </a:solidFill>
-              <a:latin typeface="MetaSerif-Book" pitchFamily="34" charset="0"/>
-            </a:endParaRPr>
-          </a:p>
-          <a:p>
-            <a:pPr indent="0" algn="ctr">
-              <a:lnSpc>
-                <a:spcPct val="110000"/>
-              </a:lnSpc>
-              <a:spcBef>
-                <a:spcPts val="0"/>
-              </a:spcBef>
-              <a:buNone/>
-            </a:pPr>
-            <a:r>
-              <a:rPr lang="pt-PT" sz="3600" dirty="0" smtClean="0">
-                <a:solidFill>
-                  <a:schemeClr val="tx1">
-                    <a:lumMod val="85000"/>
-                    <a:lumOff val="15000"/>
-                  </a:schemeClr>
-                </a:solidFill>
-                <a:latin typeface="MetaSerif-Book" pitchFamily="34" charset="0"/>
-              </a:rPr>
-              <a:t>Flexible, but too complex...</a:t>
-            </a:r>
-            <a:endParaRPr lang="pt-PT" sz="3600" dirty="0" smtClean="0">
-              <a:solidFill>
-                <a:schemeClr val="tx1">
-                  <a:lumMod val="85000"/>
-                  <a:lumOff val="15000"/>
-                </a:schemeClr>
-              </a:solidFill>
-              <a:latin typeface="MetaSerif-Book" pitchFamily="34" charset="0"/>
-            </a:endParaRPr>
-          </a:p>
-        </p:txBody>
-      </p:sp>
-      <p:sp>
-        <p:nvSpPr>
           <p:cNvPr id="4" name="Slide Number Placeholder 3"/>
           <p:cNvSpPr>
             <a:spLocks noGrp="1"/>
@@ -5857,6 +5719,39 @@
           </a:p>
         </p:txBody>
       </p:sp>
+      <p:pic>
+        <p:nvPicPr>
+          <p:cNvPr id="3074" name="Picture 2" descr="C:\Users\jgradim\Documents\thesis\presentations\images\social_network_current.png"/>
+          <p:cNvPicPr>
+            <a:picLocks noChangeAspect="1" noChangeArrowheads="1"/>
+          </p:cNvPicPr>
+          <p:nvPr/>
+        </p:nvPicPr>
+        <p:blipFill>
+          <a:blip r:embed="rId2" cstate="print"/>
+          <a:srcRect/>
+          <a:stretch>
+            <a:fillRect/>
+          </a:stretch>
+        </p:blipFill>
+        <p:spPr bwMode="auto">
+          <a:xfrm>
+            <a:off x="2438400" y="1204913"/>
+            <a:ext cx="4267200" cy="4448175"/>
+          </a:xfrm>
+          <a:prstGeom prst="rect">
+            <a:avLst/>
+          </a:prstGeom>
+          <a:noFill/>
+          <a:effectLst>
+            <a:outerShdw blurRad="50800" dist="38100" dir="2700000" algn="tl" rotWithShape="0">
+              <a:prstClr val="black">
+                <a:alpha val="40000"/>
+              </a:prstClr>
+            </a:outerShdw>
+          </a:effectLst>
+        </p:spPr>
+      </p:pic>
     </p:spTree>
   </p:cSld>
   <p:clrMapOvr>
@@ -6083,7 +5978,7 @@
                 </a:solidFill>
                 <a:latin typeface="League Gothic" pitchFamily="50" charset="0"/>
               </a:rPr>
-              <a:t>Document Editor</a:t>
+              <a:t>Social Network</a:t>
             </a:r>
             <a:endParaRPr lang="pt-PT" sz="1800" dirty="0">
               <a:solidFill>
@@ -6096,56 +5991,6 @@
       </p:sp>
       <p:sp>
         <p:nvSpPr>
-          <p:cNvPr id="3" name="Content Placeholder 2"/>
-          <p:cNvSpPr>
-            <a:spLocks noGrp="1"/>
-          </p:cNvSpPr>
-          <p:nvPr>
-            <p:ph idx="1"/>
-          </p:nvPr>
-        </p:nvSpPr>
-        <p:spPr>
-          <a:xfrm>
-            <a:off x="457200" y="1124744"/>
-            <a:ext cx="8229600" cy="5040560"/>
-          </a:xfrm>
-          <a:effectLst>
-            <a:outerShdw blurRad="50800" dist="25400" dir="2700000" algn="tl" rotWithShape="0">
-              <a:prstClr val="black">
-                <a:alpha val="15000"/>
-              </a:prstClr>
-            </a:outerShdw>
-          </a:effectLst>
-        </p:spPr>
-        <p:txBody>
-          <a:bodyPr vert="horz" anchor="ctr" anchorCtr="1">
-            <a:normAutofit/>
-          </a:bodyPr>
-          <a:lstStyle/>
-          <a:p>
-            <a:pPr indent="0" algn="ctr">
-              <a:lnSpc>
-                <a:spcPct val="110000"/>
-              </a:lnSpc>
-              <a:spcBef>
-                <a:spcPts val="0"/>
-              </a:spcBef>
-              <a:buNone/>
-            </a:pPr>
-            <a:endParaRPr lang="pt-PT" sz="3600" dirty="0" smtClean="0">
-              <a:solidFill>
-                <a:schemeClr val="tx1">
-                  <a:lumMod val="85000"/>
-                  <a:lumOff val="15000"/>
-                </a:schemeClr>
-              </a:solidFill>
-              <a:latin typeface="MetaSerif-Book" pitchFamily="34" charset="0"/>
-            </a:endParaRPr>
-          </a:p>
-        </p:txBody>
-      </p:sp>
-      <p:sp>
-        <p:nvSpPr>
           <p:cNvPr id="4" name="Slide Number Placeholder 3"/>
           <p:cNvSpPr>
             <a:spLocks noGrp="1"/>
@@ -6168,6 +6013,39 @@
           </a:p>
         </p:txBody>
       </p:sp>
+      <p:pic>
+        <p:nvPicPr>
+          <p:cNvPr id="6" name="Picture 3" descr="C:\Users\jgradim\Documents\thesis\presentations\images\social_network_conceptual.png"/>
+          <p:cNvPicPr>
+            <a:picLocks noChangeAspect="1" noChangeArrowheads="1"/>
+          </p:cNvPicPr>
+          <p:nvPr/>
+        </p:nvPicPr>
+        <p:blipFill>
+          <a:blip r:embed="rId2" cstate="print"/>
+          <a:srcRect/>
+          <a:stretch>
+            <a:fillRect/>
+          </a:stretch>
+        </p:blipFill>
+        <p:spPr bwMode="auto">
+          <a:xfrm>
+            <a:off x="917848" y="2021053"/>
+            <a:ext cx="7308304" cy="2815894"/>
+          </a:xfrm>
+          <a:prstGeom prst="rect">
+            <a:avLst/>
+          </a:prstGeom>
+          <a:noFill/>
+          <a:effectLst>
+            <a:outerShdw blurRad="50800" dist="38100" dir="2700000" algn="tl" rotWithShape="0">
+              <a:prstClr val="black">
+                <a:alpha val="40000"/>
+              </a:prstClr>
+            </a:outerShdw>
+          </a:effectLst>
+        </p:spPr>
+      </p:pic>
     </p:spTree>
   </p:cSld>
   <p:clrMapOvr>
@@ -6200,32 +6078,6 @@
           <a:chExt cx="0" cy="0"/>
         </a:xfrm>
       </p:grpSpPr>
-      <p:pic>
-        <p:nvPicPr>
-          <p:cNvPr id="3074" name="Picture 2" descr="C:\Users\jgradim\Documents\thesis\presentations\old_books.jpg"/>
-          <p:cNvPicPr>
-            <a:picLocks noChangeAspect="1" noChangeArrowheads="1"/>
-          </p:cNvPicPr>
-          <p:nvPr/>
-        </p:nvPicPr>
-        <p:blipFill>
-          <a:blip r:embed="rId2" cstate="print"/>
-          <a:srcRect r="11066"/>
-          <a:stretch>
-            <a:fillRect/>
-          </a:stretch>
-        </p:blipFill>
-        <p:spPr bwMode="auto">
-          <a:xfrm>
-            <a:off x="0" y="0"/>
-            <a:ext cx="9144000" cy="6858000"/>
-          </a:xfrm>
-          <a:prstGeom prst="rect">
-            <a:avLst/>
-          </a:prstGeom>
-          <a:noFill/>
-        </p:spPr>
-      </p:pic>
       <p:sp>
         <p:nvSpPr>
           <p:cNvPr id="2" name="Title 1"/>
@@ -6238,8 +6090,8 @@
         </p:nvSpPr>
         <p:spPr>
           <a:xfrm>
-            <a:off x="0" y="2941730"/>
-            <a:ext cx="4644008" cy="974540"/>
+            <a:off x="5868144" y="188640"/>
+            <a:ext cx="3275856" cy="706090"/>
           </a:xfrm>
           <a:solidFill>
             <a:schemeClr val="tx1">
@@ -6248,22 +6100,22 @@
           </a:solidFill>
         </p:spPr>
         <p:txBody>
-          <a:bodyPr lIns="360000">
-            <a:noAutofit/>
+          <a:bodyPr rIns="144000">
+            <a:normAutofit/>
           </a:bodyPr>
           <a:lstStyle/>
           <a:p>
-            <a:pPr algn="l"/>
-            <a:r>
-              <a:rPr lang="pt-PT" sz="5400" dirty="0" smtClean="0">
+            <a:pPr algn="r"/>
+            <a:r>
+              <a:rPr lang="pt-PT" sz="3200" dirty="0" smtClean="0">
                 <a:solidFill>
                   <a:schemeClr val="bg1"/>
                 </a:solidFill>
                 <a:latin typeface="League Gothic" pitchFamily="50" charset="0"/>
               </a:rPr>
-              <a:t>Conclusions</a:t>
-            </a:r>
-            <a:endParaRPr lang="pt-PT" sz="5400" dirty="0">
+              <a:t>Document Editor</a:t>
+            </a:r>
+            <a:endParaRPr lang="pt-PT" sz="1800" dirty="0">
               <a:solidFill>
                 <a:schemeClr val="bg1"/>
               </a:solidFill>
@@ -6274,56 +6126,164 @@
       </p:sp>
       <p:sp>
         <p:nvSpPr>
-          <p:cNvPr id="4" name="TextBox 3"/>
-          <p:cNvSpPr txBox="1"/>
-          <p:nvPr/>
+          <p:cNvPr id="3" name="Content Placeholder 2"/>
+          <p:cNvSpPr>
+            <a:spLocks noGrp="1"/>
+          </p:cNvSpPr>
+          <p:nvPr>
+            <p:ph idx="1"/>
+          </p:nvPr>
         </p:nvSpPr>
         <p:spPr>
           <a:xfrm>
-            <a:off x="1" y="6599813"/>
-            <a:ext cx="9144000" cy="246221"/>
-          </a:xfrm>
-          <a:prstGeom prst="rect">
-            <a:avLst/>
-          </a:prstGeom>
-          <a:noFill/>
-        </p:spPr>
-        <p:txBody>
-          <a:bodyPr wrap="square" rtlCol="0">
-            <a:spAutoFit/>
+            <a:off x="457200" y="1124744"/>
+            <a:ext cx="8229600" cy="5040560"/>
+          </a:xfrm>
+          <a:effectLst>
+            <a:outerShdw blurRad="50800" dist="25400" dir="2700000" algn="tl" rotWithShape="0">
+              <a:prstClr val="black">
+                <a:alpha val="15000"/>
+              </a:prstClr>
+            </a:outerShdw>
+          </a:effectLst>
+        </p:spPr>
+        <p:txBody>
+          <a:bodyPr vert="horz" anchor="ctr" anchorCtr="1">
+            <a:normAutofit/>
           </a:bodyPr>
           <a:lstStyle/>
           <a:p>
-            <a:pPr algn="r"/>
-            <a:r>
-              <a:rPr lang="pt-PT" sz="1000" dirty="0" smtClean="0">
+            <a:pPr indent="0" algn="ctr">
+              <a:lnSpc>
+                <a:spcPct val="110000"/>
+              </a:lnSpc>
+              <a:spcBef>
+                <a:spcPts val="0"/>
+              </a:spcBef>
+              <a:buNone/>
+            </a:pPr>
+            <a:r>
+              <a:rPr lang="pt-PT" sz="3600" dirty="0" smtClean="0">
                 <a:solidFill>
-                  <a:schemeClr val="bg1"/>
+                  <a:schemeClr val="tx1">
+                    <a:lumMod val="85000"/>
+                    <a:lumOff val="15000"/>
+                  </a:schemeClr>
                 </a:solidFill>
-                <a:effectLst>
-                  <a:outerShdw blurRad="38100" dist="38100" dir="2700000" algn="tl">
-                    <a:srgbClr val="000000">
-                      <a:alpha val="43137"/>
-                    </a:srgbClr>
-                  </a:outerShdw>
-                </a:effectLst>
                 <a:latin typeface="MetaSerif-Book" pitchFamily="34" charset="0"/>
               </a:rPr>
-              <a:t>http://www.flickr.com/photos/ dklimke /</a:t>
-            </a:r>
-            <a:endParaRPr lang="pt-PT" sz="1000" dirty="0">
+              <a:t>One of the most used features</a:t>
+            </a:r>
+          </a:p>
+          <a:p>
+            <a:pPr indent="0" algn="ctr">
+              <a:lnSpc>
+                <a:spcPct val="110000"/>
+              </a:lnSpc>
+              <a:spcBef>
+                <a:spcPts val="0"/>
+              </a:spcBef>
+              <a:buNone/>
+            </a:pPr>
+            <a:endParaRPr lang="pt-PT" sz="3600" dirty="0" smtClean="0">
               <a:solidFill>
-                <a:schemeClr val="bg1"/>
+                <a:schemeClr val="tx1">
+                  <a:lumMod val="85000"/>
+                  <a:lumOff val="15000"/>
+                </a:schemeClr>
               </a:solidFill>
-              <a:effectLst>
-                <a:outerShdw blurRad="38100" dist="38100" dir="2700000" algn="tl">
-                  <a:srgbClr val="000000">
-                    <a:alpha val="43137"/>
-                  </a:srgbClr>
-                </a:outerShdw>
-              </a:effectLst>
               <a:latin typeface="MetaSerif-Book" pitchFamily="34" charset="0"/>
             </a:endParaRPr>
+          </a:p>
+          <a:p>
+            <a:pPr indent="0" algn="ctr">
+              <a:lnSpc>
+                <a:spcPct val="110000"/>
+              </a:lnSpc>
+              <a:spcBef>
+                <a:spcPts val="0"/>
+              </a:spcBef>
+              <a:buNone/>
+            </a:pPr>
+            <a:r>
+              <a:rPr lang="pt-PT" sz="3600" dirty="0" smtClean="0">
+                <a:solidFill>
+                  <a:schemeClr val="tx1">
+                    <a:lumMod val="85000"/>
+                    <a:lumOff val="15000"/>
+                  </a:schemeClr>
+                </a:solidFill>
+                <a:latin typeface="MetaSerif-Book" pitchFamily="34" charset="0"/>
+              </a:rPr>
+              <a:t>Many different types of content</a:t>
+            </a:r>
+          </a:p>
+          <a:p>
+            <a:pPr indent="0" algn="ctr">
+              <a:lnSpc>
+                <a:spcPct val="110000"/>
+              </a:lnSpc>
+              <a:spcBef>
+                <a:spcPts val="0"/>
+              </a:spcBef>
+              <a:buNone/>
+            </a:pPr>
+            <a:endParaRPr lang="pt-PT" sz="3600" dirty="0" smtClean="0">
+              <a:solidFill>
+                <a:schemeClr val="tx1">
+                  <a:lumMod val="85000"/>
+                  <a:lumOff val="15000"/>
+                </a:schemeClr>
+              </a:solidFill>
+              <a:latin typeface="MetaSerif-Book" pitchFamily="34" charset="0"/>
+            </a:endParaRPr>
+          </a:p>
+          <a:p>
+            <a:pPr indent="0" algn="ctr">
+              <a:lnSpc>
+                <a:spcPct val="110000"/>
+              </a:lnSpc>
+              <a:spcBef>
+                <a:spcPts val="0"/>
+              </a:spcBef>
+              <a:buNone/>
+            </a:pPr>
+            <a:r>
+              <a:rPr lang="pt-PT" sz="3600" dirty="0" smtClean="0">
+                <a:solidFill>
+                  <a:schemeClr val="tx1">
+                    <a:lumMod val="85000"/>
+                    <a:lumOff val="15000"/>
+                  </a:schemeClr>
+                </a:solidFill>
+                <a:latin typeface="MetaSerif-Book" pitchFamily="34" charset="0"/>
+              </a:rPr>
+              <a:t>Flexible, but too complex...</a:t>
+            </a:r>
+          </a:p>
+        </p:txBody>
+      </p:sp>
+      <p:sp>
+        <p:nvSpPr>
+          <p:cNvPr id="4" name="Slide Number Placeholder 3"/>
+          <p:cNvSpPr>
+            <a:spLocks noGrp="1"/>
+          </p:cNvSpPr>
+          <p:nvPr>
+            <p:ph type="sldNum" sz="quarter" idx="12"/>
+          </p:nvPr>
+        </p:nvSpPr>
+        <p:spPr/>
+        <p:txBody>
+          <a:bodyPr/>
+          <a:lstStyle/>
+          <a:p>
+            <a:fld id="{AF2DD60D-AE1E-4B35-90D2-0ABAEDD7A6F5}" type="slidenum">
+              <a:rPr lang="pt-PT" smtClean="0"/>
+              <a:pPr/>
+              <a:t>21</a:t>
+            </a:fld>
+            <a:endParaRPr lang="pt-PT" dirty="0"/>
           </a:p>
         </p:txBody>
       </p:sp>
@@ -6394,67 +6354,14 @@
                 </a:solidFill>
                 <a:latin typeface="League Gothic" pitchFamily="50" charset="0"/>
               </a:rPr>
-              <a:t>AOMs</a:t>
-            </a:r>
-            <a:endParaRPr lang="pt-PT" sz="3200" dirty="0">
+              <a:t>Document Editor</a:t>
+            </a:r>
+            <a:endParaRPr lang="pt-PT" sz="1800" dirty="0">
               <a:solidFill>
                 <a:schemeClr val="bg1"/>
               </a:solidFill>
               <a:latin typeface="League Gothic" pitchFamily="50" charset="0"/>
             </a:endParaRPr>
-          </a:p>
-        </p:txBody>
-      </p:sp>
-      <p:sp>
-        <p:nvSpPr>
-          <p:cNvPr id="3" name="Content Placeholder 2"/>
-          <p:cNvSpPr>
-            <a:spLocks noGrp="1"/>
-          </p:cNvSpPr>
-          <p:nvPr>
-            <p:ph idx="1"/>
-          </p:nvPr>
-        </p:nvSpPr>
-        <p:spPr>
-          <a:xfrm>
-            <a:off x="457200" y="1124744"/>
-            <a:ext cx="8229600" cy="5040560"/>
-          </a:xfrm>
-          <a:effectLst>
-            <a:outerShdw blurRad="50800" dist="25400" dir="2700000" algn="tl" rotWithShape="0">
-              <a:prstClr val="black">
-                <a:alpha val="15000"/>
-              </a:prstClr>
-            </a:outerShdw>
-          </a:effectLst>
-        </p:spPr>
-        <p:txBody>
-          <a:bodyPr vert="horz" anchor="ctr" anchorCtr="1">
-            <a:normAutofit/>
-          </a:bodyPr>
-          <a:lstStyle/>
-          <a:p>
-            <a:pPr indent="0">
-              <a:lnSpc>
-                <a:spcPct val="110000"/>
-              </a:lnSpc>
-              <a:spcBef>
-                <a:spcPts val="0"/>
-              </a:spcBef>
-              <a:buNone/>
-            </a:pPr>
-            <a:r>
-              <a:rPr lang="pt-PT" sz="3600" dirty="0" smtClean="0">
-                <a:solidFill>
-                  <a:schemeClr val="tx1">
-                    <a:lumMod val="85000"/>
-                    <a:lumOff val="15000"/>
-                  </a:schemeClr>
-                </a:solidFill>
-                <a:latin typeface="MetaSerif-Book" pitchFamily="34" charset="0"/>
-              </a:rPr>
-              <a:t>AOM architectures provide the best framework for building adaptable software systems</a:t>
-            </a:r>
           </a:p>
         </p:txBody>
       </p:sp>
@@ -6482,6 +6389,39 @@
           </a:p>
         </p:txBody>
       </p:sp>
+      <p:pic>
+        <p:nvPicPr>
+          <p:cNvPr id="4098" name="Picture 2" descr="C:\Users\jgradim\Documents\thesis\presentations\images\documents_current.png"/>
+          <p:cNvPicPr>
+            <a:picLocks noChangeAspect="1" noChangeArrowheads="1"/>
+          </p:cNvPicPr>
+          <p:nvPr/>
+        </p:nvPicPr>
+        <p:blipFill>
+          <a:blip r:embed="rId2" cstate="print"/>
+          <a:srcRect/>
+          <a:stretch>
+            <a:fillRect/>
+          </a:stretch>
+        </p:blipFill>
+        <p:spPr bwMode="auto">
+          <a:xfrm>
+            <a:off x="168473" y="1016732"/>
+            <a:ext cx="8807054" cy="4824536"/>
+          </a:xfrm>
+          <a:prstGeom prst="rect">
+            <a:avLst/>
+          </a:prstGeom>
+          <a:noFill/>
+          <a:effectLst>
+            <a:outerShdw blurRad="50800" dist="38100" dir="2700000" algn="tl" rotWithShape="0">
+              <a:prstClr val="black">
+                <a:alpha val="40000"/>
+              </a:prstClr>
+            </a:outerShdw>
+          </a:effectLst>
+        </p:spPr>
+      </p:pic>
     </p:spTree>
   </p:cSld>
   <p:clrMapOvr>
@@ -6549,67 +6489,14 @@
                 </a:solidFill>
                 <a:latin typeface="League Gothic" pitchFamily="50" charset="0"/>
               </a:rPr>
-              <a:t>Rails &amp; MVC</a:t>
-            </a:r>
-            <a:endParaRPr lang="pt-PT" sz="3200" dirty="0">
+              <a:t>Document Editor</a:t>
+            </a:r>
+            <a:endParaRPr lang="pt-PT" sz="1800" dirty="0">
               <a:solidFill>
                 <a:schemeClr val="bg1"/>
               </a:solidFill>
               <a:latin typeface="League Gothic" pitchFamily="50" charset="0"/>
             </a:endParaRPr>
-          </a:p>
-        </p:txBody>
-      </p:sp>
-      <p:sp>
-        <p:nvSpPr>
-          <p:cNvPr id="3" name="Content Placeholder 2"/>
-          <p:cNvSpPr>
-            <a:spLocks noGrp="1"/>
-          </p:cNvSpPr>
-          <p:nvPr>
-            <p:ph idx="1"/>
-          </p:nvPr>
-        </p:nvSpPr>
-        <p:spPr>
-          <a:xfrm>
-            <a:off x="457200" y="1124744"/>
-            <a:ext cx="8229600" cy="5040560"/>
-          </a:xfrm>
-          <a:effectLst>
-            <a:outerShdw blurRad="50800" dist="25400" dir="2700000" algn="tl" rotWithShape="0">
-              <a:prstClr val="black">
-                <a:alpha val="15000"/>
-              </a:prstClr>
-            </a:outerShdw>
-          </a:effectLst>
-        </p:spPr>
-        <p:txBody>
-          <a:bodyPr anchor="ctr" anchorCtr="1">
-            <a:normAutofit/>
-          </a:bodyPr>
-          <a:lstStyle/>
-          <a:p>
-            <a:pPr indent="0">
-              <a:lnSpc>
-                <a:spcPct val="110000"/>
-              </a:lnSpc>
-              <a:spcBef>
-                <a:spcPts val="0"/>
-              </a:spcBef>
-              <a:buNone/>
-            </a:pPr>
-            <a:r>
-              <a:rPr lang="pt-PT" sz="3600" dirty="0" smtClean="0">
-                <a:solidFill>
-                  <a:schemeClr val="tx1">
-                    <a:lumMod val="85000"/>
-                    <a:lumOff val="15000"/>
-                  </a:schemeClr>
-                </a:solidFill>
-                <a:latin typeface="MetaSerif-Book" pitchFamily="34" charset="0"/>
-              </a:rPr>
-              <a:t>MVC architecture used by Rails can coexist harmoniously with AOM design patterns, especially with the AR engine</a:t>
-            </a:r>
           </a:p>
         </p:txBody>
       </p:sp>
@@ -6637,6 +6524,39 @@
           </a:p>
         </p:txBody>
       </p:sp>
+      <p:pic>
+        <p:nvPicPr>
+          <p:cNvPr id="5122" name="Picture 2" descr="C:\Users\jgradim\Documents\thesis\presentations\images\documents_conceptual.png"/>
+          <p:cNvPicPr>
+            <a:picLocks noChangeAspect="1" noChangeArrowheads="1"/>
+          </p:cNvPicPr>
+          <p:nvPr/>
+        </p:nvPicPr>
+        <p:blipFill>
+          <a:blip r:embed="rId2" cstate="print"/>
+          <a:srcRect/>
+          <a:stretch>
+            <a:fillRect/>
+          </a:stretch>
+        </p:blipFill>
+        <p:spPr bwMode="auto">
+          <a:xfrm>
+            <a:off x="2396169" y="1501329"/>
+            <a:ext cx="4351663" cy="3855343"/>
+          </a:xfrm>
+          <a:prstGeom prst="rect">
+            <a:avLst/>
+          </a:prstGeom>
+          <a:noFill/>
+          <a:effectLst>
+            <a:outerShdw blurRad="50800" dist="38100" dir="2700000" algn="tl" rotWithShape="0">
+              <a:prstClr val="black">
+                <a:alpha val="40000"/>
+              </a:prstClr>
+            </a:outerShdw>
+          </a:effectLst>
+        </p:spPr>
+      </p:pic>
     </p:spTree>
   </p:cSld>
   <p:clrMapOvr>
@@ -6669,6 +6589,32 @@
           <a:chExt cx="0" cy="0"/>
         </a:xfrm>
       </p:grpSpPr>
+      <p:pic>
+        <p:nvPicPr>
+          <p:cNvPr id="3074" name="Picture 2" descr="C:\Users\jgradim\Documents\thesis\presentations\old_books.jpg"/>
+          <p:cNvPicPr>
+            <a:picLocks noChangeAspect="1" noChangeArrowheads="1"/>
+          </p:cNvPicPr>
+          <p:nvPr/>
+        </p:nvPicPr>
+        <p:blipFill>
+          <a:blip r:embed="rId2" cstate="print"/>
+          <a:srcRect r="11066"/>
+          <a:stretch>
+            <a:fillRect/>
+          </a:stretch>
+        </p:blipFill>
+        <p:spPr bwMode="auto">
+          <a:xfrm>
+            <a:off x="0" y="0"/>
+            <a:ext cx="9144000" cy="6858000"/>
+          </a:xfrm>
+          <a:prstGeom prst="rect">
+            <a:avLst/>
+          </a:prstGeom>
+          <a:noFill/>
+        </p:spPr>
+      </p:pic>
       <p:sp>
         <p:nvSpPr>
           <p:cNvPr id="2" name="Title 1"/>
@@ -6681,8 +6627,8 @@
         </p:nvSpPr>
         <p:spPr>
           <a:xfrm>
-            <a:off x="5868144" y="188640"/>
-            <a:ext cx="3275856" cy="706090"/>
+            <a:off x="0" y="2941730"/>
+            <a:ext cx="4644008" cy="974540"/>
           </a:xfrm>
           <a:solidFill>
             <a:schemeClr val="tx1">
@@ -6691,22 +6637,22 @@
           </a:solidFill>
         </p:spPr>
         <p:txBody>
-          <a:bodyPr rIns="144000">
-            <a:normAutofit/>
+          <a:bodyPr lIns="360000">
+            <a:noAutofit/>
           </a:bodyPr>
           <a:lstStyle/>
           <a:p>
-            <a:pPr algn="r"/>
-            <a:r>
-              <a:rPr lang="pt-PT" sz="3200" dirty="0" smtClean="0">
+            <a:pPr algn="l"/>
+            <a:r>
+              <a:rPr lang="pt-PT" sz="5400" dirty="0" smtClean="0">
                 <a:solidFill>
                   <a:schemeClr val="bg1"/>
                 </a:solidFill>
                 <a:latin typeface="League Gothic" pitchFamily="50" charset="0"/>
               </a:rPr>
-              <a:t>Variability</a:t>
-            </a:r>
-            <a:endParaRPr lang="pt-PT" sz="3200" dirty="0">
+              <a:t>Conclusions</a:t>
+            </a:r>
+            <a:endParaRPr lang="pt-PT" sz="5400" dirty="0">
               <a:solidFill>
                 <a:schemeClr val="bg1"/>
               </a:solidFill>
@@ -6717,75 +6663,56 @@
       </p:sp>
       <p:sp>
         <p:nvSpPr>
-          <p:cNvPr id="3" name="Content Placeholder 2"/>
-          <p:cNvSpPr>
-            <a:spLocks noGrp="1"/>
-          </p:cNvSpPr>
-          <p:nvPr>
-            <p:ph idx="1"/>
-          </p:nvPr>
+          <p:cNvPr id="4" name="TextBox 3"/>
+          <p:cNvSpPr txBox="1"/>
+          <p:nvPr/>
         </p:nvSpPr>
         <p:spPr>
           <a:xfrm>
-            <a:off x="457200" y="1124744"/>
-            <a:ext cx="8229600" cy="5040560"/>
-          </a:xfrm>
-          <a:effectLst>
-            <a:outerShdw blurRad="50800" dist="25400" dir="2700000" algn="tl" rotWithShape="0">
-              <a:prstClr val="black">
-                <a:alpha val="15000"/>
-              </a:prstClr>
-            </a:outerShdw>
-          </a:effectLst>
-        </p:spPr>
-        <p:txBody>
-          <a:bodyPr anchor="ctr" anchorCtr="1">
-            <a:normAutofit/>
+            <a:off x="1" y="6599813"/>
+            <a:ext cx="9144000" cy="246221"/>
+          </a:xfrm>
+          <a:prstGeom prst="rect">
+            <a:avLst/>
+          </a:prstGeom>
+          <a:noFill/>
+        </p:spPr>
+        <p:txBody>
+          <a:bodyPr wrap="square" rtlCol="0">
+            <a:spAutoFit/>
           </a:bodyPr>
           <a:lstStyle/>
           <a:p>
-            <a:pPr indent="0">
-              <a:lnSpc>
-                <a:spcPct val="110000"/>
-              </a:lnSpc>
-              <a:spcBef>
-                <a:spcPts val="0"/>
-              </a:spcBef>
-              <a:buNone/>
-            </a:pPr>
-            <a:endParaRPr lang="pt-PT" sz="3600" dirty="0" smtClean="0">
+            <a:pPr algn="r"/>
+            <a:r>
+              <a:rPr lang="pt-PT" sz="1000" dirty="0" smtClean="0">
+                <a:solidFill>
+                  <a:schemeClr val="bg1"/>
+                </a:solidFill>
+                <a:effectLst>
+                  <a:outerShdw blurRad="38100" dist="38100" dir="2700000" algn="tl">
+                    <a:srgbClr val="000000">
+                      <a:alpha val="43137"/>
+                    </a:srgbClr>
+                  </a:outerShdw>
+                </a:effectLst>
+                <a:latin typeface="MetaSerif-Book" pitchFamily="34" charset="0"/>
+              </a:rPr>
+              <a:t>http://www.flickr.com/photos/ dklimke /</a:t>
+            </a:r>
+            <a:endParaRPr lang="pt-PT" sz="1000" dirty="0">
               <a:solidFill>
-                <a:schemeClr val="tx1">
-                  <a:lumMod val="85000"/>
-                  <a:lumOff val="15000"/>
-                </a:schemeClr>
+                <a:schemeClr val="bg1"/>
               </a:solidFill>
+              <a:effectLst>
+                <a:outerShdw blurRad="38100" dist="38100" dir="2700000" algn="tl">
+                  <a:srgbClr val="000000">
+                    <a:alpha val="43137"/>
+                  </a:srgbClr>
+                </a:outerShdw>
+              </a:effectLst>
               <a:latin typeface="MetaSerif-Book" pitchFamily="34" charset="0"/>
             </a:endParaRPr>
-          </a:p>
-        </p:txBody>
-      </p:sp>
-      <p:sp>
-        <p:nvSpPr>
-          <p:cNvPr id="4" name="Slide Number Placeholder 3"/>
-          <p:cNvSpPr>
-            <a:spLocks noGrp="1"/>
-          </p:cNvSpPr>
-          <p:nvPr>
-            <p:ph type="sldNum" sz="quarter" idx="12"/>
-          </p:nvPr>
-        </p:nvSpPr>
-        <p:spPr/>
-        <p:txBody>
-          <a:bodyPr/>
-          <a:lstStyle/>
-          <a:p>
-            <a:fld id="{AF2DD60D-AE1E-4B35-90D2-0ABAEDD7A6F5}" type="slidenum">
-              <a:rPr lang="pt-PT" smtClean="0"/>
-              <a:pPr/>
-              <a:t>24</a:t>
-            </a:fld>
-            <a:endParaRPr lang="pt-PT" dirty="0"/>
           </a:p>
         </p:txBody>
       </p:sp>
@@ -6856,7 +6783,7 @@
                 </a:solidFill>
                 <a:latin typeface="League Gothic" pitchFamily="50" charset="0"/>
               </a:rPr>
-              <a:t>Performance</a:t>
+              <a:t>AOMs</a:t>
             </a:r>
             <a:endParaRPr lang="pt-PT" sz="3200" dirty="0">
               <a:solidFill>
@@ -6891,7 +6818,7 @@
           </a:effectLst>
         </p:spPr>
         <p:txBody>
-          <a:bodyPr anchor="ctr" anchorCtr="1">
+          <a:bodyPr vert="horz" anchor="ctr" anchorCtr="1">
             <a:normAutofit/>
           </a:bodyPr>
           <a:lstStyle/>
@@ -6915,7 +6842,7 @@
                 </a:solidFill>
                 <a:latin typeface="MetaSerif-Book" pitchFamily="34" charset="0"/>
               </a:rPr>
-              <a:t>Performance can be increased</a:t>
+              <a:t>AOM architectures provide the best framework for building adaptable software systems</a:t>
             </a:r>
           </a:p>
         </p:txBody>
@@ -6976,32 +6903,6 @@
           <a:chExt cx="0" cy="0"/>
         </a:xfrm>
       </p:grpSpPr>
-      <p:pic>
-        <p:nvPicPr>
-          <p:cNvPr id="3076" name="Picture 4" descr="C:\Users\jgradim\Documents\thesis\presentations\death_star.jpg"/>
-          <p:cNvPicPr>
-            <a:picLocks noChangeAspect="1" noChangeArrowheads="1"/>
-          </p:cNvPicPr>
-          <p:nvPr/>
-        </p:nvPicPr>
-        <p:blipFill>
-          <a:blip r:embed="rId2" cstate="print"/>
-          <a:srcRect r="2083"/>
-          <a:stretch>
-            <a:fillRect/>
-          </a:stretch>
-        </p:blipFill>
-        <p:spPr bwMode="auto">
-          <a:xfrm>
-            <a:off x="0" y="0"/>
-            <a:ext cx="9144000" cy="6858000"/>
-          </a:xfrm>
-          <a:prstGeom prst="rect">
-            <a:avLst/>
-          </a:prstGeom>
-          <a:noFill/>
-        </p:spPr>
-      </p:pic>
       <p:sp>
         <p:nvSpPr>
           <p:cNvPr id="2" name="Title 1"/>
@@ -7014,8 +6915,8 @@
         </p:nvSpPr>
         <p:spPr>
           <a:xfrm>
-            <a:off x="0" y="2941730"/>
-            <a:ext cx="4644008" cy="974540"/>
+            <a:off x="5868144" y="188640"/>
+            <a:ext cx="3275856" cy="706090"/>
           </a:xfrm>
           <a:solidFill>
             <a:schemeClr val="tx1">
@@ -7024,27 +6925,104 @@
           </a:solidFill>
         </p:spPr>
         <p:txBody>
-          <a:bodyPr lIns="360000">
-            <a:noAutofit/>
+          <a:bodyPr rIns="144000">
+            <a:normAutofit/>
           </a:bodyPr>
           <a:lstStyle/>
           <a:p>
-            <a:pPr algn="l"/>
-            <a:r>
-              <a:rPr lang="pt-PT" sz="5400" dirty="0" smtClean="0">
+            <a:pPr algn="r"/>
+            <a:r>
+              <a:rPr lang="pt-PT" sz="3200" dirty="0" smtClean="0">
                 <a:solidFill>
                   <a:schemeClr val="bg1"/>
                 </a:solidFill>
                 <a:latin typeface="League Gothic" pitchFamily="50" charset="0"/>
               </a:rPr>
-              <a:t>Further Work</a:t>
-            </a:r>
-            <a:endParaRPr lang="pt-PT" sz="5400" dirty="0">
+              <a:t>Rails &amp; MVC</a:t>
+            </a:r>
+            <a:endParaRPr lang="pt-PT" sz="3200" dirty="0">
               <a:solidFill>
                 <a:schemeClr val="bg1"/>
               </a:solidFill>
               <a:latin typeface="League Gothic" pitchFamily="50" charset="0"/>
             </a:endParaRPr>
+          </a:p>
+        </p:txBody>
+      </p:sp>
+      <p:sp>
+        <p:nvSpPr>
+          <p:cNvPr id="3" name="Content Placeholder 2"/>
+          <p:cNvSpPr>
+            <a:spLocks noGrp="1"/>
+          </p:cNvSpPr>
+          <p:nvPr>
+            <p:ph idx="1"/>
+          </p:nvPr>
+        </p:nvSpPr>
+        <p:spPr>
+          <a:xfrm>
+            <a:off x="457200" y="1124744"/>
+            <a:ext cx="8229600" cy="5040560"/>
+          </a:xfrm>
+          <a:effectLst>
+            <a:outerShdw blurRad="50800" dist="25400" dir="2700000" algn="tl" rotWithShape="0">
+              <a:prstClr val="black">
+                <a:alpha val="15000"/>
+              </a:prstClr>
+            </a:outerShdw>
+          </a:effectLst>
+        </p:spPr>
+        <p:txBody>
+          <a:bodyPr anchor="ctr" anchorCtr="1">
+            <a:normAutofit/>
+          </a:bodyPr>
+          <a:lstStyle/>
+          <a:p>
+            <a:pPr indent="0">
+              <a:lnSpc>
+                <a:spcPct val="110000"/>
+              </a:lnSpc>
+              <a:spcBef>
+                <a:spcPts val="0"/>
+              </a:spcBef>
+              <a:buNone/>
+            </a:pPr>
+            <a:r>
+              <a:rPr lang="pt-PT" sz="3600" dirty="0" smtClean="0">
+                <a:solidFill>
+                  <a:schemeClr val="tx1">
+                    <a:lumMod val="85000"/>
+                    <a:lumOff val="15000"/>
+                  </a:schemeClr>
+                </a:solidFill>
+                <a:latin typeface="MetaSerif-Book" pitchFamily="34" charset="0"/>
+              </a:rPr>
+              <a:t>MVC architecture used by Rails can coexist harmoniously with AOM design patterns, especially with the AR engine</a:t>
+            </a:r>
+          </a:p>
+        </p:txBody>
+      </p:sp>
+      <p:sp>
+        <p:nvSpPr>
+          <p:cNvPr id="4" name="Slide Number Placeholder 3"/>
+          <p:cNvSpPr>
+            <a:spLocks noGrp="1"/>
+          </p:cNvSpPr>
+          <p:nvPr>
+            <p:ph type="sldNum" sz="quarter" idx="12"/>
+          </p:nvPr>
+        </p:nvSpPr>
+        <p:spPr/>
+        <p:txBody>
+          <a:bodyPr/>
+          <a:lstStyle/>
+          <a:p>
+            <a:fld id="{AF2DD60D-AE1E-4B35-90D2-0ABAEDD7A6F5}" type="slidenum">
+              <a:rPr lang="pt-PT" smtClean="0"/>
+              <a:pPr/>
+              <a:t>26</a:t>
+            </a:fld>
+            <a:endParaRPr lang="pt-PT" dirty="0"/>
           </a:p>
         </p:txBody>
       </p:sp>
@@ -7115,7 +7093,7 @@
                 </a:solidFill>
                 <a:latin typeface="League Gothic" pitchFamily="50" charset="0"/>
               </a:rPr>
-              <a:t>Implementation</a:t>
+              <a:t>Variability</a:t>
             </a:r>
             <a:endParaRPr lang="pt-PT" sz="3200" dirty="0">
               <a:solidFill>
@@ -7316,15 +7294,18 @@
               </a:spcBef>
               <a:buNone/>
             </a:pPr>
-            <a:endParaRPr lang="pt-PT" sz="3600" dirty="0" smtClean="0">
-              <a:solidFill>
-                <a:schemeClr val="tx1">
-                  <a:lumMod val="85000"/>
-                  <a:lumOff val="15000"/>
-                </a:schemeClr>
-              </a:solidFill>
-              <a:latin typeface="MetaSerif-Book" pitchFamily="34" charset="0"/>
-            </a:endParaRPr>
+            <a:r>
+              <a:rPr lang="pt-PT" sz="3600" dirty="0" smtClean="0">
+                <a:solidFill>
+                  <a:schemeClr val="tx1">
+                    <a:lumMod val="85000"/>
+                    <a:lumOff val="15000"/>
+                  </a:schemeClr>
+                </a:solidFill>
+                <a:latin typeface="MetaSerif-Book" pitchFamily="34" charset="0"/>
+              </a:rPr>
+              <a:t>Performance can be increased</a:t>
+            </a:r>
           </a:p>
         </p:txBody>
       </p:sp>
@@ -7349,6 +7330,110 @@
               <a:t>28</a:t>
             </a:fld>
             <a:endParaRPr lang="pt-PT" dirty="0"/>
+          </a:p>
+        </p:txBody>
+      </p:sp>
+    </p:spTree>
+  </p:cSld>
+  <p:clrMapOvr>
+    <a:masterClrMapping/>
+  </p:clrMapOvr>
+  <p:timing>
+    <p:tnLst>
+      <p:par>
+        <p:cTn id="1" dur="indefinite" restart="never" nodeType="tmRoot"/>
+      </p:par>
+    </p:tnLst>
+  </p:timing>
+</p:sld>
+</file>
+
+<file path=ppt/slides/slide29.xml><?xml version="1.0" encoding="utf-8"?>
+<p:sld xmlns:a="http://schemas.openxmlformats.org/drawingml/2006/main" xmlns:r="http://schemas.openxmlformats.org/officeDocument/2006/relationships" xmlns:p="http://schemas.openxmlformats.org/presentationml/2006/main">
+  <p:cSld>
+    <p:spTree>
+      <p:nvGrpSpPr>
+        <p:cNvPr id="1" name=""/>
+        <p:cNvGrpSpPr/>
+        <p:nvPr/>
+      </p:nvGrpSpPr>
+      <p:grpSpPr>
+        <a:xfrm>
+          <a:off x="0" y="0"/>
+          <a:ext cx="0" cy="0"/>
+          <a:chOff x="0" y="0"/>
+          <a:chExt cx="0" cy="0"/>
+        </a:xfrm>
+      </p:grpSpPr>
+      <p:pic>
+        <p:nvPicPr>
+          <p:cNvPr id="3076" name="Picture 4" descr="C:\Users\jgradim\Documents\thesis\presentations\death_star.jpg"/>
+          <p:cNvPicPr>
+            <a:picLocks noChangeAspect="1" noChangeArrowheads="1"/>
+          </p:cNvPicPr>
+          <p:nvPr/>
+        </p:nvPicPr>
+        <p:blipFill>
+          <a:blip r:embed="rId2" cstate="print"/>
+          <a:srcRect r="2083"/>
+          <a:stretch>
+            <a:fillRect/>
+          </a:stretch>
+        </p:blipFill>
+        <p:spPr bwMode="auto">
+          <a:xfrm>
+            <a:off x="0" y="0"/>
+            <a:ext cx="9144000" cy="6858000"/>
+          </a:xfrm>
+          <a:prstGeom prst="rect">
+            <a:avLst/>
+          </a:prstGeom>
+          <a:noFill/>
+        </p:spPr>
+      </p:pic>
+      <p:sp>
+        <p:nvSpPr>
+          <p:cNvPr id="2" name="Title 1"/>
+          <p:cNvSpPr>
+            <a:spLocks noGrp="1"/>
+          </p:cNvSpPr>
+          <p:nvPr>
+            <p:ph type="title"/>
+          </p:nvPr>
+        </p:nvSpPr>
+        <p:spPr>
+          <a:xfrm>
+            <a:off x="0" y="2941730"/>
+            <a:ext cx="4644008" cy="974540"/>
+          </a:xfrm>
+          <a:solidFill>
+            <a:schemeClr val="tx1">
+              <a:alpha val="90000"/>
+            </a:schemeClr>
+          </a:solidFill>
+        </p:spPr>
+        <p:txBody>
+          <a:bodyPr lIns="360000">
+            <a:noAutofit/>
+          </a:bodyPr>
+          <a:lstStyle/>
+          <a:p>
+            <a:pPr algn="l"/>
+            <a:r>
+              <a:rPr lang="pt-PT" sz="5400" dirty="0" smtClean="0">
+                <a:solidFill>
+                  <a:schemeClr val="bg1"/>
+                </a:solidFill>
+                <a:latin typeface="League Gothic" pitchFamily="50" charset="0"/>
+              </a:rPr>
+              <a:t>Further Work</a:t>
+            </a:r>
+            <a:endParaRPr lang="pt-PT" sz="5400" dirty="0">
+              <a:solidFill>
+                <a:schemeClr val="bg1"/>
+              </a:solidFill>
+              <a:latin typeface="League Gothic" pitchFamily="50" charset="0"/>
+            </a:endParaRPr>
           </a:p>
         </p:txBody>
       </p:sp>
@@ -7499,6 +7584,310 @@
               <a:rPr lang="pt-PT" smtClean="0"/>
               <a:pPr/>
               <a:t>3</a:t>
+            </a:fld>
+            <a:endParaRPr lang="pt-PT" dirty="0"/>
+          </a:p>
+        </p:txBody>
+      </p:sp>
+    </p:spTree>
+  </p:cSld>
+  <p:clrMapOvr>
+    <a:masterClrMapping/>
+  </p:clrMapOvr>
+  <p:timing>
+    <p:tnLst>
+      <p:par>
+        <p:cTn id="1" dur="indefinite" restart="never" nodeType="tmRoot"/>
+      </p:par>
+    </p:tnLst>
+  </p:timing>
+</p:sld>
+</file>
+
+<file path=ppt/slides/slide30.xml><?xml version="1.0" encoding="utf-8"?>
+<p:sld xmlns:a="http://schemas.openxmlformats.org/drawingml/2006/main" xmlns:r="http://schemas.openxmlformats.org/officeDocument/2006/relationships" xmlns:p="http://schemas.openxmlformats.org/presentationml/2006/main">
+  <p:cSld>
+    <p:spTree>
+      <p:nvGrpSpPr>
+        <p:cNvPr id="1" name=""/>
+        <p:cNvGrpSpPr/>
+        <p:nvPr/>
+      </p:nvGrpSpPr>
+      <p:grpSpPr>
+        <a:xfrm>
+          <a:off x="0" y="0"/>
+          <a:ext cx="0" cy="0"/>
+          <a:chOff x="0" y="0"/>
+          <a:chExt cx="0" cy="0"/>
+        </a:xfrm>
+      </p:grpSpPr>
+      <p:sp>
+        <p:nvSpPr>
+          <p:cNvPr id="2" name="Title 1"/>
+          <p:cNvSpPr>
+            <a:spLocks noGrp="1"/>
+          </p:cNvSpPr>
+          <p:nvPr>
+            <p:ph type="title"/>
+          </p:nvPr>
+        </p:nvSpPr>
+        <p:spPr>
+          <a:xfrm>
+            <a:off x="5868144" y="188640"/>
+            <a:ext cx="3275856" cy="706090"/>
+          </a:xfrm>
+          <a:solidFill>
+            <a:schemeClr val="tx1">
+              <a:alpha val="90000"/>
+            </a:schemeClr>
+          </a:solidFill>
+        </p:spPr>
+        <p:txBody>
+          <a:bodyPr rIns="144000">
+            <a:normAutofit/>
+          </a:bodyPr>
+          <a:lstStyle/>
+          <a:p>
+            <a:pPr algn="r"/>
+            <a:r>
+              <a:rPr lang="pt-PT" sz="3200" dirty="0" smtClean="0">
+                <a:solidFill>
+                  <a:schemeClr val="bg1"/>
+                </a:solidFill>
+                <a:latin typeface="League Gothic" pitchFamily="50" charset="0"/>
+              </a:rPr>
+              <a:t>Implementation</a:t>
+            </a:r>
+            <a:endParaRPr lang="pt-PT" sz="3200" dirty="0">
+              <a:solidFill>
+                <a:schemeClr val="bg1"/>
+              </a:solidFill>
+              <a:latin typeface="League Gothic" pitchFamily="50" charset="0"/>
+            </a:endParaRPr>
+          </a:p>
+        </p:txBody>
+      </p:sp>
+      <p:sp>
+        <p:nvSpPr>
+          <p:cNvPr id="3" name="Content Placeholder 2"/>
+          <p:cNvSpPr>
+            <a:spLocks noGrp="1"/>
+          </p:cNvSpPr>
+          <p:nvPr>
+            <p:ph idx="1"/>
+          </p:nvPr>
+        </p:nvSpPr>
+        <p:spPr>
+          <a:xfrm>
+            <a:off x="457200" y="1124744"/>
+            <a:ext cx="8229600" cy="5040560"/>
+          </a:xfrm>
+          <a:effectLst>
+            <a:outerShdw blurRad="50800" dist="25400" dir="2700000" algn="tl" rotWithShape="0">
+              <a:prstClr val="black">
+                <a:alpha val="15000"/>
+              </a:prstClr>
+            </a:outerShdw>
+          </a:effectLst>
+        </p:spPr>
+        <p:txBody>
+          <a:bodyPr anchor="ctr" anchorCtr="1">
+            <a:normAutofit/>
+          </a:bodyPr>
+          <a:lstStyle/>
+          <a:p>
+            <a:pPr indent="0">
+              <a:lnSpc>
+                <a:spcPct val="110000"/>
+              </a:lnSpc>
+              <a:spcBef>
+                <a:spcPts val="0"/>
+              </a:spcBef>
+              <a:buNone/>
+            </a:pPr>
+            <a:endParaRPr lang="pt-PT" sz="3600" dirty="0" smtClean="0">
+              <a:solidFill>
+                <a:schemeClr val="tx1">
+                  <a:lumMod val="85000"/>
+                  <a:lumOff val="15000"/>
+                </a:schemeClr>
+              </a:solidFill>
+              <a:latin typeface="MetaSerif-Book" pitchFamily="34" charset="0"/>
+            </a:endParaRPr>
+          </a:p>
+        </p:txBody>
+      </p:sp>
+      <p:sp>
+        <p:nvSpPr>
+          <p:cNvPr id="4" name="Slide Number Placeholder 3"/>
+          <p:cNvSpPr>
+            <a:spLocks noGrp="1"/>
+          </p:cNvSpPr>
+          <p:nvPr>
+            <p:ph type="sldNum" sz="quarter" idx="12"/>
+          </p:nvPr>
+        </p:nvSpPr>
+        <p:spPr/>
+        <p:txBody>
+          <a:bodyPr/>
+          <a:lstStyle/>
+          <a:p>
+            <a:fld id="{AF2DD60D-AE1E-4B35-90D2-0ABAEDD7A6F5}" type="slidenum">
+              <a:rPr lang="pt-PT" smtClean="0"/>
+              <a:pPr/>
+              <a:t>30</a:t>
+            </a:fld>
+            <a:endParaRPr lang="pt-PT" dirty="0"/>
+          </a:p>
+        </p:txBody>
+      </p:sp>
+    </p:spTree>
+  </p:cSld>
+  <p:clrMapOvr>
+    <a:masterClrMapping/>
+  </p:clrMapOvr>
+  <p:timing>
+    <p:tnLst>
+      <p:par>
+        <p:cTn id="1" dur="indefinite" restart="never" nodeType="tmRoot"/>
+      </p:par>
+    </p:tnLst>
+  </p:timing>
+</p:sld>
+</file>
+
+<file path=ppt/slides/slide31.xml><?xml version="1.0" encoding="utf-8"?>
+<p:sld xmlns:a="http://schemas.openxmlformats.org/drawingml/2006/main" xmlns:r="http://schemas.openxmlformats.org/officeDocument/2006/relationships" xmlns:p="http://schemas.openxmlformats.org/presentationml/2006/main">
+  <p:cSld>
+    <p:spTree>
+      <p:nvGrpSpPr>
+        <p:cNvPr id="1" name=""/>
+        <p:cNvGrpSpPr/>
+        <p:nvPr/>
+      </p:nvGrpSpPr>
+      <p:grpSpPr>
+        <a:xfrm>
+          <a:off x="0" y="0"/>
+          <a:ext cx="0" cy="0"/>
+          <a:chOff x="0" y="0"/>
+          <a:chExt cx="0" cy="0"/>
+        </a:xfrm>
+      </p:grpSpPr>
+      <p:sp>
+        <p:nvSpPr>
+          <p:cNvPr id="2" name="Title 1"/>
+          <p:cNvSpPr>
+            <a:spLocks noGrp="1"/>
+          </p:cNvSpPr>
+          <p:nvPr>
+            <p:ph type="title"/>
+          </p:nvPr>
+        </p:nvSpPr>
+        <p:spPr>
+          <a:xfrm>
+            <a:off x="5868144" y="188640"/>
+            <a:ext cx="3275856" cy="706090"/>
+          </a:xfrm>
+          <a:solidFill>
+            <a:schemeClr val="tx1">
+              <a:alpha val="90000"/>
+            </a:schemeClr>
+          </a:solidFill>
+        </p:spPr>
+        <p:txBody>
+          <a:bodyPr rIns="144000">
+            <a:normAutofit/>
+          </a:bodyPr>
+          <a:lstStyle/>
+          <a:p>
+            <a:pPr algn="r"/>
+            <a:r>
+              <a:rPr lang="pt-PT" sz="3200" dirty="0" smtClean="0">
+                <a:solidFill>
+                  <a:schemeClr val="bg1"/>
+                </a:solidFill>
+                <a:latin typeface="League Gothic" pitchFamily="50" charset="0"/>
+              </a:rPr>
+              <a:t>Performance</a:t>
+            </a:r>
+            <a:endParaRPr lang="pt-PT" sz="3200" dirty="0">
+              <a:solidFill>
+                <a:schemeClr val="bg1"/>
+              </a:solidFill>
+              <a:latin typeface="League Gothic" pitchFamily="50" charset="0"/>
+            </a:endParaRPr>
+          </a:p>
+        </p:txBody>
+      </p:sp>
+      <p:sp>
+        <p:nvSpPr>
+          <p:cNvPr id="3" name="Content Placeholder 2"/>
+          <p:cNvSpPr>
+            <a:spLocks noGrp="1"/>
+          </p:cNvSpPr>
+          <p:nvPr>
+            <p:ph idx="1"/>
+          </p:nvPr>
+        </p:nvSpPr>
+        <p:spPr>
+          <a:xfrm>
+            <a:off x="457200" y="1124744"/>
+            <a:ext cx="8229600" cy="5040560"/>
+          </a:xfrm>
+          <a:effectLst>
+            <a:outerShdw blurRad="50800" dist="25400" dir="2700000" algn="tl" rotWithShape="0">
+              <a:prstClr val="black">
+                <a:alpha val="15000"/>
+              </a:prstClr>
+            </a:outerShdw>
+          </a:effectLst>
+        </p:spPr>
+        <p:txBody>
+          <a:bodyPr anchor="ctr" anchorCtr="1">
+            <a:normAutofit/>
+          </a:bodyPr>
+          <a:lstStyle/>
+          <a:p>
+            <a:pPr indent="0">
+              <a:lnSpc>
+                <a:spcPct val="110000"/>
+              </a:lnSpc>
+              <a:spcBef>
+                <a:spcPts val="0"/>
+              </a:spcBef>
+              <a:buNone/>
+            </a:pPr>
+            <a:endParaRPr lang="pt-PT" sz="3600" dirty="0" smtClean="0">
+              <a:solidFill>
+                <a:schemeClr val="tx1">
+                  <a:lumMod val="85000"/>
+                  <a:lumOff val="15000"/>
+                </a:schemeClr>
+              </a:solidFill>
+              <a:latin typeface="MetaSerif-Book" pitchFamily="34" charset="0"/>
+            </a:endParaRPr>
+          </a:p>
+        </p:txBody>
+      </p:sp>
+      <p:sp>
+        <p:nvSpPr>
+          <p:cNvPr id="4" name="Slide Number Placeholder 3"/>
+          <p:cNvSpPr>
+            <a:spLocks noGrp="1"/>
+          </p:cNvSpPr>
+          <p:nvPr>
+            <p:ph type="sldNum" sz="quarter" idx="12"/>
+          </p:nvPr>
+        </p:nvSpPr>
+        <p:spPr/>
+        <p:txBody>
+          <a:bodyPr/>
+          <a:lstStyle/>
+          <a:p>
+            <a:fld id="{AF2DD60D-AE1E-4B35-90D2-0ABAEDD7A6F5}" type="slidenum">
+              <a:rPr lang="pt-PT" smtClean="0"/>
+              <a:pPr/>
+              <a:t>31</a:t>
             </a:fld>
             <a:endParaRPr lang="pt-PT" dirty="0"/>
           </a:p>

</xml_diff>

<commit_message>
Almost final version, missing some images
</commit_message>
<xml_diff>
--- a/presentations/jgradim-presentation.pptx
+++ b/presentations/jgradim-presentation.pptx
@@ -5,7 +5,7 @@
     <p:sldMasterId id="2147483648" r:id="rId1"/>
   </p:sldMasterIdLst>
   <p:notesMasterIdLst>
-    <p:notesMasterId r:id="rId33"/>
+    <p:notesMasterId r:id="rId38"/>
   </p:notesMasterIdLst>
   <p:sldIdLst>
     <p:sldId id="256" r:id="rId2"/>
@@ -25,20 +25,25 @@
     <p:sldId id="280" r:id="rId16"/>
     <p:sldId id="282" r:id="rId17"/>
     <p:sldId id="287" r:id="rId18"/>
-    <p:sldId id="283" r:id="rId19"/>
-    <p:sldId id="285" r:id="rId20"/>
-    <p:sldId id="288" r:id="rId21"/>
-    <p:sldId id="284" r:id="rId22"/>
-    <p:sldId id="289" r:id="rId23"/>
-    <p:sldId id="286" r:id="rId24"/>
-    <p:sldId id="259" r:id="rId25"/>
-    <p:sldId id="279" r:id="rId26"/>
-    <p:sldId id="264" r:id="rId27"/>
-    <p:sldId id="269" r:id="rId28"/>
-    <p:sldId id="270" r:id="rId29"/>
-    <p:sldId id="266" r:id="rId30"/>
-    <p:sldId id="267" r:id="rId31"/>
-    <p:sldId id="268" r:id="rId32"/>
+    <p:sldId id="290" r:id="rId19"/>
+    <p:sldId id="283" r:id="rId20"/>
+    <p:sldId id="285" r:id="rId21"/>
+    <p:sldId id="288" r:id="rId22"/>
+    <p:sldId id="292" r:id="rId23"/>
+    <p:sldId id="293" r:id="rId24"/>
+    <p:sldId id="284" r:id="rId25"/>
+    <p:sldId id="289" r:id="rId26"/>
+    <p:sldId id="286" r:id="rId27"/>
+    <p:sldId id="291" r:id="rId28"/>
+    <p:sldId id="294" r:id="rId29"/>
+    <p:sldId id="259" r:id="rId30"/>
+    <p:sldId id="279" r:id="rId31"/>
+    <p:sldId id="264" r:id="rId32"/>
+    <p:sldId id="269" r:id="rId33"/>
+    <p:sldId id="270" r:id="rId34"/>
+    <p:sldId id="266" r:id="rId35"/>
+    <p:sldId id="267" r:id="rId36"/>
+    <p:sldId id="268" r:id="rId37"/>
   </p:sldIdLst>
   <p:sldSz cx="9144000" cy="6858000" type="screen4x3"/>
   <p:notesSz cx="6858000" cy="9144000"/>
@@ -223,7 +228,7 @@
             <a:fld id="{A4A9652A-D4BF-41F5-B3CF-F03C6BFD8852}" type="datetimeFigureOut">
               <a:rPr lang="pt-PT" smtClean="0"/>
               <a:pPr/>
-              <a:t>07-02-2011</a:t>
+              <a:t>08-02-2011</a:t>
             </a:fld>
             <a:endParaRPr lang="pt-PT"/>
           </a:p>
@@ -489,6 +494,261 @@
 </p:notesMaster>
 </file>
 
+<file path=ppt/notesSlides/notesSlide1.xml><?xml version="1.0" encoding="utf-8"?>
+<p:notes xmlns:a="http://schemas.openxmlformats.org/drawingml/2006/main" xmlns:r="http://schemas.openxmlformats.org/officeDocument/2006/relationships" xmlns:p="http://schemas.openxmlformats.org/presentationml/2006/main">
+  <p:cSld>
+    <p:spTree>
+      <p:nvGrpSpPr>
+        <p:cNvPr id="1" name=""/>
+        <p:cNvGrpSpPr/>
+        <p:nvPr/>
+      </p:nvGrpSpPr>
+      <p:grpSpPr>
+        <a:xfrm>
+          <a:off x="0" y="0"/>
+          <a:ext cx="0" cy="0"/>
+          <a:chOff x="0" y="0"/>
+          <a:chExt cx="0" cy="0"/>
+        </a:xfrm>
+      </p:grpSpPr>
+      <p:sp>
+        <p:nvSpPr>
+          <p:cNvPr id="2" name="Slide Image Placeholder 1"/>
+          <p:cNvSpPr>
+            <a:spLocks noGrp="1" noRot="1" noChangeAspect="1"/>
+          </p:cNvSpPr>
+          <p:nvPr>
+            <p:ph type="sldImg"/>
+          </p:nvPr>
+        </p:nvSpPr>
+        <p:spPr/>
+      </p:sp>
+      <p:sp>
+        <p:nvSpPr>
+          <p:cNvPr id="3" name="Notes Placeholder 2"/>
+          <p:cNvSpPr>
+            <a:spLocks noGrp="1"/>
+          </p:cNvSpPr>
+          <p:nvPr>
+            <p:ph type="body" idx="1"/>
+          </p:nvPr>
+        </p:nvSpPr>
+        <p:spPr/>
+        <p:txBody>
+          <a:bodyPr>
+            <a:normAutofit/>
+          </a:bodyPr>
+          <a:lstStyle/>
+          <a:p>
+            <a:r>
+              <a:rPr lang="pt-PT" dirty="0" smtClean="0"/>
+              <a:t>1 – without any effort</a:t>
+            </a:r>
+            <a:r>
+              <a:rPr lang="pt-PT" baseline="0" dirty="0" smtClean="0"/>
+              <a:t> and without polluting the codebase with hardcoded exceptions</a:t>
+            </a:r>
+            <a:endParaRPr lang="pt-PT" dirty="0"/>
+          </a:p>
+        </p:txBody>
+      </p:sp>
+      <p:sp>
+        <p:nvSpPr>
+          <p:cNvPr id="4" name="Slide Number Placeholder 3"/>
+          <p:cNvSpPr>
+            <a:spLocks noGrp="1"/>
+          </p:cNvSpPr>
+          <p:nvPr>
+            <p:ph type="sldNum" sz="quarter" idx="10"/>
+          </p:nvPr>
+        </p:nvSpPr>
+        <p:spPr/>
+        <p:txBody>
+          <a:bodyPr/>
+          <a:lstStyle/>
+          <a:p>
+            <a:fld id="{EE5867BE-386C-4D16-9B1D-8635FC172DF2}" type="slidenum">
+              <a:rPr lang="pt-PT" smtClean="0"/>
+              <a:pPr/>
+              <a:t>22</a:t>
+            </a:fld>
+            <a:endParaRPr lang="pt-PT"/>
+          </a:p>
+        </p:txBody>
+      </p:sp>
+    </p:spTree>
+  </p:cSld>
+  <p:clrMapOvr>
+    <a:masterClrMapping/>
+  </p:clrMapOvr>
+</p:notes>
+</file>
+
+<file path=ppt/notesSlides/notesSlide2.xml><?xml version="1.0" encoding="utf-8"?>
+<p:notes xmlns:a="http://schemas.openxmlformats.org/drawingml/2006/main" xmlns:r="http://schemas.openxmlformats.org/officeDocument/2006/relationships" xmlns:p="http://schemas.openxmlformats.org/presentationml/2006/main">
+  <p:cSld>
+    <p:spTree>
+      <p:nvGrpSpPr>
+        <p:cNvPr id="1" name=""/>
+        <p:cNvGrpSpPr/>
+        <p:nvPr/>
+      </p:nvGrpSpPr>
+      <p:grpSpPr>
+        <a:xfrm>
+          <a:off x="0" y="0"/>
+          <a:ext cx="0" cy="0"/>
+          <a:chOff x="0" y="0"/>
+          <a:chExt cx="0" cy="0"/>
+        </a:xfrm>
+      </p:grpSpPr>
+      <p:sp>
+        <p:nvSpPr>
+          <p:cNvPr id="2" name="Slide Image Placeholder 1"/>
+          <p:cNvSpPr>
+            <a:spLocks noGrp="1" noRot="1" noChangeAspect="1"/>
+          </p:cNvSpPr>
+          <p:nvPr>
+            <p:ph type="sldImg"/>
+          </p:nvPr>
+        </p:nvSpPr>
+        <p:spPr/>
+      </p:sp>
+      <p:sp>
+        <p:nvSpPr>
+          <p:cNvPr id="3" name="Notes Placeholder 2"/>
+          <p:cNvSpPr>
+            <a:spLocks noGrp="1"/>
+          </p:cNvSpPr>
+          <p:nvPr>
+            <p:ph type="body" idx="1"/>
+          </p:nvPr>
+        </p:nvSpPr>
+        <p:spPr/>
+        <p:txBody>
+          <a:bodyPr>
+            <a:normAutofit/>
+          </a:bodyPr>
+          <a:lstStyle/>
+          <a:p>
+            <a:pPr marL="0" marR="0" indent="0" algn="l" defTabSz="914400" rtl="0" eaLnBrk="1" fontAlgn="auto" latinLnBrk="0" hangingPunct="1">
+              <a:lnSpc>
+                <a:spcPct val="100000"/>
+              </a:lnSpc>
+              <a:spcBef>
+                <a:spcPts val="0"/>
+              </a:spcBef>
+              <a:spcAft>
+                <a:spcPts val="0"/>
+              </a:spcAft>
+              <a:buClrTx/>
+              <a:buSzTx/>
+              <a:buFontTx/>
+              <a:buNone/>
+              <a:tabLst/>
+              <a:defRPr/>
+            </a:pPr>
+            <a:r>
+              <a:rPr lang="pt-PT" dirty="0" smtClean="0"/>
+              <a:t>Much simpler infrastructure:</a:t>
+            </a:r>
+            <a:r>
+              <a:rPr lang="pt-PT" baseline="0" dirty="0" smtClean="0"/>
+              <a:t> focus on model description instead of versioning and association logic</a:t>
+            </a:r>
+          </a:p>
+          <a:p>
+            <a:pPr marL="0" marR="0" indent="0" algn="l" defTabSz="914400" rtl="0" eaLnBrk="1" fontAlgn="auto" latinLnBrk="0" hangingPunct="1">
+              <a:lnSpc>
+                <a:spcPct val="100000"/>
+              </a:lnSpc>
+              <a:spcBef>
+                <a:spcPts val="0"/>
+              </a:spcBef>
+              <a:spcAft>
+                <a:spcPts val="0"/>
+              </a:spcAft>
+              <a:buClrTx/>
+              <a:buSzTx/>
+              <a:buFontTx/>
+              <a:buNone/>
+              <a:tabLst/>
+              <a:defRPr/>
+            </a:pPr>
+            <a:endParaRPr lang="pt-PT" dirty="0" smtClean="0"/>
+          </a:p>
+          <a:p>
+            <a:pPr marL="0" marR="0" indent="0" algn="l" defTabSz="914400" rtl="0" eaLnBrk="1" fontAlgn="auto" latinLnBrk="0" hangingPunct="1">
+              <a:lnSpc>
+                <a:spcPct val="100000"/>
+              </a:lnSpc>
+              <a:spcBef>
+                <a:spcPts val="0"/>
+              </a:spcBef>
+              <a:spcAft>
+                <a:spcPts val="0"/>
+              </a:spcAft>
+              <a:buClrTx/>
+              <a:buSzTx/>
+              <a:buFontTx/>
+              <a:buNone/>
+              <a:tabLst/>
+              <a:defRPr/>
+            </a:pPr>
+            <a:r>
+              <a:rPr lang="pt-PT" dirty="0" smtClean="0"/>
+              <a:t>No code repetition</a:t>
+            </a:r>
+            <a:r>
+              <a:rPr lang="pt-PT" baseline="0" dirty="0" smtClean="0"/>
+              <a:t>: </a:t>
+            </a:r>
+            <a:r>
+              <a:rPr lang="pt-PT" sz="1200" dirty="0" smtClean="0">
+                <a:solidFill>
+                  <a:schemeClr val="tx1">
+                    <a:lumMod val="85000"/>
+                    <a:lumOff val="15000"/>
+                  </a:schemeClr>
+                </a:solidFill>
+                <a:latin typeface="MetaSerif-Book" pitchFamily="34" charset="0"/>
+              </a:rPr>
+              <a:t>unique handler for user input, less errors, more focus</a:t>
+            </a:r>
+          </a:p>
+        </p:txBody>
+      </p:sp>
+      <p:sp>
+        <p:nvSpPr>
+          <p:cNvPr id="4" name="Slide Number Placeholder 3"/>
+          <p:cNvSpPr>
+            <a:spLocks noGrp="1"/>
+          </p:cNvSpPr>
+          <p:nvPr>
+            <p:ph type="sldNum" sz="quarter" idx="10"/>
+          </p:nvPr>
+        </p:nvSpPr>
+        <p:spPr/>
+        <p:txBody>
+          <a:bodyPr/>
+          <a:lstStyle/>
+          <a:p>
+            <a:fld id="{EE5867BE-386C-4D16-9B1D-8635FC172DF2}" type="slidenum">
+              <a:rPr lang="pt-PT" smtClean="0"/>
+              <a:pPr/>
+              <a:t>27</a:t>
+            </a:fld>
+            <a:endParaRPr lang="pt-PT"/>
+          </a:p>
+        </p:txBody>
+      </p:sp>
+    </p:spTree>
+  </p:cSld>
+  <p:clrMapOvr>
+    <a:masterClrMapping/>
+  </p:clrMapOvr>
+</p:notes>
+</file>
+
 <file path=ppt/slideLayouts/slideLayout1.xml><?xml version="1.0" encoding="utf-8"?>
 <p:sldLayout xmlns:a="http://schemas.openxmlformats.org/drawingml/2006/main" xmlns:r="http://schemas.openxmlformats.org/officeDocument/2006/relationships" xmlns:p="http://schemas.openxmlformats.org/presentationml/2006/main" type="title" preserve="1">
   <p:cSld name="Title Slide">
@@ -679,7 +939,7 @@
             <a:fld id="{B21DA5EC-CDBD-4BE5-AFEC-D05D842E9DCA}" type="datetime1">
               <a:rPr lang="pt-PT" smtClean="0"/>
               <a:pPr/>
-              <a:t>07-02-2011</a:t>
+              <a:t>08-02-2011</a:t>
             </a:fld>
             <a:endParaRPr lang="pt-PT"/>
           </a:p>
@@ -854,7 +1114,7 @@
             <a:fld id="{265ABC6D-62B8-444F-8CBB-55DA24843F08}" type="datetime1">
               <a:rPr lang="pt-PT" smtClean="0"/>
               <a:pPr/>
-              <a:t>07-02-2011</a:t>
+              <a:t>08-02-2011</a:t>
             </a:fld>
             <a:endParaRPr lang="pt-PT"/>
           </a:p>
@@ -1039,7 +1299,7 @@
             <a:fld id="{642BB447-BC74-408D-87E2-151F2C4E6D5C}" type="datetime1">
               <a:rPr lang="pt-PT" smtClean="0"/>
               <a:pPr/>
-              <a:t>07-02-2011</a:t>
+              <a:t>08-02-2011</a:t>
             </a:fld>
             <a:endParaRPr lang="pt-PT"/>
           </a:p>
@@ -1267,7 +1527,7 @@
             <a:fld id="{1AE16238-79D5-4CE1-9F7C-9EB0DB09B684}" type="datetime1">
               <a:rPr lang="pt-PT" smtClean="0"/>
               <a:pPr/>
-              <a:t>07-02-2011</a:t>
+              <a:t>08-02-2011</a:t>
             </a:fld>
             <a:endParaRPr lang="pt-PT"/>
           </a:p>
@@ -1525,7 +1785,7 @@
             <a:fld id="{29EC9118-B484-4893-9D08-9848F3CE7FF2}" type="datetime1">
               <a:rPr lang="pt-PT" smtClean="0"/>
               <a:pPr/>
-              <a:t>07-02-2011</a:t>
+              <a:t>08-02-2011</a:t>
             </a:fld>
             <a:endParaRPr lang="pt-PT"/>
           </a:p>
@@ -1818,7 +2078,7 @@
             <a:fld id="{93295FF2-CB18-49BE-8735-588EA2A78858}" type="datetime1">
               <a:rPr lang="pt-PT" smtClean="0"/>
               <a:pPr/>
-              <a:t>07-02-2011</a:t>
+              <a:t>08-02-2011</a:t>
             </a:fld>
             <a:endParaRPr lang="pt-PT"/>
           </a:p>
@@ -2245,7 +2505,7 @@
             <a:fld id="{50896DA6-8084-488D-9E6B-45E32377C613}" type="datetime1">
               <a:rPr lang="pt-PT" smtClean="0"/>
               <a:pPr/>
-              <a:t>07-02-2011</a:t>
+              <a:t>08-02-2011</a:t>
             </a:fld>
             <a:endParaRPr lang="pt-PT"/>
           </a:p>
@@ -2368,7 +2628,7 @@
             <a:fld id="{40926C83-C8D3-48F0-B08F-F8259B57109C}" type="datetime1">
               <a:rPr lang="pt-PT" smtClean="0"/>
               <a:pPr/>
-              <a:t>07-02-2011</a:t>
+              <a:t>08-02-2011</a:t>
             </a:fld>
             <a:endParaRPr lang="pt-PT"/>
           </a:p>
@@ -2468,7 +2728,7 @@
             <a:fld id="{379D2EB6-009D-45E0-886C-0BF1B142AD62}" type="datetime1">
               <a:rPr lang="pt-PT" smtClean="0"/>
               <a:pPr/>
-              <a:t>07-02-2011</a:t>
+              <a:t>08-02-2011</a:t>
             </a:fld>
             <a:endParaRPr lang="pt-PT"/>
           </a:p>
@@ -2750,7 +3010,7 @@
             <a:fld id="{D9720365-511F-43DE-9BF0-D286DA1D7131}" type="datetime1">
               <a:rPr lang="pt-PT" smtClean="0"/>
               <a:pPr/>
-              <a:t>07-02-2011</a:t>
+              <a:t>08-02-2011</a:t>
             </a:fld>
             <a:endParaRPr lang="pt-PT"/>
           </a:p>
@@ -3008,7 +3268,7 @@
             <a:fld id="{E9DCFC39-BBD6-4CEF-9802-34CE70E119D6}" type="datetime1">
               <a:rPr lang="pt-PT" smtClean="0"/>
               <a:pPr/>
-              <a:t>07-02-2011</a:t>
+              <a:t>08-02-2011</a:t>
             </a:fld>
             <a:endParaRPr lang="pt-PT"/>
           </a:p>
@@ -3982,8 +4242,8 @@
         </p:nvSpPr>
         <p:spPr>
           <a:xfrm>
-            <a:off x="5868144" y="188640"/>
-            <a:ext cx="3275856" cy="706090"/>
+            <a:off x="5184000" y="188640"/>
+            <a:ext cx="3960000" cy="706090"/>
           </a:xfrm>
           <a:solidFill>
             <a:schemeClr val="tx1">
@@ -4061,7 +4321,7 @@
                 </a:solidFill>
                 <a:latin typeface="MetaSerif-Book" pitchFamily="34" charset="0"/>
               </a:rPr>
-              <a:t>Metaprogramming</a:t>
+              <a:t>Aspect-Oriented Programming</a:t>
             </a:r>
           </a:p>
           <a:p>
@@ -4098,7 +4358,7 @@
                 </a:solidFill>
                 <a:latin typeface="MetaSerif-Book" pitchFamily="34" charset="0"/>
               </a:rPr>
-              <a:t>Aspect-Oriented Programming</a:t>
+              <a:t>Metaprogramming</a:t>
             </a:r>
           </a:p>
         </p:txBody>
@@ -4171,8 +4431,8 @@
         </p:nvSpPr>
         <p:spPr>
           <a:xfrm>
-            <a:off x="5868144" y="188640"/>
-            <a:ext cx="3275856" cy="706090"/>
+            <a:off x="5184000" y="188640"/>
+            <a:ext cx="3960000" cy="706090"/>
           </a:xfrm>
           <a:solidFill>
             <a:schemeClr val="tx1">
@@ -4360,8 +4620,8 @@
         </p:nvSpPr>
         <p:spPr>
           <a:xfrm>
-            <a:off x="5868144" y="188640"/>
-            <a:ext cx="3275856" cy="706090"/>
+            <a:off x="5184000" y="188640"/>
+            <a:ext cx="3960000" cy="706090"/>
           </a:xfrm>
           <a:solidFill>
             <a:schemeClr val="tx1">
@@ -4396,53 +4656,6 @@
       </p:sp>
       <p:sp>
         <p:nvSpPr>
-          <p:cNvPr id="3" name="Content Placeholder 2"/>
-          <p:cNvSpPr>
-            <a:spLocks noGrp="1"/>
-          </p:cNvSpPr>
-          <p:nvPr>
-            <p:ph idx="1"/>
-          </p:nvPr>
-        </p:nvSpPr>
-        <p:spPr>
-          <a:xfrm>
-            <a:off x="457200" y="908720"/>
-            <a:ext cx="8229600" cy="5472608"/>
-          </a:xfrm>
-          <a:effectLst>
-            <a:outerShdw blurRad="50800" dist="25400" dir="2700000" algn="tl" rotWithShape="0">
-              <a:prstClr val="black">
-                <a:alpha val="15000"/>
-              </a:prstClr>
-            </a:outerShdw>
-          </a:effectLst>
-        </p:spPr>
-        <p:txBody>
-          <a:bodyPr anchor="ctr" anchorCtr="1">
-            <a:normAutofit/>
-          </a:bodyPr>
-          <a:lstStyle/>
-          <a:p>
-            <a:pPr algn="ctr">
-              <a:lnSpc>
-                <a:spcPct val="110000"/>
-              </a:lnSpc>
-              <a:buNone/>
-            </a:pPr>
-            <a:endParaRPr lang="pt-PT" sz="3600" dirty="0" smtClean="0">
-              <a:solidFill>
-                <a:schemeClr val="tx1">
-                  <a:lumMod val="85000"/>
-                  <a:lumOff val="15000"/>
-                </a:schemeClr>
-              </a:solidFill>
-              <a:latin typeface="MetaSerif-Book" pitchFamily="34" charset="0"/>
-            </a:endParaRPr>
-          </a:p>
-        </p:txBody>
-      </p:sp>
-      <p:sp>
-        <p:nvSpPr>
           <p:cNvPr id="4" name="Slide Number Placeholder 3"/>
           <p:cNvSpPr>
             <a:spLocks noGrp="1"/>
@@ -4465,6 +4678,39 @@
           </a:p>
         </p:txBody>
       </p:sp>
+      <p:pic>
+        <p:nvPicPr>
+          <p:cNvPr id="5" name="Picture 2" descr="C:\Users\jgradim\Documents\thesis\presentations\images\aom_pattern_composition.png"/>
+          <p:cNvPicPr>
+            <a:picLocks noChangeAspect="1" noChangeArrowheads="1"/>
+          </p:cNvPicPr>
+          <p:nvPr/>
+        </p:nvPicPr>
+        <p:blipFill>
+          <a:blip r:embed="rId2" cstate="print"/>
+          <a:srcRect/>
+          <a:stretch>
+            <a:fillRect/>
+          </a:stretch>
+        </p:blipFill>
+        <p:spPr bwMode="auto">
+          <a:xfrm>
+            <a:off x="129158" y="1160911"/>
+            <a:ext cx="8885685" cy="4536179"/>
+          </a:xfrm>
+          <a:prstGeom prst="rect">
+            <a:avLst/>
+          </a:prstGeom>
+          <a:noFill/>
+          <a:effectLst>
+            <a:outerShdw blurRad="38100" dist="38100" dir="2700000" algn="tl" rotWithShape="0">
+              <a:prstClr val="black">
+                <a:alpha val="15000"/>
+              </a:prstClr>
+            </a:outerShdw>
+          </a:effectLst>
+        </p:spPr>
+      </p:pic>
     </p:spTree>
   </p:cSld>
   <p:clrMapOvr>
@@ -4668,8 +4914,8 @@
         </p:nvSpPr>
         <p:spPr>
           <a:xfrm>
-            <a:off x="5868144" y="188640"/>
-            <a:ext cx="3275856" cy="706090"/>
+            <a:off x="5184000" y="188640"/>
+            <a:ext cx="3960000" cy="706090"/>
           </a:xfrm>
           <a:solidFill>
             <a:schemeClr val="tx1">
@@ -4909,8 +5155,8 @@
         </p:nvSpPr>
         <p:spPr>
           <a:xfrm>
-            <a:off x="5868144" y="188640"/>
-            <a:ext cx="3275856" cy="706090"/>
+            <a:off x="5184000" y="188640"/>
+            <a:ext cx="3960000" cy="706090"/>
           </a:xfrm>
           <a:solidFill>
             <a:schemeClr val="tx1">
@@ -5034,7 +5280,7 @@
                 </a:solidFill>
                 <a:latin typeface="MetaSerif-Book" pitchFamily="34" charset="0"/>
               </a:rPr>
-              <a:t>Declarative authorization (CanCan)</a:t>
+              <a:t>Multi-level hierarchy</a:t>
             </a:r>
           </a:p>
           <a:p>
@@ -5150,8 +5396,8 @@
         </p:nvSpPr>
         <p:spPr>
           <a:xfrm>
-            <a:off x="5868144" y="188640"/>
-            <a:ext cx="3275856" cy="706090"/>
+            <a:off x="5184000" y="188640"/>
+            <a:ext cx="3960000" cy="706090"/>
           </a:xfrm>
           <a:solidFill>
             <a:schemeClr val="tx1">
@@ -5173,7 +5419,7 @@
                 </a:solidFill>
                 <a:latin typeface="League Gothic" pitchFamily="50" charset="0"/>
               </a:rPr>
-              <a:t>User Roles</a:t>
+              <a:t>User Roles – Before</a:t>
             </a:r>
             <a:endParaRPr lang="pt-PT" sz="1800" dirty="0">
               <a:solidFill>
@@ -5225,8 +5471,8 @@
         </p:blipFill>
         <p:spPr bwMode="auto">
           <a:xfrm>
-            <a:off x="328448" y="692696"/>
-            <a:ext cx="8276000" cy="5666259"/>
+            <a:off x="467544" y="787930"/>
+            <a:ext cx="7997808" cy="5475792"/>
           </a:xfrm>
           <a:prstGeom prst="rect">
             <a:avLst/>
@@ -5285,8 +5531,8 @@
         </p:nvSpPr>
         <p:spPr>
           <a:xfrm>
-            <a:off x="5868144" y="188640"/>
-            <a:ext cx="3275856" cy="706090"/>
+            <a:off x="5184000" y="188640"/>
+            <a:ext cx="3960000" cy="706090"/>
           </a:xfrm>
           <a:solidFill>
             <a:schemeClr val="tx1">
@@ -5308,7 +5554,7 @@
                 </a:solidFill>
                 <a:latin typeface="League Gothic" pitchFamily="50" charset="0"/>
               </a:rPr>
-              <a:t>User Roles</a:t>
+              <a:t>User Roles – After</a:t>
             </a:r>
             <a:endParaRPr lang="pt-PT" sz="1800" dirty="0">
               <a:solidFill>
@@ -5360,8 +5606,8 @@
         </p:blipFill>
         <p:spPr bwMode="auto">
           <a:xfrm>
-            <a:off x="323528" y="1916832"/>
-            <a:ext cx="8587855" cy="3321672"/>
+            <a:off x="161414" y="1854128"/>
+            <a:ext cx="8912084" cy="3447080"/>
           </a:xfrm>
           <a:prstGeom prst="rect">
             <a:avLst/>
@@ -5420,8 +5666,8 @@
         </p:nvSpPr>
         <p:spPr>
           <a:xfrm>
-            <a:off x="5868144" y="188640"/>
-            <a:ext cx="3275856" cy="706090"/>
+            <a:off x="5184000" y="188640"/>
+            <a:ext cx="3960000" cy="706090"/>
           </a:xfrm>
           <a:solidFill>
             <a:schemeClr val="tx1">
@@ -5443,7 +5689,7 @@
                 </a:solidFill>
                 <a:latin typeface="League Gothic" pitchFamily="50" charset="0"/>
               </a:rPr>
-              <a:t>Social Network</a:t>
+              <a:t>User Roles – Results</a:t>
             </a:r>
             <a:endParaRPr lang="pt-PT" sz="1800" dirty="0">
               <a:solidFill>
@@ -5456,7 +5702,31 @@
       </p:sp>
       <p:sp>
         <p:nvSpPr>
-          <p:cNvPr id="3" name="Content Placeholder 2"/>
+          <p:cNvPr id="4" name="Slide Number Placeholder 3"/>
+          <p:cNvSpPr>
+            <a:spLocks noGrp="1"/>
+          </p:cNvSpPr>
+          <p:nvPr>
+            <p:ph type="sldNum" sz="quarter" idx="12"/>
+          </p:nvPr>
+        </p:nvSpPr>
+        <p:spPr/>
+        <p:txBody>
+          <a:bodyPr/>
+          <a:lstStyle/>
+          <a:p>
+            <a:fld id="{AF2DD60D-AE1E-4B35-90D2-0ABAEDD7A6F5}" type="slidenum">
+              <a:rPr lang="pt-PT" smtClean="0"/>
+              <a:pPr/>
+              <a:t>18</a:t>
+            </a:fld>
+            <a:endParaRPr lang="pt-PT" dirty="0"/>
+          </a:p>
+        </p:txBody>
+      </p:sp>
+      <p:sp>
+        <p:nvSpPr>
+          <p:cNvPr id="6" name="Content Placeholder 2"/>
           <p:cNvSpPr>
             <a:spLocks noGrp="1"/>
           </p:cNvSpPr>
@@ -5502,7 +5772,7 @@
                 </a:solidFill>
                 <a:latin typeface="MetaSerif-Book" pitchFamily="34" charset="0"/>
               </a:rPr>
-              <a:t>Completely dynamic</a:t>
+              <a:t>Flexible design</a:t>
             </a:r>
           </a:p>
           <a:p>
@@ -5545,7 +5815,19 @@
                 </a:solidFill>
                 <a:latin typeface="MetaSerif-Book" pitchFamily="34" charset="0"/>
               </a:rPr>
-              <a:t>Built upon request, on runtime</a:t>
+              <a:t>Rulesets </a:t>
+            </a:r>
+            <a:r>
+              <a:rPr lang="pt-PT" sz="3600" dirty="0" smtClean="0">
+                <a:solidFill>
+                  <a:schemeClr val="tx1">
+                    <a:lumMod val="85000"/>
+                    <a:lumOff val="15000"/>
+                  </a:schemeClr>
+                </a:solidFill>
+                <a:latin typeface="MetaSerif-Book" pitchFamily="34" charset="0"/>
+              </a:rPr>
+              <a:t>are based on role composition instead of subclassing</a:t>
             </a:r>
           </a:p>
           <a:p>
@@ -5588,32 +5870,8 @@
                 </a:solidFill>
                 <a:latin typeface="MetaSerif-Book" pitchFamily="34" charset="0"/>
               </a:rPr>
-              <a:t>Not very flexible...</a:t>
-            </a:r>
-          </a:p>
-        </p:txBody>
-      </p:sp>
-      <p:sp>
-        <p:nvSpPr>
-          <p:cNvPr id="4" name="Slide Number Placeholder 3"/>
-          <p:cNvSpPr>
-            <a:spLocks noGrp="1"/>
-          </p:cNvSpPr>
-          <p:nvPr>
-            <p:ph type="sldNum" sz="quarter" idx="12"/>
-          </p:nvPr>
-        </p:nvSpPr>
-        <p:spPr/>
-        <p:txBody>
-          <a:bodyPr/>
-          <a:lstStyle/>
-          <a:p>
-            <a:fld id="{AF2DD60D-AE1E-4B35-90D2-0ABAEDD7A6F5}" type="slidenum">
-              <a:rPr lang="pt-PT" smtClean="0"/>
-              <a:pPr/>
-              <a:t>18</a:t>
-            </a:fld>
-            <a:endParaRPr lang="pt-PT" dirty="0"/>
+              <a:t>Independent roles</a:t>
+            </a:r>
           </a:p>
         </p:txBody>
       </p:sp>
@@ -5661,8 +5919,8 @@
         </p:nvSpPr>
         <p:spPr>
           <a:xfrm>
-            <a:off x="5868144" y="188640"/>
-            <a:ext cx="3275856" cy="706090"/>
+            <a:off x="5184000" y="188640"/>
+            <a:ext cx="3960000" cy="706090"/>
           </a:xfrm>
           <a:solidFill>
             <a:schemeClr val="tx1">
@@ -5697,6 +5955,154 @@
       </p:sp>
       <p:sp>
         <p:nvSpPr>
+          <p:cNvPr id="3" name="Content Placeholder 2"/>
+          <p:cNvSpPr>
+            <a:spLocks noGrp="1"/>
+          </p:cNvSpPr>
+          <p:nvPr>
+            <p:ph idx="1"/>
+          </p:nvPr>
+        </p:nvSpPr>
+        <p:spPr>
+          <a:xfrm>
+            <a:off x="457200" y="1124744"/>
+            <a:ext cx="8229600" cy="5040560"/>
+          </a:xfrm>
+          <a:effectLst>
+            <a:outerShdw blurRad="50800" dist="25400" dir="2700000" algn="tl" rotWithShape="0">
+              <a:prstClr val="black">
+                <a:alpha val="15000"/>
+              </a:prstClr>
+            </a:outerShdw>
+          </a:effectLst>
+        </p:spPr>
+        <p:txBody>
+          <a:bodyPr vert="horz" anchor="ctr" anchorCtr="1">
+            <a:normAutofit/>
+          </a:bodyPr>
+          <a:lstStyle/>
+          <a:p>
+            <a:pPr indent="0" algn="ctr">
+              <a:lnSpc>
+                <a:spcPct val="110000"/>
+              </a:lnSpc>
+              <a:spcBef>
+                <a:spcPts val="0"/>
+              </a:spcBef>
+              <a:buNone/>
+            </a:pPr>
+            <a:r>
+              <a:rPr lang="pt-PT" sz="3600" dirty="0" smtClean="0">
+                <a:solidFill>
+                  <a:schemeClr val="tx1">
+                    <a:lumMod val="85000"/>
+                    <a:lumOff val="15000"/>
+                  </a:schemeClr>
+                </a:solidFill>
+                <a:latin typeface="MetaSerif-Book" pitchFamily="34" charset="0"/>
+              </a:rPr>
+              <a:t>Completely dynamic</a:t>
+            </a:r>
+          </a:p>
+          <a:p>
+            <a:pPr indent="0" algn="ctr">
+              <a:lnSpc>
+                <a:spcPct val="110000"/>
+              </a:lnSpc>
+              <a:spcBef>
+                <a:spcPts val="0"/>
+              </a:spcBef>
+              <a:buNone/>
+            </a:pPr>
+            <a:endParaRPr lang="pt-PT" sz="3600" dirty="0" smtClean="0">
+              <a:solidFill>
+                <a:schemeClr val="tx1">
+                  <a:lumMod val="85000"/>
+                  <a:lumOff val="15000"/>
+                </a:schemeClr>
+              </a:solidFill>
+              <a:latin typeface="MetaSerif-Book" pitchFamily="34" charset="0"/>
+            </a:endParaRPr>
+          </a:p>
+          <a:p>
+            <a:pPr indent="0" algn="ctr">
+              <a:lnSpc>
+                <a:spcPct val="110000"/>
+              </a:lnSpc>
+              <a:spcBef>
+                <a:spcPts val="0"/>
+              </a:spcBef>
+              <a:buNone/>
+            </a:pPr>
+            <a:r>
+              <a:rPr lang="pt-PT" sz="3600" dirty="0" smtClean="0">
+                <a:solidFill>
+                  <a:schemeClr val="tx1">
+                    <a:lumMod val="85000"/>
+                    <a:lumOff val="15000"/>
+                  </a:schemeClr>
+                </a:solidFill>
+                <a:latin typeface="MetaSerif-Book" pitchFamily="34" charset="0"/>
+              </a:rPr>
+              <a:t>Built upon request, on runtime</a:t>
+            </a:r>
+          </a:p>
+          <a:p>
+            <a:pPr indent="0" algn="ctr">
+              <a:lnSpc>
+                <a:spcPct val="110000"/>
+              </a:lnSpc>
+              <a:spcBef>
+                <a:spcPts val="0"/>
+              </a:spcBef>
+              <a:buNone/>
+            </a:pPr>
+            <a:endParaRPr lang="pt-PT" sz="3600" dirty="0" smtClean="0">
+              <a:solidFill>
+                <a:schemeClr val="tx1">
+                  <a:lumMod val="85000"/>
+                  <a:lumOff val="15000"/>
+                </a:schemeClr>
+              </a:solidFill>
+              <a:latin typeface="MetaSerif-Book" pitchFamily="34" charset="0"/>
+            </a:endParaRPr>
+          </a:p>
+          <a:p>
+            <a:pPr indent="0" algn="ctr">
+              <a:lnSpc>
+                <a:spcPct val="110000"/>
+              </a:lnSpc>
+              <a:spcBef>
+                <a:spcPts val="0"/>
+              </a:spcBef>
+              <a:buNone/>
+            </a:pPr>
+            <a:r>
+              <a:rPr lang="pt-PT" sz="3600" dirty="0" smtClean="0">
+                <a:solidFill>
+                  <a:schemeClr val="tx1">
+                    <a:lumMod val="85000"/>
+                    <a:lumOff val="15000"/>
+                  </a:schemeClr>
+                </a:solidFill>
+                <a:latin typeface="MetaSerif-Book" pitchFamily="34" charset="0"/>
+              </a:rPr>
+              <a:t>Not very flexible...</a:t>
+            </a:r>
+            <a:endParaRPr lang="pt-PT" sz="3600" dirty="0" smtClean="0">
+              <a:solidFill>
+                <a:schemeClr val="tx1">
+                  <a:lumMod val="85000"/>
+                  <a:lumOff val="15000"/>
+                </a:schemeClr>
+              </a:solidFill>
+              <a:latin typeface="MetaSerif-Book" pitchFamily="34" charset="0"/>
+            </a:endParaRPr>
+          </a:p>
+        </p:txBody>
+      </p:sp>
+      <p:sp>
+        <p:nvSpPr>
           <p:cNvPr id="4" name="Slide Number Placeholder 3"/>
           <p:cNvSpPr>
             <a:spLocks noGrp="1"/>
@@ -5719,39 +6125,6 @@
           </a:p>
         </p:txBody>
       </p:sp>
-      <p:pic>
-        <p:nvPicPr>
-          <p:cNvPr id="3074" name="Picture 2" descr="C:\Users\jgradim\Documents\thesis\presentations\images\social_network_current.png"/>
-          <p:cNvPicPr>
-            <a:picLocks noChangeAspect="1" noChangeArrowheads="1"/>
-          </p:cNvPicPr>
-          <p:nvPr/>
-        </p:nvPicPr>
-        <p:blipFill>
-          <a:blip r:embed="rId2" cstate="print"/>
-          <a:srcRect/>
-          <a:stretch>
-            <a:fillRect/>
-          </a:stretch>
-        </p:blipFill>
-        <p:spPr bwMode="auto">
-          <a:xfrm>
-            <a:off x="2438400" y="1204913"/>
-            <a:ext cx="4267200" cy="4448175"/>
-          </a:xfrm>
-          <a:prstGeom prst="rect">
-            <a:avLst/>
-          </a:prstGeom>
-          <a:noFill/>
-          <a:effectLst>
-            <a:outerShdw blurRad="50800" dist="38100" dir="2700000" algn="tl" rotWithShape="0">
-              <a:prstClr val="black">
-                <a:alpha val="40000"/>
-              </a:prstClr>
-            </a:outerShdw>
-          </a:effectLst>
-        </p:spPr>
-      </p:pic>
     </p:spTree>
   </p:cSld>
   <p:clrMapOvr>
@@ -5955,8 +6328,8 @@
         </p:nvSpPr>
         <p:spPr>
           <a:xfrm>
-            <a:off x="5868144" y="188640"/>
-            <a:ext cx="3275856" cy="706090"/>
+            <a:off x="5184000" y="188640"/>
+            <a:ext cx="3960000" cy="706090"/>
           </a:xfrm>
           <a:solidFill>
             <a:schemeClr val="tx1">
@@ -5978,7 +6351,7 @@
                 </a:solidFill>
                 <a:latin typeface="League Gothic" pitchFamily="50" charset="0"/>
               </a:rPr>
-              <a:t>Social Network</a:t>
+              <a:t>Social Network – Before</a:t>
             </a:r>
             <a:endParaRPr lang="pt-PT" sz="1800" dirty="0">
               <a:solidFill>
@@ -6015,7 +6388,7 @@
       </p:sp>
       <p:pic>
         <p:nvPicPr>
-          <p:cNvPr id="6" name="Picture 3" descr="C:\Users\jgradim\Documents\thesis\presentations\images\social_network_conceptual.png"/>
+          <p:cNvPr id="3074" name="Picture 2" descr="C:\Users\jgradim\Documents\thesis\presentations\images\social_network_current.png"/>
           <p:cNvPicPr>
             <a:picLocks noChangeAspect="1" noChangeArrowheads="1"/>
           </p:cNvPicPr>
@@ -6030,8 +6403,8 @@
         </p:blipFill>
         <p:spPr bwMode="auto">
           <a:xfrm>
-            <a:off x="917848" y="2021053"/>
-            <a:ext cx="7308304" cy="2815894"/>
+            <a:off x="2438400" y="1204913"/>
+            <a:ext cx="4267200" cy="4448175"/>
           </a:xfrm>
           <a:prstGeom prst="rect">
             <a:avLst/>
@@ -6090,8 +6463,8 @@
         </p:nvSpPr>
         <p:spPr>
           <a:xfrm>
-            <a:off x="5868144" y="188640"/>
-            <a:ext cx="3275856" cy="706090"/>
+            <a:off x="5184000" y="188640"/>
+            <a:ext cx="3960000" cy="706090"/>
           </a:xfrm>
           <a:solidFill>
             <a:schemeClr val="tx1">
@@ -6113,7 +6486,7 @@
                 </a:solidFill>
                 <a:latin typeface="League Gothic" pitchFamily="50" charset="0"/>
               </a:rPr>
-              <a:t>Document Editor</a:t>
+              <a:t>Social Network – After</a:t>
             </a:r>
             <a:endParaRPr lang="pt-PT" sz="1800" dirty="0">
               <a:solidFill>
@@ -6126,145 +6499,6 @@
       </p:sp>
       <p:sp>
         <p:nvSpPr>
-          <p:cNvPr id="3" name="Content Placeholder 2"/>
-          <p:cNvSpPr>
-            <a:spLocks noGrp="1"/>
-          </p:cNvSpPr>
-          <p:nvPr>
-            <p:ph idx="1"/>
-          </p:nvPr>
-        </p:nvSpPr>
-        <p:spPr>
-          <a:xfrm>
-            <a:off x="457200" y="1124744"/>
-            <a:ext cx="8229600" cy="5040560"/>
-          </a:xfrm>
-          <a:effectLst>
-            <a:outerShdw blurRad="50800" dist="25400" dir="2700000" algn="tl" rotWithShape="0">
-              <a:prstClr val="black">
-                <a:alpha val="15000"/>
-              </a:prstClr>
-            </a:outerShdw>
-          </a:effectLst>
-        </p:spPr>
-        <p:txBody>
-          <a:bodyPr vert="horz" anchor="ctr" anchorCtr="1">
-            <a:normAutofit/>
-          </a:bodyPr>
-          <a:lstStyle/>
-          <a:p>
-            <a:pPr indent="0" algn="ctr">
-              <a:lnSpc>
-                <a:spcPct val="110000"/>
-              </a:lnSpc>
-              <a:spcBef>
-                <a:spcPts val="0"/>
-              </a:spcBef>
-              <a:buNone/>
-            </a:pPr>
-            <a:r>
-              <a:rPr lang="pt-PT" sz="3600" dirty="0" smtClean="0">
-                <a:solidFill>
-                  <a:schemeClr val="tx1">
-                    <a:lumMod val="85000"/>
-                    <a:lumOff val="15000"/>
-                  </a:schemeClr>
-                </a:solidFill>
-                <a:latin typeface="MetaSerif-Book" pitchFamily="34" charset="0"/>
-              </a:rPr>
-              <a:t>One of the most used features</a:t>
-            </a:r>
-          </a:p>
-          <a:p>
-            <a:pPr indent="0" algn="ctr">
-              <a:lnSpc>
-                <a:spcPct val="110000"/>
-              </a:lnSpc>
-              <a:spcBef>
-                <a:spcPts val="0"/>
-              </a:spcBef>
-              <a:buNone/>
-            </a:pPr>
-            <a:endParaRPr lang="pt-PT" sz="3600" dirty="0" smtClean="0">
-              <a:solidFill>
-                <a:schemeClr val="tx1">
-                  <a:lumMod val="85000"/>
-                  <a:lumOff val="15000"/>
-                </a:schemeClr>
-              </a:solidFill>
-              <a:latin typeface="MetaSerif-Book" pitchFamily="34" charset="0"/>
-            </a:endParaRPr>
-          </a:p>
-          <a:p>
-            <a:pPr indent="0" algn="ctr">
-              <a:lnSpc>
-                <a:spcPct val="110000"/>
-              </a:lnSpc>
-              <a:spcBef>
-                <a:spcPts val="0"/>
-              </a:spcBef>
-              <a:buNone/>
-            </a:pPr>
-            <a:r>
-              <a:rPr lang="pt-PT" sz="3600" dirty="0" smtClean="0">
-                <a:solidFill>
-                  <a:schemeClr val="tx1">
-                    <a:lumMod val="85000"/>
-                    <a:lumOff val="15000"/>
-                  </a:schemeClr>
-                </a:solidFill>
-                <a:latin typeface="MetaSerif-Book" pitchFamily="34" charset="0"/>
-              </a:rPr>
-              <a:t>Many different types of content</a:t>
-            </a:r>
-          </a:p>
-          <a:p>
-            <a:pPr indent="0" algn="ctr">
-              <a:lnSpc>
-                <a:spcPct val="110000"/>
-              </a:lnSpc>
-              <a:spcBef>
-                <a:spcPts val="0"/>
-              </a:spcBef>
-              <a:buNone/>
-            </a:pPr>
-            <a:endParaRPr lang="pt-PT" sz="3600" dirty="0" smtClean="0">
-              <a:solidFill>
-                <a:schemeClr val="tx1">
-                  <a:lumMod val="85000"/>
-                  <a:lumOff val="15000"/>
-                </a:schemeClr>
-              </a:solidFill>
-              <a:latin typeface="MetaSerif-Book" pitchFamily="34" charset="0"/>
-            </a:endParaRPr>
-          </a:p>
-          <a:p>
-            <a:pPr indent="0" algn="ctr">
-              <a:lnSpc>
-                <a:spcPct val="110000"/>
-              </a:lnSpc>
-              <a:spcBef>
-                <a:spcPts val="0"/>
-              </a:spcBef>
-              <a:buNone/>
-            </a:pPr>
-            <a:r>
-              <a:rPr lang="pt-PT" sz="3600" dirty="0" smtClean="0">
-                <a:solidFill>
-                  <a:schemeClr val="tx1">
-                    <a:lumMod val="85000"/>
-                    <a:lumOff val="15000"/>
-                  </a:schemeClr>
-                </a:solidFill>
-                <a:latin typeface="MetaSerif-Book" pitchFamily="34" charset="0"/>
-              </a:rPr>
-              <a:t>Flexible, but too complex...</a:t>
-            </a:r>
-          </a:p>
-        </p:txBody>
-      </p:sp>
-      <p:sp>
-        <p:nvSpPr>
           <p:cNvPr id="4" name="Slide Number Placeholder 3"/>
           <p:cNvSpPr>
             <a:spLocks noGrp="1"/>
@@ -6287,6 +6521,39 @@
           </a:p>
         </p:txBody>
       </p:sp>
+      <p:pic>
+        <p:nvPicPr>
+          <p:cNvPr id="6" name="Picture 3" descr="C:\Users\jgradim\Documents\thesis\presentations\images\social_network_conceptual.png"/>
+          <p:cNvPicPr>
+            <a:picLocks noChangeAspect="1" noChangeArrowheads="1"/>
+          </p:cNvPicPr>
+          <p:nvPr/>
+        </p:nvPicPr>
+        <p:blipFill>
+          <a:blip r:embed="rId2" cstate="print"/>
+          <a:srcRect/>
+          <a:stretch>
+            <a:fillRect/>
+          </a:stretch>
+        </p:blipFill>
+        <p:spPr bwMode="auto">
+          <a:xfrm>
+            <a:off x="917848" y="2021053"/>
+            <a:ext cx="7308304" cy="2815894"/>
+          </a:xfrm>
+          <a:prstGeom prst="rect">
+            <a:avLst/>
+          </a:prstGeom>
+          <a:noFill/>
+          <a:effectLst>
+            <a:outerShdw blurRad="50800" dist="38100" dir="2700000" algn="tl" rotWithShape="0">
+              <a:prstClr val="black">
+                <a:alpha val="40000"/>
+              </a:prstClr>
+            </a:outerShdw>
+          </a:effectLst>
+        </p:spPr>
+      </p:pic>
     </p:spTree>
   </p:cSld>
   <p:clrMapOvr>
@@ -6331,8 +6598,8 @@
         </p:nvSpPr>
         <p:spPr>
           <a:xfrm>
-            <a:off x="5868144" y="188640"/>
-            <a:ext cx="3275856" cy="706090"/>
+            <a:off x="5184000" y="188640"/>
+            <a:ext cx="3960000" cy="706090"/>
           </a:xfrm>
           <a:solidFill>
             <a:schemeClr val="tx1">
@@ -6354,7 +6621,7 @@
                 </a:solidFill>
                 <a:latin typeface="League Gothic" pitchFamily="50" charset="0"/>
               </a:rPr>
-              <a:t>Document Editor</a:t>
+              <a:t>Social Network – Results</a:t>
             </a:r>
             <a:endParaRPr lang="pt-PT" sz="1800" dirty="0">
               <a:solidFill>
@@ -6389,39 +6656,154 @@
           </a:p>
         </p:txBody>
       </p:sp>
-      <p:pic>
-        <p:nvPicPr>
-          <p:cNvPr id="4098" name="Picture 2" descr="C:\Users\jgradim\Documents\thesis\presentations\images\documents_current.png"/>
-          <p:cNvPicPr>
-            <a:picLocks noChangeAspect="1" noChangeArrowheads="1"/>
-          </p:cNvPicPr>
-          <p:nvPr/>
-        </p:nvPicPr>
-        <p:blipFill>
-          <a:blip r:embed="rId2" cstate="print"/>
-          <a:srcRect/>
-          <a:stretch>
-            <a:fillRect/>
-          </a:stretch>
-        </p:blipFill>
-        <p:spPr bwMode="auto">
-          <a:xfrm>
-            <a:off x="168473" y="1016732"/>
-            <a:ext cx="8807054" cy="4824536"/>
-          </a:xfrm>
-          <a:prstGeom prst="rect">
-            <a:avLst/>
-          </a:prstGeom>
-          <a:noFill/>
+      <p:sp>
+        <p:nvSpPr>
+          <p:cNvPr id="5" name="Content Placeholder 2"/>
+          <p:cNvSpPr>
+            <a:spLocks noGrp="1"/>
+          </p:cNvSpPr>
+          <p:nvPr>
+            <p:ph idx="1"/>
+          </p:nvPr>
+        </p:nvSpPr>
+        <p:spPr>
+          <a:xfrm>
+            <a:off x="457200" y="1124744"/>
+            <a:ext cx="8229600" cy="5040560"/>
+          </a:xfrm>
           <a:effectLst>
-            <a:outerShdw blurRad="50800" dist="38100" dir="2700000" algn="tl" rotWithShape="0">
+            <a:outerShdw blurRad="50800" dist="25400" dir="2700000" algn="tl" rotWithShape="0">
               <a:prstClr val="black">
-                <a:alpha val="40000"/>
+                <a:alpha val="15000"/>
               </a:prstClr>
             </a:outerShdw>
           </a:effectLst>
         </p:spPr>
-      </p:pic>
+        <p:txBody>
+          <a:bodyPr vert="horz" anchor="ctr" anchorCtr="1">
+            <a:normAutofit/>
+          </a:bodyPr>
+          <a:lstStyle/>
+          <a:p>
+            <a:pPr indent="0" algn="ctr">
+              <a:lnSpc>
+                <a:spcPct val="110000"/>
+              </a:lnSpc>
+              <a:spcBef>
+                <a:spcPts val="0"/>
+              </a:spcBef>
+              <a:buNone/>
+            </a:pPr>
+            <a:r>
+              <a:rPr lang="pt-PT" sz="3600" dirty="0" smtClean="0">
+                <a:solidFill>
+                  <a:schemeClr val="tx1">
+                    <a:lumMod val="85000"/>
+                    <a:lumOff val="15000"/>
+                  </a:schemeClr>
+                </a:solidFill>
+                <a:latin typeface="MetaSerif-Book" pitchFamily="34" charset="0"/>
+              </a:rPr>
+              <a:t>User network can be manually edited</a:t>
+            </a:r>
+          </a:p>
+          <a:p>
+            <a:pPr indent="0" algn="ctr">
+              <a:lnSpc>
+                <a:spcPct val="110000"/>
+              </a:lnSpc>
+              <a:spcBef>
+                <a:spcPts val="0"/>
+              </a:spcBef>
+              <a:buNone/>
+            </a:pPr>
+            <a:endParaRPr lang="pt-PT" sz="3600" dirty="0" smtClean="0">
+              <a:solidFill>
+                <a:schemeClr val="tx1">
+                  <a:lumMod val="85000"/>
+                  <a:lumOff val="15000"/>
+                </a:schemeClr>
+              </a:solidFill>
+              <a:latin typeface="MetaSerif-Book" pitchFamily="34" charset="0"/>
+            </a:endParaRPr>
+          </a:p>
+          <a:p>
+            <a:pPr indent="0" algn="ctr">
+              <a:lnSpc>
+                <a:spcPct val="110000"/>
+              </a:lnSpc>
+              <a:spcBef>
+                <a:spcPts val="0"/>
+              </a:spcBef>
+              <a:buNone/>
+            </a:pPr>
+            <a:r>
+              <a:rPr lang="pt-PT" sz="3600" dirty="0" smtClean="0">
+                <a:solidFill>
+                  <a:schemeClr val="tx1">
+                    <a:lumMod val="85000"/>
+                    <a:lumOff val="15000"/>
+                  </a:schemeClr>
+                </a:solidFill>
+                <a:latin typeface="MetaSerif-Book" pitchFamily="34" charset="0"/>
+              </a:rPr>
+              <a:t>Possibility to create connections between any two entities</a:t>
+            </a:r>
+          </a:p>
+          <a:p>
+            <a:pPr indent="0" algn="ctr">
+              <a:lnSpc>
+                <a:spcPct val="110000"/>
+              </a:lnSpc>
+              <a:spcBef>
+                <a:spcPts val="0"/>
+              </a:spcBef>
+              <a:buNone/>
+            </a:pPr>
+            <a:endParaRPr lang="pt-PT" sz="3600" dirty="0" smtClean="0">
+              <a:solidFill>
+                <a:schemeClr val="tx1">
+                  <a:lumMod val="85000"/>
+                  <a:lumOff val="15000"/>
+                </a:schemeClr>
+              </a:solidFill>
+              <a:latin typeface="MetaSerif-Book" pitchFamily="34" charset="0"/>
+            </a:endParaRPr>
+          </a:p>
+          <a:p>
+            <a:pPr indent="0" algn="ctr">
+              <a:lnSpc>
+                <a:spcPct val="110000"/>
+              </a:lnSpc>
+              <a:spcBef>
+                <a:spcPts val="0"/>
+              </a:spcBef>
+              <a:buNone/>
+            </a:pPr>
+            <a:r>
+              <a:rPr lang="pt-PT" sz="3600" dirty="0" smtClean="0">
+                <a:solidFill>
+                  <a:schemeClr val="tx1">
+                    <a:lumMod val="85000"/>
+                    <a:lumOff val="15000"/>
+                  </a:schemeClr>
+                </a:solidFill>
+                <a:latin typeface="MetaSerif-Book" pitchFamily="34" charset="0"/>
+              </a:rPr>
+              <a:t>Huge performance increase</a:t>
+            </a:r>
+            <a:endParaRPr lang="pt-PT" sz="3600" dirty="0" smtClean="0">
+              <a:solidFill>
+                <a:schemeClr val="tx1">
+                  <a:lumMod val="85000"/>
+                  <a:lumOff val="15000"/>
+                </a:schemeClr>
+              </a:solidFill>
+              <a:latin typeface="MetaSerif-Book" pitchFamily="34" charset="0"/>
+            </a:endParaRPr>
+          </a:p>
+        </p:txBody>
+      </p:sp>
     </p:spTree>
   </p:cSld>
   <p:clrMapOvr>
@@ -6466,8 +6848,8 @@
         </p:nvSpPr>
         <p:spPr>
           <a:xfrm>
-            <a:off x="5868144" y="188640"/>
-            <a:ext cx="3275856" cy="706090"/>
+            <a:off x="5184000" y="188640"/>
+            <a:ext cx="3960000" cy="706090"/>
           </a:xfrm>
           <a:solidFill>
             <a:schemeClr val="tx1">
@@ -6489,7 +6871,7 @@
                 </a:solidFill>
                 <a:latin typeface="League Gothic" pitchFamily="50" charset="0"/>
               </a:rPr>
-              <a:t>Document Editor</a:t>
+              <a:t>Social Network – Results</a:t>
             </a:r>
             <a:endParaRPr lang="pt-PT" sz="1800" dirty="0">
               <a:solidFill>
@@ -6524,39 +6906,56 @@
           </a:p>
         </p:txBody>
       </p:sp>
-      <p:pic>
-        <p:nvPicPr>
-          <p:cNvPr id="5122" name="Picture 2" descr="C:\Users\jgradim\Documents\thesis\presentations\images\documents_conceptual.png"/>
-          <p:cNvPicPr>
-            <a:picLocks noChangeAspect="1" noChangeArrowheads="1"/>
-          </p:cNvPicPr>
-          <p:nvPr/>
-        </p:nvPicPr>
-        <p:blipFill>
-          <a:blip r:embed="rId2" cstate="print"/>
-          <a:srcRect/>
-          <a:stretch>
-            <a:fillRect/>
-          </a:stretch>
-        </p:blipFill>
-        <p:spPr bwMode="auto">
-          <a:xfrm>
-            <a:off x="2396169" y="1501329"/>
-            <a:ext cx="4351663" cy="3855343"/>
-          </a:xfrm>
-          <a:prstGeom prst="rect">
-            <a:avLst/>
-          </a:prstGeom>
-          <a:noFill/>
+      <p:sp>
+        <p:nvSpPr>
+          <p:cNvPr id="5" name="Content Placeholder 2"/>
+          <p:cNvSpPr>
+            <a:spLocks noGrp="1"/>
+          </p:cNvSpPr>
+          <p:nvPr>
+            <p:ph idx="1"/>
+          </p:nvPr>
+        </p:nvSpPr>
+        <p:spPr>
+          <a:xfrm>
+            <a:off x="457200" y="1124744"/>
+            <a:ext cx="8229600" cy="5040560"/>
+          </a:xfrm>
           <a:effectLst>
-            <a:outerShdw blurRad="50800" dist="38100" dir="2700000" algn="tl" rotWithShape="0">
+            <a:outerShdw blurRad="50800" dist="25400" dir="2700000" algn="tl" rotWithShape="0">
               <a:prstClr val="black">
-                <a:alpha val="40000"/>
+                <a:alpha val="15000"/>
               </a:prstClr>
             </a:outerShdw>
           </a:effectLst>
         </p:spPr>
-      </p:pic>
+        <p:txBody>
+          <a:bodyPr vert="horz" anchor="ctr" anchorCtr="1">
+            <a:normAutofit/>
+          </a:bodyPr>
+          <a:lstStyle/>
+          <a:p>
+            <a:pPr indent="0" algn="ctr">
+              <a:lnSpc>
+                <a:spcPct val="110000"/>
+              </a:lnSpc>
+              <a:spcBef>
+                <a:spcPts val="0"/>
+              </a:spcBef>
+              <a:buNone/>
+            </a:pPr>
+            <a:endParaRPr lang="pt-PT" sz="3600" dirty="0" smtClean="0">
+              <a:solidFill>
+                <a:schemeClr val="tx1">
+                  <a:lumMod val="85000"/>
+                  <a:lumOff val="15000"/>
+                </a:schemeClr>
+              </a:solidFill>
+              <a:latin typeface="MetaSerif-Book" pitchFamily="34" charset="0"/>
+            </a:endParaRPr>
+          </a:p>
+        </p:txBody>
+      </p:sp>
     </p:spTree>
   </p:cSld>
   <p:clrMapOvr>
@@ -6589,32 +6988,6 @@
           <a:chExt cx="0" cy="0"/>
         </a:xfrm>
       </p:grpSpPr>
-      <p:pic>
-        <p:nvPicPr>
-          <p:cNvPr id="3074" name="Picture 2" descr="C:\Users\jgradim\Documents\thesis\presentations\old_books.jpg"/>
-          <p:cNvPicPr>
-            <a:picLocks noChangeAspect="1" noChangeArrowheads="1"/>
-          </p:cNvPicPr>
-          <p:nvPr/>
-        </p:nvPicPr>
-        <p:blipFill>
-          <a:blip r:embed="rId2" cstate="print"/>
-          <a:srcRect r="11066"/>
-          <a:stretch>
-            <a:fillRect/>
-          </a:stretch>
-        </p:blipFill>
-        <p:spPr bwMode="auto">
-          <a:xfrm>
-            <a:off x="0" y="0"/>
-            <a:ext cx="9144000" cy="6858000"/>
-          </a:xfrm>
-          <a:prstGeom prst="rect">
-            <a:avLst/>
-          </a:prstGeom>
-          <a:noFill/>
-        </p:spPr>
-      </p:pic>
       <p:sp>
         <p:nvSpPr>
           <p:cNvPr id="2" name="Title 1"/>
@@ -6627,8 +7000,8 @@
         </p:nvSpPr>
         <p:spPr>
           <a:xfrm>
-            <a:off x="0" y="2941730"/>
-            <a:ext cx="4644008" cy="974540"/>
+            <a:off x="5184000" y="188640"/>
+            <a:ext cx="3960000" cy="706090"/>
           </a:xfrm>
           <a:solidFill>
             <a:schemeClr val="tx1">
@@ -6637,22 +7010,22 @@
           </a:solidFill>
         </p:spPr>
         <p:txBody>
-          <a:bodyPr lIns="360000">
-            <a:noAutofit/>
+          <a:bodyPr rIns="144000">
+            <a:normAutofit/>
           </a:bodyPr>
           <a:lstStyle/>
           <a:p>
-            <a:pPr algn="l"/>
-            <a:r>
-              <a:rPr lang="pt-PT" sz="5400" dirty="0" smtClean="0">
+            <a:pPr algn="r"/>
+            <a:r>
+              <a:rPr lang="pt-PT" sz="3200" dirty="0" smtClean="0">
                 <a:solidFill>
                   <a:schemeClr val="bg1"/>
                 </a:solidFill>
                 <a:latin typeface="League Gothic" pitchFamily="50" charset="0"/>
               </a:rPr>
-              <a:t>Conclusions</a:t>
-            </a:r>
-            <a:endParaRPr lang="pt-PT" sz="5400" dirty="0">
+              <a:t>Document Editor</a:t>
+            </a:r>
+            <a:endParaRPr lang="pt-PT" sz="1800" dirty="0">
               <a:solidFill>
                 <a:schemeClr val="bg1"/>
               </a:solidFill>
@@ -6663,56 +7036,164 @@
       </p:sp>
       <p:sp>
         <p:nvSpPr>
-          <p:cNvPr id="4" name="TextBox 3"/>
-          <p:cNvSpPr txBox="1"/>
-          <p:nvPr/>
+          <p:cNvPr id="3" name="Content Placeholder 2"/>
+          <p:cNvSpPr>
+            <a:spLocks noGrp="1"/>
+          </p:cNvSpPr>
+          <p:nvPr>
+            <p:ph idx="1"/>
+          </p:nvPr>
         </p:nvSpPr>
         <p:spPr>
           <a:xfrm>
-            <a:off x="1" y="6599813"/>
-            <a:ext cx="9144000" cy="246221"/>
-          </a:xfrm>
-          <a:prstGeom prst="rect">
-            <a:avLst/>
-          </a:prstGeom>
-          <a:noFill/>
-        </p:spPr>
-        <p:txBody>
-          <a:bodyPr wrap="square" rtlCol="0">
-            <a:spAutoFit/>
+            <a:off x="457200" y="1124744"/>
+            <a:ext cx="8229600" cy="5040560"/>
+          </a:xfrm>
+          <a:effectLst>
+            <a:outerShdw blurRad="50800" dist="25400" dir="2700000" algn="tl" rotWithShape="0">
+              <a:prstClr val="black">
+                <a:alpha val="15000"/>
+              </a:prstClr>
+            </a:outerShdw>
+          </a:effectLst>
+        </p:spPr>
+        <p:txBody>
+          <a:bodyPr vert="horz" anchor="ctr" anchorCtr="1">
+            <a:normAutofit/>
           </a:bodyPr>
           <a:lstStyle/>
           <a:p>
-            <a:pPr algn="r"/>
-            <a:r>
-              <a:rPr lang="pt-PT" sz="1000" dirty="0" smtClean="0">
-                <a:solidFill>
-                  <a:schemeClr val="bg1"/>
-                </a:solidFill>
-                <a:effectLst>
-                  <a:outerShdw blurRad="38100" dist="38100" dir="2700000" algn="tl">
-                    <a:srgbClr val="000000">
-                      <a:alpha val="43137"/>
-                    </a:srgbClr>
-                  </a:outerShdw>
-                </a:effectLst>
+            <a:pPr indent="0" algn="ctr">
+              <a:lnSpc>
+                <a:spcPct val="110000"/>
+              </a:lnSpc>
+              <a:spcBef>
+                <a:spcPts val="0"/>
+              </a:spcBef>
+              <a:buNone/>
+            </a:pPr>
+            <a:r>
+              <a:rPr lang="pt-PT" sz="3600" dirty="0" smtClean="0">
+                <a:solidFill>
+                  <a:schemeClr val="tx1">
+                    <a:lumMod val="85000"/>
+                    <a:lumOff val="15000"/>
+                  </a:schemeClr>
+                </a:solidFill>
                 <a:latin typeface="MetaSerif-Book" pitchFamily="34" charset="0"/>
               </a:rPr>
-              <a:t>http://www.flickr.com/photos/ dklimke /</a:t>
-            </a:r>
-            <a:endParaRPr lang="pt-PT" sz="1000" dirty="0">
+              <a:t>One of the most used features</a:t>
+            </a:r>
+          </a:p>
+          <a:p>
+            <a:pPr indent="0" algn="ctr">
+              <a:lnSpc>
+                <a:spcPct val="110000"/>
+              </a:lnSpc>
+              <a:spcBef>
+                <a:spcPts val="0"/>
+              </a:spcBef>
+              <a:buNone/>
+            </a:pPr>
+            <a:endParaRPr lang="pt-PT" sz="3600" dirty="0" smtClean="0">
               <a:solidFill>
-                <a:schemeClr val="bg1"/>
+                <a:schemeClr val="tx1">
+                  <a:lumMod val="85000"/>
+                  <a:lumOff val="15000"/>
+                </a:schemeClr>
               </a:solidFill>
-              <a:effectLst>
-                <a:outerShdw blurRad="38100" dist="38100" dir="2700000" algn="tl">
-                  <a:srgbClr val="000000">
-                    <a:alpha val="43137"/>
-                  </a:srgbClr>
-                </a:outerShdw>
-              </a:effectLst>
               <a:latin typeface="MetaSerif-Book" pitchFamily="34" charset="0"/>
             </a:endParaRPr>
+          </a:p>
+          <a:p>
+            <a:pPr indent="0" algn="ctr">
+              <a:lnSpc>
+                <a:spcPct val="110000"/>
+              </a:lnSpc>
+              <a:spcBef>
+                <a:spcPts val="0"/>
+              </a:spcBef>
+              <a:buNone/>
+            </a:pPr>
+            <a:r>
+              <a:rPr lang="pt-PT" sz="3600" dirty="0" smtClean="0">
+                <a:solidFill>
+                  <a:schemeClr val="tx1">
+                    <a:lumMod val="85000"/>
+                    <a:lumOff val="15000"/>
+                  </a:schemeClr>
+                </a:solidFill>
+                <a:latin typeface="MetaSerif-Book" pitchFamily="34" charset="0"/>
+              </a:rPr>
+              <a:t>Many different types of content</a:t>
+            </a:r>
+          </a:p>
+          <a:p>
+            <a:pPr indent="0" algn="ctr">
+              <a:lnSpc>
+                <a:spcPct val="110000"/>
+              </a:lnSpc>
+              <a:spcBef>
+                <a:spcPts val="0"/>
+              </a:spcBef>
+              <a:buNone/>
+            </a:pPr>
+            <a:endParaRPr lang="pt-PT" sz="3600" dirty="0" smtClean="0">
+              <a:solidFill>
+                <a:schemeClr val="tx1">
+                  <a:lumMod val="85000"/>
+                  <a:lumOff val="15000"/>
+                </a:schemeClr>
+              </a:solidFill>
+              <a:latin typeface="MetaSerif-Book" pitchFamily="34" charset="0"/>
+            </a:endParaRPr>
+          </a:p>
+          <a:p>
+            <a:pPr indent="0" algn="ctr">
+              <a:lnSpc>
+                <a:spcPct val="110000"/>
+              </a:lnSpc>
+              <a:spcBef>
+                <a:spcPts val="0"/>
+              </a:spcBef>
+              <a:buNone/>
+            </a:pPr>
+            <a:r>
+              <a:rPr lang="pt-PT" sz="3600" dirty="0" smtClean="0">
+                <a:solidFill>
+                  <a:schemeClr val="tx1">
+                    <a:lumMod val="85000"/>
+                    <a:lumOff val="15000"/>
+                  </a:schemeClr>
+                </a:solidFill>
+                <a:latin typeface="MetaSerif-Book" pitchFamily="34" charset="0"/>
+              </a:rPr>
+              <a:t>Flexible, but too complex...</a:t>
+            </a:r>
+          </a:p>
+        </p:txBody>
+      </p:sp>
+      <p:sp>
+        <p:nvSpPr>
+          <p:cNvPr id="4" name="Slide Number Placeholder 3"/>
+          <p:cNvSpPr>
+            <a:spLocks noGrp="1"/>
+          </p:cNvSpPr>
+          <p:nvPr>
+            <p:ph type="sldNum" sz="quarter" idx="12"/>
+          </p:nvPr>
+        </p:nvSpPr>
+        <p:spPr/>
+        <p:txBody>
+          <a:bodyPr/>
+          <a:lstStyle/>
+          <a:p>
+            <a:fld id="{AF2DD60D-AE1E-4B35-90D2-0ABAEDD7A6F5}" type="slidenum">
+              <a:rPr lang="pt-PT" smtClean="0"/>
+              <a:pPr/>
+              <a:t>24</a:t>
+            </a:fld>
+            <a:endParaRPr lang="pt-PT" dirty="0"/>
           </a:p>
         </p:txBody>
       </p:sp>
@@ -6760,8 +7241,8 @@
         </p:nvSpPr>
         <p:spPr>
           <a:xfrm>
-            <a:off x="5868144" y="188640"/>
-            <a:ext cx="3275856" cy="706090"/>
+            <a:off x="5184000" y="188640"/>
+            <a:ext cx="3960000" cy="706090"/>
           </a:xfrm>
           <a:solidFill>
             <a:schemeClr val="tx1">
@@ -6783,67 +7264,14 @@
                 </a:solidFill>
                 <a:latin typeface="League Gothic" pitchFamily="50" charset="0"/>
               </a:rPr>
-              <a:t>AOMs</a:t>
-            </a:r>
-            <a:endParaRPr lang="pt-PT" sz="3200" dirty="0">
+              <a:t>Document Editor – Before</a:t>
+            </a:r>
+            <a:endParaRPr lang="pt-PT" sz="1800" dirty="0">
               <a:solidFill>
                 <a:schemeClr val="bg1"/>
               </a:solidFill>
               <a:latin typeface="League Gothic" pitchFamily="50" charset="0"/>
             </a:endParaRPr>
-          </a:p>
-        </p:txBody>
-      </p:sp>
-      <p:sp>
-        <p:nvSpPr>
-          <p:cNvPr id="3" name="Content Placeholder 2"/>
-          <p:cNvSpPr>
-            <a:spLocks noGrp="1"/>
-          </p:cNvSpPr>
-          <p:nvPr>
-            <p:ph idx="1"/>
-          </p:nvPr>
-        </p:nvSpPr>
-        <p:spPr>
-          <a:xfrm>
-            <a:off x="457200" y="1124744"/>
-            <a:ext cx="8229600" cy="5040560"/>
-          </a:xfrm>
-          <a:effectLst>
-            <a:outerShdw blurRad="50800" dist="25400" dir="2700000" algn="tl" rotWithShape="0">
-              <a:prstClr val="black">
-                <a:alpha val="15000"/>
-              </a:prstClr>
-            </a:outerShdw>
-          </a:effectLst>
-        </p:spPr>
-        <p:txBody>
-          <a:bodyPr vert="horz" anchor="ctr" anchorCtr="1">
-            <a:normAutofit/>
-          </a:bodyPr>
-          <a:lstStyle/>
-          <a:p>
-            <a:pPr indent="0">
-              <a:lnSpc>
-                <a:spcPct val="110000"/>
-              </a:lnSpc>
-              <a:spcBef>
-                <a:spcPts val="0"/>
-              </a:spcBef>
-              <a:buNone/>
-            </a:pPr>
-            <a:r>
-              <a:rPr lang="pt-PT" sz="3600" dirty="0" smtClean="0">
-                <a:solidFill>
-                  <a:schemeClr val="tx1">
-                    <a:lumMod val="85000"/>
-                    <a:lumOff val="15000"/>
-                  </a:schemeClr>
-                </a:solidFill>
-                <a:latin typeface="MetaSerif-Book" pitchFamily="34" charset="0"/>
-              </a:rPr>
-              <a:t>AOM architectures provide the best framework for building adaptable software systems</a:t>
-            </a:r>
           </a:p>
         </p:txBody>
       </p:sp>
@@ -6871,6 +7299,39 @@
           </a:p>
         </p:txBody>
       </p:sp>
+      <p:pic>
+        <p:nvPicPr>
+          <p:cNvPr id="4098" name="Picture 2" descr="C:\Users\jgradim\Documents\thesis\presentations\images\documents_current.png"/>
+          <p:cNvPicPr>
+            <a:picLocks noChangeAspect="1" noChangeArrowheads="1"/>
+          </p:cNvPicPr>
+          <p:nvPr/>
+        </p:nvPicPr>
+        <p:blipFill>
+          <a:blip r:embed="rId2" cstate="print"/>
+          <a:srcRect/>
+          <a:stretch>
+            <a:fillRect/>
+          </a:stretch>
+        </p:blipFill>
+        <p:spPr bwMode="auto">
+          <a:xfrm>
+            <a:off x="168473" y="1016732"/>
+            <a:ext cx="8807054" cy="4824536"/>
+          </a:xfrm>
+          <a:prstGeom prst="rect">
+            <a:avLst/>
+          </a:prstGeom>
+          <a:noFill/>
+          <a:effectLst>
+            <a:outerShdw blurRad="50800" dist="38100" dir="2700000" algn="tl" rotWithShape="0">
+              <a:prstClr val="black">
+                <a:alpha val="40000"/>
+              </a:prstClr>
+            </a:outerShdw>
+          </a:effectLst>
+        </p:spPr>
+      </p:pic>
     </p:spTree>
   </p:cSld>
   <p:clrMapOvr>
@@ -6915,8 +7376,8 @@
         </p:nvSpPr>
         <p:spPr>
           <a:xfrm>
-            <a:off x="5868144" y="188640"/>
-            <a:ext cx="3275856" cy="706090"/>
+            <a:off x="5184000" y="188640"/>
+            <a:ext cx="3960000" cy="706090"/>
           </a:xfrm>
           <a:solidFill>
             <a:schemeClr val="tx1">
@@ -6938,67 +7399,14 @@
                 </a:solidFill>
                 <a:latin typeface="League Gothic" pitchFamily="50" charset="0"/>
               </a:rPr>
-              <a:t>Rails &amp; MVC</a:t>
-            </a:r>
-            <a:endParaRPr lang="pt-PT" sz="3200" dirty="0">
+              <a:t>Document Editor – After</a:t>
+            </a:r>
+            <a:endParaRPr lang="pt-PT" sz="1800" dirty="0">
               <a:solidFill>
                 <a:schemeClr val="bg1"/>
               </a:solidFill>
               <a:latin typeface="League Gothic" pitchFamily="50" charset="0"/>
             </a:endParaRPr>
-          </a:p>
-        </p:txBody>
-      </p:sp>
-      <p:sp>
-        <p:nvSpPr>
-          <p:cNvPr id="3" name="Content Placeholder 2"/>
-          <p:cNvSpPr>
-            <a:spLocks noGrp="1"/>
-          </p:cNvSpPr>
-          <p:nvPr>
-            <p:ph idx="1"/>
-          </p:nvPr>
-        </p:nvSpPr>
-        <p:spPr>
-          <a:xfrm>
-            <a:off x="457200" y="1124744"/>
-            <a:ext cx="8229600" cy="5040560"/>
-          </a:xfrm>
-          <a:effectLst>
-            <a:outerShdw blurRad="50800" dist="25400" dir="2700000" algn="tl" rotWithShape="0">
-              <a:prstClr val="black">
-                <a:alpha val="15000"/>
-              </a:prstClr>
-            </a:outerShdw>
-          </a:effectLst>
-        </p:spPr>
-        <p:txBody>
-          <a:bodyPr anchor="ctr" anchorCtr="1">
-            <a:normAutofit/>
-          </a:bodyPr>
-          <a:lstStyle/>
-          <a:p>
-            <a:pPr indent="0">
-              <a:lnSpc>
-                <a:spcPct val="110000"/>
-              </a:lnSpc>
-              <a:spcBef>
-                <a:spcPts val="0"/>
-              </a:spcBef>
-              <a:buNone/>
-            </a:pPr>
-            <a:r>
-              <a:rPr lang="pt-PT" sz="3600" dirty="0" smtClean="0">
-                <a:solidFill>
-                  <a:schemeClr val="tx1">
-                    <a:lumMod val="85000"/>
-                    <a:lumOff val="15000"/>
-                  </a:schemeClr>
-                </a:solidFill>
-                <a:latin typeface="MetaSerif-Book" pitchFamily="34" charset="0"/>
-              </a:rPr>
-              <a:t>MVC architecture used by Rails can coexist harmoniously with AOM design patterns, especially with the AR engine</a:t>
-            </a:r>
           </a:p>
         </p:txBody>
       </p:sp>
@@ -7026,6 +7434,39 @@
           </a:p>
         </p:txBody>
       </p:sp>
+      <p:pic>
+        <p:nvPicPr>
+          <p:cNvPr id="1026" name="Picture 2" descr="C:\Users\jgradim\Documents\thesis\presentations\images\documents_conceptual.png"/>
+          <p:cNvPicPr>
+            <a:picLocks noChangeAspect="1" noChangeArrowheads="1"/>
+          </p:cNvPicPr>
+          <p:nvPr/>
+        </p:nvPicPr>
+        <p:blipFill>
+          <a:blip r:embed="rId2" cstate="print"/>
+          <a:srcRect/>
+          <a:stretch>
+            <a:fillRect/>
+          </a:stretch>
+        </p:blipFill>
+        <p:spPr bwMode="auto">
+          <a:xfrm>
+            <a:off x="2231740" y="1364065"/>
+            <a:ext cx="4680520" cy="4129870"/>
+          </a:xfrm>
+          <a:prstGeom prst="rect">
+            <a:avLst/>
+          </a:prstGeom>
+          <a:noFill/>
+          <a:effectLst>
+            <a:outerShdw blurRad="50800" dist="38100" dir="2700000" algn="tl" rotWithShape="0">
+              <a:prstClr val="black">
+                <a:alpha val="40000"/>
+              </a:prstClr>
+            </a:outerShdw>
+          </a:effectLst>
+        </p:spPr>
+      </p:pic>
     </p:spTree>
   </p:cSld>
   <p:clrMapOvr>
@@ -7070,8 +7511,8 @@
         </p:nvSpPr>
         <p:spPr>
           <a:xfrm>
-            <a:off x="5868144" y="188640"/>
-            <a:ext cx="3275856" cy="706090"/>
+            <a:off x="5184000" y="188640"/>
+            <a:ext cx="3960000" cy="706090"/>
           </a:xfrm>
           <a:solidFill>
             <a:schemeClr val="tx1">
@@ -7093,9 +7534,9 @@
                 </a:solidFill>
                 <a:latin typeface="League Gothic" pitchFamily="50" charset="0"/>
               </a:rPr>
-              <a:t>Variability</a:t>
-            </a:r>
-            <a:endParaRPr lang="pt-PT" sz="3200" dirty="0">
+              <a:t>Document Editor – Results</a:t>
+            </a:r>
+            <a:endParaRPr lang="pt-PT" sz="1800" dirty="0">
               <a:solidFill>
                 <a:schemeClr val="bg1"/>
               </a:solidFill>
@@ -7106,7 +7547,31 @@
       </p:sp>
       <p:sp>
         <p:nvSpPr>
-          <p:cNvPr id="3" name="Content Placeholder 2"/>
+          <p:cNvPr id="4" name="Slide Number Placeholder 3"/>
+          <p:cNvSpPr>
+            <a:spLocks noGrp="1"/>
+          </p:cNvSpPr>
+          <p:nvPr>
+            <p:ph type="sldNum" sz="quarter" idx="12"/>
+          </p:nvPr>
+        </p:nvSpPr>
+        <p:spPr/>
+        <p:txBody>
+          <a:bodyPr/>
+          <a:lstStyle/>
+          <a:p>
+            <a:fld id="{AF2DD60D-AE1E-4B35-90D2-0ABAEDD7A6F5}" type="slidenum">
+              <a:rPr lang="pt-PT" smtClean="0"/>
+              <a:pPr/>
+              <a:t>27</a:t>
+            </a:fld>
+            <a:endParaRPr lang="pt-PT" dirty="0"/>
+          </a:p>
+        </p:txBody>
+      </p:sp>
+      <p:sp>
+        <p:nvSpPr>
+          <p:cNvPr id="5" name="Content Placeholder 2"/>
           <p:cNvSpPr>
             <a:spLocks noGrp="1"/>
           </p:cNvSpPr>
@@ -7128,12 +7593,44 @@
           </a:effectLst>
         </p:spPr>
         <p:txBody>
-          <a:bodyPr anchor="ctr" anchorCtr="1">
+          <a:bodyPr vert="horz" anchor="ctr" anchorCtr="1">
             <a:normAutofit/>
           </a:bodyPr>
           <a:lstStyle/>
           <a:p>
-            <a:pPr indent="0">
+            <a:pPr indent="0" algn="ctr">
+              <a:lnSpc>
+                <a:spcPct val="110000"/>
+              </a:lnSpc>
+              <a:spcBef>
+                <a:spcPts val="0"/>
+              </a:spcBef>
+              <a:buNone/>
+            </a:pPr>
+            <a:r>
+              <a:rPr lang="pt-PT" sz="3600" dirty="0" smtClean="0">
+                <a:solidFill>
+                  <a:schemeClr val="tx1">
+                    <a:lumMod val="85000"/>
+                    <a:lumOff val="15000"/>
+                  </a:schemeClr>
+                </a:solidFill>
+                <a:latin typeface="MetaSerif-Book" pitchFamily="34" charset="0"/>
+              </a:rPr>
+              <a:t>Much simpler infrastructure</a:t>
+            </a:r>
+            <a:endParaRPr lang="pt-PT" sz="3600" dirty="0" smtClean="0">
+              <a:solidFill>
+                <a:schemeClr val="tx1">
+                  <a:lumMod val="85000"/>
+                  <a:lumOff val="15000"/>
+                </a:schemeClr>
+              </a:solidFill>
+              <a:latin typeface="MetaSerif-Book" pitchFamily="34" charset="0"/>
+            </a:endParaRPr>
+          </a:p>
+          <a:p>
+            <a:pPr indent="0" algn="ctr">
               <a:lnSpc>
                 <a:spcPct val="110000"/>
               </a:lnSpc>
@@ -7152,29 +7649,80 @@
               <a:latin typeface="MetaSerif-Book" pitchFamily="34" charset="0"/>
             </a:endParaRPr>
           </a:p>
-        </p:txBody>
-      </p:sp>
-      <p:sp>
-        <p:nvSpPr>
-          <p:cNvPr id="4" name="Slide Number Placeholder 3"/>
-          <p:cNvSpPr>
-            <a:spLocks noGrp="1"/>
-          </p:cNvSpPr>
-          <p:nvPr>
-            <p:ph type="sldNum" sz="quarter" idx="12"/>
-          </p:nvPr>
-        </p:nvSpPr>
-        <p:spPr/>
-        <p:txBody>
-          <a:bodyPr/>
-          <a:lstStyle/>
-          <a:p>
-            <a:fld id="{AF2DD60D-AE1E-4B35-90D2-0ABAEDD7A6F5}" type="slidenum">
-              <a:rPr lang="pt-PT" smtClean="0"/>
-              <a:pPr/>
-              <a:t>27</a:t>
-            </a:fld>
-            <a:endParaRPr lang="pt-PT" dirty="0"/>
+          <a:p>
+            <a:pPr indent="0" algn="ctr">
+              <a:lnSpc>
+                <a:spcPct val="110000"/>
+              </a:lnSpc>
+              <a:spcBef>
+                <a:spcPts val="0"/>
+              </a:spcBef>
+              <a:buNone/>
+            </a:pPr>
+            <a:r>
+              <a:rPr lang="pt-PT" sz="3600" dirty="0" smtClean="0">
+                <a:solidFill>
+                  <a:schemeClr val="tx1">
+                    <a:lumMod val="85000"/>
+                    <a:lumOff val="15000"/>
+                  </a:schemeClr>
+                </a:solidFill>
+                <a:latin typeface="MetaSerif-Book" pitchFamily="34" charset="0"/>
+              </a:rPr>
+              <a:t>No code repetition</a:t>
+            </a:r>
+          </a:p>
+          <a:p>
+            <a:pPr indent="0" algn="ctr">
+              <a:lnSpc>
+                <a:spcPct val="110000"/>
+              </a:lnSpc>
+              <a:spcBef>
+                <a:spcPts val="0"/>
+              </a:spcBef>
+              <a:buNone/>
+            </a:pPr>
+            <a:endParaRPr lang="pt-PT" sz="3600" dirty="0" smtClean="0">
+              <a:solidFill>
+                <a:schemeClr val="tx1">
+                  <a:lumMod val="85000"/>
+                  <a:lumOff val="15000"/>
+                </a:schemeClr>
+              </a:solidFill>
+              <a:latin typeface="MetaSerif-Book" pitchFamily="34" charset="0"/>
+            </a:endParaRPr>
+          </a:p>
+          <a:p>
+            <a:pPr indent="0" algn="ctr">
+              <a:lnSpc>
+                <a:spcPct val="110000"/>
+              </a:lnSpc>
+              <a:spcBef>
+                <a:spcPts val="0"/>
+              </a:spcBef>
+              <a:buNone/>
+            </a:pPr>
+            <a:r>
+              <a:rPr lang="pt-PT" sz="3600" dirty="0" smtClean="0">
+                <a:solidFill>
+                  <a:schemeClr val="tx1">
+                    <a:lumMod val="85000"/>
+                    <a:lumOff val="15000"/>
+                  </a:schemeClr>
+                </a:solidFill>
+                <a:latin typeface="MetaSerif-Book" pitchFamily="34" charset="0"/>
+              </a:rPr>
+              <a:t>Performance increase</a:t>
+            </a:r>
+            <a:endParaRPr lang="pt-PT" sz="3600" dirty="0" smtClean="0">
+              <a:solidFill>
+                <a:schemeClr val="tx1">
+                  <a:lumMod val="85000"/>
+                  <a:lumOff val="15000"/>
+                </a:schemeClr>
+              </a:solidFill>
+              <a:latin typeface="MetaSerif-Book" pitchFamily="34" charset="0"/>
+            </a:endParaRPr>
           </a:p>
         </p:txBody>
       </p:sp>
@@ -7222,8 +7770,8 @@
         </p:nvSpPr>
         <p:spPr>
           <a:xfrm>
-            <a:off x="5868144" y="188640"/>
-            <a:ext cx="3275856" cy="706090"/>
+            <a:off x="5184000" y="188640"/>
+            <a:ext cx="3960000" cy="706090"/>
           </a:xfrm>
           <a:solidFill>
             <a:schemeClr val="tx1">
@@ -7245,67 +7793,14 @@
                 </a:solidFill>
                 <a:latin typeface="League Gothic" pitchFamily="50" charset="0"/>
               </a:rPr>
-              <a:t>Performance</a:t>
-            </a:r>
-            <a:endParaRPr lang="pt-PT" sz="3200" dirty="0">
+              <a:t>Document Editor – Results</a:t>
+            </a:r>
+            <a:endParaRPr lang="pt-PT" sz="1800" dirty="0">
               <a:solidFill>
                 <a:schemeClr val="bg1"/>
               </a:solidFill>
               <a:latin typeface="League Gothic" pitchFamily="50" charset="0"/>
             </a:endParaRPr>
-          </a:p>
-        </p:txBody>
-      </p:sp>
-      <p:sp>
-        <p:nvSpPr>
-          <p:cNvPr id="3" name="Content Placeholder 2"/>
-          <p:cNvSpPr>
-            <a:spLocks noGrp="1"/>
-          </p:cNvSpPr>
-          <p:nvPr>
-            <p:ph idx="1"/>
-          </p:nvPr>
-        </p:nvSpPr>
-        <p:spPr>
-          <a:xfrm>
-            <a:off x="457200" y="1124744"/>
-            <a:ext cx="8229600" cy="5040560"/>
-          </a:xfrm>
-          <a:effectLst>
-            <a:outerShdw blurRad="50800" dist="25400" dir="2700000" algn="tl" rotWithShape="0">
-              <a:prstClr val="black">
-                <a:alpha val="15000"/>
-              </a:prstClr>
-            </a:outerShdw>
-          </a:effectLst>
-        </p:spPr>
-        <p:txBody>
-          <a:bodyPr anchor="ctr" anchorCtr="1">
-            <a:normAutofit/>
-          </a:bodyPr>
-          <a:lstStyle/>
-          <a:p>
-            <a:pPr indent="0">
-              <a:lnSpc>
-                <a:spcPct val="110000"/>
-              </a:lnSpc>
-              <a:spcBef>
-                <a:spcPts val="0"/>
-              </a:spcBef>
-              <a:buNone/>
-            </a:pPr>
-            <a:r>
-              <a:rPr lang="pt-PT" sz="3600" dirty="0" smtClean="0">
-                <a:solidFill>
-                  <a:schemeClr val="tx1">
-                    <a:lumMod val="85000"/>
-                    <a:lumOff val="15000"/>
-                  </a:schemeClr>
-                </a:solidFill>
-                <a:latin typeface="MetaSerif-Book" pitchFamily="34" charset="0"/>
-              </a:rPr>
-              <a:t>Performance can be increased</a:t>
-            </a:r>
           </a:p>
         </p:txBody>
       </p:sp>
@@ -7367,7 +7862,7 @@
       </p:grpSpPr>
       <p:pic>
         <p:nvPicPr>
-          <p:cNvPr id="3076" name="Picture 4" descr="C:\Users\jgradim\Documents\thesis\presentations\death_star.jpg"/>
+          <p:cNvPr id="3074" name="Picture 2" descr="C:\Users\jgradim\Documents\thesis\presentations\old_books.jpg"/>
           <p:cNvPicPr>
             <a:picLocks noChangeAspect="1" noChangeArrowheads="1"/>
           </p:cNvPicPr>
@@ -7375,7 +7870,7 @@
         </p:nvPicPr>
         <p:blipFill>
           <a:blip r:embed="rId2" cstate="print"/>
-          <a:srcRect r="2083"/>
+          <a:srcRect r="11066"/>
           <a:stretch>
             <a:fillRect/>
           </a:stretch>
@@ -7426,13 +7921,68 @@
                 </a:solidFill>
                 <a:latin typeface="League Gothic" pitchFamily="50" charset="0"/>
               </a:rPr>
-              <a:t>Further Work</a:t>
+              <a:t>Conclusions</a:t>
             </a:r>
             <a:endParaRPr lang="pt-PT" sz="5400" dirty="0">
               <a:solidFill>
                 <a:schemeClr val="bg1"/>
               </a:solidFill>
               <a:latin typeface="League Gothic" pitchFamily="50" charset="0"/>
+            </a:endParaRPr>
+          </a:p>
+        </p:txBody>
+      </p:sp>
+      <p:sp>
+        <p:nvSpPr>
+          <p:cNvPr id="4" name="TextBox 3"/>
+          <p:cNvSpPr txBox="1"/>
+          <p:nvPr/>
+        </p:nvSpPr>
+        <p:spPr>
+          <a:xfrm>
+            <a:off x="1" y="6599813"/>
+            <a:ext cx="9144000" cy="246221"/>
+          </a:xfrm>
+          <a:prstGeom prst="rect">
+            <a:avLst/>
+          </a:prstGeom>
+          <a:noFill/>
+        </p:spPr>
+        <p:txBody>
+          <a:bodyPr wrap="square" rtlCol="0">
+            <a:spAutoFit/>
+          </a:bodyPr>
+          <a:lstStyle/>
+          <a:p>
+            <a:pPr algn="r"/>
+            <a:r>
+              <a:rPr lang="pt-PT" sz="1000" dirty="0" smtClean="0">
+                <a:solidFill>
+                  <a:schemeClr val="bg1"/>
+                </a:solidFill>
+                <a:effectLst>
+                  <a:outerShdw blurRad="38100" dist="38100" dir="2700000" algn="tl">
+                    <a:srgbClr val="000000">
+                      <a:alpha val="43137"/>
+                    </a:srgbClr>
+                  </a:outerShdw>
+                </a:effectLst>
+                <a:latin typeface="MetaSerif-Book" pitchFamily="34" charset="0"/>
+              </a:rPr>
+              <a:t>http://www.flickr.com/photos/ dklimke /</a:t>
+            </a:r>
+            <a:endParaRPr lang="pt-PT" sz="1000" dirty="0">
+              <a:solidFill>
+                <a:schemeClr val="bg1"/>
+              </a:solidFill>
+              <a:effectLst>
+                <a:outerShdw blurRad="38100" dist="38100" dir="2700000" algn="tl">
+                  <a:srgbClr val="000000">
+                    <a:alpha val="43137"/>
+                  </a:srgbClr>
+                </a:outerShdw>
+              </a:effectLst>
+              <a:latin typeface="MetaSerif-Book" pitchFamily="34" charset="0"/>
             </a:endParaRPr>
           </a:p>
         </p:txBody>
@@ -7481,8 +8031,8 @@
         </p:nvSpPr>
         <p:spPr>
           <a:xfrm>
-            <a:off x="5868144" y="188640"/>
-            <a:ext cx="3275856" cy="706090"/>
+            <a:off x="5184000" y="188640"/>
+            <a:ext cx="3960000" cy="706090"/>
           </a:xfrm>
           <a:solidFill>
             <a:schemeClr val="tx1">
@@ -7633,8 +8183,8 @@
         </p:nvSpPr>
         <p:spPr>
           <a:xfrm>
-            <a:off x="5868144" y="188640"/>
-            <a:ext cx="3275856" cy="706090"/>
+            <a:off x="5184000" y="188640"/>
+            <a:ext cx="3960000" cy="706090"/>
           </a:xfrm>
           <a:solidFill>
             <a:schemeClr val="tx1">
@@ -7656,7 +8206,7 @@
                 </a:solidFill>
                 <a:latin typeface="League Gothic" pitchFamily="50" charset="0"/>
               </a:rPr>
-              <a:t>Implementation</a:t>
+              <a:t>AOMs</a:t>
             </a:r>
             <a:endParaRPr lang="pt-PT" sz="3200" dirty="0">
               <a:solidFill>
@@ -7691,7 +8241,7 @@
           </a:effectLst>
         </p:spPr>
         <p:txBody>
-          <a:bodyPr anchor="ctr" anchorCtr="1">
+          <a:bodyPr vert="horz" anchor="ctr" anchorCtr="1">
             <a:normAutofit/>
           </a:bodyPr>
           <a:lstStyle/>
@@ -7705,15 +8255,18 @@
               </a:spcBef>
               <a:buNone/>
             </a:pPr>
-            <a:endParaRPr lang="pt-PT" sz="3600" dirty="0" smtClean="0">
-              <a:solidFill>
-                <a:schemeClr val="tx1">
-                  <a:lumMod val="85000"/>
-                  <a:lumOff val="15000"/>
-                </a:schemeClr>
-              </a:solidFill>
-              <a:latin typeface="MetaSerif-Book" pitchFamily="34" charset="0"/>
-            </a:endParaRPr>
+            <a:r>
+              <a:rPr lang="pt-PT" sz="3600" dirty="0" smtClean="0">
+                <a:solidFill>
+                  <a:schemeClr val="tx1">
+                    <a:lumMod val="85000"/>
+                    <a:lumOff val="15000"/>
+                  </a:schemeClr>
+                </a:solidFill>
+                <a:latin typeface="MetaSerif-Book" pitchFamily="34" charset="0"/>
+              </a:rPr>
+              <a:t>AOM architectures provide the best framework for building adaptable software systems</a:t>
+            </a:r>
           </a:p>
         </p:txBody>
       </p:sp>
@@ -7785,8 +8338,8 @@
         </p:nvSpPr>
         <p:spPr>
           <a:xfrm>
-            <a:off x="5868144" y="188640"/>
-            <a:ext cx="3275856" cy="706090"/>
+            <a:off x="5184000" y="188640"/>
+            <a:ext cx="3960000" cy="706090"/>
           </a:xfrm>
           <a:solidFill>
             <a:schemeClr val="tx1">
@@ -7808,7 +8361,162 @@
                 </a:solidFill>
                 <a:latin typeface="League Gothic" pitchFamily="50" charset="0"/>
               </a:rPr>
-              <a:t>Performance</a:t>
+              <a:t>Rails &amp; MVC</a:t>
+            </a:r>
+            <a:endParaRPr lang="pt-PT" sz="3200" dirty="0">
+              <a:solidFill>
+                <a:schemeClr val="bg1"/>
+              </a:solidFill>
+              <a:latin typeface="League Gothic" pitchFamily="50" charset="0"/>
+            </a:endParaRPr>
+          </a:p>
+        </p:txBody>
+      </p:sp>
+      <p:sp>
+        <p:nvSpPr>
+          <p:cNvPr id="3" name="Content Placeholder 2"/>
+          <p:cNvSpPr>
+            <a:spLocks noGrp="1"/>
+          </p:cNvSpPr>
+          <p:nvPr>
+            <p:ph idx="1"/>
+          </p:nvPr>
+        </p:nvSpPr>
+        <p:spPr>
+          <a:xfrm>
+            <a:off x="457200" y="1124744"/>
+            <a:ext cx="8229600" cy="5040560"/>
+          </a:xfrm>
+          <a:effectLst>
+            <a:outerShdw blurRad="50800" dist="25400" dir="2700000" algn="tl" rotWithShape="0">
+              <a:prstClr val="black">
+                <a:alpha val="15000"/>
+              </a:prstClr>
+            </a:outerShdw>
+          </a:effectLst>
+        </p:spPr>
+        <p:txBody>
+          <a:bodyPr anchor="ctr" anchorCtr="1">
+            <a:normAutofit/>
+          </a:bodyPr>
+          <a:lstStyle/>
+          <a:p>
+            <a:pPr indent="0">
+              <a:lnSpc>
+                <a:spcPct val="110000"/>
+              </a:lnSpc>
+              <a:spcBef>
+                <a:spcPts val="0"/>
+              </a:spcBef>
+              <a:buNone/>
+            </a:pPr>
+            <a:r>
+              <a:rPr lang="pt-PT" sz="3600" dirty="0" smtClean="0">
+                <a:solidFill>
+                  <a:schemeClr val="tx1">
+                    <a:lumMod val="85000"/>
+                    <a:lumOff val="15000"/>
+                  </a:schemeClr>
+                </a:solidFill>
+                <a:latin typeface="MetaSerif-Book" pitchFamily="34" charset="0"/>
+              </a:rPr>
+              <a:t>MVC architecture used by Rails can coexist harmoniously with AOM design patterns, especially with the AR engine</a:t>
+            </a:r>
+          </a:p>
+        </p:txBody>
+      </p:sp>
+      <p:sp>
+        <p:nvSpPr>
+          <p:cNvPr id="4" name="Slide Number Placeholder 3"/>
+          <p:cNvSpPr>
+            <a:spLocks noGrp="1"/>
+          </p:cNvSpPr>
+          <p:nvPr>
+            <p:ph type="sldNum" sz="quarter" idx="12"/>
+          </p:nvPr>
+        </p:nvSpPr>
+        <p:spPr/>
+        <p:txBody>
+          <a:bodyPr/>
+          <a:lstStyle/>
+          <a:p>
+            <a:fld id="{AF2DD60D-AE1E-4B35-90D2-0ABAEDD7A6F5}" type="slidenum">
+              <a:rPr lang="pt-PT" smtClean="0"/>
+              <a:pPr/>
+              <a:t>31</a:t>
+            </a:fld>
+            <a:endParaRPr lang="pt-PT" dirty="0"/>
+          </a:p>
+        </p:txBody>
+      </p:sp>
+    </p:spTree>
+  </p:cSld>
+  <p:clrMapOvr>
+    <a:masterClrMapping/>
+  </p:clrMapOvr>
+  <p:timing>
+    <p:tnLst>
+      <p:par>
+        <p:cTn id="1" dur="indefinite" restart="never" nodeType="tmRoot"/>
+      </p:par>
+    </p:tnLst>
+  </p:timing>
+</p:sld>
+</file>
+
+<file path=ppt/slides/slide32.xml><?xml version="1.0" encoding="utf-8"?>
+<p:sld xmlns:a="http://schemas.openxmlformats.org/drawingml/2006/main" xmlns:r="http://schemas.openxmlformats.org/officeDocument/2006/relationships" xmlns:p="http://schemas.openxmlformats.org/presentationml/2006/main">
+  <p:cSld>
+    <p:spTree>
+      <p:nvGrpSpPr>
+        <p:cNvPr id="1" name=""/>
+        <p:cNvGrpSpPr/>
+        <p:nvPr/>
+      </p:nvGrpSpPr>
+      <p:grpSpPr>
+        <a:xfrm>
+          <a:off x="0" y="0"/>
+          <a:ext cx="0" cy="0"/>
+          <a:chOff x="0" y="0"/>
+          <a:chExt cx="0" cy="0"/>
+        </a:xfrm>
+      </p:grpSpPr>
+      <p:sp>
+        <p:nvSpPr>
+          <p:cNvPr id="2" name="Title 1"/>
+          <p:cNvSpPr>
+            <a:spLocks noGrp="1"/>
+          </p:cNvSpPr>
+          <p:nvPr>
+            <p:ph type="title"/>
+          </p:nvPr>
+        </p:nvSpPr>
+        <p:spPr>
+          <a:xfrm>
+            <a:off x="5184000" y="188640"/>
+            <a:ext cx="3960000" cy="706090"/>
+          </a:xfrm>
+          <a:solidFill>
+            <a:schemeClr val="tx1">
+              <a:alpha val="90000"/>
+            </a:schemeClr>
+          </a:solidFill>
+        </p:spPr>
+        <p:txBody>
+          <a:bodyPr rIns="144000">
+            <a:normAutofit/>
+          </a:bodyPr>
+          <a:lstStyle/>
+          <a:p>
+            <a:pPr algn="r"/>
+            <a:r>
+              <a:rPr lang="pt-PT" sz="3200" dirty="0" smtClean="0">
+                <a:solidFill>
+                  <a:schemeClr val="bg1"/>
+                </a:solidFill>
+                <a:latin typeface="League Gothic" pitchFamily="50" charset="0"/>
+              </a:rPr>
+              <a:t>Variability</a:t>
             </a:r>
             <a:endParaRPr lang="pt-PT" sz="3200" dirty="0">
               <a:solidFill>
@@ -7887,7 +8595,619 @@
             <a:fld id="{AF2DD60D-AE1E-4B35-90D2-0ABAEDD7A6F5}" type="slidenum">
               <a:rPr lang="pt-PT" smtClean="0"/>
               <a:pPr/>
-              <a:t>31</a:t>
+              <a:t>32</a:t>
+            </a:fld>
+            <a:endParaRPr lang="pt-PT" dirty="0"/>
+          </a:p>
+        </p:txBody>
+      </p:sp>
+    </p:spTree>
+  </p:cSld>
+  <p:clrMapOvr>
+    <a:masterClrMapping/>
+  </p:clrMapOvr>
+  <p:timing>
+    <p:tnLst>
+      <p:par>
+        <p:cTn id="1" dur="indefinite" restart="never" nodeType="tmRoot"/>
+      </p:par>
+    </p:tnLst>
+  </p:timing>
+</p:sld>
+</file>
+
+<file path=ppt/slides/slide33.xml><?xml version="1.0" encoding="utf-8"?>
+<p:sld xmlns:a="http://schemas.openxmlformats.org/drawingml/2006/main" xmlns:r="http://schemas.openxmlformats.org/officeDocument/2006/relationships" xmlns:p="http://schemas.openxmlformats.org/presentationml/2006/main">
+  <p:cSld>
+    <p:spTree>
+      <p:nvGrpSpPr>
+        <p:cNvPr id="1" name=""/>
+        <p:cNvGrpSpPr/>
+        <p:nvPr/>
+      </p:nvGrpSpPr>
+      <p:grpSpPr>
+        <a:xfrm>
+          <a:off x="0" y="0"/>
+          <a:ext cx="0" cy="0"/>
+          <a:chOff x="0" y="0"/>
+          <a:chExt cx="0" cy="0"/>
+        </a:xfrm>
+      </p:grpSpPr>
+      <p:sp>
+        <p:nvSpPr>
+          <p:cNvPr id="2" name="Title 1"/>
+          <p:cNvSpPr>
+            <a:spLocks noGrp="1"/>
+          </p:cNvSpPr>
+          <p:nvPr>
+            <p:ph type="title"/>
+          </p:nvPr>
+        </p:nvSpPr>
+        <p:spPr>
+          <a:xfrm>
+            <a:off x="5184000" y="188640"/>
+            <a:ext cx="3960000" cy="706090"/>
+          </a:xfrm>
+          <a:solidFill>
+            <a:schemeClr val="tx1">
+              <a:alpha val="90000"/>
+            </a:schemeClr>
+          </a:solidFill>
+        </p:spPr>
+        <p:txBody>
+          <a:bodyPr rIns="144000">
+            <a:normAutofit/>
+          </a:bodyPr>
+          <a:lstStyle/>
+          <a:p>
+            <a:pPr algn="r"/>
+            <a:r>
+              <a:rPr lang="pt-PT" sz="3200" dirty="0" smtClean="0">
+                <a:solidFill>
+                  <a:schemeClr val="bg1"/>
+                </a:solidFill>
+                <a:latin typeface="League Gothic" pitchFamily="50" charset="0"/>
+              </a:rPr>
+              <a:t>Performance</a:t>
+            </a:r>
+            <a:endParaRPr lang="pt-PT" sz="3200" dirty="0">
+              <a:solidFill>
+                <a:schemeClr val="bg1"/>
+              </a:solidFill>
+              <a:latin typeface="League Gothic" pitchFamily="50" charset="0"/>
+            </a:endParaRPr>
+          </a:p>
+        </p:txBody>
+      </p:sp>
+      <p:sp>
+        <p:nvSpPr>
+          <p:cNvPr id="3" name="Content Placeholder 2"/>
+          <p:cNvSpPr>
+            <a:spLocks noGrp="1"/>
+          </p:cNvSpPr>
+          <p:nvPr>
+            <p:ph idx="1"/>
+          </p:nvPr>
+        </p:nvSpPr>
+        <p:spPr>
+          <a:xfrm>
+            <a:off x="457200" y="1124744"/>
+            <a:ext cx="8229600" cy="5040560"/>
+          </a:xfrm>
+          <a:effectLst>
+            <a:outerShdw blurRad="50800" dist="25400" dir="2700000" algn="tl" rotWithShape="0">
+              <a:prstClr val="black">
+                <a:alpha val="15000"/>
+              </a:prstClr>
+            </a:outerShdw>
+          </a:effectLst>
+        </p:spPr>
+        <p:txBody>
+          <a:bodyPr anchor="ctr" anchorCtr="1">
+            <a:normAutofit/>
+          </a:bodyPr>
+          <a:lstStyle/>
+          <a:p>
+            <a:pPr indent="0">
+              <a:lnSpc>
+                <a:spcPct val="110000"/>
+              </a:lnSpc>
+              <a:spcBef>
+                <a:spcPts val="0"/>
+              </a:spcBef>
+              <a:buNone/>
+            </a:pPr>
+            <a:r>
+              <a:rPr lang="pt-PT" sz="3600" dirty="0" smtClean="0">
+                <a:solidFill>
+                  <a:schemeClr val="tx1">
+                    <a:lumMod val="85000"/>
+                    <a:lumOff val="15000"/>
+                  </a:schemeClr>
+                </a:solidFill>
+                <a:latin typeface="MetaSerif-Book" pitchFamily="34" charset="0"/>
+              </a:rPr>
+              <a:t>Performance can be increased</a:t>
+            </a:r>
+          </a:p>
+        </p:txBody>
+      </p:sp>
+      <p:sp>
+        <p:nvSpPr>
+          <p:cNvPr id="4" name="Slide Number Placeholder 3"/>
+          <p:cNvSpPr>
+            <a:spLocks noGrp="1"/>
+          </p:cNvSpPr>
+          <p:nvPr>
+            <p:ph type="sldNum" sz="quarter" idx="12"/>
+          </p:nvPr>
+        </p:nvSpPr>
+        <p:spPr/>
+        <p:txBody>
+          <a:bodyPr/>
+          <a:lstStyle/>
+          <a:p>
+            <a:fld id="{AF2DD60D-AE1E-4B35-90D2-0ABAEDD7A6F5}" type="slidenum">
+              <a:rPr lang="pt-PT" smtClean="0"/>
+              <a:pPr/>
+              <a:t>33</a:t>
+            </a:fld>
+            <a:endParaRPr lang="pt-PT" dirty="0"/>
+          </a:p>
+        </p:txBody>
+      </p:sp>
+    </p:spTree>
+  </p:cSld>
+  <p:clrMapOvr>
+    <a:masterClrMapping/>
+  </p:clrMapOvr>
+  <p:timing>
+    <p:tnLst>
+      <p:par>
+        <p:cTn id="1" dur="indefinite" restart="never" nodeType="tmRoot"/>
+      </p:par>
+    </p:tnLst>
+  </p:timing>
+</p:sld>
+</file>
+
+<file path=ppt/slides/slide34.xml><?xml version="1.0" encoding="utf-8"?>
+<p:sld xmlns:a="http://schemas.openxmlformats.org/drawingml/2006/main" xmlns:r="http://schemas.openxmlformats.org/officeDocument/2006/relationships" xmlns:p="http://schemas.openxmlformats.org/presentationml/2006/main">
+  <p:cSld>
+    <p:spTree>
+      <p:nvGrpSpPr>
+        <p:cNvPr id="1" name=""/>
+        <p:cNvGrpSpPr/>
+        <p:nvPr/>
+      </p:nvGrpSpPr>
+      <p:grpSpPr>
+        <a:xfrm>
+          <a:off x="0" y="0"/>
+          <a:ext cx="0" cy="0"/>
+          <a:chOff x="0" y="0"/>
+          <a:chExt cx="0" cy="0"/>
+        </a:xfrm>
+      </p:grpSpPr>
+      <p:pic>
+        <p:nvPicPr>
+          <p:cNvPr id="3076" name="Picture 4" descr="C:\Users\jgradim\Documents\thesis\presentations\death_star.jpg"/>
+          <p:cNvPicPr>
+            <a:picLocks noChangeAspect="1" noChangeArrowheads="1"/>
+          </p:cNvPicPr>
+          <p:nvPr/>
+        </p:nvPicPr>
+        <p:blipFill>
+          <a:blip r:embed="rId2" cstate="print"/>
+          <a:srcRect r="2083"/>
+          <a:stretch>
+            <a:fillRect/>
+          </a:stretch>
+        </p:blipFill>
+        <p:spPr bwMode="auto">
+          <a:xfrm>
+            <a:off x="0" y="0"/>
+            <a:ext cx="9144000" cy="6858000"/>
+          </a:xfrm>
+          <a:prstGeom prst="rect">
+            <a:avLst/>
+          </a:prstGeom>
+          <a:noFill/>
+        </p:spPr>
+      </p:pic>
+      <p:sp>
+        <p:nvSpPr>
+          <p:cNvPr id="2" name="Title 1"/>
+          <p:cNvSpPr>
+            <a:spLocks noGrp="1"/>
+          </p:cNvSpPr>
+          <p:nvPr>
+            <p:ph type="title"/>
+          </p:nvPr>
+        </p:nvSpPr>
+        <p:spPr>
+          <a:xfrm>
+            <a:off x="0" y="2941730"/>
+            <a:ext cx="4644008" cy="974540"/>
+          </a:xfrm>
+          <a:solidFill>
+            <a:schemeClr val="tx1">
+              <a:alpha val="90000"/>
+            </a:schemeClr>
+          </a:solidFill>
+        </p:spPr>
+        <p:txBody>
+          <a:bodyPr lIns="360000">
+            <a:noAutofit/>
+          </a:bodyPr>
+          <a:lstStyle/>
+          <a:p>
+            <a:pPr algn="l"/>
+            <a:r>
+              <a:rPr lang="pt-PT" sz="5400" dirty="0" smtClean="0">
+                <a:solidFill>
+                  <a:schemeClr val="bg1"/>
+                </a:solidFill>
+                <a:latin typeface="League Gothic" pitchFamily="50" charset="0"/>
+              </a:rPr>
+              <a:t>Further Work</a:t>
+            </a:r>
+            <a:endParaRPr lang="pt-PT" sz="5400" dirty="0">
+              <a:solidFill>
+                <a:schemeClr val="bg1"/>
+              </a:solidFill>
+              <a:latin typeface="League Gothic" pitchFamily="50" charset="0"/>
+            </a:endParaRPr>
+          </a:p>
+        </p:txBody>
+      </p:sp>
+    </p:spTree>
+  </p:cSld>
+  <p:clrMapOvr>
+    <a:masterClrMapping/>
+  </p:clrMapOvr>
+  <p:timing>
+    <p:tnLst>
+      <p:par>
+        <p:cTn id="1" dur="indefinite" restart="never" nodeType="tmRoot"/>
+      </p:par>
+    </p:tnLst>
+  </p:timing>
+</p:sld>
+</file>
+
+<file path=ppt/slides/slide35.xml><?xml version="1.0" encoding="utf-8"?>
+<p:sld xmlns:a="http://schemas.openxmlformats.org/drawingml/2006/main" xmlns:r="http://schemas.openxmlformats.org/officeDocument/2006/relationships" xmlns:p="http://schemas.openxmlformats.org/presentationml/2006/main">
+  <p:cSld>
+    <p:spTree>
+      <p:nvGrpSpPr>
+        <p:cNvPr id="1" name=""/>
+        <p:cNvGrpSpPr/>
+        <p:nvPr/>
+      </p:nvGrpSpPr>
+      <p:grpSpPr>
+        <a:xfrm>
+          <a:off x="0" y="0"/>
+          <a:ext cx="0" cy="0"/>
+          <a:chOff x="0" y="0"/>
+          <a:chExt cx="0" cy="0"/>
+        </a:xfrm>
+      </p:grpSpPr>
+      <p:sp>
+        <p:nvSpPr>
+          <p:cNvPr id="2" name="Title 1"/>
+          <p:cNvSpPr>
+            <a:spLocks noGrp="1"/>
+          </p:cNvSpPr>
+          <p:nvPr>
+            <p:ph type="title"/>
+          </p:nvPr>
+        </p:nvSpPr>
+        <p:spPr>
+          <a:xfrm>
+            <a:off x="5184000" y="188640"/>
+            <a:ext cx="3960000" cy="706090"/>
+          </a:xfrm>
+          <a:solidFill>
+            <a:schemeClr val="tx1">
+              <a:alpha val="90000"/>
+            </a:schemeClr>
+          </a:solidFill>
+        </p:spPr>
+        <p:txBody>
+          <a:bodyPr rIns="144000">
+            <a:normAutofit/>
+          </a:bodyPr>
+          <a:lstStyle/>
+          <a:p>
+            <a:pPr algn="r"/>
+            <a:r>
+              <a:rPr lang="pt-PT" sz="3200" dirty="0" smtClean="0">
+                <a:solidFill>
+                  <a:schemeClr val="bg1"/>
+                </a:solidFill>
+                <a:latin typeface="League Gothic" pitchFamily="50" charset="0"/>
+              </a:rPr>
+              <a:t>Implementation</a:t>
+            </a:r>
+            <a:endParaRPr lang="pt-PT" sz="3200" dirty="0">
+              <a:solidFill>
+                <a:schemeClr val="bg1"/>
+              </a:solidFill>
+              <a:latin typeface="League Gothic" pitchFamily="50" charset="0"/>
+            </a:endParaRPr>
+          </a:p>
+        </p:txBody>
+      </p:sp>
+      <p:sp>
+        <p:nvSpPr>
+          <p:cNvPr id="3" name="Content Placeholder 2"/>
+          <p:cNvSpPr>
+            <a:spLocks noGrp="1"/>
+          </p:cNvSpPr>
+          <p:nvPr>
+            <p:ph idx="1"/>
+          </p:nvPr>
+        </p:nvSpPr>
+        <p:spPr>
+          <a:xfrm>
+            <a:off x="457200" y="1124744"/>
+            <a:ext cx="8229600" cy="5040560"/>
+          </a:xfrm>
+          <a:effectLst>
+            <a:outerShdw blurRad="50800" dist="25400" dir="2700000" algn="tl" rotWithShape="0">
+              <a:prstClr val="black">
+                <a:alpha val="15000"/>
+              </a:prstClr>
+            </a:outerShdw>
+          </a:effectLst>
+        </p:spPr>
+        <p:txBody>
+          <a:bodyPr anchor="ctr" anchorCtr="1">
+            <a:normAutofit/>
+          </a:bodyPr>
+          <a:lstStyle/>
+          <a:p>
+            <a:pPr indent="0">
+              <a:lnSpc>
+                <a:spcPct val="110000"/>
+              </a:lnSpc>
+              <a:spcBef>
+                <a:spcPts val="0"/>
+              </a:spcBef>
+              <a:buNone/>
+            </a:pPr>
+            <a:r>
+              <a:rPr lang="pt-PT" sz="3600" dirty="0" smtClean="0">
+                <a:solidFill>
+                  <a:schemeClr val="tx1">
+                    <a:lumMod val="85000"/>
+                    <a:lumOff val="15000"/>
+                  </a:schemeClr>
+                </a:solidFill>
+                <a:latin typeface="MetaSerif-Book" pitchFamily="34" charset="0"/>
+              </a:rPr>
+              <a:t>Implement everything!</a:t>
+            </a:r>
+          </a:p>
+        </p:txBody>
+      </p:sp>
+      <p:sp>
+        <p:nvSpPr>
+          <p:cNvPr id="4" name="Slide Number Placeholder 3"/>
+          <p:cNvSpPr>
+            <a:spLocks noGrp="1"/>
+          </p:cNvSpPr>
+          <p:nvPr>
+            <p:ph type="sldNum" sz="quarter" idx="12"/>
+          </p:nvPr>
+        </p:nvSpPr>
+        <p:spPr/>
+        <p:txBody>
+          <a:bodyPr/>
+          <a:lstStyle/>
+          <a:p>
+            <a:fld id="{AF2DD60D-AE1E-4B35-90D2-0ABAEDD7A6F5}" type="slidenum">
+              <a:rPr lang="pt-PT" smtClean="0"/>
+              <a:pPr/>
+              <a:t>35</a:t>
+            </a:fld>
+            <a:endParaRPr lang="pt-PT" dirty="0"/>
+          </a:p>
+        </p:txBody>
+      </p:sp>
+    </p:spTree>
+  </p:cSld>
+  <p:clrMapOvr>
+    <a:masterClrMapping/>
+  </p:clrMapOvr>
+  <p:timing>
+    <p:tnLst>
+      <p:par>
+        <p:cTn id="1" dur="indefinite" restart="never" nodeType="tmRoot"/>
+      </p:par>
+    </p:tnLst>
+  </p:timing>
+</p:sld>
+</file>
+
+<file path=ppt/slides/slide36.xml><?xml version="1.0" encoding="utf-8"?>
+<p:sld xmlns:a="http://schemas.openxmlformats.org/drawingml/2006/main" xmlns:r="http://schemas.openxmlformats.org/officeDocument/2006/relationships" xmlns:p="http://schemas.openxmlformats.org/presentationml/2006/main">
+  <p:cSld>
+    <p:spTree>
+      <p:nvGrpSpPr>
+        <p:cNvPr id="1" name=""/>
+        <p:cNvGrpSpPr/>
+        <p:nvPr/>
+      </p:nvGrpSpPr>
+      <p:grpSpPr>
+        <a:xfrm>
+          <a:off x="0" y="0"/>
+          <a:ext cx="0" cy="0"/>
+          <a:chOff x="0" y="0"/>
+          <a:chExt cx="0" cy="0"/>
+        </a:xfrm>
+      </p:grpSpPr>
+      <p:sp>
+        <p:nvSpPr>
+          <p:cNvPr id="2" name="Title 1"/>
+          <p:cNvSpPr>
+            <a:spLocks noGrp="1"/>
+          </p:cNvSpPr>
+          <p:nvPr>
+            <p:ph type="title"/>
+          </p:nvPr>
+        </p:nvSpPr>
+        <p:spPr>
+          <a:xfrm>
+            <a:off x="5184000" y="188640"/>
+            <a:ext cx="3960000" cy="706090"/>
+          </a:xfrm>
+          <a:solidFill>
+            <a:schemeClr val="tx1">
+              <a:alpha val="90000"/>
+            </a:schemeClr>
+          </a:solidFill>
+        </p:spPr>
+        <p:txBody>
+          <a:bodyPr rIns="144000">
+            <a:normAutofit/>
+          </a:bodyPr>
+          <a:lstStyle/>
+          <a:p>
+            <a:pPr algn="r"/>
+            <a:r>
+              <a:rPr lang="pt-PT" sz="3200" dirty="0" smtClean="0">
+                <a:solidFill>
+                  <a:schemeClr val="bg1"/>
+                </a:solidFill>
+                <a:latin typeface="League Gothic" pitchFamily="50" charset="0"/>
+              </a:rPr>
+              <a:t>Performance</a:t>
+            </a:r>
+            <a:endParaRPr lang="pt-PT" sz="3200" dirty="0">
+              <a:solidFill>
+                <a:schemeClr val="bg1"/>
+              </a:solidFill>
+              <a:latin typeface="League Gothic" pitchFamily="50" charset="0"/>
+            </a:endParaRPr>
+          </a:p>
+        </p:txBody>
+      </p:sp>
+      <p:sp>
+        <p:nvSpPr>
+          <p:cNvPr id="3" name="Content Placeholder 2"/>
+          <p:cNvSpPr>
+            <a:spLocks noGrp="1"/>
+          </p:cNvSpPr>
+          <p:nvPr>
+            <p:ph idx="1"/>
+          </p:nvPr>
+        </p:nvSpPr>
+        <p:spPr>
+          <a:xfrm>
+            <a:off x="457200" y="1124744"/>
+            <a:ext cx="8229600" cy="5040560"/>
+          </a:xfrm>
+          <a:effectLst>
+            <a:outerShdw blurRad="50800" dist="25400" dir="2700000" algn="tl" rotWithShape="0">
+              <a:prstClr val="black">
+                <a:alpha val="15000"/>
+              </a:prstClr>
+            </a:outerShdw>
+          </a:effectLst>
+        </p:spPr>
+        <p:txBody>
+          <a:bodyPr anchor="ctr" anchorCtr="1">
+            <a:normAutofit/>
+          </a:bodyPr>
+          <a:lstStyle/>
+          <a:p>
+            <a:pPr indent="0" algn="ctr">
+              <a:lnSpc>
+                <a:spcPct val="110000"/>
+              </a:lnSpc>
+              <a:spcBef>
+                <a:spcPts val="0"/>
+              </a:spcBef>
+              <a:buNone/>
+            </a:pPr>
+            <a:r>
+              <a:rPr lang="pt-PT" sz="3600" dirty="0" smtClean="0">
+                <a:solidFill>
+                  <a:schemeClr val="tx1">
+                    <a:lumMod val="85000"/>
+                    <a:lumOff val="15000"/>
+                  </a:schemeClr>
+                </a:solidFill>
+                <a:latin typeface="MetaSerif-Book" pitchFamily="34" charset="0"/>
+              </a:rPr>
+              <a:t>Keep all accountabilities in memory</a:t>
+            </a:r>
+          </a:p>
+          <a:p>
+            <a:pPr indent="0" algn="ctr">
+              <a:lnSpc>
+                <a:spcPct val="110000"/>
+              </a:lnSpc>
+              <a:spcBef>
+                <a:spcPts val="0"/>
+              </a:spcBef>
+              <a:buNone/>
+            </a:pPr>
+            <a:endParaRPr lang="pt-PT" sz="3600" dirty="0" smtClean="0">
+              <a:solidFill>
+                <a:schemeClr val="tx1">
+                  <a:lumMod val="85000"/>
+                  <a:lumOff val="15000"/>
+                </a:schemeClr>
+              </a:solidFill>
+              <a:latin typeface="MetaSerif-Book" pitchFamily="34" charset="0"/>
+            </a:endParaRPr>
+          </a:p>
+          <a:p>
+            <a:pPr indent="0" algn="ctr">
+              <a:lnSpc>
+                <a:spcPct val="110000"/>
+              </a:lnSpc>
+              <a:spcBef>
+                <a:spcPts val="0"/>
+              </a:spcBef>
+              <a:buNone/>
+            </a:pPr>
+            <a:r>
+              <a:rPr lang="pt-PT" sz="3600" dirty="0" smtClean="0">
+                <a:solidFill>
+                  <a:schemeClr val="tx1">
+                    <a:lumMod val="85000"/>
+                    <a:lumOff val="15000"/>
+                  </a:schemeClr>
+                </a:solidFill>
+                <a:latin typeface="MetaSerif-Book" pitchFamily="34" charset="0"/>
+              </a:rPr>
+              <a:t>Optimize queries used to retrieve accountabilities (SQL)</a:t>
+            </a:r>
+          </a:p>
+        </p:txBody>
+      </p:sp>
+      <p:sp>
+        <p:nvSpPr>
+          <p:cNvPr id="4" name="Slide Number Placeholder 3"/>
+          <p:cNvSpPr>
+            <a:spLocks noGrp="1"/>
+          </p:cNvSpPr>
+          <p:nvPr>
+            <p:ph type="sldNum" sz="quarter" idx="12"/>
+          </p:nvPr>
+        </p:nvSpPr>
+        <p:spPr/>
+        <p:txBody>
+          <a:bodyPr/>
+          <a:lstStyle/>
+          <a:p>
+            <a:fld id="{AF2DD60D-AE1E-4B35-90D2-0ABAEDD7A6F5}" type="slidenum">
+              <a:rPr lang="pt-PT" smtClean="0"/>
+              <a:pPr/>
+              <a:t>36</a:t>
             </a:fld>
             <a:endParaRPr lang="pt-PT" dirty="0"/>
           </a:p>
@@ -7937,8 +9257,8 @@
         </p:nvSpPr>
         <p:spPr>
           <a:xfrm>
-            <a:off x="5868144" y="188640"/>
-            <a:ext cx="3275856" cy="706090"/>
+            <a:off x="5184000" y="188640"/>
+            <a:ext cx="3960000" cy="706090"/>
           </a:xfrm>
           <a:solidFill>
             <a:schemeClr val="tx1">
@@ -8089,8 +9409,8 @@
         </p:nvSpPr>
         <p:spPr>
           <a:xfrm>
-            <a:off x="5868144" y="188640"/>
-            <a:ext cx="3275856" cy="706090"/>
+            <a:off x="5184000" y="188640"/>
+            <a:ext cx="3960000" cy="706090"/>
           </a:xfrm>
           <a:solidFill>
             <a:schemeClr val="tx1">
@@ -8241,8 +9561,8 @@
         </p:nvSpPr>
         <p:spPr>
           <a:xfrm>
-            <a:off x="5868144" y="188640"/>
-            <a:ext cx="3275856" cy="706090"/>
+            <a:off x="5184000" y="188640"/>
+            <a:ext cx="3960000" cy="706090"/>
           </a:xfrm>
           <a:solidFill>
             <a:schemeClr val="tx1">
@@ -8323,14 +9643,14 @@
               <a:t>Adapting ideas and methodologies associated with meta-architectures and </a:t>
             </a:r>
             <a:r>
-              <a:rPr lang="pt-PT" sz="3600" i="1" dirty="0" smtClean="0">
+              <a:rPr lang="pt-PT" sz="3600" dirty="0" smtClean="0">
                 <a:solidFill>
                   <a:schemeClr val="tx1">
                     <a:lumMod val="85000"/>
                     <a:lumOff val="15000"/>
                   </a:schemeClr>
                 </a:solidFill>
-                <a:latin typeface="MetaSerif-Book" pitchFamily="34" charset="0"/>
+                <a:latin typeface="MetaSerif-BookIta" pitchFamily="34" charset="0"/>
               </a:rPr>
               <a:t>“incomplete by design”</a:t>
             </a:r>
@@ -8610,8 +9930,8 @@
         </p:nvSpPr>
         <p:spPr>
           <a:xfrm>
-            <a:off x="5868144" y="188640"/>
-            <a:ext cx="3275856" cy="706090"/>
+            <a:off x="5184000" y="188640"/>
+            <a:ext cx="3960000" cy="706090"/>
           </a:xfrm>
           <a:solidFill>
             <a:schemeClr val="tx1">
@@ -8762,8 +10082,8 @@
         </p:nvSpPr>
         <p:spPr>
           <a:xfrm>
-            <a:off x="5868144" y="188640"/>
-            <a:ext cx="3275856" cy="706090"/>
+            <a:off x="5184000" y="188640"/>
+            <a:ext cx="3960000" cy="706090"/>
           </a:xfrm>
           <a:solidFill>
             <a:schemeClr val="tx1">

</xml_diff>

<commit_message>
Added notes to all the necessary slides
</commit_message>
<xml_diff>
--- a/presentations/jgradim-presentation.pptx
+++ b/presentations/jgradim-presentation.pptx
@@ -238,7 +238,7 @@
             <a:fld id="{A4A9652A-D4BF-41F5-B3CF-F03C6BFD8852}" type="datetimeFigureOut">
               <a:rPr lang="pt-PT" smtClean="0"/>
               <a:pPr/>
-              <a:t>09-02-2011</a:t>
+              <a:t>10-02-2011</a:t>
             </a:fld>
             <a:endParaRPr lang="pt-PT"/>
           </a:p>
@@ -551,10 +551,32 @@
           <a:lstStyle/>
           <a:p>
             <a:r>
-              <a:rPr lang="pt-PT" smtClean="0"/>
-              <a:t>Also mention MySQL usage constraints</a:t>
-            </a:r>
-            <a:endParaRPr lang="pt-PT"/>
+              <a:rPr lang="pt-PT" dirty="0" smtClean="0"/>
+              <a:t>Muito bom dia a todos. Quero desde já agradecer à</a:t>
+            </a:r>
+            <a:r>
+              <a:rPr lang="pt-PT" baseline="0" dirty="0" smtClean="0"/>
+              <a:t> assistencia pela sua presença</a:t>
+            </a:r>
+          </a:p>
+          <a:p>
+            <a:endParaRPr lang="pt-PT" baseline="0" dirty="0" smtClean="0"/>
+          </a:p>
+          <a:p>
+            <a:r>
+              <a:rPr lang="pt-PT" baseline="0" dirty="0" smtClean="0"/>
+              <a:t>Passaria de imediato o trabalho de dissertação que realizei, intitulado “Improving Variability of Applications using Adaptive Object-Models”</a:t>
+            </a:r>
+          </a:p>
+          <a:p>
+            <a:endParaRPr lang="pt-PT" baseline="0" dirty="0" smtClean="0"/>
+          </a:p>
+          <a:p>
+            <a:r>
+              <a:rPr lang="pt-PT" baseline="0" dirty="0" smtClean="0"/>
+              <a:t>Este trabalho foi desenvolvido na Tecla Colorida, no projecto escolinhas.pt sob a supervisão dos profs. Ademar Aguiar e Hugo Ferreira</a:t>
+            </a:r>
+            <a:endParaRPr lang="pt-PT" dirty="0"/>
           </a:p>
         </p:txBody>
       </p:sp>
@@ -576,7 +598,7 @@
             <a:fld id="{EE5867BE-386C-4D16-9B1D-8635FC172DF2}" type="slidenum">
               <a:rPr lang="pt-PT" smtClean="0"/>
               <a:pPr/>
-              <a:t>6</a:t>
+              <a:t>1</a:t>
             </a:fld>
             <a:endParaRPr lang="pt-PT"/>
           </a:p>
@@ -637,10 +659,14 @@
           <a:lstStyle/>
           <a:p>
             <a:r>
-              <a:rPr lang="pt-PT" dirty="0" smtClean="0"/>
-              <a:t>Performance increase is dependant on the previous design</a:t>
-            </a:r>
-            <a:endParaRPr lang="pt-PT" dirty="0"/>
+              <a:rPr lang="pt-PT" smtClean="0"/>
+              <a:t>Role-Object</a:t>
+            </a:r>
+            <a:r>
+              <a:rPr lang="pt-PT" baseline="0" smtClean="0"/>
+              <a:t> Pattern</a:t>
+            </a:r>
+            <a:endParaRPr lang="pt-PT"/>
           </a:p>
         </p:txBody>
       </p:sp>
@@ -662,7 +688,7 @@
             <a:fld id="{EE5867BE-386C-4D16-9B1D-8635FC172DF2}" type="slidenum">
               <a:rPr lang="pt-PT" smtClean="0"/>
               <a:pPr/>
-              <a:t>42</a:t>
+              <a:t>19</a:t>
             </a:fld>
             <a:endParaRPr lang="pt-PT"/>
           </a:p>
@@ -676,7 +702,7 @@
 </p:notes>
 </file>
 
-<file path=ppt/notesSlides/notesSlide2.xml><?xml version="1.0" encoding="utf-8"?>
+<file path=ppt/notesSlides/notesSlide11.xml><?xml version="1.0" encoding="utf-8"?>
 <p:notes xmlns:a="http://schemas.openxmlformats.org/drawingml/2006/main" xmlns:r="http://schemas.openxmlformats.org/officeDocument/2006/relationships" xmlns:p="http://schemas.openxmlformats.org/presentationml/2006/main">
   <p:cSld>
     <p:spTree>
@@ -752,7 +778,7 @@
             <a:fld id="{EE5867BE-386C-4D16-9B1D-8635FC172DF2}" type="slidenum">
               <a:rPr lang="pt-PT" smtClean="0"/>
               <a:pPr/>
-              <a:t>19</a:t>
+              <a:t>20</a:t>
             </a:fld>
             <a:endParaRPr lang="pt-PT"/>
           </a:p>
@@ -766,7 +792,7 @@
 </p:notes>
 </file>
 
-<file path=ppt/notesSlides/notesSlide3.xml><?xml version="1.0" encoding="utf-8"?>
+<file path=ppt/notesSlides/notesSlide12.xml><?xml version="1.0" encoding="utf-8"?>
 <p:notes xmlns:a="http://schemas.openxmlformats.org/drawingml/2006/main" xmlns:r="http://schemas.openxmlformats.org/officeDocument/2006/relationships" xmlns:p="http://schemas.openxmlformats.org/presentationml/2006/main">
   <p:cSld>
     <p:spTree>
@@ -813,14 +839,10 @@
           <a:lstStyle/>
           <a:p>
             <a:r>
-              <a:rPr lang="pt-PT" smtClean="0"/>
-              <a:t>Role-Object</a:t>
-            </a:r>
-            <a:r>
-              <a:rPr lang="pt-PT" baseline="0" smtClean="0"/>
-              <a:t> Pattern</a:t>
-            </a:r>
-            <a:endParaRPr lang="pt-PT"/>
+              <a:rPr lang="pt-PT" dirty="0" smtClean="0"/>
+              <a:t>Ligações entre utilizadores, turmas, e escolas</a:t>
+            </a:r>
+            <a:endParaRPr lang="pt-PT" dirty="0"/>
           </a:p>
         </p:txBody>
       </p:sp>
@@ -842,7 +864,7 @@
             <a:fld id="{EE5867BE-386C-4D16-9B1D-8635FC172DF2}" type="slidenum">
               <a:rPr lang="pt-PT" smtClean="0"/>
               <a:pPr/>
-              <a:t>20</a:t>
+              <a:t>24</a:t>
             </a:fld>
             <a:endParaRPr lang="pt-PT"/>
           </a:p>
@@ -856,7 +878,7 @@
 </p:notes>
 </file>
 
-<file path=ppt/notesSlides/notesSlide4.xml><?xml version="1.0" encoding="utf-8"?>
+<file path=ppt/notesSlides/notesSlide13.xml><?xml version="1.0" encoding="utf-8"?>
 <p:notes xmlns:a="http://schemas.openxmlformats.org/drawingml/2006/main" xmlns:r="http://schemas.openxmlformats.org/officeDocument/2006/relationships" xmlns:p="http://schemas.openxmlformats.org/presentationml/2006/main">
   <p:cSld>
     <p:spTree>
@@ -946,7 +968,7 @@
 </p:notes>
 </file>
 
-<file path=ppt/notesSlides/notesSlide5.xml><?xml version="1.0" encoding="utf-8"?>
+<file path=ppt/notesSlides/notesSlide14.xml><?xml version="1.0" encoding="utf-8"?>
 <p:notes xmlns:a="http://schemas.openxmlformats.org/drawingml/2006/main" xmlns:r="http://schemas.openxmlformats.org/officeDocument/2006/relationships" xmlns:p="http://schemas.openxmlformats.org/presentationml/2006/main">
   <p:cSld>
     <p:spTree>
@@ -1032,7 +1054,7 @@
 </p:notes>
 </file>
 
-<file path=ppt/notesSlides/notesSlide6.xml><?xml version="1.0" encoding="utf-8"?>
+<file path=ppt/notesSlides/notesSlide15.xml><?xml version="1.0" encoding="utf-8"?>
 <p:notes xmlns:a="http://schemas.openxmlformats.org/drawingml/2006/main" xmlns:r="http://schemas.openxmlformats.org/officeDocument/2006/relationships" xmlns:p="http://schemas.openxmlformats.org/presentationml/2006/main">
   <p:cSld>
     <p:spTree>
@@ -1118,7 +1140,7 @@
 </p:notes>
 </file>
 
-<file path=ppt/notesSlides/notesSlide7.xml><?xml version="1.0" encoding="utf-8"?>
+<file path=ppt/notesSlides/notesSlide16.xml><?xml version="1.0" encoding="utf-8"?>
 <p:notes xmlns:a="http://schemas.openxmlformats.org/drawingml/2006/main" xmlns:r="http://schemas.openxmlformats.org/officeDocument/2006/relationships" xmlns:p="http://schemas.openxmlformats.org/presentationml/2006/main">
   <p:cSld>
     <p:spTree>
@@ -1283,7 +1305,7 @@
 </p:notes>
 </file>
 
-<file path=ppt/notesSlides/notesSlide8.xml><?xml version="1.0" encoding="utf-8"?>
+<file path=ppt/notesSlides/notesSlide17.xml><?xml version="1.0" encoding="utf-8"?>
 <p:notes xmlns:a="http://schemas.openxmlformats.org/drawingml/2006/main" xmlns:r="http://schemas.openxmlformats.org/officeDocument/2006/relationships" xmlns:p="http://schemas.openxmlformats.org/presentationml/2006/main">
   <p:cSld>
     <p:spTree>
@@ -1390,7 +1412,7 @@
 </p:notes>
 </file>
 
-<file path=ppt/notesSlides/notesSlide9.xml><?xml version="1.0" encoding="utf-8"?>
+<file path=ppt/notesSlides/notesSlide18.xml><?xml version="1.0" encoding="utf-8"?>
 <p:notes xmlns:a="http://schemas.openxmlformats.org/drawingml/2006/main" xmlns:r="http://schemas.openxmlformats.org/officeDocument/2006/relationships" xmlns:p="http://schemas.openxmlformats.org/presentationml/2006/main">
   <p:cSld>
     <p:spTree>
@@ -1484,6 +1506,1496 @@
               <a:rPr lang="pt-PT" smtClean="0"/>
               <a:pPr/>
               <a:t>36</a:t>
+            </a:fld>
+            <a:endParaRPr lang="pt-PT"/>
+          </a:p>
+        </p:txBody>
+      </p:sp>
+    </p:spTree>
+  </p:cSld>
+  <p:clrMapOvr>
+    <a:masterClrMapping/>
+  </p:clrMapOvr>
+</p:notes>
+</file>
+
+<file path=ppt/notesSlides/notesSlide19.xml><?xml version="1.0" encoding="utf-8"?>
+<p:notes xmlns:a="http://schemas.openxmlformats.org/drawingml/2006/main" xmlns:r="http://schemas.openxmlformats.org/officeDocument/2006/relationships" xmlns:p="http://schemas.openxmlformats.org/presentationml/2006/main">
+  <p:cSld>
+    <p:spTree>
+      <p:nvGrpSpPr>
+        <p:cNvPr id="1" name=""/>
+        <p:cNvGrpSpPr/>
+        <p:nvPr/>
+      </p:nvGrpSpPr>
+      <p:grpSpPr>
+        <a:xfrm>
+          <a:off x="0" y="0"/>
+          <a:ext cx="0" cy="0"/>
+          <a:chOff x="0" y="0"/>
+          <a:chExt cx="0" cy="0"/>
+        </a:xfrm>
+      </p:grpSpPr>
+      <p:sp>
+        <p:nvSpPr>
+          <p:cNvPr id="2" name="Slide Image Placeholder 1"/>
+          <p:cNvSpPr>
+            <a:spLocks noGrp="1" noRot="1" noChangeAspect="1"/>
+          </p:cNvSpPr>
+          <p:nvPr>
+            <p:ph type="sldImg"/>
+          </p:nvPr>
+        </p:nvSpPr>
+        <p:spPr/>
+      </p:sp>
+      <p:sp>
+        <p:nvSpPr>
+          <p:cNvPr id="3" name="Notes Placeholder 2"/>
+          <p:cNvSpPr>
+            <a:spLocks noGrp="1"/>
+          </p:cNvSpPr>
+          <p:nvPr>
+            <p:ph type="body" idx="1"/>
+          </p:nvPr>
+        </p:nvSpPr>
+        <p:spPr/>
+        <p:txBody>
+          <a:bodyPr>
+            <a:normAutofit/>
+          </a:bodyPr>
+          <a:lstStyle/>
+          <a:p>
+            <a:r>
+              <a:rPr lang="pt-PT" dirty="0" smtClean="0"/>
+              <a:t>O que é que é então possível concluir do trabalho efectuado?</a:t>
+            </a:r>
+            <a:endParaRPr lang="pt-PT" dirty="0"/>
+          </a:p>
+        </p:txBody>
+      </p:sp>
+      <p:sp>
+        <p:nvSpPr>
+          <p:cNvPr id="4" name="Slide Number Placeholder 3"/>
+          <p:cNvSpPr>
+            <a:spLocks noGrp="1"/>
+          </p:cNvSpPr>
+          <p:nvPr>
+            <p:ph type="sldNum" sz="quarter" idx="10"/>
+          </p:nvPr>
+        </p:nvSpPr>
+        <p:spPr/>
+        <p:txBody>
+          <a:bodyPr/>
+          <a:lstStyle/>
+          <a:p>
+            <a:fld id="{EE5867BE-386C-4D16-9B1D-8635FC172DF2}" type="slidenum">
+              <a:rPr lang="pt-PT" smtClean="0"/>
+              <a:pPr/>
+              <a:t>38</a:t>
+            </a:fld>
+            <a:endParaRPr lang="pt-PT"/>
+          </a:p>
+        </p:txBody>
+      </p:sp>
+    </p:spTree>
+  </p:cSld>
+  <p:clrMapOvr>
+    <a:masterClrMapping/>
+  </p:clrMapOvr>
+</p:notes>
+</file>
+
+<file path=ppt/notesSlides/notesSlide2.xml><?xml version="1.0" encoding="utf-8"?>
+<p:notes xmlns:a="http://schemas.openxmlformats.org/drawingml/2006/main" xmlns:r="http://schemas.openxmlformats.org/officeDocument/2006/relationships" xmlns:p="http://schemas.openxmlformats.org/presentationml/2006/main">
+  <p:cSld>
+    <p:spTree>
+      <p:nvGrpSpPr>
+        <p:cNvPr id="1" name=""/>
+        <p:cNvGrpSpPr/>
+        <p:nvPr/>
+      </p:nvGrpSpPr>
+      <p:grpSpPr>
+        <a:xfrm>
+          <a:off x="0" y="0"/>
+          <a:ext cx="0" cy="0"/>
+          <a:chOff x="0" y="0"/>
+          <a:chExt cx="0" cy="0"/>
+        </a:xfrm>
+      </p:grpSpPr>
+      <p:sp>
+        <p:nvSpPr>
+          <p:cNvPr id="2" name="Slide Image Placeholder 1"/>
+          <p:cNvSpPr>
+            <a:spLocks noGrp="1" noRot="1" noChangeAspect="1"/>
+          </p:cNvSpPr>
+          <p:nvPr>
+            <p:ph type="sldImg"/>
+          </p:nvPr>
+        </p:nvSpPr>
+        <p:spPr/>
+      </p:sp>
+      <p:sp>
+        <p:nvSpPr>
+          <p:cNvPr id="3" name="Notes Placeholder 2"/>
+          <p:cNvSpPr>
+            <a:spLocks noGrp="1"/>
+          </p:cNvSpPr>
+          <p:nvPr>
+            <p:ph type="body" idx="1"/>
+          </p:nvPr>
+        </p:nvSpPr>
+        <p:spPr/>
+        <p:txBody>
+          <a:bodyPr>
+            <a:normAutofit/>
+          </a:bodyPr>
+          <a:lstStyle/>
+          <a:p>
+            <a:r>
+              <a:rPr lang="pt-PT" dirty="0" smtClean="0"/>
+              <a:t>Comçando então por expor o problema:</a:t>
+            </a:r>
+            <a:endParaRPr lang="pt-PT" dirty="0"/>
+          </a:p>
+        </p:txBody>
+      </p:sp>
+      <p:sp>
+        <p:nvSpPr>
+          <p:cNvPr id="4" name="Slide Number Placeholder 3"/>
+          <p:cNvSpPr>
+            <a:spLocks noGrp="1"/>
+          </p:cNvSpPr>
+          <p:nvPr>
+            <p:ph type="sldNum" sz="quarter" idx="10"/>
+          </p:nvPr>
+        </p:nvSpPr>
+        <p:spPr/>
+        <p:txBody>
+          <a:bodyPr/>
+          <a:lstStyle/>
+          <a:p>
+            <a:fld id="{EE5867BE-386C-4D16-9B1D-8635FC172DF2}" type="slidenum">
+              <a:rPr lang="pt-PT" smtClean="0"/>
+              <a:pPr/>
+              <a:t>2</a:t>
+            </a:fld>
+            <a:endParaRPr lang="pt-PT"/>
+          </a:p>
+        </p:txBody>
+      </p:sp>
+    </p:spTree>
+  </p:cSld>
+  <p:clrMapOvr>
+    <a:masterClrMapping/>
+  </p:clrMapOvr>
+</p:notes>
+</file>
+
+<file path=ppt/notesSlides/notesSlide20.xml><?xml version="1.0" encoding="utf-8"?>
+<p:notes xmlns:a="http://schemas.openxmlformats.org/drawingml/2006/main" xmlns:r="http://schemas.openxmlformats.org/officeDocument/2006/relationships" xmlns:p="http://schemas.openxmlformats.org/presentationml/2006/main">
+  <p:cSld>
+    <p:spTree>
+      <p:nvGrpSpPr>
+        <p:cNvPr id="1" name=""/>
+        <p:cNvGrpSpPr/>
+        <p:nvPr/>
+      </p:nvGrpSpPr>
+      <p:grpSpPr>
+        <a:xfrm>
+          <a:off x="0" y="0"/>
+          <a:ext cx="0" cy="0"/>
+          <a:chOff x="0" y="0"/>
+          <a:chExt cx="0" cy="0"/>
+        </a:xfrm>
+      </p:grpSpPr>
+      <p:sp>
+        <p:nvSpPr>
+          <p:cNvPr id="2" name="Slide Image Placeholder 1"/>
+          <p:cNvSpPr>
+            <a:spLocks noGrp="1" noRot="1" noChangeAspect="1"/>
+          </p:cNvSpPr>
+          <p:nvPr>
+            <p:ph type="sldImg"/>
+          </p:nvPr>
+        </p:nvSpPr>
+        <p:spPr/>
+      </p:sp>
+      <p:sp>
+        <p:nvSpPr>
+          <p:cNvPr id="3" name="Notes Placeholder 2"/>
+          <p:cNvSpPr>
+            <a:spLocks noGrp="1"/>
+          </p:cNvSpPr>
+          <p:nvPr>
+            <p:ph type="body" idx="1"/>
+          </p:nvPr>
+        </p:nvSpPr>
+        <p:spPr/>
+        <p:txBody>
+          <a:bodyPr>
+            <a:normAutofit/>
+          </a:bodyPr>
+          <a:lstStyle/>
+          <a:p>
+            <a:r>
+              <a:rPr lang="pt-PT" dirty="0" smtClean="0"/>
+              <a:t>Arquitecturas</a:t>
+            </a:r>
+            <a:r>
+              <a:rPr lang="pt-PT" baseline="0" dirty="0" smtClean="0"/>
+              <a:t> </a:t>
+            </a:r>
+            <a:r>
+              <a:rPr lang="pt-PT" dirty="0" smtClean="0"/>
+              <a:t>AOM providenciam</a:t>
+            </a:r>
+            <a:r>
+              <a:rPr lang="pt-PT" baseline="0" dirty="0" smtClean="0"/>
+              <a:t> o melhor conjunto de ferramentas para a construção de sistemas altamente variáveis. Foram pensadas e desenhadas especificamente para esse propósito, pelo que são a melhor solução para este tipo de aplicações.</a:t>
+            </a:r>
+          </a:p>
+        </p:txBody>
+      </p:sp>
+      <p:sp>
+        <p:nvSpPr>
+          <p:cNvPr id="4" name="Slide Number Placeholder 3"/>
+          <p:cNvSpPr>
+            <a:spLocks noGrp="1"/>
+          </p:cNvSpPr>
+          <p:nvPr>
+            <p:ph type="sldNum" sz="quarter" idx="10"/>
+          </p:nvPr>
+        </p:nvSpPr>
+        <p:spPr/>
+        <p:txBody>
+          <a:bodyPr/>
+          <a:lstStyle/>
+          <a:p>
+            <a:fld id="{EE5867BE-386C-4D16-9B1D-8635FC172DF2}" type="slidenum">
+              <a:rPr lang="pt-PT" smtClean="0"/>
+              <a:pPr/>
+              <a:t>39</a:t>
+            </a:fld>
+            <a:endParaRPr lang="pt-PT"/>
+          </a:p>
+        </p:txBody>
+      </p:sp>
+    </p:spTree>
+  </p:cSld>
+  <p:clrMapOvr>
+    <a:masterClrMapping/>
+  </p:clrMapOvr>
+</p:notes>
+</file>
+
+<file path=ppt/notesSlides/notesSlide21.xml><?xml version="1.0" encoding="utf-8"?>
+<p:notes xmlns:a="http://schemas.openxmlformats.org/drawingml/2006/main" xmlns:r="http://schemas.openxmlformats.org/officeDocument/2006/relationships" xmlns:p="http://schemas.openxmlformats.org/presentationml/2006/main">
+  <p:cSld>
+    <p:spTree>
+      <p:nvGrpSpPr>
+        <p:cNvPr id="1" name=""/>
+        <p:cNvGrpSpPr/>
+        <p:nvPr/>
+      </p:nvGrpSpPr>
+      <p:grpSpPr>
+        <a:xfrm>
+          <a:off x="0" y="0"/>
+          <a:ext cx="0" cy="0"/>
+          <a:chOff x="0" y="0"/>
+          <a:chExt cx="0" cy="0"/>
+        </a:xfrm>
+      </p:grpSpPr>
+      <p:sp>
+        <p:nvSpPr>
+          <p:cNvPr id="2" name="Slide Image Placeholder 1"/>
+          <p:cNvSpPr>
+            <a:spLocks noGrp="1" noRot="1" noChangeAspect="1"/>
+          </p:cNvSpPr>
+          <p:nvPr>
+            <p:ph type="sldImg"/>
+          </p:nvPr>
+        </p:nvSpPr>
+        <p:spPr/>
+      </p:sp>
+      <p:sp>
+        <p:nvSpPr>
+          <p:cNvPr id="3" name="Notes Placeholder 2"/>
+          <p:cNvSpPr>
+            <a:spLocks noGrp="1"/>
+          </p:cNvSpPr>
+          <p:nvPr>
+            <p:ph type="body" idx="1"/>
+          </p:nvPr>
+        </p:nvSpPr>
+        <p:spPr/>
+        <p:txBody>
+          <a:bodyPr>
+            <a:normAutofit/>
+          </a:bodyPr>
+          <a:lstStyle/>
+          <a:p>
+            <a:r>
+              <a:rPr lang="pt-PT" dirty="0" smtClean="0"/>
+              <a:t>...</a:t>
+            </a:r>
+          </a:p>
+          <a:p>
+            <a:endParaRPr lang="pt-PT" dirty="0" smtClean="0"/>
+          </a:p>
+          <a:p>
+            <a:r>
+              <a:rPr lang="pt-PT" dirty="0" smtClean="0"/>
+              <a:t>Apesar</a:t>
+            </a:r>
+            <a:r>
+              <a:rPr lang="pt-PT" baseline="0" dirty="0" smtClean="0"/>
+              <a:t> do excelente conjunto de ferramentas providenciado pelo Rails, o uso de uma arquitectura MVC e as convenções usadas podem por vezes dificultar a criação de ambientes altamente variáveis – no entanto, na verdade, serão raras as vezes em que é preciso niveis tao extremos de variabilidade</a:t>
+            </a:r>
+            <a:endParaRPr lang="pt-PT" dirty="0" smtClean="0"/>
+          </a:p>
+        </p:txBody>
+      </p:sp>
+      <p:sp>
+        <p:nvSpPr>
+          <p:cNvPr id="4" name="Slide Number Placeholder 3"/>
+          <p:cNvSpPr>
+            <a:spLocks noGrp="1"/>
+          </p:cNvSpPr>
+          <p:nvPr>
+            <p:ph type="sldNum" sz="quarter" idx="10"/>
+          </p:nvPr>
+        </p:nvSpPr>
+        <p:spPr/>
+        <p:txBody>
+          <a:bodyPr/>
+          <a:lstStyle/>
+          <a:p>
+            <a:fld id="{EE5867BE-386C-4D16-9B1D-8635FC172DF2}" type="slidenum">
+              <a:rPr lang="pt-PT" smtClean="0"/>
+              <a:pPr/>
+              <a:t>40</a:t>
+            </a:fld>
+            <a:endParaRPr lang="pt-PT"/>
+          </a:p>
+        </p:txBody>
+      </p:sp>
+    </p:spTree>
+  </p:cSld>
+  <p:clrMapOvr>
+    <a:masterClrMapping/>
+  </p:clrMapOvr>
+</p:notes>
+</file>
+
+<file path=ppt/notesSlides/notesSlide22.xml><?xml version="1.0" encoding="utf-8"?>
+<p:notes xmlns:a="http://schemas.openxmlformats.org/drawingml/2006/main" xmlns:r="http://schemas.openxmlformats.org/officeDocument/2006/relationships" xmlns:p="http://schemas.openxmlformats.org/presentationml/2006/main">
+  <p:cSld>
+    <p:spTree>
+      <p:nvGrpSpPr>
+        <p:cNvPr id="1" name=""/>
+        <p:cNvGrpSpPr/>
+        <p:nvPr/>
+      </p:nvGrpSpPr>
+      <p:grpSpPr>
+        <a:xfrm>
+          <a:off x="0" y="0"/>
+          <a:ext cx="0" cy="0"/>
+          <a:chOff x="0" y="0"/>
+          <a:chExt cx="0" cy="0"/>
+        </a:xfrm>
+      </p:grpSpPr>
+      <p:sp>
+        <p:nvSpPr>
+          <p:cNvPr id="2" name="Slide Image Placeholder 1"/>
+          <p:cNvSpPr>
+            <a:spLocks noGrp="1" noRot="1" noChangeAspect="1"/>
+          </p:cNvSpPr>
+          <p:nvPr>
+            <p:ph type="sldImg"/>
+          </p:nvPr>
+        </p:nvSpPr>
+        <p:spPr/>
+      </p:sp>
+      <p:sp>
+        <p:nvSpPr>
+          <p:cNvPr id="3" name="Notes Placeholder 2"/>
+          <p:cNvSpPr>
+            <a:spLocks noGrp="1"/>
+          </p:cNvSpPr>
+          <p:nvPr>
+            <p:ph type="body" idx="1"/>
+          </p:nvPr>
+        </p:nvSpPr>
+        <p:spPr/>
+        <p:txBody>
+          <a:bodyPr>
+            <a:normAutofit/>
+          </a:bodyPr>
+          <a:lstStyle/>
+          <a:p>
+            <a:r>
+              <a:rPr lang="pt-PT" dirty="0" smtClean="0"/>
+              <a:t>Por si</a:t>
+            </a:r>
+            <a:r>
+              <a:rPr lang="pt-PT" baseline="0" dirty="0" smtClean="0"/>
+              <a:t> só, o Rails pode ser um entrave à construção destes sistemas: no entanto, tal como demonstrado pelo trabalho desenvolvido ...</a:t>
+            </a:r>
+            <a:endParaRPr lang="pt-PT" dirty="0"/>
+          </a:p>
+        </p:txBody>
+      </p:sp>
+      <p:sp>
+        <p:nvSpPr>
+          <p:cNvPr id="4" name="Slide Number Placeholder 3"/>
+          <p:cNvSpPr>
+            <a:spLocks noGrp="1"/>
+          </p:cNvSpPr>
+          <p:nvPr>
+            <p:ph type="sldNum" sz="quarter" idx="10"/>
+          </p:nvPr>
+        </p:nvSpPr>
+        <p:spPr/>
+        <p:txBody>
+          <a:bodyPr/>
+          <a:lstStyle/>
+          <a:p>
+            <a:fld id="{EE5867BE-386C-4D16-9B1D-8635FC172DF2}" type="slidenum">
+              <a:rPr lang="pt-PT" smtClean="0"/>
+              <a:pPr/>
+              <a:t>41</a:t>
+            </a:fld>
+            <a:endParaRPr lang="pt-PT"/>
+          </a:p>
+        </p:txBody>
+      </p:sp>
+    </p:spTree>
+  </p:cSld>
+  <p:clrMapOvr>
+    <a:masterClrMapping/>
+  </p:clrMapOvr>
+</p:notes>
+</file>
+
+<file path=ppt/notesSlides/notesSlide23.xml><?xml version="1.0" encoding="utf-8"?>
+<p:notes xmlns:a="http://schemas.openxmlformats.org/drawingml/2006/main" xmlns:r="http://schemas.openxmlformats.org/officeDocument/2006/relationships" xmlns:p="http://schemas.openxmlformats.org/presentationml/2006/main">
+  <p:cSld>
+    <p:spTree>
+      <p:nvGrpSpPr>
+        <p:cNvPr id="1" name=""/>
+        <p:cNvGrpSpPr/>
+        <p:nvPr/>
+      </p:nvGrpSpPr>
+      <p:grpSpPr>
+        <a:xfrm>
+          <a:off x="0" y="0"/>
+          <a:ext cx="0" cy="0"/>
+          <a:chOff x="0" y="0"/>
+          <a:chExt cx="0" cy="0"/>
+        </a:xfrm>
+      </p:grpSpPr>
+      <p:sp>
+        <p:nvSpPr>
+          <p:cNvPr id="2" name="Slide Image Placeholder 1"/>
+          <p:cNvSpPr>
+            <a:spLocks noGrp="1" noRot="1" noChangeAspect="1"/>
+          </p:cNvSpPr>
+          <p:nvPr>
+            <p:ph type="sldImg"/>
+          </p:nvPr>
+        </p:nvSpPr>
+        <p:spPr/>
+      </p:sp>
+      <p:sp>
+        <p:nvSpPr>
+          <p:cNvPr id="3" name="Notes Placeholder 2"/>
+          <p:cNvSpPr>
+            <a:spLocks noGrp="1"/>
+          </p:cNvSpPr>
+          <p:nvPr>
+            <p:ph type="body" idx="1"/>
+          </p:nvPr>
+        </p:nvSpPr>
+        <p:spPr/>
+        <p:txBody>
+          <a:bodyPr>
+            <a:normAutofit/>
+          </a:bodyPr>
+          <a:lstStyle/>
+          <a:p>
+            <a:r>
+              <a:rPr lang="pt-PT" dirty="0" smtClean="0"/>
+              <a:t>Performance increase is dependant on the previous design</a:t>
+            </a:r>
+            <a:endParaRPr lang="pt-PT" dirty="0"/>
+          </a:p>
+        </p:txBody>
+      </p:sp>
+      <p:sp>
+        <p:nvSpPr>
+          <p:cNvPr id="4" name="Slide Number Placeholder 3"/>
+          <p:cNvSpPr>
+            <a:spLocks noGrp="1"/>
+          </p:cNvSpPr>
+          <p:nvPr>
+            <p:ph type="sldNum" sz="quarter" idx="10"/>
+          </p:nvPr>
+        </p:nvSpPr>
+        <p:spPr/>
+        <p:txBody>
+          <a:bodyPr/>
+          <a:lstStyle/>
+          <a:p>
+            <a:fld id="{EE5867BE-386C-4D16-9B1D-8635FC172DF2}" type="slidenum">
+              <a:rPr lang="pt-PT" smtClean="0"/>
+              <a:pPr/>
+              <a:t>42</a:t>
+            </a:fld>
+            <a:endParaRPr lang="pt-PT"/>
+          </a:p>
+        </p:txBody>
+      </p:sp>
+    </p:spTree>
+  </p:cSld>
+  <p:clrMapOvr>
+    <a:masterClrMapping/>
+  </p:clrMapOvr>
+</p:notes>
+</file>
+
+<file path=ppt/notesSlides/notesSlide24.xml><?xml version="1.0" encoding="utf-8"?>
+<p:notes xmlns:a="http://schemas.openxmlformats.org/drawingml/2006/main" xmlns:r="http://schemas.openxmlformats.org/officeDocument/2006/relationships" xmlns:p="http://schemas.openxmlformats.org/presentationml/2006/main">
+  <p:cSld>
+    <p:spTree>
+      <p:nvGrpSpPr>
+        <p:cNvPr id="1" name=""/>
+        <p:cNvGrpSpPr/>
+        <p:nvPr/>
+      </p:nvGrpSpPr>
+      <p:grpSpPr>
+        <a:xfrm>
+          <a:off x="0" y="0"/>
+          <a:ext cx="0" cy="0"/>
+          <a:chOff x="0" y="0"/>
+          <a:chExt cx="0" cy="0"/>
+        </a:xfrm>
+      </p:grpSpPr>
+      <p:sp>
+        <p:nvSpPr>
+          <p:cNvPr id="2" name="Slide Image Placeholder 1"/>
+          <p:cNvSpPr>
+            <a:spLocks noGrp="1" noRot="1" noChangeAspect="1"/>
+          </p:cNvSpPr>
+          <p:nvPr>
+            <p:ph type="sldImg"/>
+          </p:nvPr>
+        </p:nvSpPr>
+        <p:spPr/>
+      </p:sp>
+      <p:sp>
+        <p:nvSpPr>
+          <p:cNvPr id="3" name="Notes Placeholder 2"/>
+          <p:cNvSpPr>
+            <a:spLocks noGrp="1"/>
+          </p:cNvSpPr>
+          <p:nvPr>
+            <p:ph type="body" idx="1"/>
+          </p:nvPr>
+        </p:nvSpPr>
+        <p:spPr/>
+        <p:txBody>
+          <a:bodyPr>
+            <a:normAutofit/>
+          </a:bodyPr>
+          <a:lstStyle/>
+          <a:p>
+            <a:endParaRPr lang="pt-PT" dirty="0"/>
+          </a:p>
+        </p:txBody>
+      </p:sp>
+      <p:sp>
+        <p:nvSpPr>
+          <p:cNvPr id="4" name="Slide Number Placeholder 3"/>
+          <p:cNvSpPr>
+            <a:spLocks noGrp="1"/>
+          </p:cNvSpPr>
+          <p:nvPr>
+            <p:ph type="sldNum" sz="quarter" idx="10"/>
+          </p:nvPr>
+        </p:nvSpPr>
+        <p:spPr/>
+        <p:txBody>
+          <a:bodyPr/>
+          <a:lstStyle/>
+          <a:p>
+            <a:fld id="{EE5867BE-386C-4D16-9B1D-8635FC172DF2}" type="slidenum">
+              <a:rPr lang="pt-PT" smtClean="0"/>
+              <a:pPr/>
+              <a:t>43</a:t>
+            </a:fld>
+            <a:endParaRPr lang="pt-PT"/>
+          </a:p>
+        </p:txBody>
+      </p:sp>
+    </p:spTree>
+  </p:cSld>
+  <p:clrMapOvr>
+    <a:masterClrMapping/>
+  </p:clrMapOvr>
+</p:notes>
+</file>
+
+<file path=ppt/notesSlides/notesSlide25.xml><?xml version="1.0" encoding="utf-8"?>
+<p:notes xmlns:a="http://schemas.openxmlformats.org/drawingml/2006/main" xmlns:r="http://schemas.openxmlformats.org/officeDocument/2006/relationships" xmlns:p="http://schemas.openxmlformats.org/presentationml/2006/main">
+  <p:cSld>
+    <p:spTree>
+      <p:nvGrpSpPr>
+        <p:cNvPr id="1" name=""/>
+        <p:cNvGrpSpPr/>
+        <p:nvPr/>
+      </p:nvGrpSpPr>
+      <p:grpSpPr>
+        <a:xfrm>
+          <a:off x="0" y="0"/>
+          <a:ext cx="0" cy="0"/>
+          <a:chOff x="0" y="0"/>
+          <a:chExt cx="0" cy="0"/>
+        </a:xfrm>
+      </p:grpSpPr>
+      <p:sp>
+        <p:nvSpPr>
+          <p:cNvPr id="2" name="Slide Image Placeholder 1"/>
+          <p:cNvSpPr>
+            <a:spLocks noGrp="1" noRot="1" noChangeAspect="1"/>
+          </p:cNvSpPr>
+          <p:nvPr>
+            <p:ph type="sldImg"/>
+          </p:nvPr>
+        </p:nvSpPr>
+        <p:spPr/>
+      </p:sp>
+      <p:sp>
+        <p:nvSpPr>
+          <p:cNvPr id="3" name="Notes Placeholder 2"/>
+          <p:cNvSpPr>
+            <a:spLocks noGrp="1"/>
+          </p:cNvSpPr>
+          <p:nvPr>
+            <p:ph type="body" idx="1"/>
+          </p:nvPr>
+        </p:nvSpPr>
+        <p:spPr/>
+        <p:txBody>
+          <a:bodyPr>
+            <a:normAutofit/>
+          </a:bodyPr>
+          <a:lstStyle/>
+          <a:p>
+            <a:endParaRPr lang="pt-PT" dirty="0"/>
+          </a:p>
+        </p:txBody>
+      </p:sp>
+      <p:sp>
+        <p:nvSpPr>
+          <p:cNvPr id="4" name="Slide Number Placeholder 3"/>
+          <p:cNvSpPr>
+            <a:spLocks noGrp="1"/>
+          </p:cNvSpPr>
+          <p:nvPr>
+            <p:ph type="sldNum" sz="quarter" idx="10"/>
+          </p:nvPr>
+        </p:nvSpPr>
+        <p:spPr/>
+        <p:txBody>
+          <a:bodyPr/>
+          <a:lstStyle/>
+          <a:p>
+            <a:fld id="{EE5867BE-386C-4D16-9B1D-8635FC172DF2}" type="slidenum">
+              <a:rPr lang="pt-PT" smtClean="0"/>
+              <a:pPr/>
+              <a:t>45</a:t>
+            </a:fld>
+            <a:endParaRPr lang="pt-PT"/>
+          </a:p>
+        </p:txBody>
+      </p:sp>
+    </p:spTree>
+  </p:cSld>
+  <p:clrMapOvr>
+    <a:masterClrMapping/>
+  </p:clrMapOvr>
+</p:notes>
+</file>
+
+<file path=ppt/notesSlides/notesSlide26.xml><?xml version="1.0" encoding="utf-8"?>
+<p:notes xmlns:a="http://schemas.openxmlformats.org/drawingml/2006/main" xmlns:r="http://schemas.openxmlformats.org/officeDocument/2006/relationships" xmlns:p="http://schemas.openxmlformats.org/presentationml/2006/main">
+  <p:cSld>
+    <p:spTree>
+      <p:nvGrpSpPr>
+        <p:cNvPr id="1" name=""/>
+        <p:cNvGrpSpPr/>
+        <p:nvPr/>
+      </p:nvGrpSpPr>
+      <p:grpSpPr>
+        <a:xfrm>
+          <a:off x="0" y="0"/>
+          <a:ext cx="0" cy="0"/>
+          <a:chOff x="0" y="0"/>
+          <a:chExt cx="0" cy="0"/>
+        </a:xfrm>
+      </p:grpSpPr>
+      <p:sp>
+        <p:nvSpPr>
+          <p:cNvPr id="2" name="Slide Image Placeholder 1"/>
+          <p:cNvSpPr>
+            <a:spLocks noGrp="1" noRot="1" noChangeAspect="1"/>
+          </p:cNvSpPr>
+          <p:nvPr>
+            <p:ph type="sldImg"/>
+          </p:nvPr>
+        </p:nvSpPr>
+        <p:spPr/>
+      </p:sp>
+      <p:sp>
+        <p:nvSpPr>
+          <p:cNvPr id="3" name="Notes Placeholder 2"/>
+          <p:cNvSpPr>
+            <a:spLocks noGrp="1"/>
+          </p:cNvSpPr>
+          <p:nvPr>
+            <p:ph type="body" idx="1"/>
+          </p:nvPr>
+        </p:nvSpPr>
+        <p:spPr/>
+        <p:txBody>
+          <a:bodyPr>
+            <a:normAutofit/>
+          </a:bodyPr>
+          <a:lstStyle/>
+          <a:p>
+            <a:endParaRPr lang="pt-PT"/>
+          </a:p>
+        </p:txBody>
+      </p:sp>
+      <p:sp>
+        <p:nvSpPr>
+          <p:cNvPr id="4" name="Slide Number Placeholder 3"/>
+          <p:cNvSpPr>
+            <a:spLocks noGrp="1"/>
+          </p:cNvSpPr>
+          <p:nvPr>
+            <p:ph type="sldNum" sz="quarter" idx="10"/>
+          </p:nvPr>
+        </p:nvSpPr>
+        <p:spPr/>
+        <p:txBody>
+          <a:bodyPr/>
+          <a:lstStyle/>
+          <a:p>
+            <a:fld id="{EE5867BE-386C-4D16-9B1D-8635FC172DF2}" type="slidenum">
+              <a:rPr lang="pt-PT" smtClean="0"/>
+              <a:pPr/>
+              <a:t>46</a:t>
+            </a:fld>
+            <a:endParaRPr lang="pt-PT"/>
+          </a:p>
+        </p:txBody>
+      </p:sp>
+    </p:spTree>
+  </p:cSld>
+  <p:clrMapOvr>
+    <a:masterClrMapping/>
+  </p:clrMapOvr>
+</p:notes>
+</file>
+
+<file path=ppt/notesSlides/notesSlide3.xml><?xml version="1.0" encoding="utf-8"?>
+<p:notes xmlns:a="http://schemas.openxmlformats.org/drawingml/2006/main" xmlns:r="http://schemas.openxmlformats.org/officeDocument/2006/relationships" xmlns:p="http://schemas.openxmlformats.org/presentationml/2006/main">
+  <p:cSld>
+    <p:spTree>
+      <p:nvGrpSpPr>
+        <p:cNvPr id="1" name=""/>
+        <p:cNvGrpSpPr/>
+        <p:nvPr/>
+      </p:nvGrpSpPr>
+      <p:grpSpPr>
+        <a:xfrm>
+          <a:off x="0" y="0"/>
+          <a:ext cx="0" cy="0"/>
+          <a:chOff x="0" y="0"/>
+          <a:chExt cx="0" cy="0"/>
+        </a:xfrm>
+      </p:grpSpPr>
+      <p:sp>
+        <p:nvSpPr>
+          <p:cNvPr id="2" name="Slide Image Placeholder 1"/>
+          <p:cNvSpPr>
+            <a:spLocks noGrp="1" noRot="1" noChangeAspect="1"/>
+          </p:cNvSpPr>
+          <p:nvPr>
+            <p:ph type="sldImg"/>
+          </p:nvPr>
+        </p:nvSpPr>
+        <p:spPr/>
+      </p:sp>
+      <p:sp>
+        <p:nvSpPr>
+          <p:cNvPr id="3" name="Notes Placeholder 2"/>
+          <p:cNvSpPr>
+            <a:spLocks noGrp="1"/>
+          </p:cNvSpPr>
+          <p:nvPr>
+            <p:ph type="body" idx="1"/>
+          </p:nvPr>
+        </p:nvSpPr>
+        <p:spPr/>
+        <p:txBody>
+          <a:bodyPr>
+            <a:normAutofit/>
+          </a:bodyPr>
+          <a:lstStyle/>
+          <a:p>
+            <a:r>
+              <a:rPr lang="pt-PT" smtClean="0"/>
+              <a:t>Also mention MySQL usage constraints</a:t>
+            </a:r>
+            <a:endParaRPr lang="pt-PT"/>
+          </a:p>
+        </p:txBody>
+      </p:sp>
+      <p:sp>
+        <p:nvSpPr>
+          <p:cNvPr id="4" name="Slide Number Placeholder 3"/>
+          <p:cNvSpPr>
+            <a:spLocks noGrp="1"/>
+          </p:cNvSpPr>
+          <p:nvPr>
+            <p:ph type="sldNum" sz="quarter" idx="10"/>
+          </p:nvPr>
+        </p:nvSpPr>
+        <p:spPr/>
+        <p:txBody>
+          <a:bodyPr/>
+          <a:lstStyle/>
+          <a:p>
+            <a:fld id="{EE5867BE-386C-4D16-9B1D-8635FC172DF2}" type="slidenum">
+              <a:rPr lang="pt-PT" smtClean="0"/>
+              <a:pPr/>
+              <a:t>6</a:t>
+            </a:fld>
+            <a:endParaRPr lang="pt-PT"/>
+          </a:p>
+        </p:txBody>
+      </p:sp>
+    </p:spTree>
+  </p:cSld>
+  <p:clrMapOvr>
+    <a:masterClrMapping/>
+  </p:clrMapOvr>
+</p:notes>
+</file>
+
+<file path=ppt/notesSlides/notesSlide4.xml><?xml version="1.0" encoding="utf-8"?>
+<p:notes xmlns:a="http://schemas.openxmlformats.org/drawingml/2006/main" xmlns:r="http://schemas.openxmlformats.org/officeDocument/2006/relationships" xmlns:p="http://schemas.openxmlformats.org/presentationml/2006/main">
+  <p:cSld>
+    <p:spTree>
+      <p:nvGrpSpPr>
+        <p:cNvPr id="1" name=""/>
+        <p:cNvGrpSpPr/>
+        <p:nvPr/>
+      </p:nvGrpSpPr>
+      <p:grpSpPr>
+        <a:xfrm>
+          <a:off x="0" y="0"/>
+          <a:ext cx="0" cy="0"/>
+          <a:chOff x="0" y="0"/>
+          <a:chExt cx="0" cy="0"/>
+        </a:xfrm>
+      </p:grpSpPr>
+      <p:sp>
+        <p:nvSpPr>
+          <p:cNvPr id="2" name="Slide Image Placeholder 1"/>
+          <p:cNvSpPr>
+            <a:spLocks noGrp="1" noRot="1" noChangeAspect="1"/>
+          </p:cNvSpPr>
+          <p:nvPr>
+            <p:ph type="sldImg"/>
+          </p:nvPr>
+        </p:nvSpPr>
+        <p:spPr/>
+      </p:sp>
+      <p:sp>
+        <p:nvSpPr>
+          <p:cNvPr id="3" name="Notes Placeholder 2"/>
+          <p:cNvSpPr>
+            <a:spLocks noGrp="1"/>
+          </p:cNvSpPr>
+          <p:nvPr>
+            <p:ph type="body" idx="1"/>
+          </p:nvPr>
+        </p:nvSpPr>
+        <p:spPr/>
+        <p:txBody>
+          <a:bodyPr>
+            <a:normAutofit/>
+          </a:bodyPr>
+          <a:lstStyle/>
+          <a:p>
+            <a:r>
+              <a:rPr lang="pt-PT" dirty="0" smtClean="0"/>
+              <a:t>Assim,</a:t>
+            </a:r>
+            <a:r>
+              <a:rPr lang="pt-PT" baseline="0" dirty="0" smtClean="0"/>
+              <a:t> é fundamental saber o que é que já foi feito e que estudos foram conduzidos para tentar resolver estes problemas? Existem diferentes abordagens, tanto ao nível do método como da técnica</a:t>
+            </a:r>
+            <a:endParaRPr lang="pt-PT" dirty="0"/>
+          </a:p>
+        </p:txBody>
+      </p:sp>
+      <p:sp>
+        <p:nvSpPr>
+          <p:cNvPr id="4" name="Slide Number Placeholder 3"/>
+          <p:cNvSpPr>
+            <a:spLocks noGrp="1"/>
+          </p:cNvSpPr>
+          <p:nvPr>
+            <p:ph type="sldNum" sz="quarter" idx="10"/>
+          </p:nvPr>
+        </p:nvSpPr>
+        <p:spPr/>
+        <p:txBody>
+          <a:bodyPr/>
+          <a:lstStyle/>
+          <a:p>
+            <a:fld id="{EE5867BE-386C-4D16-9B1D-8635FC172DF2}" type="slidenum">
+              <a:rPr lang="pt-PT" smtClean="0"/>
+              <a:pPr/>
+              <a:t>7</a:t>
+            </a:fld>
+            <a:endParaRPr lang="pt-PT"/>
+          </a:p>
+        </p:txBody>
+      </p:sp>
+    </p:spTree>
+  </p:cSld>
+  <p:clrMapOvr>
+    <a:masterClrMapping/>
+  </p:clrMapOvr>
+</p:notes>
+</file>
+
+<file path=ppt/notesSlides/notesSlide5.xml><?xml version="1.0" encoding="utf-8"?>
+<p:notes xmlns:a="http://schemas.openxmlformats.org/drawingml/2006/main" xmlns:r="http://schemas.openxmlformats.org/officeDocument/2006/relationships" xmlns:p="http://schemas.openxmlformats.org/presentationml/2006/main">
+  <p:cSld>
+    <p:spTree>
+      <p:nvGrpSpPr>
+        <p:cNvPr id="1" name=""/>
+        <p:cNvGrpSpPr/>
+        <p:nvPr/>
+      </p:nvGrpSpPr>
+      <p:grpSpPr>
+        <a:xfrm>
+          <a:off x="0" y="0"/>
+          <a:ext cx="0" cy="0"/>
+          <a:chOff x="0" y="0"/>
+          <a:chExt cx="0" cy="0"/>
+        </a:xfrm>
+      </p:grpSpPr>
+      <p:sp>
+        <p:nvSpPr>
+          <p:cNvPr id="2" name="Slide Image Placeholder 1"/>
+          <p:cNvSpPr>
+            <a:spLocks noGrp="1" noRot="1" noChangeAspect="1"/>
+          </p:cNvSpPr>
+          <p:nvPr>
+            <p:ph type="sldImg"/>
+          </p:nvPr>
+        </p:nvSpPr>
+        <p:spPr/>
+      </p:sp>
+      <p:sp>
+        <p:nvSpPr>
+          <p:cNvPr id="3" name="Notes Placeholder 2"/>
+          <p:cNvSpPr>
+            <a:spLocks noGrp="1"/>
+          </p:cNvSpPr>
+          <p:nvPr>
+            <p:ph type="body" idx="1"/>
+          </p:nvPr>
+        </p:nvSpPr>
+        <p:spPr/>
+        <p:txBody>
+          <a:bodyPr>
+            <a:normAutofit/>
+          </a:bodyPr>
+          <a:lstStyle/>
+          <a:p>
+            <a:r>
+              <a:rPr lang="pt-PT" dirty="0" smtClean="0"/>
+              <a:t>O foco desta</a:t>
+            </a:r>
+            <a:r>
+              <a:rPr lang="pt-PT" baseline="0" dirty="0" smtClean="0"/>
+              <a:t> dissertação é, no entanto, os padrões de desenho, especificamente os que fazem parte das arquitecturas</a:t>
+            </a:r>
+            <a:endParaRPr lang="pt-PT" dirty="0"/>
+          </a:p>
+        </p:txBody>
+      </p:sp>
+      <p:sp>
+        <p:nvSpPr>
+          <p:cNvPr id="4" name="Slide Number Placeholder 3"/>
+          <p:cNvSpPr>
+            <a:spLocks noGrp="1"/>
+          </p:cNvSpPr>
+          <p:nvPr>
+            <p:ph type="sldNum" sz="quarter" idx="10"/>
+          </p:nvPr>
+        </p:nvSpPr>
+        <p:spPr/>
+        <p:txBody>
+          <a:bodyPr/>
+          <a:lstStyle/>
+          <a:p>
+            <a:fld id="{EE5867BE-386C-4D16-9B1D-8635FC172DF2}" type="slidenum">
+              <a:rPr lang="pt-PT" smtClean="0"/>
+              <a:pPr/>
+              <a:t>12</a:t>
+            </a:fld>
+            <a:endParaRPr lang="pt-PT"/>
+          </a:p>
+        </p:txBody>
+      </p:sp>
+    </p:spTree>
+  </p:cSld>
+  <p:clrMapOvr>
+    <a:masterClrMapping/>
+  </p:clrMapOvr>
+</p:notes>
+</file>
+
+<file path=ppt/notesSlides/notesSlide6.xml><?xml version="1.0" encoding="utf-8"?>
+<p:notes xmlns:a="http://schemas.openxmlformats.org/drawingml/2006/main" xmlns:r="http://schemas.openxmlformats.org/officeDocument/2006/relationships" xmlns:p="http://schemas.openxmlformats.org/presentationml/2006/main">
+  <p:cSld>
+    <p:spTree>
+      <p:nvGrpSpPr>
+        <p:cNvPr id="1" name=""/>
+        <p:cNvGrpSpPr/>
+        <p:nvPr/>
+      </p:nvGrpSpPr>
+      <p:grpSpPr>
+        <a:xfrm>
+          <a:off x="0" y="0"/>
+          <a:ext cx="0" cy="0"/>
+          <a:chOff x="0" y="0"/>
+          <a:chExt cx="0" cy="0"/>
+        </a:xfrm>
+      </p:grpSpPr>
+      <p:sp>
+        <p:nvSpPr>
+          <p:cNvPr id="2" name="Slide Image Placeholder 1"/>
+          <p:cNvSpPr>
+            <a:spLocks noGrp="1" noRot="1" noChangeAspect="1"/>
+          </p:cNvSpPr>
+          <p:nvPr>
+            <p:ph type="sldImg"/>
+          </p:nvPr>
+        </p:nvSpPr>
+        <p:spPr/>
+      </p:sp>
+      <p:sp>
+        <p:nvSpPr>
+          <p:cNvPr id="3" name="Notes Placeholder 2"/>
+          <p:cNvSpPr>
+            <a:spLocks noGrp="1"/>
+          </p:cNvSpPr>
+          <p:nvPr>
+            <p:ph type="body" idx="1"/>
+          </p:nvPr>
+        </p:nvSpPr>
+        <p:spPr/>
+        <p:txBody>
+          <a:bodyPr>
+            <a:normAutofit/>
+          </a:bodyPr>
+          <a:lstStyle/>
+          <a:p>
+            <a:r>
+              <a:rPr lang="pt-PT" dirty="0" smtClean="0"/>
+              <a:t>AOM,</a:t>
+            </a:r>
+            <a:r>
+              <a:rPr lang="pt-PT" baseline="0" dirty="0" smtClean="0"/>
+              <a:t> ou adaptive object models. Uma arquitectura; aliás, meta-arquitectura AOM é uma composição de padrões de desenho (tal como aqui exemplificado) especialmente concebidos para uma evolução constante dos sistemas a que servem de infra-estrutura</a:t>
+            </a:r>
+            <a:endParaRPr lang="pt-PT" dirty="0"/>
+          </a:p>
+        </p:txBody>
+      </p:sp>
+      <p:sp>
+        <p:nvSpPr>
+          <p:cNvPr id="4" name="Slide Number Placeholder 3"/>
+          <p:cNvSpPr>
+            <a:spLocks noGrp="1"/>
+          </p:cNvSpPr>
+          <p:nvPr>
+            <p:ph type="sldNum" sz="quarter" idx="10"/>
+          </p:nvPr>
+        </p:nvSpPr>
+        <p:spPr/>
+        <p:txBody>
+          <a:bodyPr/>
+          <a:lstStyle/>
+          <a:p>
+            <a:fld id="{EE5867BE-386C-4D16-9B1D-8635FC172DF2}" type="slidenum">
+              <a:rPr lang="pt-PT" smtClean="0"/>
+              <a:pPr/>
+              <a:t>13</a:t>
+            </a:fld>
+            <a:endParaRPr lang="pt-PT"/>
+          </a:p>
+        </p:txBody>
+      </p:sp>
+    </p:spTree>
+  </p:cSld>
+  <p:clrMapOvr>
+    <a:masterClrMapping/>
+  </p:clrMapOvr>
+</p:notes>
+</file>
+
+<file path=ppt/notesSlides/notesSlide7.xml><?xml version="1.0" encoding="utf-8"?>
+<p:notes xmlns:a="http://schemas.openxmlformats.org/drawingml/2006/main" xmlns:r="http://schemas.openxmlformats.org/officeDocument/2006/relationships" xmlns:p="http://schemas.openxmlformats.org/presentationml/2006/main">
+  <p:cSld>
+    <p:spTree>
+      <p:nvGrpSpPr>
+        <p:cNvPr id="1" name=""/>
+        <p:cNvGrpSpPr/>
+        <p:nvPr/>
+      </p:nvGrpSpPr>
+      <p:grpSpPr>
+        <a:xfrm>
+          <a:off x="0" y="0"/>
+          <a:ext cx="0" cy="0"/>
+          <a:chOff x="0" y="0"/>
+          <a:chExt cx="0" cy="0"/>
+        </a:xfrm>
+      </p:grpSpPr>
+      <p:sp>
+        <p:nvSpPr>
+          <p:cNvPr id="2" name="Slide Image Placeholder 1"/>
+          <p:cNvSpPr>
+            <a:spLocks noGrp="1" noRot="1" noChangeAspect="1"/>
+          </p:cNvSpPr>
+          <p:nvPr>
+            <p:ph type="sldImg"/>
+          </p:nvPr>
+        </p:nvSpPr>
+        <p:spPr/>
+      </p:sp>
+      <p:sp>
+        <p:nvSpPr>
+          <p:cNvPr id="3" name="Notes Placeholder 2"/>
+          <p:cNvSpPr>
+            <a:spLocks noGrp="1"/>
+          </p:cNvSpPr>
+          <p:nvPr>
+            <p:ph type="body" idx="1"/>
+          </p:nvPr>
+        </p:nvSpPr>
+        <p:spPr/>
+        <p:txBody>
+          <a:bodyPr>
+            <a:normAutofit/>
+          </a:bodyPr>
+          <a:lstStyle/>
+          <a:p>
+            <a:r>
+              <a:rPr lang="pt-PT" dirty="0" smtClean="0"/>
+              <a:t>Este tipo de arquitecturas são normalmente desenhadas em 3 níveis,</a:t>
+            </a:r>
+            <a:r>
+              <a:rPr lang="pt-PT" baseline="0" dirty="0" smtClean="0"/>
+              <a:t> MO, M1 e M2 com um 4º nível opcional M3, caso a arquitectura esteja de acordo com o Meta Object Facility definida pelo Object Management Group. Esta especificação tem como objectivo definir uma arquitectura de metamodelação para modelos MOF e para o próprio UML, por exemplo.</a:t>
+            </a:r>
+          </a:p>
+          <a:p>
+            <a:endParaRPr lang="pt-PT" baseline="0" dirty="0" smtClean="0"/>
+          </a:p>
+          <a:p>
+            <a:r>
+              <a:rPr lang="pt-PT" baseline="0" dirty="0" smtClean="0"/>
+              <a:t>Explicar as associações em runtime, começando por M2</a:t>
+            </a:r>
+          </a:p>
+          <a:p>
+            <a:endParaRPr lang="pt-PT" baseline="0" dirty="0" smtClean="0"/>
+          </a:p>
+          <a:p>
+            <a:r>
+              <a:rPr lang="pt-PT" baseline="0" dirty="0" smtClean="0"/>
+              <a:t>M2 – infraestrutura</a:t>
+            </a:r>
+          </a:p>
+          <a:p>
+            <a:r>
+              <a:rPr lang="pt-PT" baseline="0" dirty="0" smtClean="0"/>
+              <a:t>M1 – definição do sistema</a:t>
+            </a:r>
+          </a:p>
+          <a:p>
+            <a:r>
+              <a:rPr lang="pt-PT" baseline="0" dirty="0" smtClean="0"/>
+              <a:t>M0 – dados, camada operacional</a:t>
+            </a:r>
+          </a:p>
+          <a:p>
+            <a:endParaRPr lang="pt-PT" baseline="0" dirty="0" smtClean="0"/>
+          </a:p>
+          <a:p>
+            <a:r>
+              <a:rPr lang="pt-PT" baseline="0" dirty="0" smtClean="0"/>
+              <a:t>Estabelecer uma analogia com ferramentas de programação visual / descrição de sistemas</a:t>
+            </a:r>
+            <a:endParaRPr lang="pt-PT" dirty="0"/>
+          </a:p>
+        </p:txBody>
+      </p:sp>
+      <p:sp>
+        <p:nvSpPr>
+          <p:cNvPr id="4" name="Slide Number Placeholder 3"/>
+          <p:cNvSpPr>
+            <a:spLocks noGrp="1"/>
+          </p:cNvSpPr>
+          <p:nvPr>
+            <p:ph type="sldNum" sz="quarter" idx="10"/>
+          </p:nvPr>
+        </p:nvSpPr>
+        <p:spPr/>
+        <p:txBody>
+          <a:bodyPr/>
+          <a:lstStyle/>
+          <a:p>
+            <a:fld id="{EE5867BE-386C-4D16-9B1D-8635FC172DF2}" type="slidenum">
+              <a:rPr lang="pt-PT" smtClean="0"/>
+              <a:pPr/>
+              <a:t>14</a:t>
+            </a:fld>
+            <a:endParaRPr lang="pt-PT"/>
+          </a:p>
+        </p:txBody>
+      </p:sp>
+    </p:spTree>
+  </p:cSld>
+  <p:clrMapOvr>
+    <a:masterClrMapping/>
+  </p:clrMapOvr>
+</p:notes>
+</file>
+
+<file path=ppt/notesSlides/notesSlide8.xml><?xml version="1.0" encoding="utf-8"?>
+<p:notes xmlns:a="http://schemas.openxmlformats.org/drawingml/2006/main" xmlns:r="http://schemas.openxmlformats.org/officeDocument/2006/relationships" xmlns:p="http://schemas.openxmlformats.org/presentationml/2006/main">
+  <p:cSld>
+    <p:spTree>
+      <p:nvGrpSpPr>
+        <p:cNvPr id="1" name=""/>
+        <p:cNvGrpSpPr/>
+        <p:nvPr/>
+      </p:nvGrpSpPr>
+      <p:grpSpPr>
+        <a:xfrm>
+          <a:off x="0" y="0"/>
+          <a:ext cx="0" cy="0"/>
+          <a:chOff x="0" y="0"/>
+          <a:chExt cx="0" cy="0"/>
+        </a:xfrm>
+      </p:grpSpPr>
+      <p:sp>
+        <p:nvSpPr>
+          <p:cNvPr id="2" name="Slide Image Placeholder 1"/>
+          <p:cNvSpPr>
+            <a:spLocks noGrp="1" noRot="1" noChangeAspect="1"/>
+          </p:cNvSpPr>
+          <p:nvPr>
+            <p:ph type="sldImg"/>
+          </p:nvPr>
+        </p:nvSpPr>
+        <p:spPr/>
+      </p:sp>
+      <p:sp>
+        <p:nvSpPr>
+          <p:cNvPr id="3" name="Notes Placeholder 2"/>
+          <p:cNvSpPr>
+            <a:spLocks noGrp="1"/>
+          </p:cNvSpPr>
+          <p:nvPr>
+            <p:ph type="body" idx="1"/>
+          </p:nvPr>
+        </p:nvSpPr>
+        <p:spPr/>
+        <p:txBody>
+          <a:bodyPr>
+            <a:normAutofit/>
+          </a:bodyPr>
+          <a:lstStyle/>
+          <a:p>
+            <a:r>
+              <a:rPr lang="pt-PT" dirty="0" smtClean="0"/>
+              <a:t>Tendo estes conhecimentos e técnicas, vejamos o que é que foi então feito para atacar o problema e tornar o escolinhas o mais ágil e adaptavel à constante</a:t>
+            </a:r>
+            <a:r>
+              <a:rPr lang="pt-PT" baseline="0" dirty="0" smtClean="0"/>
+              <a:t> evolução que sofre.</a:t>
+            </a:r>
+            <a:endParaRPr lang="pt-PT" dirty="0"/>
+          </a:p>
+        </p:txBody>
+      </p:sp>
+      <p:sp>
+        <p:nvSpPr>
+          <p:cNvPr id="4" name="Slide Number Placeholder 3"/>
+          <p:cNvSpPr>
+            <a:spLocks noGrp="1"/>
+          </p:cNvSpPr>
+          <p:nvPr>
+            <p:ph type="sldNum" sz="quarter" idx="10"/>
+          </p:nvPr>
+        </p:nvSpPr>
+        <p:spPr/>
+        <p:txBody>
+          <a:bodyPr/>
+          <a:lstStyle/>
+          <a:p>
+            <a:fld id="{EE5867BE-386C-4D16-9B1D-8635FC172DF2}" type="slidenum">
+              <a:rPr lang="pt-PT" smtClean="0"/>
+              <a:pPr/>
+              <a:t>15</a:t>
+            </a:fld>
+            <a:endParaRPr lang="pt-PT"/>
+          </a:p>
+        </p:txBody>
+      </p:sp>
+    </p:spTree>
+  </p:cSld>
+  <p:clrMapOvr>
+    <a:masterClrMapping/>
+  </p:clrMapOvr>
+</p:notes>
+</file>
+
+<file path=ppt/notesSlides/notesSlide9.xml><?xml version="1.0" encoding="utf-8"?>
+<p:notes xmlns:a="http://schemas.openxmlformats.org/drawingml/2006/main" xmlns:r="http://schemas.openxmlformats.org/officeDocument/2006/relationships" xmlns:p="http://schemas.openxmlformats.org/presentationml/2006/main">
+  <p:cSld>
+    <p:spTree>
+      <p:nvGrpSpPr>
+        <p:cNvPr id="1" name=""/>
+        <p:cNvGrpSpPr/>
+        <p:nvPr/>
+      </p:nvGrpSpPr>
+      <p:grpSpPr>
+        <a:xfrm>
+          <a:off x="0" y="0"/>
+          <a:ext cx="0" cy="0"/>
+          <a:chOff x="0" y="0"/>
+          <a:chExt cx="0" cy="0"/>
+        </a:xfrm>
+      </p:grpSpPr>
+      <p:sp>
+        <p:nvSpPr>
+          <p:cNvPr id="2" name="Slide Image Placeholder 1"/>
+          <p:cNvSpPr>
+            <a:spLocks noGrp="1" noRot="1" noChangeAspect="1"/>
+          </p:cNvSpPr>
+          <p:nvPr>
+            <p:ph type="sldImg"/>
+          </p:nvPr>
+        </p:nvSpPr>
+        <p:spPr/>
+      </p:sp>
+      <p:sp>
+        <p:nvSpPr>
+          <p:cNvPr id="3" name="Notes Placeholder 2"/>
+          <p:cNvSpPr>
+            <a:spLocks noGrp="1"/>
+          </p:cNvSpPr>
+          <p:nvPr>
+            <p:ph type="body" idx="1"/>
+          </p:nvPr>
+        </p:nvSpPr>
+        <p:spPr/>
+        <p:txBody>
+          <a:bodyPr>
+            <a:normAutofit/>
+          </a:bodyPr>
+          <a:lstStyle/>
+          <a:p>
+            <a:r>
+              <a:rPr lang="pt-PT" dirty="0" smtClean="0"/>
+              <a:t>Explicar o processo de estudo,</a:t>
+            </a:r>
+            <a:r>
+              <a:rPr lang="pt-PT" baseline="0" dirty="0" smtClean="0"/>
+              <a:t> como é que a plataforma foi estudada, etc</a:t>
+            </a:r>
+            <a:endParaRPr lang="pt-PT" dirty="0" smtClean="0"/>
+          </a:p>
+          <a:p>
+            <a:endParaRPr lang="pt-PT" dirty="0" smtClean="0"/>
+          </a:p>
+          <a:p>
+            <a:r>
+              <a:rPr lang="pt-PT" dirty="0" smtClean="0"/>
+              <a:t>Foram então escolhidas</a:t>
+            </a:r>
+            <a:r>
+              <a:rPr lang="pt-PT" baseline="0" dirty="0" smtClean="0"/>
+              <a:t> 3 áreas:</a:t>
+            </a:r>
+          </a:p>
+          <a:p>
+            <a:endParaRPr lang="pt-PT" baseline="0" dirty="0" smtClean="0"/>
+          </a:p>
+          <a:p>
+            <a:r>
+              <a:rPr lang="pt-PT" baseline="0" dirty="0" smtClean="0"/>
+              <a:t>  * papeis de utilizadores</a:t>
+            </a:r>
+          </a:p>
+          <a:p>
+            <a:r>
+              <a:rPr lang="pt-PT" baseline="0" dirty="0" smtClean="0"/>
+              <a:t>  * rede social</a:t>
+            </a:r>
+          </a:p>
+          <a:p>
+            <a:r>
+              <a:rPr lang="pt-PT" baseline="0" dirty="0" smtClean="0"/>
+              <a:t>  * editor de documentos</a:t>
+            </a:r>
+            <a:endParaRPr lang="pt-PT" dirty="0"/>
+          </a:p>
+        </p:txBody>
+      </p:sp>
+      <p:sp>
+        <p:nvSpPr>
+          <p:cNvPr id="4" name="Slide Number Placeholder 3"/>
+          <p:cNvSpPr>
+            <a:spLocks noGrp="1"/>
+          </p:cNvSpPr>
+          <p:nvPr>
+            <p:ph type="sldNum" sz="quarter" idx="10"/>
+          </p:nvPr>
+        </p:nvSpPr>
+        <p:spPr/>
+        <p:txBody>
+          <a:bodyPr/>
+          <a:lstStyle/>
+          <a:p>
+            <a:fld id="{EE5867BE-386C-4D16-9B1D-8635FC172DF2}" type="slidenum">
+              <a:rPr lang="pt-PT" smtClean="0"/>
+              <a:pPr/>
+              <a:t>16</a:t>
             </a:fld>
             <a:endParaRPr lang="pt-PT"/>
           </a:p>
@@ -1687,7 +3199,7 @@
             <a:fld id="{B21DA5EC-CDBD-4BE5-AFEC-D05D842E9DCA}" type="datetime1">
               <a:rPr lang="pt-PT" smtClean="0"/>
               <a:pPr/>
-              <a:t>09-02-2011</a:t>
+              <a:t>10-02-2011</a:t>
             </a:fld>
             <a:endParaRPr lang="pt-PT"/>
           </a:p>
@@ -1862,7 +3374,7 @@
             <a:fld id="{265ABC6D-62B8-444F-8CBB-55DA24843F08}" type="datetime1">
               <a:rPr lang="pt-PT" smtClean="0"/>
               <a:pPr/>
-              <a:t>09-02-2011</a:t>
+              <a:t>10-02-2011</a:t>
             </a:fld>
             <a:endParaRPr lang="pt-PT"/>
           </a:p>
@@ -2047,7 +3559,7 @@
             <a:fld id="{642BB447-BC74-408D-87E2-151F2C4E6D5C}" type="datetime1">
               <a:rPr lang="pt-PT" smtClean="0"/>
               <a:pPr/>
-              <a:t>09-02-2011</a:t>
+              <a:t>10-02-2011</a:t>
             </a:fld>
             <a:endParaRPr lang="pt-PT"/>
           </a:p>
@@ -2275,7 +3787,7 @@
             <a:fld id="{1AE16238-79D5-4CE1-9F7C-9EB0DB09B684}" type="datetime1">
               <a:rPr lang="pt-PT" smtClean="0"/>
               <a:pPr/>
-              <a:t>09-02-2011</a:t>
+              <a:t>10-02-2011</a:t>
             </a:fld>
             <a:endParaRPr lang="pt-PT"/>
           </a:p>
@@ -2533,7 +4045,7 @@
             <a:fld id="{29EC9118-B484-4893-9D08-9848F3CE7FF2}" type="datetime1">
               <a:rPr lang="pt-PT" smtClean="0"/>
               <a:pPr/>
-              <a:t>09-02-2011</a:t>
+              <a:t>10-02-2011</a:t>
             </a:fld>
             <a:endParaRPr lang="pt-PT"/>
           </a:p>
@@ -2826,7 +4338,7 @@
             <a:fld id="{93295FF2-CB18-49BE-8735-588EA2A78858}" type="datetime1">
               <a:rPr lang="pt-PT" smtClean="0"/>
               <a:pPr/>
-              <a:t>09-02-2011</a:t>
+              <a:t>10-02-2011</a:t>
             </a:fld>
             <a:endParaRPr lang="pt-PT"/>
           </a:p>
@@ -3253,7 +4765,7 @@
             <a:fld id="{50896DA6-8084-488D-9E6B-45E32377C613}" type="datetime1">
               <a:rPr lang="pt-PT" smtClean="0"/>
               <a:pPr/>
-              <a:t>09-02-2011</a:t>
+              <a:t>10-02-2011</a:t>
             </a:fld>
             <a:endParaRPr lang="pt-PT"/>
           </a:p>
@@ -3376,7 +4888,7 @@
             <a:fld id="{40926C83-C8D3-48F0-B08F-F8259B57109C}" type="datetime1">
               <a:rPr lang="pt-PT" smtClean="0"/>
               <a:pPr/>
-              <a:t>09-02-2011</a:t>
+              <a:t>10-02-2011</a:t>
             </a:fld>
             <a:endParaRPr lang="pt-PT"/>
           </a:p>
@@ -3476,7 +4988,7 @@
             <a:fld id="{379D2EB6-009D-45E0-886C-0BF1B142AD62}" type="datetime1">
               <a:rPr lang="pt-PT" smtClean="0"/>
               <a:pPr/>
-              <a:t>09-02-2011</a:t>
+              <a:t>10-02-2011</a:t>
             </a:fld>
             <a:endParaRPr lang="pt-PT"/>
           </a:p>
@@ -3758,7 +5270,7 @@
             <a:fld id="{D9720365-511F-43DE-9BF0-D286DA1D7131}" type="datetime1">
               <a:rPr lang="pt-PT" smtClean="0"/>
               <a:pPr/>
-              <a:t>09-02-2011</a:t>
+              <a:t>10-02-2011</a:t>
             </a:fld>
             <a:endParaRPr lang="pt-PT"/>
           </a:p>
@@ -4016,7 +5528,7 @@
             <a:fld id="{E9DCFC39-BBD6-4CEF-9802-34CE70E119D6}" type="datetime1">
               <a:rPr lang="pt-PT" smtClean="0"/>
               <a:pPr/>
-              <a:t>09-02-2011</a:t>
+              <a:t>10-02-2011</a:t>
             </a:fld>
             <a:endParaRPr lang="pt-PT"/>
           </a:p>
@@ -4577,7 +6089,7 @@
           <p:nvPr/>
         </p:nvPicPr>
         <p:blipFill>
-          <a:blip r:embed="rId2" cstate="print"/>
+          <a:blip r:embed="rId3" cstate="print"/>
           <a:srcRect/>
           <a:stretch>
             <a:fillRect/>
@@ -4603,7 +6115,7 @@
           <p:nvPr/>
         </p:nvPicPr>
         <p:blipFill>
-          <a:blip r:embed="rId3" cstate="print"/>
+          <a:blip r:embed="rId4" cstate="print"/>
           <a:srcRect/>
           <a:stretch>
             <a:fillRect/>
@@ -4629,7 +6141,7 @@
           <p:nvPr/>
         </p:nvPicPr>
         <p:blipFill>
-          <a:blip r:embed="rId4" cstate="print"/>
+          <a:blip r:embed="rId5" cstate="print"/>
           <a:srcRect r="6250" b="9320"/>
           <a:stretch>
             <a:fillRect/>
@@ -5624,7 +7136,7 @@
           <p:nvPr/>
         </p:nvPicPr>
         <p:blipFill>
-          <a:blip r:embed="rId2" cstate="print"/>
+          <a:blip r:embed="rId3" cstate="print"/>
           <a:srcRect/>
           <a:stretch>
             <a:fillRect/>
@@ -5689,7 +7201,7 @@
           <p:nvPr/>
         </p:nvPicPr>
         <p:blipFill>
-          <a:blip r:embed="rId2" cstate="print"/>
+          <a:blip r:embed="rId3" cstate="print"/>
           <a:srcRect/>
           <a:stretch>
             <a:fillRect/>
@@ -5817,7 +7329,7 @@
           <p:nvPr/>
         </p:nvPicPr>
         <p:blipFill>
-          <a:blip r:embed="rId2" cstate="print"/>
+          <a:blip r:embed="rId3" cstate="print"/>
           <a:srcRect r="11068"/>
           <a:stretch>
             <a:fillRect/>
@@ -6728,7 +8240,7 @@
           <p:nvPr/>
         </p:nvPicPr>
         <p:blipFill>
-          <a:blip r:embed="rId2" cstate="print"/>
+          <a:blip r:embed="rId3" cstate="print"/>
           <a:srcRect l="10677"/>
           <a:stretch>
             <a:fillRect/>
@@ -6862,7 +8374,7 @@
 </file>
 
 <file path=ppt/slides/slide20.xml><?xml version="1.0" encoding="utf-8"?>
-<p:sld xmlns:a="http://schemas.openxmlformats.org/drawingml/2006/main" xmlns:r="http://schemas.openxmlformats.org/officeDocument/2006/relationships" xmlns:p="http://schemas.openxmlformats.org/presentationml/2006/main" show="0">
+<p:sld xmlns:a="http://schemas.openxmlformats.org/drawingml/2006/main" xmlns:r="http://schemas.openxmlformats.org/officeDocument/2006/relationships" xmlns:p="http://schemas.openxmlformats.org/presentationml/2006/main">
   <p:cSld>
     <p:spTree>
       <p:nvGrpSpPr>
@@ -7710,7 +9222,7 @@
           <p:nvPr/>
         </p:nvPicPr>
         <p:blipFill>
-          <a:blip r:embed="rId2" cstate="print"/>
+          <a:blip r:embed="rId3" cstate="print"/>
           <a:srcRect/>
           <a:stretch>
             <a:fillRect/>
@@ -10088,7 +11600,7 @@
           <p:nvPr/>
         </p:nvPicPr>
         <p:blipFill>
-          <a:blip r:embed="rId2" cstate="print"/>
+          <a:blip r:embed="rId3" cstate="print"/>
           <a:srcRect r="11066"/>
           <a:stretch>
             <a:fillRect/>
@@ -10741,7 +12253,7 @@
                 </a:solidFill>
                 <a:latin typeface="MetaSerif-Book" pitchFamily="34" charset="0"/>
               </a:rPr>
-              <a:t>Rails MVC architecture and conventions can be an obstacle to highly-variable systems</a:t>
+              <a:t>Rails MVC architecture and conventions may be an obstacle to highly-variable systems</a:t>
             </a:r>
             <a:endParaRPr kumimoji="0" lang="pt-PT" sz="3600" b="0" i="0" u="none" strike="noStrike" kern="1200" cap="none" spc="0" normalizeH="0" baseline="0" noProof="0" dirty="0" smtClean="0">
               <a:ln>
@@ -11114,7 +12626,7 @@
           <p:nvPr/>
         </p:nvPicPr>
         <p:blipFill>
-          <a:blip r:embed="rId2" cstate="print"/>
+          <a:blip r:embed="rId3" cstate="print"/>
           <a:srcRect r="2083"/>
           <a:stretch>
             <a:fillRect/>
@@ -12019,7 +13531,7 @@
           <p:nvPr/>
         </p:nvPicPr>
         <p:blipFill>
-          <a:blip r:embed="rId2" cstate="print">
+          <a:blip r:embed="rId3" cstate="print">
             <a:duotone>
               <a:schemeClr val="bg2">
                 <a:shade val="45000"/>
@@ -12053,7 +13565,7 @@
           <p:nvPr/>
         </p:nvPicPr>
         <p:blipFill>
-          <a:blip r:embed="rId3" cstate="print"/>
+          <a:blip r:embed="rId4" cstate="print"/>
           <a:srcRect l="10756"/>
           <a:stretch>
             <a:fillRect/>

</xml_diff>

<commit_message>
Added some aditional notes
</commit_message>
<xml_diff>
--- a/presentations/jgradim-presentation.pptx
+++ b/presentations/jgradim-presentation.pptx
@@ -5,7 +5,7 @@
     <p:sldMasterId id="2147483648" r:id="rId1"/>
   </p:sldMasterIdLst>
   <p:notesMasterIdLst>
-    <p:notesMasterId r:id="rId48"/>
+    <p:notesMasterId r:id="rId47"/>
   </p:notesMasterIdLst>
   <p:sldIdLst>
     <p:sldId id="256" r:id="rId2"/>
@@ -27,33 +27,32 @@
     <p:sldId id="280" r:id="rId18"/>
     <p:sldId id="282" r:id="rId19"/>
     <p:sldId id="302" r:id="rId20"/>
-    <p:sldId id="304" r:id="rId21"/>
-    <p:sldId id="287" r:id="rId22"/>
-    <p:sldId id="290" r:id="rId23"/>
-    <p:sldId id="283" r:id="rId24"/>
-    <p:sldId id="285" r:id="rId25"/>
-    <p:sldId id="300" r:id="rId26"/>
-    <p:sldId id="288" r:id="rId27"/>
-    <p:sldId id="292" r:id="rId28"/>
-    <p:sldId id="293" r:id="rId29"/>
-    <p:sldId id="284" r:id="rId30"/>
-    <p:sldId id="289" r:id="rId31"/>
-    <p:sldId id="301" r:id="rId32"/>
-    <p:sldId id="303" r:id="rId33"/>
-    <p:sldId id="286" r:id="rId34"/>
-    <p:sldId id="291" r:id="rId35"/>
-    <p:sldId id="295" r:id="rId36"/>
-    <p:sldId id="296" r:id="rId37"/>
-    <p:sldId id="294" r:id="rId38"/>
-    <p:sldId id="259" r:id="rId39"/>
-    <p:sldId id="279" r:id="rId40"/>
-    <p:sldId id="269" r:id="rId41"/>
-    <p:sldId id="264" r:id="rId42"/>
-    <p:sldId id="270" r:id="rId43"/>
-    <p:sldId id="266" r:id="rId44"/>
-    <p:sldId id="267" r:id="rId45"/>
-    <p:sldId id="268" r:id="rId46"/>
-    <p:sldId id="297" r:id="rId47"/>
+    <p:sldId id="287" r:id="rId21"/>
+    <p:sldId id="290" r:id="rId22"/>
+    <p:sldId id="283" r:id="rId23"/>
+    <p:sldId id="285" r:id="rId24"/>
+    <p:sldId id="300" r:id="rId25"/>
+    <p:sldId id="288" r:id="rId26"/>
+    <p:sldId id="292" r:id="rId27"/>
+    <p:sldId id="293" r:id="rId28"/>
+    <p:sldId id="284" r:id="rId29"/>
+    <p:sldId id="289" r:id="rId30"/>
+    <p:sldId id="301" r:id="rId31"/>
+    <p:sldId id="303" r:id="rId32"/>
+    <p:sldId id="286" r:id="rId33"/>
+    <p:sldId id="291" r:id="rId34"/>
+    <p:sldId id="295" r:id="rId35"/>
+    <p:sldId id="296" r:id="rId36"/>
+    <p:sldId id="294" r:id="rId37"/>
+    <p:sldId id="259" r:id="rId38"/>
+    <p:sldId id="279" r:id="rId39"/>
+    <p:sldId id="269" r:id="rId40"/>
+    <p:sldId id="264" r:id="rId41"/>
+    <p:sldId id="270" r:id="rId42"/>
+    <p:sldId id="266" r:id="rId43"/>
+    <p:sldId id="267" r:id="rId44"/>
+    <p:sldId id="268" r:id="rId45"/>
+    <p:sldId id="297" r:id="rId46"/>
   </p:sldIdLst>
   <p:sldSz cx="9144000" cy="6858000" type="screen4x3"/>
   <p:notesSz cx="6858000" cy="9144000"/>
@@ -565,7 +564,15 @@
           <a:p>
             <a:r>
               <a:rPr lang="pt-PT" baseline="0" dirty="0" smtClean="0"/>
-              <a:t>Passaria de imediato o trabalho de dissertação que realizei, intitulado “Improving Variability of Applications using Adaptive Object-Models”</a:t>
+              <a:t>Passaria de imediato </a:t>
+            </a:r>
+            <a:r>
+              <a:rPr lang="pt-PT" baseline="0" dirty="0" smtClean="0"/>
+              <a:t>a apresentar o </a:t>
+            </a:r>
+            <a:r>
+              <a:rPr lang="pt-PT" baseline="0" dirty="0" smtClean="0"/>
+              <a:t>trabalho de dissertação que realizei, intitulado “Improving Variability of Applications using Adaptive Object-Models”</a:t>
             </a:r>
           </a:p>
           <a:p>
@@ -749,14 +756,10 @@
           <a:lstStyle/>
           <a:p>
             <a:r>
-              <a:rPr lang="pt-PT" smtClean="0"/>
-              <a:t>Role-Object</a:t>
-            </a:r>
-            <a:r>
-              <a:rPr lang="pt-PT" baseline="0" smtClean="0"/>
-              <a:t> Pattern</a:t>
-            </a:r>
-            <a:endParaRPr lang="pt-PT"/>
+              <a:rPr lang="pt-PT" dirty="0" smtClean="0"/>
+              <a:t>Ligações entre utilizadores, turmas, e escolas</a:t>
+            </a:r>
+            <a:endParaRPr lang="pt-PT" dirty="0"/>
           </a:p>
         </p:txBody>
       </p:sp>
@@ -778,7 +781,7 @@
             <a:fld id="{EE5867BE-386C-4D16-9B1D-8635FC172DF2}" type="slidenum">
               <a:rPr lang="pt-PT" smtClean="0"/>
               <a:pPr/>
-              <a:t>20</a:t>
+              <a:t>23</a:t>
             </a:fld>
             <a:endParaRPr lang="pt-PT"/>
           </a:p>
@@ -840,7 +843,11 @@
           <a:p>
             <a:r>
               <a:rPr lang="pt-PT" dirty="0" smtClean="0"/>
-              <a:t>Ligações entre utilizadores, turmas, e escolas</a:t>
+              <a:t>1 – without any effort</a:t>
+            </a:r>
+            <a:r>
+              <a:rPr lang="pt-PT" baseline="0" dirty="0" smtClean="0"/>
+              <a:t> and without polluting the codebase with hardcoded exceptions</a:t>
             </a:r>
             <a:endParaRPr lang="pt-PT" dirty="0"/>
           </a:p>
@@ -864,7 +871,7 @@
             <a:fld id="{EE5867BE-386C-4D16-9B1D-8635FC172DF2}" type="slidenum">
               <a:rPr lang="pt-PT" smtClean="0"/>
               <a:pPr/>
-              <a:t>24</a:t>
+              <a:t>26</a:t>
             </a:fld>
             <a:endParaRPr lang="pt-PT"/>
           </a:p>
@@ -926,11 +933,11 @@
           <a:p>
             <a:r>
               <a:rPr lang="pt-PT" dirty="0" smtClean="0"/>
-              <a:t>1 – without any effort</a:t>
+              <a:t>Edge case: 715</a:t>
             </a:r>
             <a:r>
               <a:rPr lang="pt-PT" baseline="0" dirty="0" smtClean="0"/>
-              <a:t> and without polluting the codebase with hardcoded exceptions</a:t>
+              <a:t> contacts = 5724 queries</a:t>
             </a:r>
             <a:endParaRPr lang="pt-PT" dirty="0"/>
           </a:p>
@@ -1016,7 +1023,7 @@
           <a:p>
             <a:r>
               <a:rPr lang="pt-PT" dirty="0" smtClean="0"/>
-              <a:t>Property</a:t>
+              <a:t>Uma das funcionalidades mais usadas da plataforma</a:t>
             </a:r>
             <a:endParaRPr lang="pt-PT" dirty="0"/>
           </a:p>
@@ -1040,7 +1047,7 @@
             <a:fld id="{EE5867BE-386C-4D16-9B1D-8635FC172DF2}" type="slidenum">
               <a:rPr lang="pt-PT" smtClean="0"/>
               <a:pPr/>
-              <a:t>31</a:t>
+              <a:t>28</a:t>
             </a:fld>
             <a:endParaRPr lang="pt-PT"/>
           </a:p>
@@ -1100,9 +1107,61 @@
           </a:bodyPr>
           <a:lstStyle/>
           <a:p>
+            <a:pPr marL="0" marR="0" indent="0" algn="l" defTabSz="914400" rtl="0" eaLnBrk="1" fontAlgn="auto" latinLnBrk="0" hangingPunct="1">
+              <a:lnSpc>
+                <a:spcPct val="100000"/>
+              </a:lnSpc>
+              <a:spcBef>
+                <a:spcPts val="0"/>
+              </a:spcBef>
+              <a:spcAft>
+                <a:spcPts val="0"/>
+              </a:spcAft>
+              <a:buClrTx/>
+              <a:buSzTx/>
+              <a:buFontTx/>
+              <a:buNone/>
+              <a:tabLst/>
+              <a:defRPr/>
+            </a:pPr>
+            <a:r>
+              <a:rPr lang="pt-PT" smtClean="0"/>
+              <a:t>Na sua forma mais básica, um documento é composto</a:t>
+            </a:r>
+            <a:r>
+              <a:rPr lang="pt-PT" baseline="0" smtClean="0"/>
+              <a:t> por um título e uma série de blocos ordenáveis que podem conter diferentes tipos de conteúdos</a:t>
+            </a:r>
+            <a:endParaRPr lang="pt-PT" smtClean="0"/>
+          </a:p>
+          <a:p>
+            <a:endParaRPr lang="pt-PT" smtClean="0"/>
+          </a:p>
+          <a:p>
             <a:r>
               <a:rPr lang="pt-PT" dirty="0" smtClean="0"/>
-              <a:t>System Memento</a:t>
+              <a:t>Iniciais:</a:t>
+            </a:r>
+          </a:p>
+          <a:p>
+            <a:endParaRPr lang="pt-PT" dirty="0" smtClean="0"/>
+          </a:p>
+          <a:p>
+            <a:r>
+              <a:rPr lang="pt-PT" baseline="0" dirty="0" smtClean="0"/>
+              <a:t>  * Paragraph</a:t>
+            </a:r>
+          </a:p>
+          <a:p>
+            <a:r>
+              <a:rPr lang="pt-PT" baseline="0" dirty="0" smtClean="0"/>
+              <a:t>  * Drawing</a:t>
+            </a:r>
+          </a:p>
+          <a:p>
+            <a:r>
+              <a:rPr lang="pt-PT" baseline="0" dirty="0" smtClean="0"/>
+              <a:t>  * ImageDocument</a:t>
             </a:r>
             <a:endParaRPr lang="pt-PT" dirty="0"/>
           </a:p>
@@ -1126,7 +1185,7 @@
             <a:fld id="{EE5867BE-386C-4D16-9B1D-8635FC172DF2}" type="slidenum">
               <a:rPr lang="pt-PT" smtClean="0"/>
               <a:pPr/>
-              <a:t>32</a:t>
+              <a:t>29</a:t>
             </a:fld>
             <a:endParaRPr lang="pt-PT"/>
           </a:p>
@@ -1186,6 +1245,178 @@
           </a:bodyPr>
           <a:lstStyle/>
           <a:p>
+            <a:r>
+              <a:rPr lang="pt-PT" dirty="0" smtClean="0"/>
+              <a:t>Property</a:t>
+            </a:r>
+            <a:endParaRPr lang="pt-PT" dirty="0"/>
+          </a:p>
+        </p:txBody>
+      </p:sp>
+      <p:sp>
+        <p:nvSpPr>
+          <p:cNvPr id="4" name="Slide Number Placeholder 3"/>
+          <p:cNvSpPr>
+            <a:spLocks noGrp="1"/>
+          </p:cNvSpPr>
+          <p:nvPr>
+            <p:ph type="sldNum" sz="quarter" idx="10"/>
+          </p:nvPr>
+        </p:nvSpPr>
+        <p:spPr/>
+        <p:txBody>
+          <a:bodyPr/>
+          <a:lstStyle/>
+          <a:p>
+            <a:fld id="{EE5867BE-386C-4D16-9B1D-8635FC172DF2}" type="slidenum">
+              <a:rPr lang="pt-PT" smtClean="0"/>
+              <a:pPr/>
+              <a:t>30</a:t>
+            </a:fld>
+            <a:endParaRPr lang="pt-PT"/>
+          </a:p>
+        </p:txBody>
+      </p:sp>
+    </p:spTree>
+  </p:cSld>
+  <p:clrMapOvr>
+    <a:masterClrMapping/>
+  </p:clrMapOvr>
+</p:notes>
+</file>
+
+<file path=ppt/notesSlides/notesSlide17.xml><?xml version="1.0" encoding="utf-8"?>
+<p:notes xmlns:a="http://schemas.openxmlformats.org/drawingml/2006/main" xmlns:r="http://schemas.openxmlformats.org/officeDocument/2006/relationships" xmlns:p="http://schemas.openxmlformats.org/presentationml/2006/main">
+  <p:cSld>
+    <p:spTree>
+      <p:nvGrpSpPr>
+        <p:cNvPr id="1" name=""/>
+        <p:cNvGrpSpPr/>
+        <p:nvPr/>
+      </p:nvGrpSpPr>
+      <p:grpSpPr>
+        <a:xfrm>
+          <a:off x="0" y="0"/>
+          <a:ext cx="0" cy="0"/>
+          <a:chOff x="0" y="0"/>
+          <a:chExt cx="0" cy="0"/>
+        </a:xfrm>
+      </p:grpSpPr>
+      <p:sp>
+        <p:nvSpPr>
+          <p:cNvPr id="2" name="Slide Image Placeholder 1"/>
+          <p:cNvSpPr>
+            <a:spLocks noGrp="1" noRot="1" noChangeAspect="1"/>
+          </p:cNvSpPr>
+          <p:nvPr>
+            <p:ph type="sldImg"/>
+          </p:nvPr>
+        </p:nvSpPr>
+        <p:spPr/>
+      </p:sp>
+      <p:sp>
+        <p:nvSpPr>
+          <p:cNvPr id="3" name="Notes Placeholder 2"/>
+          <p:cNvSpPr>
+            <a:spLocks noGrp="1"/>
+          </p:cNvSpPr>
+          <p:nvPr>
+            <p:ph type="body" idx="1"/>
+          </p:nvPr>
+        </p:nvSpPr>
+        <p:spPr/>
+        <p:txBody>
+          <a:bodyPr>
+            <a:normAutofit/>
+          </a:bodyPr>
+          <a:lstStyle/>
+          <a:p>
+            <a:r>
+              <a:rPr lang="pt-PT" dirty="0" smtClean="0"/>
+              <a:t>System Memento</a:t>
+            </a:r>
+            <a:endParaRPr lang="pt-PT" dirty="0"/>
+          </a:p>
+        </p:txBody>
+      </p:sp>
+      <p:sp>
+        <p:nvSpPr>
+          <p:cNvPr id="4" name="Slide Number Placeholder 3"/>
+          <p:cNvSpPr>
+            <a:spLocks noGrp="1"/>
+          </p:cNvSpPr>
+          <p:nvPr>
+            <p:ph type="sldNum" sz="quarter" idx="10"/>
+          </p:nvPr>
+        </p:nvSpPr>
+        <p:spPr/>
+        <p:txBody>
+          <a:bodyPr/>
+          <a:lstStyle/>
+          <a:p>
+            <a:fld id="{EE5867BE-386C-4D16-9B1D-8635FC172DF2}" type="slidenum">
+              <a:rPr lang="pt-PT" smtClean="0"/>
+              <a:pPr/>
+              <a:t>31</a:t>
+            </a:fld>
+            <a:endParaRPr lang="pt-PT"/>
+          </a:p>
+        </p:txBody>
+      </p:sp>
+    </p:spTree>
+  </p:cSld>
+  <p:clrMapOvr>
+    <a:masterClrMapping/>
+  </p:clrMapOvr>
+</p:notes>
+</file>
+
+<file path=ppt/notesSlides/notesSlide18.xml><?xml version="1.0" encoding="utf-8"?>
+<p:notes xmlns:a="http://schemas.openxmlformats.org/drawingml/2006/main" xmlns:r="http://schemas.openxmlformats.org/officeDocument/2006/relationships" xmlns:p="http://schemas.openxmlformats.org/presentationml/2006/main">
+  <p:cSld>
+    <p:spTree>
+      <p:nvGrpSpPr>
+        <p:cNvPr id="1" name=""/>
+        <p:cNvGrpSpPr/>
+        <p:nvPr/>
+      </p:nvGrpSpPr>
+      <p:grpSpPr>
+        <a:xfrm>
+          <a:off x="0" y="0"/>
+          <a:ext cx="0" cy="0"/>
+          <a:chOff x="0" y="0"/>
+          <a:chExt cx="0" cy="0"/>
+        </a:xfrm>
+      </p:grpSpPr>
+      <p:sp>
+        <p:nvSpPr>
+          <p:cNvPr id="2" name="Slide Image Placeholder 1"/>
+          <p:cNvSpPr>
+            <a:spLocks noGrp="1" noRot="1" noChangeAspect="1"/>
+          </p:cNvSpPr>
+          <p:nvPr>
+            <p:ph type="sldImg"/>
+          </p:nvPr>
+        </p:nvSpPr>
+        <p:spPr/>
+      </p:sp>
+      <p:sp>
+        <p:nvSpPr>
+          <p:cNvPr id="3" name="Notes Placeholder 2"/>
+          <p:cNvSpPr>
+            <a:spLocks noGrp="1"/>
+          </p:cNvSpPr>
+          <p:nvPr>
+            <p:ph type="body" idx="1"/>
+          </p:nvPr>
+        </p:nvSpPr>
+        <p:spPr/>
+        <p:txBody>
+          <a:bodyPr>
+            <a:normAutofit/>
+          </a:bodyPr>
+          <a:lstStyle/>
+          <a:p>
             <a:pPr marL="0" marR="0" indent="0" algn="l" defTabSz="914400" rtl="0" eaLnBrk="1" fontAlgn="auto" latinLnBrk="0" hangingPunct="1">
               <a:lnSpc>
                 <a:spcPct val="100000"/>
@@ -1291,7 +1522,7 @@
             <a:fld id="{EE5867BE-386C-4D16-9B1D-8635FC172DF2}" type="slidenum">
               <a:rPr lang="pt-PT" smtClean="0"/>
               <a:pPr/>
-              <a:t>34</a:t>
+              <a:t>33</a:t>
             </a:fld>
             <a:endParaRPr lang="pt-PT"/>
           </a:p>
@@ -1305,7 +1536,7 @@
 </p:notes>
 </file>
 
-<file path=ppt/notesSlides/notesSlide17.xml><?xml version="1.0" encoding="utf-8"?>
+<file path=ppt/notesSlides/notesSlide19.xml><?xml version="1.0" encoding="utf-8"?>
 <p:notes xmlns:a="http://schemas.openxmlformats.org/drawingml/2006/main" xmlns:r="http://schemas.openxmlformats.org/officeDocument/2006/relationships" xmlns:p="http://schemas.openxmlformats.org/presentationml/2006/main">
   <p:cSld>
     <p:spTree>
@@ -1398,7 +1629,7 @@
             <a:fld id="{EE5867BE-386C-4D16-9B1D-8635FC172DF2}" type="slidenum">
               <a:rPr lang="pt-PT" smtClean="0"/>
               <a:pPr/>
-              <a:t>35</a:t>
+              <a:t>34</a:t>
             </a:fld>
             <a:endParaRPr lang="pt-PT"/>
           </a:p>
@@ -1412,7 +1643,93 @@
 </p:notes>
 </file>
 
-<file path=ppt/notesSlides/notesSlide18.xml><?xml version="1.0" encoding="utf-8"?>
+<file path=ppt/notesSlides/notesSlide2.xml><?xml version="1.0" encoding="utf-8"?>
+<p:notes xmlns:a="http://schemas.openxmlformats.org/drawingml/2006/main" xmlns:r="http://schemas.openxmlformats.org/officeDocument/2006/relationships" xmlns:p="http://schemas.openxmlformats.org/presentationml/2006/main">
+  <p:cSld>
+    <p:spTree>
+      <p:nvGrpSpPr>
+        <p:cNvPr id="1" name=""/>
+        <p:cNvGrpSpPr/>
+        <p:nvPr/>
+      </p:nvGrpSpPr>
+      <p:grpSpPr>
+        <a:xfrm>
+          <a:off x="0" y="0"/>
+          <a:ext cx="0" cy="0"/>
+          <a:chOff x="0" y="0"/>
+          <a:chExt cx="0" cy="0"/>
+        </a:xfrm>
+      </p:grpSpPr>
+      <p:sp>
+        <p:nvSpPr>
+          <p:cNvPr id="2" name="Slide Image Placeholder 1"/>
+          <p:cNvSpPr>
+            <a:spLocks noGrp="1" noRot="1" noChangeAspect="1"/>
+          </p:cNvSpPr>
+          <p:nvPr>
+            <p:ph type="sldImg"/>
+          </p:nvPr>
+        </p:nvSpPr>
+        <p:spPr/>
+      </p:sp>
+      <p:sp>
+        <p:nvSpPr>
+          <p:cNvPr id="3" name="Notes Placeholder 2"/>
+          <p:cNvSpPr>
+            <a:spLocks noGrp="1"/>
+          </p:cNvSpPr>
+          <p:nvPr>
+            <p:ph type="body" idx="1"/>
+          </p:nvPr>
+        </p:nvSpPr>
+        <p:spPr/>
+        <p:txBody>
+          <a:bodyPr>
+            <a:normAutofit/>
+          </a:bodyPr>
+          <a:lstStyle/>
+          <a:p>
+            <a:r>
+              <a:rPr lang="pt-PT" dirty="0" smtClean="0"/>
+              <a:t>Comçando então por expor o problema:</a:t>
+            </a:r>
+            <a:endParaRPr lang="pt-PT" dirty="0"/>
+          </a:p>
+        </p:txBody>
+      </p:sp>
+      <p:sp>
+        <p:nvSpPr>
+          <p:cNvPr id="4" name="Slide Number Placeholder 3"/>
+          <p:cNvSpPr>
+            <a:spLocks noGrp="1"/>
+          </p:cNvSpPr>
+          <p:nvPr>
+            <p:ph type="sldNum" sz="quarter" idx="10"/>
+          </p:nvPr>
+        </p:nvSpPr>
+        <p:spPr/>
+        <p:txBody>
+          <a:bodyPr/>
+          <a:lstStyle/>
+          <a:p>
+            <a:fld id="{EE5867BE-386C-4D16-9B1D-8635FC172DF2}" type="slidenum">
+              <a:rPr lang="pt-PT" smtClean="0"/>
+              <a:pPr/>
+              <a:t>2</a:t>
+            </a:fld>
+            <a:endParaRPr lang="pt-PT"/>
+          </a:p>
+        </p:txBody>
+      </p:sp>
+    </p:spTree>
+  </p:cSld>
+  <p:clrMapOvr>
+    <a:masterClrMapping/>
+  </p:clrMapOvr>
+</p:notes>
+</file>
+
+<file path=ppt/notesSlides/notesSlide20.xml><?xml version="1.0" encoding="utf-8"?>
 <p:notes xmlns:a="http://schemas.openxmlformats.org/drawingml/2006/main" xmlns:r="http://schemas.openxmlformats.org/officeDocument/2006/relationships" xmlns:p="http://schemas.openxmlformats.org/presentationml/2006/main">
   <p:cSld>
     <p:spTree>
@@ -1505,276 +1822,7 @@
             <a:fld id="{EE5867BE-386C-4D16-9B1D-8635FC172DF2}" type="slidenum">
               <a:rPr lang="pt-PT" smtClean="0"/>
               <a:pPr/>
-              <a:t>36</a:t>
-            </a:fld>
-            <a:endParaRPr lang="pt-PT"/>
-          </a:p>
-        </p:txBody>
-      </p:sp>
-    </p:spTree>
-  </p:cSld>
-  <p:clrMapOvr>
-    <a:masterClrMapping/>
-  </p:clrMapOvr>
-</p:notes>
-</file>
-
-<file path=ppt/notesSlides/notesSlide19.xml><?xml version="1.0" encoding="utf-8"?>
-<p:notes xmlns:a="http://schemas.openxmlformats.org/drawingml/2006/main" xmlns:r="http://schemas.openxmlformats.org/officeDocument/2006/relationships" xmlns:p="http://schemas.openxmlformats.org/presentationml/2006/main">
-  <p:cSld>
-    <p:spTree>
-      <p:nvGrpSpPr>
-        <p:cNvPr id="1" name=""/>
-        <p:cNvGrpSpPr/>
-        <p:nvPr/>
-      </p:nvGrpSpPr>
-      <p:grpSpPr>
-        <a:xfrm>
-          <a:off x="0" y="0"/>
-          <a:ext cx="0" cy="0"/>
-          <a:chOff x="0" y="0"/>
-          <a:chExt cx="0" cy="0"/>
-        </a:xfrm>
-      </p:grpSpPr>
-      <p:sp>
-        <p:nvSpPr>
-          <p:cNvPr id="2" name="Slide Image Placeholder 1"/>
-          <p:cNvSpPr>
-            <a:spLocks noGrp="1" noRot="1" noChangeAspect="1"/>
-          </p:cNvSpPr>
-          <p:nvPr>
-            <p:ph type="sldImg"/>
-          </p:nvPr>
-        </p:nvSpPr>
-        <p:spPr/>
-      </p:sp>
-      <p:sp>
-        <p:nvSpPr>
-          <p:cNvPr id="3" name="Notes Placeholder 2"/>
-          <p:cNvSpPr>
-            <a:spLocks noGrp="1"/>
-          </p:cNvSpPr>
-          <p:nvPr>
-            <p:ph type="body" idx="1"/>
-          </p:nvPr>
-        </p:nvSpPr>
-        <p:spPr/>
-        <p:txBody>
-          <a:bodyPr>
-            <a:normAutofit/>
-          </a:bodyPr>
-          <a:lstStyle/>
-          <a:p>
-            <a:r>
-              <a:rPr lang="pt-PT" dirty="0" smtClean="0"/>
-              <a:t>O que é que é então possível concluir do trabalho efectuado?</a:t>
-            </a:r>
-            <a:endParaRPr lang="pt-PT" dirty="0"/>
-          </a:p>
-        </p:txBody>
-      </p:sp>
-      <p:sp>
-        <p:nvSpPr>
-          <p:cNvPr id="4" name="Slide Number Placeholder 3"/>
-          <p:cNvSpPr>
-            <a:spLocks noGrp="1"/>
-          </p:cNvSpPr>
-          <p:nvPr>
-            <p:ph type="sldNum" sz="quarter" idx="10"/>
-          </p:nvPr>
-        </p:nvSpPr>
-        <p:spPr/>
-        <p:txBody>
-          <a:bodyPr/>
-          <a:lstStyle/>
-          <a:p>
-            <a:fld id="{EE5867BE-386C-4D16-9B1D-8635FC172DF2}" type="slidenum">
-              <a:rPr lang="pt-PT" smtClean="0"/>
-              <a:pPr/>
-              <a:t>38</a:t>
-            </a:fld>
-            <a:endParaRPr lang="pt-PT"/>
-          </a:p>
-        </p:txBody>
-      </p:sp>
-    </p:spTree>
-  </p:cSld>
-  <p:clrMapOvr>
-    <a:masterClrMapping/>
-  </p:clrMapOvr>
-</p:notes>
-</file>
-
-<file path=ppt/notesSlides/notesSlide2.xml><?xml version="1.0" encoding="utf-8"?>
-<p:notes xmlns:a="http://schemas.openxmlformats.org/drawingml/2006/main" xmlns:r="http://schemas.openxmlformats.org/officeDocument/2006/relationships" xmlns:p="http://schemas.openxmlformats.org/presentationml/2006/main">
-  <p:cSld>
-    <p:spTree>
-      <p:nvGrpSpPr>
-        <p:cNvPr id="1" name=""/>
-        <p:cNvGrpSpPr/>
-        <p:nvPr/>
-      </p:nvGrpSpPr>
-      <p:grpSpPr>
-        <a:xfrm>
-          <a:off x="0" y="0"/>
-          <a:ext cx="0" cy="0"/>
-          <a:chOff x="0" y="0"/>
-          <a:chExt cx="0" cy="0"/>
-        </a:xfrm>
-      </p:grpSpPr>
-      <p:sp>
-        <p:nvSpPr>
-          <p:cNvPr id="2" name="Slide Image Placeholder 1"/>
-          <p:cNvSpPr>
-            <a:spLocks noGrp="1" noRot="1" noChangeAspect="1"/>
-          </p:cNvSpPr>
-          <p:nvPr>
-            <p:ph type="sldImg"/>
-          </p:nvPr>
-        </p:nvSpPr>
-        <p:spPr/>
-      </p:sp>
-      <p:sp>
-        <p:nvSpPr>
-          <p:cNvPr id="3" name="Notes Placeholder 2"/>
-          <p:cNvSpPr>
-            <a:spLocks noGrp="1"/>
-          </p:cNvSpPr>
-          <p:nvPr>
-            <p:ph type="body" idx="1"/>
-          </p:nvPr>
-        </p:nvSpPr>
-        <p:spPr/>
-        <p:txBody>
-          <a:bodyPr>
-            <a:normAutofit/>
-          </a:bodyPr>
-          <a:lstStyle/>
-          <a:p>
-            <a:r>
-              <a:rPr lang="pt-PT" dirty="0" smtClean="0"/>
-              <a:t>Comçando então por expor o problema:</a:t>
-            </a:r>
-            <a:endParaRPr lang="pt-PT" dirty="0"/>
-          </a:p>
-        </p:txBody>
-      </p:sp>
-      <p:sp>
-        <p:nvSpPr>
-          <p:cNvPr id="4" name="Slide Number Placeholder 3"/>
-          <p:cNvSpPr>
-            <a:spLocks noGrp="1"/>
-          </p:cNvSpPr>
-          <p:nvPr>
-            <p:ph type="sldNum" sz="quarter" idx="10"/>
-          </p:nvPr>
-        </p:nvSpPr>
-        <p:spPr/>
-        <p:txBody>
-          <a:bodyPr/>
-          <a:lstStyle/>
-          <a:p>
-            <a:fld id="{EE5867BE-386C-4D16-9B1D-8635FC172DF2}" type="slidenum">
-              <a:rPr lang="pt-PT" smtClean="0"/>
-              <a:pPr/>
-              <a:t>2</a:t>
-            </a:fld>
-            <a:endParaRPr lang="pt-PT"/>
-          </a:p>
-        </p:txBody>
-      </p:sp>
-    </p:spTree>
-  </p:cSld>
-  <p:clrMapOvr>
-    <a:masterClrMapping/>
-  </p:clrMapOvr>
-</p:notes>
-</file>
-
-<file path=ppt/notesSlides/notesSlide20.xml><?xml version="1.0" encoding="utf-8"?>
-<p:notes xmlns:a="http://schemas.openxmlformats.org/drawingml/2006/main" xmlns:r="http://schemas.openxmlformats.org/officeDocument/2006/relationships" xmlns:p="http://schemas.openxmlformats.org/presentationml/2006/main">
-  <p:cSld>
-    <p:spTree>
-      <p:nvGrpSpPr>
-        <p:cNvPr id="1" name=""/>
-        <p:cNvGrpSpPr/>
-        <p:nvPr/>
-      </p:nvGrpSpPr>
-      <p:grpSpPr>
-        <a:xfrm>
-          <a:off x="0" y="0"/>
-          <a:ext cx="0" cy="0"/>
-          <a:chOff x="0" y="0"/>
-          <a:chExt cx="0" cy="0"/>
-        </a:xfrm>
-      </p:grpSpPr>
-      <p:sp>
-        <p:nvSpPr>
-          <p:cNvPr id="2" name="Slide Image Placeholder 1"/>
-          <p:cNvSpPr>
-            <a:spLocks noGrp="1" noRot="1" noChangeAspect="1"/>
-          </p:cNvSpPr>
-          <p:nvPr>
-            <p:ph type="sldImg"/>
-          </p:nvPr>
-        </p:nvSpPr>
-        <p:spPr/>
-      </p:sp>
-      <p:sp>
-        <p:nvSpPr>
-          <p:cNvPr id="3" name="Notes Placeholder 2"/>
-          <p:cNvSpPr>
-            <a:spLocks noGrp="1"/>
-          </p:cNvSpPr>
-          <p:nvPr>
-            <p:ph type="body" idx="1"/>
-          </p:nvPr>
-        </p:nvSpPr>
-        <p:spPr/>
-        <p:txBody>
-          <a:bodyPr>
-            <a:normAutofit/>
-          </a:bodyPr>
-          <a:lstStyle/>
-          <a:p>
-            <a:r>
-              <a:rPr lang="pt-PT" dirty="0" smtClean="0"/>
-              <a:t>Arquitecturas</a:t>
-            </a:r>
-            <a:r>
-              <a:rPr lang="pt-PT" baseline="0" dirty="0" smtClean="0"/>
-              <a:t> </a:t>
-            </a:r>
-            <a:r>
-              <a:rPr lang="pt-PT" dirty="0" smtClean="0"/>
-              <a:t>AOM providenciam</a:t>
-            </a:r>
-            <a:r>
-              <a:rPr lang="pt-PT" baseline="0" dirty="0" smtClean="0"/>
-              <a:t> o melhor conjunto de ferramentas para a construção de sistemas altamente variáveis. Foram pensadas e desenhadas especificamente para esse propósito, pelo que são a melhor solução para este tipo de aplicações.</a:t>
-            </a:r>
-          </a:p>
-        </p:txBody>
-      </p:sp>
-      <p:sp>
-        <p:nvSpPr>
-          <p:cNvPr id="4" name="Slide Number Placeholder 3"/>
-          <p:cNvSpPr>
-            <a:spLocks noGrp="1"/>
-          </p:cNvSpPr>
-          <p:nvPr>
-            <p:ph type="sldNum" sz="quarter" idx="10"/>
-          </p:nvPr>
-        </p:nvSpPr>
-        <p:spPr/>
-        <p:txBody>
-          <a:bodyPr/>
-          <a:lstStyle/>
-          <a:p>
-            <a:fld id="{EE5867BE-386C-4D16-9B1D-8635FC172DF2}" type="slidenum">
-              <a:rPr lang="pt-PT" smtClean="0"/>
-              <a:pPr/>
-              <a:t>39</a:t>
+              <a:t>35</a:t>
             </a:fld>
             <a:endParaRPr lang="pt-PT"/>
           </a:p>
@@ -1836,22 +1884,9 @@
           <a:p>
             <a:r>
               <a:rPr lang="pt-PT" dirty="0" smtClean="0"/>
-              <a:t>...</a:t>
-            </a:r>
-          </a:p>
-          <a:p>
-            <a:endParaRPr lang="pt-PT" dirty="0" smtClean="0"/>
-          </a:p>
-          <a:p>
-            <a:r>
-              <a:rPr lang="pt-PT" dirty="0" smtClean="0"/>
-              <a:t>Apesar</a:t>
-            </a:r>
-            <a:r>
-              <a:rPr lang="pt-PT" baseline="0" dirty="0" smtClean="0"/>
-              <a:t> do excelente conjunto de ferramentas providenciado pelo Rails, o uso de uma arquitectura MVC e as convenções usadas podem por vezes dificultar a criação de ambientes altamente variáveis – no entanto, na verdade, serão raras as vezes em que é preciso niveis tao extremos de variabilidade</a:t>
-            </a:r>
-            <a:endParaRPr lang="pt-PT" dirty="0" smtClean="0"/>
+              <a:t>O que é que é então possível concluir do trabalho efectuado?</a:t>
+            </a:r>
+            <a:endParaRPr lang="pt-PT" dirty="0"/>
           </a:p>
         </p:txBody>
       </p:sp>
@@ -1873,7 +1908,7 @@
             <a:fld id="{EE5867BE-386C-4D16-9B1D-8635FC172DF2}" type="slidenum">
               <a:rPr lang="pt-PT" smtClean="0"/>
               <a:pPr/>
-              <a:t>40</a:t>
+              <a:t>37</a:t>
             </a:fld>
             <a:endParaRPr lang="pt-PT"/>
           </a:p>
@@ -1935,13 +1970,20 @@
           <a:p>
             <a:r>
               <a:rPr lang="pt-PT" dirty="0" smtClean="0"/>
-              <a:t>Por si</a:t>
+              <a:t>Arquitecturas</a:t>
             </a:r>
             <a:r>
               <a:rPr lang="pt-PT" baseline="0" dirty="0" smtClean="0"/>
-              <a:t> só, o Rails pode ser um entrave à construção destes sistemas: no entanto, tal como demonstrado pelo trabalho desenvolvido ...</a:t>
-            </a:r>
-            <a:endParaRPr lang="pt-PT" dirty="0"/>
+              <a:t> </a:t>
+            </a:r>
+            <a:r>
+              <a:rPr lang="pt-PT" dirty="0" smtClean="0"/>
+              <a:t>AOM providenciam</a:t>
+            </a:r>
+            <a:r>
+              <a:rPr lang="pt-PT" baseline="0" dirty="0" smtClean="0"/>
+              <a:t> o melhor conjunto de ferramentas para a construção de sistemas altamente variáveis. Foram pensadas e desenhadas especificamente para esse propósito, pelo que são a melhor solução para este tipo de aplicações.</a:t>
+            </a:r>
           </a:p>
         </p:txBody>
       </p:sp>
@@ -1963,7 +2005,7 @@
             <a:fld id="{EE5867BE-386C-4D16-9B1D-8635FC172DF2}" type="slidenum">
               <a:rPr lang="pt-PT" smtClean="0"/>
               <a:pPr/>
-              <a:t>41</a:t>
+              <a:t>38</a:t>
             </a:fld>
             <a:endParaRPr lang="pt-PT"/>
           </a:p>
@@ -2025,9 +2067,22 @@
           <a:p>
             <a:r>
               <a:rPr lang="pt-PT" dirty="0" smtClean="0"/>
-              <a:t>Performance increase is dependant on the previous design</a:t>
-            </a:r>
-            <a:endParaRPr lang="pt-PT" dirty="0"/>
+              <a:t>...</a:t>
+            </a:r>
+          </a:p>
+          <a:p>
+            <a:endParaRPr lang="pt-PT" dirty="0" smtClean="0"/>
+          </a:p>
+          <a:p>
+            <a:r>
+              <a:rPr lang="pt-PT" dirty="0" smtClean="0"/>
+              <a:t>Apesar</a:t>
+            </a:r>
+            <a:r>
+              <a:rPr lang="pt-PT" baseline="0" dirty="0" smtClean="0"/>
+              <a:t> do excelente conjunto de ferramentas providenciado pelo Rails, o uso de uma arquitectura MVC e as convenções usadas podem por vezes dificultar a criação de ambientes altamente variáveis – no entanto, na verdade, serão raras as vezes em que é preciso niveis tao extremos de variabilidade</a:t>
+            </a:r>
+            <a:endParaRPr lang="pt-PT" dirty="0" smtClean="0"/>
           </a:p>
         </p:txBody>
       </p:sp>
@@ -2049,7 +2104,7 @@
             <a:fld id="{EE5867BE-386C-4D16-9B1D-8635FC172DF2}" type="slidenum">
               <a:rPr lang="pt-PT" smtClean="0"/>
               <a:pPr/>
-              <a:t>42</a:t>
+              <a:t>39</a:t>
             </a:fld>
             <a:endParaRPr lang="pt-PT"/>
           </a:p>
@@ -2109,6 +2164,14 @@
           </a:bodyPr>
           <a:lstStyle/>
           <a:p>
+            <a:r>
+              <a:rPr lang="pt-PT" dirty="0" smtClean="0"/>
+              <a:t>Por si</a:t>
+            </a:r>
+            <a:r>
+              <a:rPr lang="pt-PT" baseline="0" dirty="0" smtClean="0"/>
+              <a:t> só, o Rails pode ser um entrave à construção destes sistemas: no entanto, tal como demonstrado pelo trabalho desenvolvido ...</a:t>
+            </a:r>
             <a:endParaRPr lang="pt-PT" dirty="0"/>
           </a:p>
         </p:txBody>
@@ -2131,7 +2194,7 @@
             <a:fld id="{EE5867BE-386C-4D16-9B1D-8635FC172DF2}" type="slidenum">
               <a:rPr lang="pt-PT" smtClean="0"/>
               <a:pPr/>
-              <a:t>43</a:t>
+              <a:t>40</a:t>
             </a:fld>
             <a:endParaRPr lang="pt-PT"/>
           </a:p>
@@ -2191,6 +2254,10 @@
           </a:bodyPr>
           <a:lstStyle/>
           <a:p>
+            <a:r>
+              <a:rPr lang="pt-PT" dirty="0" smtClean="0"/>
+              <a:t>Performance increase is dependant on the previous design</a:t>
+            </a:r>
             <a:endParaRPr lang="pt-PT" dirty="0"/>
           </a:p>
         </p:txBody>
@@ -2213,7 +2280,7 @@
             <a:fld id="{EE5867BE-386C-4D16-9B1D-8635FC172DF2}" type="slidenum">
               <a:rPr lang="pt-PT" smtClean="0"/>
               <a:pPr/>
-              <a:t>45</a:t>
+              <a:t>41</a:t>
             </a:fld>
             <a:endParaRPr lang="pt-PT"/>
           </a:p>
@@ -2273,7 +2340,7 @@
           </a:bodyPr>
           <a:lstStyle/>
           <a:p>
-            <a:endParaRPr lang="pt-PT"/>
+            <a:endParaRPr lang="pt-PT" dirty="0"/>
           </a:p>
         </p:txBody>
       </p:sp>
@@ -2295,7 +2362,171 @@
             <a:fld id="{EE5867BE-386C-4D16-9B1D-8635FC172DF2}" type="slidenum">
               <a:rPr lang="pt-PT" smtClean="0"/>
               <a:pPr/>
-              <a:t>46</a:t>
+              <a:t>42</a:t>
+            </a:fld>
+            <a:endParaRPr lang="pt-PT"/>
+          </a:p>
+        </p:txBody>
+      </p:sp>
+    </p:spTree>
+  </p:cSld>
+  <p:clrMapOvr>
+    <a:masterClrMapping/>
+  </p:clrMapOvr>
+</p:notes>
+</file>
+
+<file path=ppt/notesSlides/notesSlide27.xml><?xml version="1.0" encoding="utf-8"?>
+<p:notes xmlns:a="http://schemas.openxmlformats.org/drawingml/2006/main" xmlns:r="http://schemas.openxmlformats.org/officeDocument/2006/relationships" xmlns:p="http://schemas.openxmlformats.org/presentationml/2006/main">
+  <p:cSld>
+    <p:spTree>
+      <p:nvGrpSpPr>
+        <p:cNvPr id="1" name=""/>
+        <p:cNvGrpSpPr/>
+        <p:nvPr/>
+      </p:nvGrpSpPr>
+      <p:grpSpPr>
+        <a:xfrm>
+          <a:off x="0" y="0"/>
+          <a:ext cx="0" cy="0"/>
+          <a:chOff x="0" y="0"/>
+          <a:chExt cx="0" cy="0"/>
+        </a:xfrm>
+      </p:grpSpPr>
+      <p:sp>
+        <p:nvSpPr>
+          <p:cNvPr id="2" name="Slide Image Placeholder 1"/>
+          <p:cNvSpPr>
+            <a:spLocks noGrp="1" noRot="1" noChangeAspect="1"/>
+          </p:cNvSpPr>
+          <p:nvPr>
+            <p:ph type="sldImg"/>
+          </p:nvPr>
+        </p:nvSpPr>
+        <p:spPr/>
+      </p:sp>
+      <p:sp>
+        <p:nvSpPr>
+          <p:cNvPr id="3" name="Notes Placeholder 2"/>
+          <p:cNvSpPr>
+            <a:spLocks noGrp="1"/>
+          </p:cNvSpPr>
+          <p:nvPr>
+            <p:ph type="body" idx="1"/>
+          </p:nvPr>
+        </p:nvSpPr>
+        <p:spPr/>
+        <p:txBody>
+          <a:bodyPr>
+            <a:normAutofit/>
+          </a:bodyPr>
+          <a:lstStyle/>
+          <a:p>
+            <a:endParaRPr lang="pt-PT" dirty="0"/>
+          </a:p>
+        </p:txBody>
+      </p:sp>
+      <p:sp>
+        <p:nvSpPr>
+          <p:cNvPr id="4" name="Slide Number Placeholder 3"/>
+          <p:cNvSpPr>
+            <a:spLocks noGrp="1"/>
+          </p:cNvSpPr>
+          <p:nvPr>
+            <p:ph type="sldNum" sz="quarter" idx="10"/>
+          </p:nvPr>
+        </p:nvSpPr>
+        <p:spPr/>
+        <p:txBody>
+          <a:bodyPr/>
+          <a:lstStyle/>
+          <a:p>
+            <a:fld id="{EE5867BE-386C-4D16-9B1D-8635FC172DF2}" type="slidenum">
+              <a:rPr lang="pt-PT" smtClean="0"/>
+              <a:pPr/>
+              <a:t>44</a:t>
+            </a:fld>
+            <a:endParaRPr lang="pt-PT"/>
+          </a:p>
+        </p:txBody>
+      </p:sp>
+    </p:spTree>
+  </p:cSld>
+  <p:clrMapOvr>
+    <a:masterClrMapping/>
+  </p:clrMapOvr>
+</p:notes>
+</file>
+
+<file path=ppt/notesSlides/notesSlide28.xml><?xml version="1.0" encoding="utf-8"?>
+<p:notes xmlns:a="http://schemas.openxmlformats.org/drawingml/2006/main" xmlns:r="http://schemas.openxmlformats.org/officeDocument/2006/relationships" xmlns:p="http://schemas.openxmlformats.org/presentationml/2006/main">
+  <p:cSld>
+    <p:spTree>
+      <p:nvGrpSpPr>
+        <p:cNvPr id="1" name=""/>
+        <p:cNvGrpSpPr/>
+        <p:nvPr/>
+      </p:nvGrpSpPr>
+      <p:grpSpPr>
+        <a:xfrm>
+          <a:off x="0" y="0"/>
+          <a:ext cx="0" cy="0"/>
+          <a:chOff x="0" y="0"/>
+          <a:chExt cx="0" cy="0"/>
+        </a:xfrm>
+      </p:grpSpPr>
+      <p:sp>
+        <p:nvSpPr>
+          <p:cNvPr id="2" name="Slide Image Placeholder 1"/>
+          <p:cNvSpPr>
+            <a:spLocks noGrp="1" noRot="1" noChangeAspect="1"/>
+          </p:cNvSpPr>
+          <p:nvPr>
+            <p:ph type="sldImg"/>
+          </p:nvPr>
+        </p:nvSpPr>
+        <p:spPr/>
+      </p:sp>
+      <p:sp>
+        <p:nvSpPr>
+          <p:cNvPr id="3" name="Notes Placeholder 2"/>
+          <p:cNvSpPr>
+            <a:spLocks noGrp="1"/>
+          </p:cNvSpPr>
+          <p:nvPr>
+            <p:ph type="body" idx="1"/>
+          </p:nvPr>
+        </p:nvSpPr>
+        <p:spPr/>
+        <p:txBody>
+          <a:bodyPr>
+            <a:normAutofit/>
+          </a:bodyPr>
+          <a:lstStyle/>
+          <a:p>
+            <a:endParaRPr lang="pt-PT"/>
+          </a:p>
+        </p:txBody>
+      </p:sp>
+      <p:sp>
+        <p:nvSpPr>
+          <p:cNvPr id="4" name="Slide Number Placeholder 3"/>
+          <p:cNvSpPr>
+            <a:spLocks noGrp="1"/>
+          </p:cNvSpPr>
+          <p:nvPr>
+            <p:ph type="sldNum" sz="quarter" idx="10"/>
+          </p:nvPr>
+        </p:nvSpPr>
+        <p:spPr/>
+        <p:txBody>
+          <a:bodyPr/>
+          <a:lstStyle/>
+          <a:p>
+            <a:fld id="{EE5867BE-386C-4D16-9B1D-8635FC172DF2}" type="slidenum">
+              <a:rPr lang="pt-PT" smtClean="0"/>
+              <a:pPr/>
+              <a:t>45</a:t>
             </a:fld>
             <a:endParaRPr lang="pt-PT"/>
           </a:p>
@@ -8425,7 +8656,7 @@
                 </a:solidFill>
                 <a:latin typeface="League Gothic" pitchFamily="50" charset="0"/>
               </a:rPr>
-              <a:t>User Roles – Chosen Pattern</a:t>
+              <a:t>User Roles – After</a:t>
             </a:r>
             <a:endParaRPr lang="pt-PT" sz="1800" dirty="0">
               <a:solidFill>
@@ -8455,142 +8686,6 @@
               <a:rPr lang="pt-PT" smtClean="0"/>
               <a:pPr/>
               <a:t>20</a:t>
-            </a:fld>
-            <a:endParaRPr lang="pt-PT" dirty="0"/>
-          </a:p>
-        </p:txBody>
-      </p:sp>
-      <p:pic>
-        <p:nvPicPr>
-          <p:cNvPr id="2050" name="Picture 2" descr="C:\Users\jgradim\Documents\thesis\presentations\images\role-object_focus.png"/>
-          <p:cNvPicPr>
-            <a:picLocks noChangeAspect="1" noChangeArrowheads="1"/>
-          </p:cNvPicPr>
-          <p:nvPr/>
-        </p:nvPicPr>
-        <p:blipFill>
-          <a:blip r:embed="rId3" cstate="print"/>
-          <a:srcRect/>
-          <a:stretch>
-            <a:fillRect/>
-          </a:stretch>
-        </p:blipFill>
-        <p:spPr bwMode="auto">
-          <a:xfrm>
-            <a:off x="1475656" y="1913312"/>
-            <a:ext cx="6192688" cy="3387896"/>
-          </a:xfrm>
-          <a:prstGeom prst="rect">
-            <a:avLst/>
-          </a:prstGeom>
-          <a:noFill/>
-          <a:effectLst>
-            <a:outerShdw blurRad="50800" dist="38100" dir="2700000" algn="tl" rotWithShape="0">
-              <a:prstClr val="black">
-                <a:alpha val="40000"/>
-              </a:prstClr>
-            </a:outerShdw>
-          </a:effectLst>
-        </p:spPr>
-      </p:pic>
-    </p:spTree>
-  </p:cSld>
-  <p:clrMapOvr>
-    <a:masterClrMapping/>
-  </p:clrMapOvr>
-  <p:transition/>
-  <p:timing>
-    <p:tnLst>
-      <p:par>
-        <p:cTn id="1" dur="indefinite" restart="never" nodeType="tmRoot"/>
-      </p:par>
-    </p:tnLst>
-  </p:timing>
-</p:sld>
-</file>
-
-<file path=ppt/slides/slide21.xml><?xml version="1.0" encoding="utf-8"?>
-<p:sld xmlns:a="http://schemas.openxmlformats.org/drawingml/2006/main" xmlns:r="http://schemas.openxmlformats.org/officeDocument/2006/relationships" xmlns:p="http://schemas.openxmlformats.org/presentationml/2006/main">
-  <p:cSld>
-    <p:spTree>
-      <p:nvGrpSpPr>
-        <p:cNvPr id="1" name=""/>
-        <p:cNvGrpSpPr/>
-        <p:nvPr/>
-      </p:nvGrpSpPr>
-      <p:grpSpPr>
-        <a:xfrm>
-          <a:off x="0" y="0"/>
-          <a:ext cx="0" cy="0"/>
-          <a:chOff x="0" y="0"/>
-          <a:chExt cx="0" cy="0"/>
-        </a:xfrm>
-      </p:grpSpPr>
-      <p:sp>
-        <p:nvSpPr>
-          <p:cNvPr id="2" name="Title 1"/>
-          <p:cNvSpPr>
-            <a:spLocks noGrp="1"/>
-          </p:cNvSpPr>
-          <p:nvPr>
-            <p:ph type="title"/>
-          </p:nvPr>
-        </p:nvSpPr>
-        <p:spPr>
-          <a:xfrm>
-            <a:off x="4464000" y="188640"/>
-            <a:ext cx="4680000" cy="706090"/>
-          </a:xfrm>
-          <a:solidFill>
-            <a:schemeClr val="tx1">
-              <a:alpha val="90000"/>
-            </a:schemeClr>
-          </a:solidFill>
-        </p:spPr>
-        <p:txBody>
-          <a:bodyPr rIns="144000">
-            <a:normAutofit/>
-          </a:bodyPr>
-          <a:lstStyle/>
-          <a:p>
-            <a:pPr algn="r"/>
-            <a:r>
-              <a:rPr lang="pt-PT" sz="3200" dirty="0" smtClean="0">
-                <a:solidFill>
-                  <a:schemeClr val="bg1"/>
-                </a:solidFill>
-                <a:latin typeface="League Gothic" pitchFamily="50" charset="0"/>
-              </a:rPr>
-              <a:t>User Roles – After</a:t>
-            </a:r>
-            <a:endParaRPr lang="pt-PT" sz="1800" dirty="0">
-              <a:solidFill>
-                <a:schemeClr val="bg1"/>
-              </a:solidFill>
-              <a:latin typeface="League Gothic" pitchFamily="50" charset="0"/>
-            </a:endParaRPr>
-          </a:p>
-        </p:txBody>
-      </p:sp>
-      <p:sp>
-        <p:nvSpPr>
-          <p:cNvPr id="4" name="Slide Number Placeholder 3"/>
-          <p:cNvSpPr>
-            <a:spLocks noGrp="1"/>
-          </p:cNvSpPr>
-          <p:nvPr>
-            <p:ph type="sldNum" sz="quarter" idx="12"/>
-          </p:nvPr>
-        </p:nvSpPr>
-        <p:spPr/>
-        <p:txBody>
-          <a:bodyPr/>
-          <a:lstStyle/>
-          <a:p>
-            <a:fld id="{AF2DD60D-AE1E-4B35-90D2-0ABAEDD7A6F5}" type="slidenum">
-              <a:rPr lang="pt-PT" smtClean="0"/>
-              <a:pPr/>
-              <a:t>21</a:t>
             </a:fld>
             <a:endParaRPr lang="pt-PT" dirty="0"/>
           </a:p>
@@ -8644,7 +8739,7 @@
 </p:sld>
 </file>
 
-<file path=ppt/slides/slide22.xml><?xml version="1.0" encoding="utf-8"?>
+<file path=ppt/slides/slide21.xml><?xml version="1.0" encoding="utf-8"?>
 <p:sld xmlns:a="http://schemas.openxmlformats.org/drawingml/2006/main" xmlns:r="http://schemas.openxmlformats.org/officeDocument/2006/relationships" xmlns:p="http://schemas.openxmlformats.org/presentationml/2006/main">
   <p:cSld>
     <p:spTree>
@@ -8725,7 +8820,7 @@
             <a:fld id="{AF2DD60D-AE1E-4B35-90D2-0ABAEDD7A6F5}" type="slidenum">
               <a:rPr lang="pt-PT" smtClean="0"/>
               <a:pPr/>
-              <a:t>22</a:t>
+              <a:t>21</a:t>
             </a:fld>
             <a:endParaRPr lang="pt-PT" dirty="0"/>
           </a:p>
@@ -8867,6 +8962,247 @@
               </a:rPr>
               <a:t>Independent  roles</a:t>
             </a:r>
+          </a:p>
+        </p:txBody>
+      </p:sp>
+    </p:spTree>
+  </p:cSld>
+  <p:clrMapOvr>
+    <a:masterClrMapping/>
+  </p:clrMapOvr>
+  <p:timing>
+    <p:tnLst>
+      <p:par>
+        <p:cTn id="1" dur="indefinite" restart="never" nodeType="tmRoot"/>
+      </p:par>
+    </p:tnLst>
+  </p:timing>
+</p:sld>
+</file>
+
+<file path=ppt/slides/slide22.xml><?xml version="1.0" encoding="utf-8"?>
+<p:sld xmlns:a="http://schemas.openxmlformats.org/drawingml/2006/main" xmlns:r="http://schemas.openxmlformats.org/officeDocument/2006/relationships" xmlns:p="http://schemas.openxmlformats.org/presentationml/2006/main">
+  <p:cSld>
+    <p:spTree>
+      <p:nvGrpSpPr>
+        <p:cNvPr id="1" name=""/>
+        <p:cNvGrpSpPr/>
+        <p:nvPr/>
+      </p:nvGrpSpPr>
+      <p:grpSpPr>
+        <a:xfrm>
+          <a:off x="0" y="0"/>
+          <a:ext cx="0" cy="0"/>
+          <a:chOff x="0" y="0"/>
+          <a:chExt cx="0" cy="0"/>
+        </a:xfrm>
+      </p:grpSpPr>
+      <p:sp>
+        <p:nvSpPr>
+          <p:cNvPr id="2" name="Title 1"/>
+          <p:cNvSpPr>
+            <a:spLocks noGrp="1"/>
+          </p:cNvSpPr>
+          <p:nvPr>
+            <p:ph type="title"/>
+          </p:nvPr>
+        </p:nvSpPr>
+        <p:spPr>
+          <a:xfrm>
+            <a:off x="4464000" y="188640"/>
+            <a:ext cx="4680000" cy="706090"/>
+          </a:xfrm>
+          <a:solidFill>
+            <a:schemeClr val="tx1">
+              <a:alpha val="90000"/>
+            </a:schemeClr>
+          </a:solidFill>
+        </p:spPr>
+        <p:txBody>
+          <a:bodyPr rIns="144000">
+            <a:normAutofit/>
+          </a:bodyPr>
+          <a:lstStyle/>
+          <a:p>
+            <a:pPr algn="r"/>
+            <a:r>
+              <a:rPr lang="pt-PT" sz="3200" dirty="0" smtClean="0">
+                <a:solidFill>
+                  <a:schemeClr val="bg1"/>
+                </a:solidFill>
+                <a:latin typeface="League Gothic" pitchFamily="50" charset="0"/>
+              </a:rPr>
+              <a:t>Social Network</a:t>
+            </a:r>
+            <a:endParaRPr lang="pt-PT" sz="1800" dirty="0">
+              <a:solidFill>
+                <a:schemeClr val="bg1"/>
+              </a:solidFill>
+              <a:latin typeface="League Gothic" pitchFamily="50" charset="0"/>
+            </a:endParaRPr>
+          </a:p>
+        </p:txBody>
+      </p:sp>
+      <p:sp>
+        <p:nvSpPr>
+          <p:cNvPr id="3" name="Content Placeholder 2"/>
+          <p:cNvSpPr>
+            <a:spLocks noGrp="1"/>
+          </p:cNvSpPr>
+          <p:nvPr>
+            <p:ph idx="1"/>
+          </p:nvPr>
+        </p:nvSpPr>
+        <p:spPr>
+          <a:xfrm>
+            <a:off x="457200" y="1124744"/>
+            <a:ext cx="8229600" cy="5040560"/>
+          </a:xfrm>
+          <a:effectLst>
+            <a:outerShdw blurRad="50800" dist="25400" dir="2700000" algn="tl" rotWithShape="0">
+              <a:prstClr val="black">
+                <a:alpha val="15000"/>
+              </a:prstClr>
+            </a:outerShdw>
+          </a:effectLst>
+        </p:spPr>
+        <p:txBody>
+          <a:bodyPr vert="horz" anchor="ctr" anchorCtr="1">
+            <a:normAutofit/>
+          </a:bodyPr>
+          <a:lstStyle/>
+          <a:p>
+            <a:pPr indent="0">
+              <a:lnSpc>
+                <a:spcPct val="110000"/>
+              </a:lnSpc>
+              <a:spcBef>
+                <a:spcPts val="0"/>
+              </a:spcBef>
+              <a:buNone/>
+            </a:pPr>
+            <a:r>
+              <a:rPr lang="pt-PT" sz="3600" dirty="0" smtClean="0">
+                <a:solidFill>
+                  <a:schemeClr val="tx1">
+                    <a:lumMod val="85000"/>
+                    <a:lumOff val="15000"/>
+                  </a:schemeClr>
+                </a:solidFill>
+                <a:latin typeface="MetaSerif-Book" pitchFamily="34" charset="0"/>
+              </a:rPr>
+              <a:t>Completely dynamic</a:t>
+            </a:r>
+          </a:p>
+          <a:p>
+            <a:pPr indent="0">
+              <a:lnSpc>
+                <a:spcPct val="110000"/>
+              </a:lnSpc>
+              <a:spcBef>
+                <a:spcPts val="0"/>
+              </a:spcBef>
+              <a:buNone/>
+            </a:pPr>
+            <a:endParaRPr lang="pt-PT" sz="3600" dirty="0" smtClean="0">
+              <a:solidFill>
+                <a:schemeClr val="tx1">
+                  <a:lumMod val="85000"/>
+                  <a:lumOff val="15000"/>
+                </a:schemeClr>
+              </a:solidFill>
+              <a:latin typeface="MetaSerif-Book" pitchFamily="34" charset="0"/>
+            </a:endParaRPr>
+          </a:p>
+          <a:p>
+            <a:pPr indent="0">
+              <a:lnSpc>
+                <a:spcPct val="110000"/>
+              </a:lnSpc>
+              <a:spcBef>
+                <a:spcPts val="0"/>
+              </a:spcBef>
+              <a:buNone/>
+            </a:pPr>
+            <a:r>
+              <a:rPr lang="pt-PT" sz="3600" dirty="0" smtClean="0">
+                <a:solidFill>
+                  <a:schemeClr val="tx1">
+                    <a:lumMod val="85000"/>
+                    <a:lumOff val="15000"/>
+                  </a:schemeClr>
+                </a:solidFill>
+                <a:latin typeface="MetaSerif-Book" pitchFamily="34" charset="0"/>
+              </a:rPr>
+              <a:t>Built upon request, on runtime</a:t>
+            </a:r>
+          </a:p>
+          <a:p>
+            <a:pPr indent="0">
+              <a:lnSpc>
+                <a:spcPct val="110000"/>
+              </a:lnSpc>
+              <a:spcBef>
+                <a:spcPts val="0"/>
+              </a:spcBef>
+              <a:buNone/>
+            </a:pPr>
+            <a:endParaRPr lang="pt-PT" sz="3600" dirty="0" smtClean="0">
+              <a:solidFill>
+                <a:schemeClr val="tx1">
+                  <a:lumMod val="85000"/>
+                  <a:lumOff val="15000"/>
+                </a:schemeClr>
+              </a:solidFill>
+              <a:latin typeface="MetaSerif-Book" pitchFamily="34" charset="0"/>
+            </a:endParaRPr>
+          </a:p>
+          <a:p>
+            <a:pPr indent="0">
+              <a:lnSpc>
+                <a:spcPct val="110000"/>
+              </a:lnSpc>
+              <a:spcBef>
+                <a:spcPts val="0"/>
+              </a:spcBef>
+              <a:buNone/>
+            </a:pPr>
+            <a:r>
+              <a:rPr lang="pt-PT" sz="3600" dirty="0" smtClean="0">
+                <a:solidFill>
+                  <a:schemeClr val="tx1">
+                    <a:lumMod val="85000"/>
+                    <a:lumOff val="15000"/>
+                  </a:schemeClr>
+                </a:solidFill>
+                <a:latin typeface="MetaSerif-Book" pitchFamily="34" charset="0"/>
+              </a:rPr>
+              <a:t>Not very flexible...</a:t>
+            </a:r>
+          </a:p>
+        </p:txBody>
+      </p:sp>
+      <p:sp>
+        <p:nvSpPr>
+          <p:cNvPr id="4" name="Slide Number Placeholder 3"/>
+          <p:cNvSpPr>
+            <a:spLocks noGrp="1"/>
+          </p:cNvSpPr>
+          <p:nvPr>
+            <p:ph type="sldNum" sz="quarter" idx="12"/>
+          </p:nvPr>
+        </p:nvSpPr>
+        <p:spPr/>
+        <p:txBody>
+          <a:bodyPr/>
+          <a:lstStyle/>
+          <a:p>
+            <a:fld id="{AF2DD60D-AE1E-4B35-90D2-0ABAEDD7A6F5}" type="slidenum">
+              <a:rPr lang="pt-PT" smtClean="0"/>
+              <a:pPr/>
+              <a:t>22</a:t>
+            </a:fld>
+            <a:endParaRPr lang="pt-PT" dirty="0"/>
           </a:p>
         </p:txBody>
       </p:sp>
@@ -8937,7 +9273,7 @@
                 </a:solidFill>
                 <a:latin typeface="League Gothic" pitchFamily="50" charset="0"/>
               </a:rPr>
-              <a:t>Social Network</a:t>
+              <a:t>Social Network – Before</a:t>
             </a:r>
             <a:endParaRPr lang="pt-PT" sz="1800" dirty="0">
               <a:solidFill>
@@ -8950,145 +9286,6 @@
       </p:sp>
       <p:sp>
         <p:nvSpPr>
-          <p:cNvPr id="3" name="Content Placeholder 2"/>
-          <p:cNvSpPr>
-            <a:spLocks noGrp="1"/>
-          </p:cNvSpPr>
-          <p:nvPr>
-            <p:ph idx="1"/>
-          </p:nvPr>
-        </p:nvSpPr>
-        <p:spPr>
-          <a:xfrm>
-            <a:off x="457200" y="1124744"/>
-            <a:ext cx="8229600" cy="5040560"/>
-          </a:xfrm>
-          <a:effectLst>
-            <a:outerShdw blurRad="50800" dist="25400" dir="2700000" algn="tl" rotWithShape="0">
-              <a:prstClr val="black">
-                <a:alpha val="15000"/>
-              </a:prstClr>
-            </a:outerShdw>
-          </a:effectLst>
-        </p:spPr>
-        <p:txBody>
-          <a:bodyPr vert="horz" anchor="ctr" anchorCtr="1">
-            <a:normAutofit/>
-          </a:bodyPr>
-          <a:lstStyle/>
-          <a:p>
-            <a:pPr indent="0">
-              <a:lnSpc>
-                <a:spcPct val="110000"/>
-              </a:lnSpc>
-              <a:spcBef>
-                <a:spcPts val="0"/>
-              </a:spcBef>
-              <a:buNone/>
-            </a:pPr>
-            <a:r>
-              <a:rPr lang="pt-PT" sz="3600" dirty="0" smtClean="0">
-                <a:solidFill>
-                  <a:schemeClr val="tx1">
-                    <a:lumMod val="85000"/>
-                    <a:lumOff val="15000"/>
-                  </a:schemeClr>
-                </a:solidFill>
-                <a:latin typeface="MetaSerif-Book" pitchFamily="34" charset="0"/>
-              </a:rPr>
-              <a:t>Completely dynamic</a:t>
-            </a:r>
-          </a:p>
-          <a:p>
-            <a:pPr indent="0">
-              <a:lnSpc>
-                <a:spcPct val="110000"/>
-              </a:lnSpc>
-              <a:spcBef>
-                <a:spcPts val="0"/>
-              </a:spcBef>
-              <a:buNone/>
-            </a:pPr>
-            <a:endParaRPr lang="pt-PT" sz="3600" dirty="0" smtClean="0">
-              <a:solidFill>
-                <a:schemeClr val="tx1">
-                  <a:lumMod val="85000"/>
-                  <a:lumOff val="15000"/>
-                </a:schemeClr>
-              </a:solidFill>
-              <a:latin typeface="MetaSerif-Book" pitchFamily="34" charset="0"/>
-            </a:endParaRPr>
-          </a:p>
-          <a:p>
-            <a:pPr indent="0">
-              <a:lnSpc>
-                <a:spcPct val="110000"/>
-              </a:lnSpc>
-              <a:spcBef>
-                <a:spcPts val="0"/>
-              </a:spcBef>
-              <a:buNone/>
-            </a:pPr>
-            <a:r>
-              <a:rPr lang="pt-PT" sz="3600" dirty="0" smtClean="0">
-                <a:solidFill>
-                  <a:schemeClr val="tx1">
-                    <a:lumMod val="85000"/>
-                    <a:lumOff val="15000"/>
-                  </a:schemeClr>
-                </a:solidFill>
-                <a:latin typeface="MetaSerif-Book" pitchFamily="34" charset="0"/>
-              </a:rPr>
-              <a:t>Built upon request, on runtime</a:t>
-            </a:r>
-          </a:p>
-          <a:p>
-            <a:pPr indent="0">
-              <a:lnSpc>
-                <a:spcPct val="110000"/>
-              </a:lnSpc>
-              <a:spcBef>
-                <a:spcPts val="0"/>
-              </a:spcBef>
-              <a:buNone/>
-            </a:pPr>
-            <a:endParaRPr lang="pt-PT" sz="3600" dirty="0" smtClean="0">
-              <a:solidFill>
-                <a:schemeClr val="tx1">
-                  <a:lumMod val="85000"/>
-                  <a:lumOff val="15000"/>
-                </a:schemeClr>
-              </a:solidFill>
-              <a:latin typeface="MetaSerif-Book" pitchFamily="34" charset="0"/>
-            </a:endParaRPr>
-          </a:p>
-          <a:p>
-            <a:pPr indent="0">
-              <a:lnSpc>
-                <a:spcPct val="110000"/>
-              </a:lnSpc>
-              <a:spcBef>
-                <a:spcPts val="0"/>
-              </a:spcBef>
-              <a:buNone/>
-            </a:pPr>
-            <a:r>
-              <a:rPr lang="pt-PT" sz="3600" dirty="0" smtClean="0">
-                <a:solidFill>
-                  <a:schemeClr val="tx1">
-                    <a:lumMod val="85000"/>
-                    <a:lumOff val="15000"/>
-                  </a:schemeClr>
-                </a:solidFill>
-                <a:latin typeface="MetaSerif-Book" pitchFamily="34" charset="0"/>
-              </a:rPr>
-              <a:t>Not very flexible...</a:t>
-            </a:r>
-          </a:p>
-        </p:txBody>
-      </p:sp>
-      <p:sp>
-        <p:nvSpPr>
           <p:cNvPr id="4" name="Slide Number Placeholder 3"/>
           <p:cNvSpPr>
             <a:spLocks noGrp="1"/>
@@ -9106,108 +9303,6 @@
               <a:rPr lang="pt-PT" smtClean="0"/>
               <a:pPr/>
               <a:t>23</a:t>
-            </a:fld>
-            <a:endParaRPr lang="pt-PT" dirty="0"/>
-          </a:p>
-        </p:txBody>
-      </p:sp>
-    </p:spTree>
-  </p:cSld>
-  <p:clrMapOvr>
-    <a:masterClrMapping/>
-  </p:clrMapOvr>
-  <p:timing>
-    <p:tnLst>
-      <p:par>
-        <p:cTn id="1" dur="indefinite" restart="never" nodeType="tmRoot"/>
-      </p:par>
-    </p:tnLst>
-  </p:timing>
-</p:sld>
-</file>
-
-<file path=ppt/slides/slide24.xml><?xml version="1.0" encoding="utf-8"?>
-<p:sld xmlns:a="http://schemas.openxmlformats.org/drawingml/2006/main" xmlns:r="http://schemas.openxmlformats.org/officeDocument/2006/relationships" xmlns:p="http://schemas.openxmlformats.org/presentationml/2006/main">
-  <p:cSld>
-    <p:spTree>
-      <p:nvGrpSpPr>
-        <p:cNvPr id="1" name=""/>
-        <p:cNvGrpSpPr/>
-        <p:nvPr/>
-      </p:nvGrpSpPr>
-      <p:grpSpPr>
-        <a:xfrm>
-          <a:off x="0" y="0"/>
-          <a:ext cx="0" cy="0"/>
-          <a:chOff x="0" y="0"/>
-          <a:chExt cx="0" cy="0"/>
-        </a:xfrm>
-      </p:grpSpPr>
-      <p:sp>
-        <p:nvSpPr>
-          <p:cNvPr id="2" name="Title 1"/>
-          <p:cNvSpPr>
-            <a:spLocks noGrp="1"/>
-          </p:cNvSpPr>
-          <p:nvPr>
-            <p:ph type="title"/>
-          </p:nvPr>
-        </p:nvSpPr>
-        <p:spPr>
-          <a:xfrm>
-            <a:off x="4464000" y="188640"/>
-            <a:ext cx="4680000" cy="706090"/>
-          </a:xfrm>
-          <a:solidFill>
-            <a:schemeClr val="tx1">
-              <a:alpha val="90000"/>
-            </a:schemeClr>
-          </a:solidFill>
-        </p:spPr>
-        <p:txBody>
-          <a:bodyPr rIns="144000">
-            <a:normAutofit/>
-          </a:bodyPr>
-          <a:lstStyle/>
-          <a:p>
-            <a:pPr algn="r"/>
-            <a:r>
-              <a:rPr lang="pt-PT" sz="3200" dirty="0" smtClean="0">
-                <a:solidFill>
-                  <a:schemeClr val="bg1"/>
-                </a:solidFill>
-                <a:latin typeface="League Gothic" pitchFamily="50" charset="0"/>
-              </a:rPr>
-              <a:t>Social Network – Before</a:t>
-            </a:r>
-            <a:endParaRPr lang="pt-PT" sz="1800" dirty="0">
-              <a:solidFill>
-                <a:schemeClr val="bg1"/>
-              </a:solidFill>
-              <a:latin typeface="League Gothic" pitchFamily="50" charset="0"/>
-            </a:endParaRPr>
-          </a:p>
-        </p:txBody>
-      </p:sp>
-      <p:sp>
-        <p:nvSpPr>
-          <p:cNvPr id="4" name="Slide Number Placeholder 3"/>
-          <p:cNvSpPr>
-            <a:spLocks noGrp="1"/>
-          </p:cNvSpPr>
-          <p:nvPr>
-            <p:ph type="sldNum" sz="quarter" idx="12"/>
-          </p:nvPr>
-        </p:nvSpPr>
-        <p:spPr/>
-        <p:txBody>
-          <a:bodyPr/>
-          <a:lstStyle/>
-          <a:p>
-            <a:fld id="{AF2DD60D-AE1E-4B35-90D2-0ABAEDD7A6F5}" type="slidenum">
-              <a:rPr lang="pt-PT" smtClean="0"/>
-              <a:pPr/>
-              <a:t>24</a:t>
             </a:fld>
             <a:endParaRPr lang="pt-PT" dirty="0"/>
           </a:p>
@@ -9261,7 +9356,7 @@
 </p:sld>
 </file>
 
-<file path=ppt/slides/slide25.xml><?xml version="1.0" encoding="utf-8"?>
+<file path=ppt/slides/slide24.xml><?xml version="1.0" encoding="utf-8"?>
 <p:sld xmlns:a="http://schemas.openxmlformats.org/drawingml/2006/main" xmlns:r="http://schemas.openxmlformats.org/officeDocument/2006/relationships" xmlns:p="http://schemas.openxmlformats.org/presentationml/2006/main">
   <p:cSld>
     <p:spTree>
@@ -9342,7 +9437,7 @@
             <a:fld id="{AF2DD60D-AE1E-4B35-90D2-0ABAEDD7A6F5}" type="slidenum">
               <a:rPr lang="pt-PT" smtClean="0"/>
               <a:pPr/>
-              <a:t>25</a:t>
+              <a:t>24</a:t>
             </a:fld>
             <a:endParaRPr lang="pt-PT" dirty="0"/>
           </a:p>
@@ -9396,7 +9491,7 @@
 </p:sld>
 </file>
 
-<file path=ppt/slides/slide26.xml><?xml version="1.0" encoding="utf-8"?>
+<file path=ppt/slides/slide25.xml><?xml version="1.0" encoding="utf-8"?>
 <p:sld xmlns:a="http://schemas.openxmlformats.org/drawingml/2006/main" xmlns:r="http://schemas.openxmlformats.org/officeDocument/2006/relationships" xmlns:p="http://schemas.openxmlformats.org/presentationml/2006/main">
   <p:cSld>
     <p:spTree>
@@ -9477,7 +9572,7 @@
             <a:fld id="{AF2DD60D-AE1E-4B35-90D2-0ABAEDD7A6F5}" type="slidenum">
               <a:rPr lang="pt-PT" smtClean="0"/>
               <a:pPr/>
-              <a:t>26</a:t>
+              <a:t>25</a:t>
             </a:fld>
             <a:endParaRPr lang="pt-PT" dirty="0"/>
           </a:p>
@@ -9531,7 +9626,7 @@
 </p:sld>
 </file>
 
-<file path=ppt/slides/slide27.xml><?xml version="1.0" encoding="utf-8"?>
+<file path=ppt/slides/slide26.xml><?xml version="1.0" encoding="utf-8"?>
 <p:sld xmlns:a="http://schemas.openxmlformats.org/drawingml/2006/main" xmlns:r="http://schemas.openxmlformats.org/officeDocument/2006/relationships" xmlns:p="http://schemas.openxmlformats.org/presentationml/2006/main">
   <p:cSld>
     <p:spTree>
@@ -9612,7 +9707,7 @@
             <a:fld id="{AF2DD60D-AE1E-4B35-90D2-0ABAEDD7A6F5}" type="slidenum">
               <a:rPr lang="pt-PT" smtClean="0"/>
               <a:pPr/>
-              <a:t>27</a:t>
+              <a:t>26</a:t>
             </a:fld>
             <a:endParaRPr lang="pt-PT" dirty="0"/>
           </a:p>
@@ -9772,7 +9867,7 @@
 </p:sld>
 </file>
 
-<file path=ppt/slides/slide28.xml><?xml version="1.0" encoding="utf-8"?>
+<file path=ppt/slides/slide27.xml><?xml version="1.0" encoding="utf-8"?>
 <p:sld xmlns:a="http://schemas.openxmlformats.org/drawingml/2006/main" xmlns:r="http://schemas.openxmlformats.org/officeDocument/2006/relationships" xmlns:p="http://schemas.openxmlformats.org/presentationml/2006/main">
   <p:cSld>
     <p:spTree>
@@ -9853,7 +9948,7 @@
             <a:fld id="{AF2DD60D-AE1E-4B35-90D2-0ABAEDD7A6F5}" type="slidenum">
               <a:rPr lang="pt-PT" smtClean="0"/>
               <a:pPr/>
-              <a:t>28</a:t>
+              <a:t>27</a:t>
             </a:fld>
             <a:endParaRPr lang="pt-PT" dirty="0"/>
           </a:p>
@@ -9868,7 +9963,7 @@
           <p:nvPr/>
         </p:nvPicPr>
         <p:blipFill>
-          <a:blip r:embed="rId2" cstate="print"/>
+          <a:blip r:embed="rId3" cstate="print"/>
           <a:srcRect/>
           <a:stretch>
             <a:fillRect/>
@@ -10016,7 +10111,7 @@
 </p:sld>
 </file>
 
-<file path=ppt/slides/slide29.xml><?xml version="1.0" encoding="utf-8"?>
+<file path=ppt/slides/slide28.xml><?xml version="1.0" encoding="utf-8"?>
 <p:sld xmlns:a="http://schemas.openxmlformats.org/drawingml/2006/main" xmlns:r="http://schemas.openxmlformats.org/officeDocument/2006/relationships" xmlns:p="http://schemas.openxmlformats.org/presentationml/2006/main">
   <p:cSld>
     <p:spTree>
@@ -10236,7 +10331,7 @@
             <a:fld id="{AF2DD60D-AE1E-4B35-90D2-0ABAEDD7A6F5}" type="slidenum">
               <a:rPr lang="pt-PT" smtClean="0"/>
               <a:pPr/>
-              <a:t>29</a:t>
+              <a:t>28</a:t>
             </a:fld>
             <a:endParaRPr lang="pt-PT" dirty="0"/>
           </a:p>
@@ -10257,7 +10352,7 @@
 </p:sld>
 </file>
 
-<file path=ppt/slides/slide3.xml><?xml version="1.0" encoding="utf-8"?>
+<file path=ppt/slides/slide29.xml><?xml version="1.0" encoding="utf-8"?>
 <p:sld xmlns:a="http://schemas.openxmlformats.org/drawingml/2006/main" xmlns:r="http://schemas.openxmlformats.org/officeDocument/2006/relationships" xmlns:p="http://schemas.openxmlformats.org/presentationml/2006/main">
   <p:cSld>
     <p:spTree>
@@ -10309,158 +10404,6 @@
                 </a:solidFill>
                 <a:latin typeface="League Gothic" pitchFamily="50" charset="0"/>
               </a:rPr>
-              <a:t>Context</a:t>
-            </a:r>
-            <a:endParaRPr lang="pt-PT" sz="3200" dirty="0">
-              <a:solidFill>
-                <a:schemeClr val="bg1"/>
-              </a:solidFill>
-              <a:latin typeface="League Gothic" pitchFamily="50" charset="0"/>
-            </a:endParaRPr>
-          </a:p>
-        </p:txBody>
-      </p:sp>
-      <p:sp>
-        <p:nvSpPr>
-          <p:cNvPr id="3" name="Content Placeholder 2"/>
-          <p:cNvSpPr>
-            <a:spLocks noGrp="1"/>
-          </p:cNvSpPr>
-          <p:nvPr>
-            <p:ph idx="1"/>
-          </p:nvPr>
-        </p:nvSpPr>
-        <p:spPr>
-          <a:xfrm>
-            <a:off x="457200" y="908720"/>
-            <a:ext cx="8229600" cy="5472608"/>
-          </a:xfrm>
-          <a:effectLst>
-            <a:outerShdw blurRad="50800" dist="25400" dir="2700000" algn="tl" rotWithShape="0">
-              <a:prstClr val="black">
-                <a:alpha val="15000"/>
-              </a:prstClr>
-            </a:outerShdw>
-          </a:effectLst>
-        </p:spPr>
-        <p:txBody>
-          <a:bodyPr anchor="ctr" anchorCtr="1">
-            <a:normAutofit/>
-          </a:bodyPr>
-          <a:lstStyle/>
-          <a:p>
-            <a:pPr indent="0">
-              <a:lnSpc>
-                <a:spcPct val="110000"/>
-              </a:lnSpc>
-              <a:buNone/>
-            </a:pPr>
-            <a:r>
-              <a:rPr lang="pt-PT" sz="3600" dirty="0" smtClean="0">
-                <a:solidFill>
-                  <a:schemeClr val="tx1">
-                    <a:lumMod val="85000"/>
-                    <a:lumOff val="15000"/>
-                  </a:schemeClr>
-                </a:solidFill>
-                <a:latin typeface="MetaSerif-Book" pitchFamily="34" charset="0"/>
-              </a:rPr>
-              <a:t>Many software projects exist in an ever-changing environment</a:t>
-            </a:r>
-          </a:p>
-        </p:txBody>
-      </p:sp>
-      <p:sp>
-        <p:nvSpPr>
-          <p:cNvPr id="4" name="Slide Number Placeholder 3"/>
-          <p:cNvSpPr>
-            <a:spLocks noGrp="1"/>
-          </p:cNvSpPr>
-          <p:nvPr>
-            <p:ph type="sldNum" sz="quarter" idx="12"/>
-          </p:nvPr>
-        </p:nvSpPr>
-        <p:spPr/>
-        <p:txBody>
-          <a:bodyPr/>
-          <a:lstStyle/>
-          <a:p>
-            <a:fld id="{AF2DD60D-AE1E-4B35-90D2-0ABAEDD7A6F5}" type="slidenum">
-              <a:rPr lang="pt-PT" smtClean="0"/>
-              <a:pPr/>
-              <a:t>3</a:t>
-            </a:fld>
-            <a:endParaRPr lang="pt-PT" dirty="0"/>
-          </a:p>
-        </p:txBody>
-      </p:sp>
-    </p:spTree>
-  </p:cSld>
-  <p:clrMapOvr>
-    <a:masterClrMapping/>
-  </p:clrMapOvr>
-  <p:timing>
-    <p:tnLst>
-      <p:par>
-        <p:cTn id="1" dur="indefinite" restart="never" nodeType="tmRoot"/>
-      </p:par>
-    </p:tnLst>
-  </p:timing>
-</p:sld>
-</file>
-
-<file path=ppt/slides/slide30.xml><?xml version="1.0" encoding="utf-8"?>
-<p:sld xmlns:a="http://schemas.openxmlformats.org/drawingml/2006/main" xmlns:r="http://schemas.openxmlformats.org/officeDocument/2006/relationships" xmlns:p="http://schemas.openxmlformats.org/presentationml/2006/main">
-  <p:cSld>
-    <p:spTree>
-      <p:nvGrpSpPr>
-        <p:cNvPr id="1" name=""/>
-        <p:cNvGrpSpPr/>
-        <p:nvPr/>
-      </p:nvGrpSpPr>
-      <p:grpSpPr>
-        <a:xfrm>
-          <a:off x="0" y="0"/>
-          <a:ext cx="0" cy="0"/>
-          <a:chOff x="0" y="0"/>
-          <a:chExt cx="0" cy="0"/>
-        </a:xfrm>
-      </p:grpSpPr>
-      <p:sp>
-        <p:nvSpPr>
-          <p:cNvPr id="2" name="Title 1"/>
-          <p:cNvSpPr>
-            <a:spLocks noGrp="1"/>
-          </p:cNvSpPr>
-          <p:nvPr>
-            <p:ph type="title"/>
-          </p:nvPr>
-        </p:nvSpPr>
-        <p:spPr>
-          <a:xfrm>
-            <a:off x="4464000" y="188640"/>
-            <a:ext cx="4680000" cy="706090"/>
-          </a:xfrm>
-          <a:solidFill>
-            <a:schemeClr val="tx1">
-              <a:alpha val="90000"/>
-            </a:schemeClr>
-          </a:solidFill>
-        </p:spPr>
-        <p:txBody>
-          <a:bodyPr rIns="144000">
-            <a:normAutofit/>
-          </a:bodyPr>
-          <a:lstStyle/>
-          <a:p>
-            <a:pPr algn="r"/>
-            <a:r>
-              <a:rPr lang="pt-PT" sz="3200" dirty="0" smtClean="0">
-                <a:solidFill>
-                  <a:schemeClr val="bg1"/>
-                </a:solidFill>
-                <a:latin typeface="League Gothic" pitchFamily="50" charset="0"/>
-              </a:rPr>
               <a:t>Document Editor – Before</a:t>
             </a:r>
             <a:endParaRPr lang="pt-PT" sz="1800" dirty="0">
@@ -10490,7 +10433,7 @@
             <a:fld id="{AF2DD60D-AE1E-4B35-90D2-0ABAEDD7A6F5}" type="slidenum">
               <a:rPr lang="pt-PT" smtClean="0"/>
               <a:pPr/>
-              <a:t>30</a:t>
+              <a:t>29</a:t>
             </a:fld>
             <a:endParaRPr lang="pt-PT" dirty="0"/>
           </a:p>
@@ -10505,7 +10448,7 @@
           <p:nvPr/>
         </p:nvPicPr>
         <p:blipFill>
-          <a:blip r:embed="rId2" cstate="print"/>
+          <a:blip r:embed="rId3" cstate="print"/>
           <a:srcRect/>
           <a:stretch>
             <a:fillRect/>
@@ -10544,7 +10487,7 @@
 </p:sld>
 </file>
 
-<file path=ppt/slides/slide31.xml><?xml version="1.0" encoding="utf-8"?>
+<file path=ppt/slides/slide3.xml><?xml version="1.0" encoding="utf-8"?>
 <p:sld xmlns:a="http://schemas.openxmlformats.org/drawingml/2006/main" xmlns:r="http://schemas.openxmlformats.org/officeDocument/2006/relationships" xmlns:p="http://schemas.openxmlformats.org/presentationml/2006/main">
   <p:cSld>
     <p:spTree>
@@ -10596,6 +10539,158 @@
                 </a:solidFill>
                 <a:latin typeface="League Gothic" pitchFamily="50" charset="0"/>
               </a:rPr>
+              <a:t>Context</a:t>
+            </a:r>
+            <a:endParaRPr lang="pt-PT" sz="3200" dirty="0">
+              <a:solidFill>
+                <a:schemeClr val="bg1"/>
+              </a:solidFill>
+              <a:latin typeface="League Gothic" pitchFamily="50" charset="0"/>
+            </a:endParaRPr>
+          </a:p>
+        </p:txBody>
+      </p:sp>
+      <p:sp>
+        <p:nvSpPr>
+          <p:cNvPr id="3" name="Content Placeholder 2"/>
+          <p:cNvSpPr>
+            <a:spLocks noGrp="1"/>
+          </p:cNvSpPr>
+          <p:nvPr>
+            <p:ph idx="1"/>
+          </p:nvPr>
+        </p:nvSpPr>
+        <p:spPr>
+          <a:xfrm>
+            <a:off x="457200" y="908720"/>
+            <a:ext cx="8229600" cy="5472608"/>
+          </a:xfrm>
+          <a:effectLst>
+            <a:outerShdw blurRad="50800" dist="25400" dir="2700000" algn="tl" rotWithShape="0">
+              <a:prstClr val="black">
+                <a:alpha val="15000"/>
+              </a:prstClr>
+            </a:outerShdw>
+          </a:effectLst>
+        </p:spPr>
+        <p:txBody>
+          <a:bodyPr anchor="ctr" anchorCtr="1">
+            <a:normAutofit/>
+          </a:bodyPr>
+          <a:lstStyle/>
+          <a:p>
+            <a:pPr indent="0">
+              <a:lnSpc>
+                <a:spcPct val="110000"/>
+              </a:lnSpc>
+              <a:buNone/>
+            </a:pPr>
+            <a:r>
+              <a:rPr lang="pt-PT" sz="3600" dirty="0" smtClean="0">
+                <a:solidFill>
+                  <a:schemeClr val="tx1">
+                    <a:lumMod val="85000"/>
+                    <a:lumOff val="15000"/>
+                  </a:schemeClr>
+                </a:solidFill>
+                <a:latin typeface="MetaSerif-Book" pitchFamily="34" charset="0"/>
+              </a:rPr>
+              <a:t>Many software projects exist in an ever-changing environment</a:t>
+            </a:r>
+          </a:p>
+        </p:txBody>
+      </p:sp>
+      <p:sp>
+        <p:nvSpPr>
+          <p:cNvPr id="4" name="Slide Number Placeholder 3"/>
+          <p:cNvSpPr>
+            <a:spLocks noGrp="1"/>
+          </p:cNvSpPr>
+          <p:nvPr>
+            <p:ph type="sldNum" sz="quarter" idx="12"/>
+          </p:nvPr>
+        </p:nvSpPr>
+        <p:spPr/>
+        <p:txBody>
+          <a:bodyPr/>
+          <a:lstStyle/>
+          <a:p>
+            <a:fld id="{AF2DD60D-AE1E-4B35-90D2-0ABAEDD7A6F5}" type="slidenum">
+              <a:rPr lang="pt-PT" smtClean="0"/>
+              <a:pPr/>
+              <a:t>3</a:t>
+            </a:fld>
+            <a:endParaRPr lang="pt-PT" dirty="0"/>
+          </a:p>
+        </p:txBody>
+      </p:sp>
+    </p:spTree>
+  </p:cSld>
+  <p:clrMapOvr>
+    <a:masterClrMapping/>
+  </p:clrMapOvr>
+  <p:timing>
+    <p:tnLst>
+      <p:par>
+        <p:cTn id="1" dur="indefinite" restart="never" nodeType="tmRoot"/>
+      </p:par>
+    </p:tnLst>
+  </p:timing>
+</p:sld>
+</file>
+
+<file path=ppt/slides/slide30.xml><?xml version="1.0" encoding="utf-8"?>
+<p:sld xmlns:a="http://schemas.openxmlformats.org/drawingml/2006/main" xmlns:r="http://schemas.openxmlformats.org/officeDocument/2006/relationships" xmlns:p="http://schemas.openxmlformats.org/presentationml/2006/main">
+  <p:cSld>
+    <p:spTree>
+      <p:nvGrpSpPr>
+        <p:cNvPr id="1" name=""/>
+        <p:cNvGrpSpPr/>
+        <p:nvPr/>
+      </p:nvGrpSpPr>
+      <p:grpSpPr>
+        <a:xfrm>
+          <a:off x="0" y="0"/>
+          <a:ext cx="0" cy="0"/>
+          <a:chOff x="0" y="0"/>
+          <a:chExt cx="0" cy="0"/>
+        </a:xfrm>
+      </p:grpSpPr>
+      <p:sp>
+        <p:nvSpPr>
+          <p:cNvPr id="2" name="Title 1"/>
+          <p:cNvSpPr>
+            <a:spLocks noGrp="1"/>
+          </p:cNvSpPr>
+          <p:nvPr>
+            <p:ph type="title"/>
+          </p:nvPr>
+        </p:nvSpPr>
+        <p:spPr>
+          <a:xfrm>
+            <a:off x="4464000" y="188640"/>
+            <a:ext cx="4680000" cy="706090"/>
+          </a:xfrm>
+          <a:solidFill>
+            <a:schemeClr val="tx1">
+              <a:alpha val="90000"/>
+            </a:schemeClr>
+          </a:solidFill>
+        </p:spPr>
+        <p:txBody>
+          <a:bodyPr rIns="144000">
+            <a:normAutofit/>
+          </a:bodyPr>
+          <a:lstStyle/>
+          <a:p>
+            <a:pPr algn="r"/>
+            <a:r>
+              <a:rPr lang="pt-PT" sz="3200" dirty="0" smtClean="0">
+                <a:solidFill>
+                  <a:schemeClr val="bg1"/>
+                </a:solidFill>
+                <a:latin typeface="League Gothic" pitchFamily="50" charset="0"/>
+              </a:rPr>
               <a:t>Document Editor – Chosen Patterns</a:t>
             </a:r>
             <a:endParaRPr lang="pt-PT" sz="1800" dirty="0">
@@ -10625,7 +10720,7 @@
             <a:fld id="{AF2DD60D-AE1E-4B35-90D2-0ABAEDD7A6F5}" type="slidenum">
               <a:rPr lang="pt-PT" smtClean="0"/>
               <a:pPr/>
-              <a:t>31</a:t>
+              <a:t>30</a:t>
             </a:fld>
             <a:endParaRPr lang="pt-PT" dirty="0"/>
           </a:p>
@@ -10679,7 +10774,7 @@
 </p:sld>
 </file>
 
-<file path=ppt/slides/slide32.xml><?xml version="1.0" encoding="utf-8"?>
+<file path=ppt/slides/slide31.xml><?xml version="1.0" encoding="utf-8"?>
 <p:sld xmlns:a="http://schemas.openxmlformats.org/drawingml/2006/main" xmlns:r="http://schemas.openxmlformats.org/officeDocument/2006/relationships" xmlns:p="http://schemas.openxmlformats.org/presentationml/2006/main">
   <p:cSld>
     <p:spTree>
@@ -10760,7 +10855,7 @@
             <a:fld id="{AF2DD60D-AE1E-4B35-90D2-0ABAEDD7A6F5}" type="slidenum">
               <a:rPr lang="pt-PT" smtClean="0"/>
               <a:pPr/>
-              <a:t>32</a:t>
+              <a:t>31</a:t>
             </a:fld>
             <a:endParaRPr lang="pt-PT" dirty="0"/>
           </a:p>
@@ -10814,7 +10909,7 @@
 </p:sld>
 </file>
 
-<file path=ppt/slides/slide33.xml><?xml version="1.0" encoding="utf-8"?>
+<file path=ppt/slides/slide32.xml><?xml version="1.0" encoding="utf-8"?>
 <p:sld xmlns:a="http://schemas.openxmlformats.org/drawingml/2006/main" xmlns:r="http://schemas.openxmlformats.org/officeDocument/2006/relationships" xmlns:p="http://schemas.openxmlformats.org/presentationml/2006/main">
   <p:cSld>
     <p:spTree>
@@ -10895,7 +10990,7 @@
             <a:fld id="{AF2DD60D-AE1E-4B35-90D2-0ABAEDD7A6F5}" type="slidenum">
               <a:rPr lang="pt-PT" smtClean="0"/>
               <a:pPr/>
-              <a:t>33</a:t>
+              <a:t>32</a:t>
             </a:fld>
             <a:endParaRPr lang="pt-PT" dirty="0"/>
           </a:p>
@@ -10949,7 +11044,7 @@
 </p:sld>
 </file>
 
-<file path=ppt/slides/slide34.xml><?xml version="1.0" encoding="utf-8"?>
+<file path=ppt/slides/slide33.xml><?xml version="1.0" encoding="utf-8"?>
 <p:sld xmlns:a="http://schemas.openxmlformats.org/drawingml/2006/main" xmlns:r="http://schemas.openxmlformats.org/officeDocument/2006/relationships" xmlns:p="http://schemas.openxmlformats.org/presentationml/2006/main">
   <p:cSld>
     <p:spTree>
@@ -11030,7 +11125,7 @@
             <a:fld id="{AF2DD60D-AE1E-4B35-90D2-0ABAEDD7A6F5}" type="slidenum">
               <a:rPr lang="pt-PT" smtClean="0"/>
               <a:pPr/>
-              <a:t>34</a:t>
+              <a:t>33</a:t>
             </a:fld>
             <a:endParaRPr lang="pt-PT" dirty="0"/>
           </a:p>
@@ -11190,7 +11285,7 @@
 </p:sld>
 </file>
 
-<file path=ppt/slides/slide35.xml><?xml version="1.0" encoding="utf-8"?>
+<file path=ppt/slides/slide34.xml><?xml version="1.0" encoding="utf-8"?>
 <p:sld xmlns:a="http://schemas.openxmlformats.org/drawingml/2006/main" xmlns:r="http://schemas.openxmlformats.org/officeDocument/2006/relationships" xmlns:p="http://schemas.openxmlformats.org/presentationml/2006/main">
   <p:cSld>
     <p:spTree>
@@ -11297,7 +11392,7 @@
             <a:fld id="{AF2DD60D-AE1E-4B35-90D2-0ABAEDD7A6F5}" type="slidenum">
               <a:rPr lang="pt-PT" smtClean="0"/>
               <a:pPr/>
-              <a:t>35</a:t>
+              <a:t>34</a:t>
             </a:fld>
             <a:endParaRPr lang="pt-PT" dirty="0"/>
           </a:p>
@@ -11318,7 +11413,7 @@
 </p:sld>
 </file>
 
-<file path=ppt/slides/slide36.xml><?xml version="1.0" encoding="utf-8"?>
+<file path=ppt/slides/slide35.xml><?xml version="1.0" encoding="utf-8"?>
 <p:sld xmlns:a="http://schemas.openxmlformats.org/drawingml/2006/main" xmlns:r="http://schemas.openxmlformats.org/officeDocument/2006/relationships" xmlns:p="http://schemas.openxmlformats.org/presentationml/2006/main">
   <p:cSld>
     <p:spTree>
@@ -11399,7 +11494,7 @@
             <a:fld id="{AF2DD60D-AE1E-4B35-90D2-0ABAEDD7A6F5}" type="slidenum">
               <a:rPr lang="pt-PT" smtClean="0"/>
               <a:pPr/>
-              <a:t>36</a:t>
+              <a:t>35</a:t>
             </a:fld>
             <a:endParaRPr lang="pt-PT" dirty="0"/>
           </a:p>
@@ -11446,7 +11541,7 @@
 </p:sld>
 </file>
 
-<file path=ppt/slides/slide37.xml><?xml version="1.0" encoding="utf-8"?>
+<file path=ppt/slides/slide36.xml><?xml version="1.0" encoding="utf-8"?>
 <p:sld xmlns:a="http://schemas.openxmlformats.org/drawingml/2006/main" xmlns:r="http://schemas.openxmlformats.org/officeDocument/2006/relationships" xmlns:p="http://schemas.openxmlformats.org/presentationml/2006/main">
   <p:cSld>
     <p:spTree>
@@ -11527,7 +11622,7 @@
             <a:fld id="{AF2DD60D-AE1E-4B35-90D2-0ABAEDD7A6F5}" type="slidenum">
               <a:rPr lang="pt-PT" smtClean="0"/>
               <a:pPr/>
-              <a:t>37</a:t>
+              <a:t>36</a:t>
             </a:fld>
             <a:endParaRPr lang="pt-PT" dirty="0"/>
           </a:p>
@@ -11574,7 +11669,7 @@
 </p:sld>
 </file>
 
-<file path=ppt/slides/slide38.xml><?xml version="1.0" encoding="utf-8"?>
+<file path=ppt/slides/slide37.xml><?xml version="1.0" encoding="utf-8"?>
 <p:sld xmlns:a="http://schemas.openxmlformats.org/drawingml/2006/main" xmlns:r="http://schemas.openxmlformats.org/officeDocument/2006/relationships" xmlns:p="http://schemas.openxmlformats.org/presentationml/2006/main">
   <p:cSld>
     <p:spTree>
@@ -11733,6 +11828,161 @@
 </p:sld>
 </file>
 
+<file path=ppt/slides/slide38.xml><?xml version="1.0" encoding="utf-8"?>
+<p:sld xmlns:a="http://schemas.openxmlformats.org/drawingml/2006/main" xmlns:r="http://schemas.openxmlformats.org/officeDocument/2006/relationships" xmlns:p="http://schemas.openxmlformats.org/presentationml/2006/main">
+  <p:cSld>
+    <p:spTree>
+      <p:nvGrpSpPr>
+        <p:cNvPr id="1" name=""/>
+        <p:cNvGrpSpPr/>
+        <p:nvPr/>
+      </p:nvGrpSpPr>
+      <p:grpSpPr>
+        <a:xfrm>
+          <a:off x="0" y="0"/>
+          <a:ext cx="0" cy="0"/>
+          <a:chOff x="0" y="0"/>
+          <a:chExt cx="0" cy="0"/>
+        </a:xfrm>
+      </p:grpSpPr>
+      <p:sp>
+        <p:nvSpPr>
+          <p:cNvPr id="2" name="Title 1"/>
+          <p:cNvSpPr>
+            <a:spLocks noGrp="1"/>
+          </p:cNvSpPr>
+          <p:nvPr>
+            <p:ph type="title"/>
+          </p:nvPr>
+        </p:nvSpPr>
+        <p:spPr>
+          <a:xfrm>
+            <a:off x="4464000" y="188640"/>
+            <a:ext cx="4680000" cy="706090"/>
+          </a:xfrm>
+          <a:solidFill>
+            <a:schemeClr val="tx1">
+              <a:alpha val="90000"/>
+            </a:schemeClr>
+          </a:solidFill>
+        </p:spPr>
+        <p:txBody>
+          <a:bodyPr rIns="144000">
+            <a:normAutofit/>
+          </a:bodyPr>
+          <a:lstStyle/>
+          <a:p>
+            <a:pPr algn="r"/>
+            <a:r>
+              <a:rPr lang="pt-PT" sz="3200" dirty="0" smtClean="0">
+                <a:solidFill>
+                  <a:schemeClr val="bg1"/>
+                </a:solidFill>
+                <a:latin typeface="League Gothic" pitchFamily="50" charset="0"/>
+              </a:rPr>
+              <a:t>AOMs</a:t>
+            </a:r>
+            <a:endParaRPr lang="pt-PT" sz="3200" dirty="0">
+              <a:solidFill>
+                <a:schemeClr val="bg1"/>
+              </a:solidFill>
+              <a:latin typeface="League Gothic" pitchFamily="50" charset="0"/>
+            </a:endParaRPr>
+          </a:p>
+        </p:txBody>
+      </p:sp>
+      <p:sp>
+        <p:nvSpPr>
+          <p:cNvPr id="3" name="Content Placeholder 2"/>
+          <p:cNvSpPr>
+            <a:spLocks noGrp="1"/>
+          </p:cNvSpPr>
+          <p:nvPr>
+            <p:ph idx="1"/>
+          </p:nvPr>
+        </p:nvSpPr>
+        <p:spPr>
+          <a:xfrm>
+            <a:off x="457200" y="1124744"/>
+            <a:ext cx="8229600" cy="5040560"/>
+          </a:xfrm>
+          <a:effectLst>
+            <a:outerShdw blurRad="50800" dist="25400" dir="2700000" algn="tl" rotWithShape="0">
+              <a:prstClr val="black">
+                <a:alpha val="15000"/>
+              </a:prstClr>
+            </a:outerShdw>
+          </a:effectLst>
+        </p:spPr>
+        <p:txBody>
+          <a:bodyPr vert="horz" anchor="ctr" anchorCtr="1">
+            <a:normAutofit/>
+          </a:bodyPr>
+          <a:lstStyle/>
+          <a:p>
+            <a:pPr indent="0">
+              <a:lnSpc>
+                <a:spcPct val="110000"/>
+              </a:lnSpc>
+              <a:spcBef>
+                <a:spcPts val="0"/>
+              </a:spcBef>
+              <a:buNone/>
+            </a:pPr>
+            <a:r>
+              <a:rPr lang="pt-PT" sz="3600" dirty="0" smtClean="0">
+                <a:solidFill>
+                  <a:schemeClr val="tx1">
+                    <a:lumMod val="85000"/>
+                    <a:lumOff val="15000"/>
+                  </a:schemeClr>
+                </a:solidFill>
+                <a:latin typeface="MetaSerif-Book" pitchFamily="34" charset="0"/>
+              </a:rPr>
+              <a:t>AOM architectures provide the best framework for building adaptable software systems</a:t>
+            </a:r>
+          </a:p>
+        </p:txBody>
+      </p:sp>
+      <p:sp>
+        <p:nvSpPr>
+          <p:cNvPr id="4" name="Slide Number Placeholder 3"/>
+          <p:cNvSpPr>
+            <a:spLocks noGrp="1"/>
+          </p:cNvSpPr>
+          <p:nvPr>
+            <p:ph type="sldNum" sz="quarter" idx="12"/>
+          </p:nvPr>
+        </p:nvSpPr>
+        <p:spPr/>
+        <p:txBody>
+          <a:bodyPr/>
+          <a:lstStyle/>
+          <a:p>
+            <a:fld id="{AF2DD60D-AE1E-4B35-90D2-0ABAEDD7A6F5}" type="slidenum">
+              <a:rPr lang="pt-PT" smtClean="0"/>
+              <a:pPr/>
+              <a:t>38</a:t>
+            </a:fld>
+            <a:endParaRPr lang="pt-PT" dirty="0"/>
+          </a:p>
+        </p:txBody>
+      </p:sp>
+    </p:spTree>
+  </p:cSld>
+  <p:clrMapOvr>
+    <a:masterClrMapping/>
+  </p:clrMapOvr>
+  <p:timing>
+    <p:tnLst>
+      <p:par>
+        <p:cTn id="1" dur="indefinite" restart="never" nodeType="tmRoot"/>
+      </p:par>
+    </p:tnLst>
+  </p:timing>
+</p:sld>
+</file>
+
 <file path=ppt/slides/slide39.xml><?xml version="1.0" encoding="utf-8"?>
 <p:sld xmlns:a="http://schemas.openxmlformats.org/drawingml/2006/main" xmlns:r="http://schemas.openxmlformats.org/officeDocument/2006/relationships" xmlns:p="http://schemas.openxmlformats.org/presentationml/2006/main">
   <p:cSld>
@@ -11785,7 +12035,7 @@
                 </a:solidFill>
                 <a:latin typeface="League Gothic" pitchFamily="50" charset="0"/>
               </a:rPr>
-              <a:t>AOMs</a:t>
+              <a:t>Variability</a:t>
             </a:r>
             <a:endParaRPr lang="pt-PT" sz="3200" dirty="0">
               <a:solidFill>
@@ -11798,19 +12048,45 @@
       </p:sp>
       <p:sp>
         <p:nvSpPr>
-          <p:cNvPr id="3" name="Content Placeholder 2"/>
-          <p:cNvSpPr>
-            <a:spLocks noGrp="1"/>
-          </p:cNvSpPr>
-          <p:nvPr>
-            <p:ph idx="1"/>
-          </p:nvPr>
+          <p:cNvPr id="4" name="Slide Number Placeholder 3"/>
+          <p:cNvSpPr>
+            <a:spLocks noGrp="1"/>
+          </p:cNvSpPr>
+          <p:nvPr>
+            <p:ph type="sldNum" sz="quarter" idx="12"/>
+          </p:nvPr>
+        </p:nvSpPr>
+        <p:spPr/>
+        <p:txBody>
+          <a:bodyPr/>
+          <a:lstStyle/>
+          <a:p>
+            <a:fld id="{AF2DD60D-AE1E-4B35-90D2-0ABAEDD7A6F5}" type="slidenum">
+              <a:rPr lang="pt-PT" smtClean="0"/>
+              <a:pPr/>
+              <a:t>39</a:t>
+            </a:fld>
+            <a:endParaRPr lang="pt-PT" dirty="0"/>
+          </a:p>
+        </p:txBody>
+      </p:sp>
+      <p:sp>
+        <p:nvSpPr>
+          <p:cNvPr id="5" name="Content Placeholder 2"/>
+          <p:cNvSpPr txBox="1">
+            <a:spLocks/>
+          </p:cNvSpPr>
+          <p:nvPr/>
         </p:nvSpPr>
         <p:spPr>
           <a:xfrm>
             <a:off x="457200" y="1124744"/>
             <a:ext cx="8229600" cy="5040560"/>
           </a:xfrm>
+          <a:prstGeom prst="rect">
+            <a:avLst/>
+          </a:prstGeom>
+          <a:noFill/>
           <a:effectLst>
             <a:outerShdw blurRad="50800" dist="25400" dir="2700000" algn="tl" rotWithShape="0">
               <a:prstClr val="black">
@@ -11820,19 +12096,95 @@
           </a:effectLst>
         </p:spPr>
         <p:txBody>
-          <a:bodyPr vert="horz" anchor="ctr" anchorCtr="1">
+          <a:bodyPr vert="horz" lIns="91440" tIns="45720" rIns="91440" bIns="45720" rtlCol="0" anchor="ctr" anchorCtr="1">
             <a:normAutofit/>
           </a:bodyPr>
           <a:lstStyle/>
           <a:p>
-            <a:pPr indent="0">
+            <a:pPr marL="342900" marR="0" lvl="0" indent="0" algn="l" defTabSz="914400" rtl="0" eaLnBrk="1" fontAlgn="auto" latinLnBrk="0" hangingPunct="1">
               <a:lnSpc>
                 <a:spcPct val="110000"/>
               </a:lnSpc>
               <a:spcBef>
                 <a:spcPts val="0"/>
               </a:spcBef>
+              <a:spcAft>
+                <a:spcPts val="0"/>
+              </a:spcAft>
+              <a:buClr>
+                <a:schemeClr val="bg1">
+                  <a:lumMod val="65000"/>
+                </a:schemeClr>
+              </a:buClr>
+              <a:buSzTx/>
+              <a:buFont typeface="Arial" pitchFamily="34" charset="0"/>
               <a:buNone/>
+              <a:tabLst/>
+              <a:defRPr/>
+            </a:pPr>
+            <a:r>
+              <a:rPr kumimoji="0" lang="pt-PT" sz="3600" b="0" i="0" u="none" strike="noStrike" kern="1200" cap="none" spc="0" normalizeH="0" baseline="0" noProof="0" dirty="0" smtClean="0">
+                <a:ln>
+                  <a:noFill/>
+                </a:ln>
+                <a:solidFill>
+                  <a:schemeClr val="tx1">
+                    <a:lumMod val="85000"/>
+                    <a:lumOff val="15000"/>
+                  </a:schemeClr>
+                </a:solidFill>
+                <a:effectLst/>
+                <a:uLnTx/>
+                <a:uFillTx/>
+                <a:latin typeface="MetaSerif-Book" pitchFamily="34" charset="0"/>
+                <a:ea typeface="+mn-ea"/>
+                <a:cs typeface="+mn-cs"/>
+              </a:rPr>
+              <a:t>Different degrees of variability achieved</a:t>
+            </a:r>
+          </a:p>
+          <a:p>
+            <a:pPr marL="342900" marR="0" lvl="0" indent="0" algn="l" defTabSz="914400" rtl="0" eaLnBrk="1" fontAlgn="auto" latinLnBrk="0" hangingPunct="1">
+              <a:lnSpc>
+                <a:spcPct val="110000"/>
+              </a:lnSpc>
+              <a:spcBef>
+                <a:spcPts val="0"/>
+              </a:spcBef>
+              <a:spcAft>
+                <a:spcPts val="0"/>
+              </a:spcAft>
+              <a:buClr>
+                <a:schemeClr val="bg1">
+                  <a:lumMod val="65000"/>
+                </a:schemeClr>
+              </a:buClr>
+              <a:buSzTx/>
+              <a:buFont typeface="Arial" pitchFamily="34" charset="0"/>
+              <a:buNone/>
+              <a:tabLst/>
+              <a:defRPr/>
+            </a:pPr>
+            <a:endParaRPr lang="pt-PT" sz="3600" dirty="0" smtClean="0">
+              <a:solidFill>
+                <a:schemeClr val="tx1">
+                  <a:lumMod val="85000"/>
+                  <a:lumOff val="15000"/>
+                </a:schemeClr>
+              </a:solidFill>
+              <a:latin typeface="MetaSerif-Book" pitchFamily="34" charset="0"/>
+            </a:endParaRPr>
+          </a:p>
+          <a:p>
+            <a:pPr marL="342900">
+              <a:lnSpc>
+                <a:spcPct val="110000"/>
+              </a:lnSpc>
+              <a:buClr>
+                <a:schemeClr val="bg1">
+                  <a:lumMod val="65000"/>
+                </a:schemeClr>
+              </a:buClr>
             </a:pPr>
             <a:r>
               <a:rPr lang="pt-PT" sz="3600" dirty="0" smtClean="0">
@@ -11844,32 +12196,25 @@
                 </a:solidFill>
                 <a:latin typeface="MetaSerif-Book" pitchFamily="34" charset="0"/>
               </a:rPr>
-              <a:t>AOM architectures provide the best framework for building adaptable software systems</a:t>
-            </a:r>
-          </a:p>
-        </p:txBody>
-      </p:sp>
-      <p:sp>
-        <p:nvSpPr>
-          <p:cNvPr id="4" name="Slide Number Placeholder 3"/>
-          <p:cNvSpPr>
-            <a:spLocks noGrp="1"/>
-          </p:cNvSpPr>
-          <p:nvPr>
-            <p:ph type="sldNum" sz="quarter" idx="12"/>
-          </p:nvPr>
-        </p:nvSpPr>
-        <p:spPr/>
-        <p:txBody>
-          <a:bodyPr/>
-          <a:lstStyle/>
-          <a:p>
-            <a:fld id="{AF2DD60D-AE1E-4B35-90D2-0ABAEDD7A6F5}" type="slidenum">
-              <a:rPr lang="pt-PT" smtClean="0"/>
-              <a:pPr/>
-              <a:t>39</a:t>
-            </a:fld>
-            <a:endParaRPr lang="pt-PT" dirty="0"/>
+              <a:t>Rails MVC architecture and conventions may be an obstacle to highly-variable systems</a:t>
+            </a:r>
+            <a:endParaRPr kumimoji="0" lang="pt-PT" sz="3600" b="0" i="0" u="none" strike="noStrike" kern="1200" cap="none" spc="0" normalizeH="0" baseline="0" noProof="0" dirty="0" smtClean="0">
+              <a:ln>
+                <a:noFill/>
+              </a:ln>
+              <a:solidFill>
+                <a:schemeClr val="tx1">
+                  <a:lumMod val="85000"/>
+                  <a:lumOff val="15000"/>
+                </a:schemeClr>
+              </a:solidFill>
+              <a:effectLst/>
+              <a:uLnTx/>
+              <a:uFillTx/>
+              <a:latin typeface="MetaSerif-Book" pitchFamily="34" charset="0"/>
+              <a:ea typeface="+mn-ea"/>
+              <a:cs typeface="+mn-cs"/>
+            </a:endParaRPr>
           </a:p>
         </p:txBody>
       </p:sp>
@@ -12092,7 +12437,7 @@
                 </a:solidFill>
                 <a:latin typeface="League Gothic" pitchFamily="50" charset="0"/>
               </a:rPr>
-              <a:t>Variability</a:t>
+              <a:t>Rails, MVC &amp; AOMs</a:t>
             </a:r>
             <a:endParaRPr lang="pt-PT" sz="3200" dirty="0">
               <a:solidFill>
@@ -12105,45 +12450,19 @@
       </p:sp>
       <p:sp>
         <p:nvSpPr>
-          <p:cNvPr id="4" name="Slide Number Placeholder 3"/>
-          <p:cNvSpPr>
-            <a:spLocks noGrp="1"/>
-          </p:cNvSpPr>
-          <p:nvPr>
-            <p:ph type="sldNum" sz="quarter" idx="12"/>
-          </p:nvPr>
-        </p:nvSpPr>
-        <p:spPr/>
-        <p:txBody>
-          <a:bodyPr/>
-          <a:lstStyle/>
-          <a:p>
-            <a:fld id="{AF2DD60D-AE1E-4B35-90D2-0ABAEDD7A6F5}" type="slidenum">
-              <a:rPr lang="pt-PT" smtClean="0"/>
-              <a:pPr/>
-              <a:t>40</a:t>
-            </a:fld>
-            <a:endParaRPr lang="pt-PT" dirty="0"/>
-          </a:p>
-        </p:txBody>
-      </p:sp>
-      <p:sp>
-        <p:nvSpPr>
-          <p:cNvPr id="5" name="Content Placeholder 2"/>
-          <p:cNvSpPr txBox="1">
-            <a:spLocks/>
-          </p:cNvSpPr>
-          <p:nvPr/>
+          <p:cNvPr id="3" name="Content Placeholder 2"/>
+          <p:cNvSpPr>
+            <a:spLocks noGrp="1"/>
+          </p:cNvSpPr>
+          <p:nvPr>
+            <p:ph idx="1"/>
+          </p:nvPr>
         </p:nvSpPr>
         <p:spPr>
           <a:xfrm>
             <a:off x="457200" y="1124744"/>
             <a:ext cx="8229600" cy="5040560"/>
           </a:xfrm>
-          <a:prstGeom prst="rect">
-            <a:avLst/>
-          </a:prstGeom>
-          <a:noFill/>
           <a:effectLst>
             <a:outerShdw blurRad="50800" dist="25400" dir="2700000" algn="tl" rotWithShape="0">
               <a:prstClr val="black">
@@ -12153,95 +12472,19 @@
           </a:effectLst>
         </p:spPr>
         <p:txBody>
-          <a:bodyPr vert="horz" lIns="91440" tIns="45720" rIns="91440" bIns="45720" rtlCol="0" anchor="ctr" anchorCtr="1">
+          <a:bodyPr anchor="ctr" anchorCtr="1">
             <a:normAutofit/>
           </a:bodyPr>
           <a:lstStyle/>
           <a:p>
-            <a:pPr marL="342900" marR="0" lvl="0" indent="0" algn="l" defTabSz="914400" rtl="0" eaLnBrk="1" fontAlgn="auto" latinLnBrk="0" hangingPunct="1">
+            <a:pPr indent="0">
               <a:lnSpc>
                 <a:spcPct val="110000"/>
               </a:lnSpc>
               <a:spcBef>
                 <a:spcPts val="0"/>
               </a:spcBef>
-              <a:spcAft>
-                <a:spcPts val="0"/>
-              </a:spcAft>
-              <a:buClr>
-                <a:schemeClr val="bg1">
-                  <a:lumMod val="65000"/>
-                </a:schemeClr>
-              </a:buClr>
-              <a:buSzTx/>
-              <a:buFont typeface="Arial" pitchFamily="34" charset="0"/>
               <a:buNone/>
-              <a:tabLst/>
-              <a:defRPr/>
-            </a:pPr>
-            <a:r>
-              <a:rPr kumimoji="0" lang="pt-PT" sz="3600" b="0" i="0" u="none" strike="noStrike" kern="1200" cap="none" spc="0" normalizeH="0" baseline="0" noProof="0" dirty="0" smtClean="0">
-                <a:ln>
-                  <a:noFill/>
-                </a:ln>
-                <a:solidFill>
-                  <a:schemeClr val="tx1">
-                    <a:lumMod val="85000"/>
-                    <a:lumOff val="15000"/>
-                  </a:schemeClr>
-                </a:solidFill>
-                <a:effectLst/>
-                <a:uLnTx/>
-                <a:uFillTx/>
-                <a:latin typeface="MetaSerif-Book" pitchFamily="34" charset="0"/>
-                <a:ea typeface="+mn-ea"/>
-                <a:cs typeface="+mn-cs"/>
-              </a:rPr>
-              <a:t>Different degrees of variability achieved</a:t>
-            </a:r>
-          </a:p>
-          <a:p>
-            <a:pPr marL="342900" marR="0" lvl="0" indent="0" algn="l" defTabSz="914400" rtl="0" eaLnBrk="1" fontAlgn="auto" latinLnBrk="0" hangingPunct="1">
-              <a:lnSpc>
-                <a:spcPct val="110000"/>
-              </a:lnSpc>
-              <a:spcBef>
-                <a:spcPts val="0"/>
-              </a:spcBef>
-              <a:spcAft>
-                <a:spcPts val="0"/>
-              </a:spcAft>
-              <a:buClr>
-                <a:schemeClr val="bg1">
-                  <a:lumMod val="65000"/>
-                </a:schemeClr>
-              </a:buClr>
-              <a:buSzTx/>
-              <a:buFont typeface="Arial" pitchFamily="34" charset="0"/>
-              <a:buNone/>
-              <a:tabLst/>
-              <a:defRPr/>
-            </a:pPr>
-            <a:endParaRPr lang="pt-PT" sz="3600" dirty="0" smtClean="0">
-              <a:solidFill>
-                <a:schemeClr val="tx1">
-                  <a:lumMod val="85000"/>
-                  <a:lumOff val="15000"/>
-                </a:schemeClr>
-              </a:solidFill>
-              <a:latin typeface="MetaSerif-Book" pitchFamily="34" charset="0"/>
-            </a:endParaRPr>
-          </a:p>
-          <a:p>
-            <a:pPr marL="342900">
-              <a:lnSpc>
-                <a:spcPct val="110000"/>
-              </a:lnSpc>
-              <a:buClr>
-                <a:schemeClr val="bg1">
-                  <a:lumMod val="65000"/>
-                </a:schemeClr>
-              </a:buClr>
             </a:pPr>
             <a:r>
               <a:rPr lang="pt-PT" sz="3600" dirty="0" smtClean="0">
@@ -12253,25 +12496,32 @@
                 </a:solidFill>
                 <a:latin typeface="MetaSerif-Book" pitchFamily="34" charset="0"/>
               </a:rPr>
-              <a:t>Rails MVC architecture and conventions may be an obstacle to highly-variable systems</a:t>
-            </a:r>
-            <a:endParaRPr kumimoji="0" lang="pt-PT" sz="3600" b="0" i="0" u="none" strike="noStrike" kern="1200" cap="none" spc="0" normalizeH="0" baseline="0" noProof="0" dirty="0" smtClean="0">
-              <a:ln>
-                <a:noFill/>
-              </a:ln>
-              <a:solidFill>
-                <a:schemeClr val="tx1">
-                  <a:lumMod val="85000"/>
-                  <a:lumOff val="15000"/>
-                </a:schemeClr>
-              </a:solidFill>
-              <a:effectLst/>
-              <a:uLnTx/>
-              <a:uFillTx/>
-              <a:latin typeface="MetaSerif-Book" pitchFamily="34" charset="0"/>
-              <a:ea typeface="+mn-ea"/>
-              <a:cs typeface="+mn-cs"/>
-            </a:endParaRPr>
+              <a:t>MVC architecture used by Rails can coexist harmoniously with AOM design patterns, especially with the AR engine</a:t>
+            </a:r>
+          </a:p>
+        </p:txBody>
+      </p:sp>
+      <p:sp>
+        <p:nvSpPr>
+          <p:cNvPr id="4" name="Slide Number Placeholder 3"/>
+          <p:cNvSpPr>
+            <a:spLocks noGrp="1"/>
+          </p:cNvSpPr>
+          <p:nvPr>
+            <p:ph type="sldNum" sz="quarter" idx="12"/>
+          </p:nvPr>
+        </p:nvSpPr>
+        <p:spPr/>
+        <p:txBody>
+          <a:bodyPr/>
+          <a:lstStyle/>
+          <a:p>
+            <a:fld id="{AF2DD60D-AE1E-4B35-90D2-0ABAEDD7A6F5}" type="slidenum">
+              <a:rPr lang="pt-PT" smtClean="0"/>
+              <a:pPr/>
+              <a:t>40</a:t>
+            </a:fld>
+            <a:endParaRPr lang="pt-PT" dirty="0"/>
           </a:p>
         </p:txBody>
       </p:sp>
@@ -12342,7 +12592,7 @@
                 </a:solidFill>
                 <a:latin typeface="League Gothic" pitchFamily="50" charset="0"/>
               </a:rPr>
-              <a:t>Rails, MVC &amp; AOMs</a:t>
+              <a:t>Performance</a:t>
             </a:r>
             <a:endParaRPr lang="pt-PT" sz="3200" dirty="0">
               <a:solidFill>
@@ -12401,7 +12651,7 @@
                 </a:solidFill>
                 <a:latin typeface="MetaSerif-Book" pitchFamily="34" charset="0"/>
               </a:rPr>
-              <a:t>MVC architecture used by Rails can coexist harmoniously with AOM design patterns, especially with the AR engine</a:t>
+              <a:t>Performance can be increased – depending on previous design</a:t>
             </a:r>
           </a:p>
         </p:txBody>
@@ -12446,161 +12696,6 @@
 </file>
 
 <file path=ppt/slides/slide42.xml><?xml version="1.0" encoding="utf-8"?>
-<p:sld xmlns:a="http://schemas.openxmlformats.org/drawingml/2006/main" xmlns:r="http://schemas.openxmlformats.org/officeDocument/2006/relationships" xmlns:p="http://schemas.openxmlformats.org/presentationml/2006/main">
-  <p:cSld>
-    <p:spTree>
-      <p:nvGrpSpPr>
-        <p:cNvPr id="1" name=""/>
-        <p:cNvGrpSpPr/>
-        <p:nvPr/>
-      </p:nvGrpSpPr>
-      <p:grpSpPr>
-        <a:xfrm>
-          <a:off x="0" y="0"/>
-          <a:ext cx="0" cy="0"/>
-          <a:chOff x="0" y="0"/>
-          <a:chExt cx="0" cy="0"/>
-        </a:xfrm>
-      </p:grpSpPr>
-      <p:sp>
-        <p:nvSpPr>
-          <p:cNvPr id="2" name="Title 1"/>
-          <p:cNvSpPr>
-            <a:spLocks noGrp="1"/>
-          </p:cNvSpPr>
-          <p:nvPr>
-            <p:ph type="title"/>
-          </p:nvPr>
-        </p:nvSpPr>
-        <p:spPr>
-          <a:xfrm>
-            <a:off x="4464000" y="188640"/>
-            <a:ext cx="4680000" cy="706090"/>
-          </a:xfrm>
-          <a:solidFill>
-            <a:schemeClr val="tx1">
-              <a:alpha val="90000"/>
-            </a:schemeClr>
-          </a:solidFill>
-        </p:spPr>
-        <p:txBody>
-          <a:bodyPr rIns="144000">
-            <a:normAutofit/>
-          </a:bodyPr>
-          <a:lstStyle/>
-          <a:p>
-            <a:pPr algn="r"/>
-            <a:r>
-              <a:rPr lang="pt-PT" sz="3200" dirty="0" smtClean="0">
-                <a:solidFill>
-                  <a:schemeClr val="bg1"/>
-                </a:solidFill>
-                <a:latin typeface="League Gothic" pitchFamily="50" charset="0"/>
-              </a:rPr>
-              <a:t>Performance</a:t>
-            </a:r>
-            <a:endParaRPr lang="pt-PT" sz="3200" dirty="0">
-              <a:solidFill>
-                <a:schemeClr val="bg1"/>
-              </a:solidFill>
-              <a:latin typeface="League Gothic" pitchFamily="50" charset="0"/>
-            </a:endParaRPr>
-          </a:p>
-        </p:txBody>
-      </p:sp>
-      <p:sp>
-        <p:nvSpPr>
-          <p:cNvPr id="3" name="Content Placeholder 2"/>
-          <p:cNvSpPr>
-            <a:spLocks noGrp="1"/>
-          </p:cNvSpPr>
-          <p:nvPr>
-            <p:ph idx="1"/>
-          </p:nvPr>
-        </p:nvSpPr>
-        <p:spPr>
-          <a:xfrm>
-            <a:off x="457200" y="1124744"/>
-            <a:ext cx="8229600" cy="5040560"/>
-          </a:xfrm>
-          <a:effectLst>
-            <a:outerShdw blurRad="50800" dist="25400" dir="2700000" algn="tl" rotWithShape="0">
-              <a:prstClr val="black">
-                <a:alpha val="15000"/>
-              </a:prstClr>
-            </a:outerShdw>
-          </a:effectLst>
-        </p:spPr>
-        <p:txBody>
-          <a:bodyPr anchor="ctr" anchorCtr="1">
-            <a:normAutofit/>
-          </a:bodyPr>
-          <a:lstStyle/>
-          <a:p>
-            <a:pPr indent="0">
-              <a:lnSpc>
-                <a:spcPct val="110000"/>
-              </a:lnSpc>
-              <a:spcBef>
-                <a:spcPts val="0"/>
-              </a:spcBef>
-              <a:buNone/>
-            </a:pPr>
-            <a:r>
-              <a:rPr lang="pt-PT" sz="3600" dirty="0" smtClean="0">
-                <a:solidFill>
-                  <a:schemeClr val="tx1">
-                    <a:lumMod val="85000"/>
-                    <a:lumOff val="15000"/>
-                  </a:schemeClr>
-                </a:solidFill>
-                <a:latin typeface="MetaSerif-Book" pitchFamily="34" charset="0"/>
-              </a:rPr>
-              <a:t>Performance can be increased – depending on previous design</a:t>
-            </a:r>
-          </a:p>
-        </p:txBody>
-      </p:sp>
-      <p:sp>
-        <p:nvSpPr>
-          <p:cNvPr id="4" name="Slide Number Placeholder 3"/>
-          <p:cNvSpPr>
-            <a:spLocks noGrp="1"/>
-          </p:cNvSpPr>
-          <p:nvPr>
-            <p:ph type="sldNum" sz="quarter" idx="12"/>
-          </p:nvPr>
-        </p:nvSpPr>
-        <p:spPr/>
-        <p:txBody>
-          <a:bodyPr/>
-          <a:lstStyle/>
-          <a:p>
-            <a:fld id="{AF2DD60D-AE1E-4B35-90D2-0ABAEDD7A6F5}" type="slidenum">
-              <a:rPr lang="pt-PT" smtClean="0"/>
-              <a:pPr/>
-              <a:t>42</a:t>
-            </a:fld>
-            <a:endParaRPr lang="pt-PT" dirty="0"/>
-          </a:p>
-        </p:txBody>
-      </p:sp>
-    </p:spTree>
-  </p:cSld>
-  <p:clrMapOvr>
-    <a:masterClrMapping/>
-  </p:clrMapOvr>
-  <p:timing>
-    <p:tnLst>
-      <p:par>
-        <p:cTn id="1" dur="indefinite" restart="never" nodeType="tmRoot"/>
-      </p:par>
-    </p:tnLst>
-  </p:timing>
-</p:sld>
-</file>
-
-<file path=ppt/slides/slide43.xml><?xml version="1.0" encoding="utf-8"?>
 <p:sld xmlns:a="http://schemas.openxmlformats.org/drawingml/2006/main" xmlns:r="http://schemas.openxmlformats.org/officeDocument/2006/relationships" xmlns:p="http://schemas.openxmlformats.org/presentationml/2006/main">
   <p:cSld>
     <p:spTree>
@@ -12704,7 +12799,7 @@
 </p:sld>
 </file>
 
-<file path=ppt/slides/slide44.xml><?xml version="1.0" encoding="utf-8"?>
+<file path=ppt/slides/slide43.xml><?xml version="1.0" encoding="utf-8"?>
 <p:sld xmlns:a="http://schemas.openxmlformats.org/drawingml/2006/main" xmlns:r="http://schemas.openxmlformats.org/officeDocument/2006/relationships" xmlns:p="http://schemas.openxmlformats.org/presentationml/2006/main">
   <p:cSld>
     <p:spTree>
@@ -12881,7 +12976,7 @@
             <a:fld id="{AF2DD60D-AE1E-4B35-90D2-0ABAEDD7A6F5}" type="slidenum">
               <a:rPr lang="pt-PT" smtClean="0"/>
               <a:pPr/>
-              <a:t>44</a:t>
+              <a:t>43</a:t>
             </a:fld>
             <a:endParaRPr lang="pt-PT" dirty="0"/>
           </a:p>
@@ -12902,7 +12997,7 @@
 </p:sld>
 </file>
 
-<file path=ppt/slides/slide45.xml><?xml version="1.0" encoding="utf-8"?>
+<file path=ppt/slides/slide44.xml><?xml version="1.0" encoding="utf-8"?>
 <p:sld xmlns:a="http://schemas.openxmlformats.org/drawingml/2006/main" xmlns:r="http://schemas.openxmlformats.org/officeDocument/2006/relationships" xmlns:p="http://schemas.openxmlformats.org/presentationml/2006/main">
   <p:cSld>
     <p:spTree>
@@ -13079,7 +13174,7 @@
             <a:fld id="{AF2DD60D-AE1E-4B35-90D2-0ABAEDD7A6F5}" type="slidenum">
               <a:rPr lang="pt-PT" smtClean="0"/>
               <a:pPr/>
-              <a:t>45</a:t>
+              <a:t>44</a:t>
             </a:fld>
             <a:endParaRPr lang="pt-PT" dirty="0"/>
           </a:p>
@@ -13100,7 +13195,7 @@
 </p:sld>
 </file>
 
-<file path=ppt/slides/slide46.xml><?xml version="1.0" encoding="utf-8"?>
+<file path=ppt/slides/slide45.xml><?xml version="1.0" encoding="utf-8"?>
 <p:sld xmlns:a="http://schemas.openxmlformats.org/drawingml/2006/main" xmlns:r="http://schemas.openxmlformats.org/officeDocument/2006/relationships" xmlns:p="http://schemas.openxmlformats.org/presentationml/2006/main">
   <p:cSld>
     <p:spTree>

</xml_diff>

<commit_message>
Some tweaks after reharsal presentations
</commit_message>
<xml_diff>
--- a/presentations/jgradim-presentation.pptx
+++ b/presentations/jgradim-presentation.pptx
@@ -5,7 +5,7 @@
     <p:sldMasterId id="2147483648" r:id="rId1"/>
   </p:sldMasterIdLst>
   <p:notesMasterIdLst>
-    <p:notesMasterId r:id="rId47"/>
+    <p:notesMasterId r:id="rId48"/>
   </p:notesMasterIdLst>
   <p:sldIdLst>
     <p:sldId id="256" r:id="rId2"/>
@@ -39,20 +39,21 @@
     <p:sldId id="289" r:id="rId30"/>
     <p:sldId id="301" r:id="rId31"/>
     <p:sldId id="303" r:id="rId32"/>
-    <p:sldId id="286" r:id="rId33"/>
-    <p:sldId id="291" r:id="rId34"/>
-    <p:sldId id="295" r:id="rId35"/>
-    <p:sldId id="296" r:id="rId36"/>
-    <p:sldId id="294" r:id="rId37"/>
-    <p:sldId id="259" r:id="rId38"/>
-    <p:sldId id="279" r:id="rId39"/>
-    <p:sldId id="269" r:id="rId40"/>
-    <p:sldId id="264" r:id="rId41"/>
-    <p:sldId id="270" r:id="rId42"/>
-    <p:sldId id="266" r:id="rId43"/>
-    <p:sldId id="267" r:id="rId44"/>
-    <p:sldId id="268" r:id="rId45"/>
-    <p:sldId id="297" r:id="rId46"/>
+    <p:sldId id="304" r:id="rId33"/>
+    <p:sldId id="286" r:id="rId34"/>
+    <p:sldId id="291" r:id="rId35"/>
+    <p:sldId id="295" r:id="rId36"/>
+    <p:sldId id="296" r:id="rId37"/>
+    <p:sldId id="294" r:id="rId38"/>
+    <p:sldId id="259" r:id="rId39"/>
+    <p:sldId id="279" r:id="rId40"/>
+    <p:sldId id="269" r:id="rId41"/>
+    <p:sldId id="264" r:id="rId42"/>
+    <p:sldId id="270" r:id="rId43"/>
+    <p:sldId id="266" r:id="rId44"/>
+    <p:sldId id="267" r:id="rId45"/>
+    <p:sldId id="268" r:id="rId46"/>
+    <p:sldId id="297" r:id="rId47"/>
   </p:sldIdLst>
   <p:sldSz cx="9144000" cy="6858000" type="screen4x3"/>
   <p:notesSz cx="6858000" cy="9144000"/>
@@ -564,15 +565,7 @@
           <a:p>
             <a:r>
               <a:rPr lang="pt-PT" baseline="0" dirty="0" smtClean="0"/>
-              <a:t>Passaria de imediato </a:t>
-            </a:r>
-            <a:r>
-              <a:rPr lang="pt-PT" baseline="0" dirty="0" smtClean="0"/>
-              <a:t>a apresentar o </a:t>
-            </a:r>
-            <a:r>
-              <a:rPr lang="pt-PT" baseline="0" dirty="0" smtClean="0"/>
-              <a:t>trabalho de dissertação que realizei, intitulado “Improving Variability of Applications using Adaptive Object-Models”</a:t>
+              <a:t>Passaria de imediato a apresentar o trabalho de dissertação que realizei, intitulado “Improving Variability of Applications using Adaptive Object-Models”</a:t>
             </a:r>
           </a:p>
           <a:p>
@@ -666,14 +659,14 @@
           <a:lstStyle/>
           <a:p>
             <a:r>
-              <a:rPr lang="pt-PT" smtClean="0"/>
-              <a:t>Role-Object</a:t>
-            </a:r>
-            <a:r>
-              <a:rPr lang="pt-PT" baseline="0" smtClean="0"/>
-              <a:t> Pattern</a:t>
-            </a:r>
-            <a:endParaRPr lang="pt-PT"/>
+              <a:rPr lang="pt-PT" dirty="0" smtClean="0"/>
+              <a:t>AOM,</a:t>
+            </a:r>
+            <a:r>
+              <a:rPr lang="pt-PT" baseline="0" dirty="0" smtClean="0"/>
+              <a:t> ou adaptive object models. Uma arquitectura; aliás, meta-arquitectura AOM é uma composição de padrões de desenho (tal como aqui exemplificado) especialmente concebidos para uma evolução constante dos sistemas a que servem de infra-estrutura</a:t>
+            </a:r>
+            <a:endParaRPr lang="pt-PT" dirty="0"/>
           </a:p>
         </p:txBody>
       </p:sp>
@@ -695,7 +688,7 @@
             <a:fld id="{EE5867BE-386C-4D16-9B1D-8635FC172DF2}" type="slidenum">
               <a:rPr lang="pt-PT" smtClean="0"/>
               <a:pPr/>
-              <a:t>19</a:t>
+              <a:t>13</a:t>
             </a:fld>
             <a:endParaRPr lang="pt-PT"/>
           </a:p>
@@ -757,7 +750,50 @@
           <a:p>
             <a:r>
               <a:rPr lang="pt-PT" dirty="0" smtClean="0"/>
-              <a:t>Ligações entre utilizadores, turmas, e escolas</a:t>
+              <a:t>Este tipo de arquitecturas são normalmente desenhadas em 3 níveis,</a:t>
+            </a:r>
+            <a:r>
+              <a:rPr lang="pt-PT" baseline="0" dirty="0" smtClean="0"/>
+              <a:t> MO, M1 e M2</a:t>
+            </a:r>
+          </a:p>
+          <a:p>
+            <a:endParaRPr lang="pt-PT" baseline="0" dirty="0" smtClean="0"/>
+          </a:p>
+          <a:p>
+            <a:r>
+              <a:rPr lang="pt-PT" baseline="0" dirty="0" smtClean="0"/>
+              <a:t>Explicar as associações em runtime, começando por M2</a:t>
+            </a:r>
+          </a:p>
+          <a:p>
+            <a:endParaRPr lang="pt-PT" baseline="0" dirty="0" smtClean="0"/>
+          </a:p>
+          <a:p>
+            <a:r>
+              <a:rPr lang="pt-PT" baseline="0" dirty="0" smtClean="0"/>
+              <a:t>M2 – infraestrutura</a:t>
+            </a:r>
+          </a:p>
+          <a:p>
+            <a:r>
+              <a:rPr lang="pt-PT" baseline="0" dirty="0" smtClean="0"/>
+              <a:t>M1 – definição do sistema</a:t>
+            </a:r>
+          </a:p>
+          <a:p>
+            <a:r>
+              <a:rPr lang="pt-PT" baseline="0" dirty="0" smtClean="0"/>
+              <a:t>M0 – dados, camada operacional</a:t>
+            </a:r>
+          </a:p>
+          <a:p>
+            <a:endParaRPr lang="pt-PT" baseline="0" dirty="0" smtClean="0"/>
+          </a:p>
+          <a:p>
+            <a:r>
+              <a:rPr lang="pt-PT" baseline="0" dirty="0" smtClean="0"/>
+              <a:t>Estabelecer uma analogia com ferramentas de programação visual / descrição de sistemas</a:t>
             </a:r>
             <a:endParaRPr lang="pt-PT" dirty="0"/>
           </a:p>
@@ -781,7 +817,7 @@
             <a:fld id="{EE5867BE-386C-4D16-9B1D-8635FC172DF2}" type="slidenum">
               <a:rPr lang="pt-PT" smtClean="0"/>
               <a:pPr/>
-              <a:t>23</a:t>
+              <a:t>14</a:t>
             </a:fld>
             <a:endParaRPr lang="pt-PT"/>
           </a:p>
@@ -843,11 +879,11 @@
           <a:p>
             <a:r>
               <a:rPr lang="pt-PT" dirty="0" smtClean="0"/>
-              <a:t>1 – without any effort</a:t>
+              <a:t>Tendo estes conhecimentos e técnicas, vejamos o que é que foi então feito para atacar o problema e tornar o escolinhas o mais ágil e adaptavel à constante</a:t>
             </a:r>
             <a:r>
               <a:rPr lang="pt-PT" baseline="0" dirty="0" smtClean="0"/>
-              <a:t> and without polluting the codebase with hardcoded exceptions</a:t>
+              <a:t> evolução que sofre.</a:t>
             </a:r>
             <a:endParaRPr lang="pt-PT" dirty="0"/>
           </a:p>
@@ -871,7 +907,7 @@
             <a:fld id="{EE5867BE-386C-4D16-9B1D-8635FC172DF2}" type="slidenum">
               <a:rPr lang="pt-PT" smtClean="0"/>
               <a:pPr/>
-              <a:t>26</a:t>
+              <a:t>15</a:t>
             </a:fld>
             <a:endParaRPr lang="pt-PT"/>
           </a:p>
@@ -933,11 +969,46 @@
           <a:p>
             <a:r>
               <a:rPr lang="pt-PT" dirty="0" smtClean="0"/>
-              <a:t>Edge case: 715</a:t>
+              <a:t>Explicar o processo de estudo,</a:t>
             </a:r>
             <a:r>
               <a:rPr lang="pt-PT" baseline="0" dirty="0" smtClean="0"/>
-              <a:t> contacts = 5724 queries</a:t>
+              <a:t> como é que a plataforma foi estudada, etc</a:t>
+            </a:r>
+            <a:endParaRPr lang="pt-PT" dirty="0" smtClean="0"/>
+          </a:p>
+          <a:p>
+            <a:endParaRPr lang="pt-PT" dirty="0" smtClean="0"/>
+          </a:p>
+          <a:p>
+            <a:r>
+              <a:rPr lang="pt-PT" dirty="0" smtClean="0"/>
+              <a:t>Foram então escolhidas</a:t>
+            </a:r>
+            <a:r>
+              <a:rPr lang="pt-PT" baseline="0" dirty="0" smtClean="0"/>
+              <a:t> 3 áreas:</a:t>
+            </a:r>
+          </a:p>
+          <a:p>
+            <a:endParaRPr lang="pt-PT" baseline="0" dirty="0" smtClean="0"/>
+          </a:p>
+          <a:p>
+            <a:r>
+              <a:rPr lang="pt-PT" baseline="0" dirty="0" smtClean="0"/>
+              <a:t>  * papeis de utilizadores</a:t>
+            </a:r>
+          </a:p>
+          <a:p>
+            <a:r>
+              <a:rPr lang="pt-PT" baseline="0" dirty="0" smtClean="0"/>
+              <a:t>  * rede social</a:t>
+            </a:r>
+          </a:p>
+          <a:p>
+            <a:r>
+              <a:rPr lang="pt-PT" baseline="0" dirty="0" smtClean="0"/>
+              <a:t>  * editor de documentos</a:t>
             </a:r>
             <a:endParaRPr lang="pt-PT" dirty="0"/>
           </a:p>
@@ -961,7 +1032,7 @@
             <a:fld id="{EE5867BE-386C-4D16-9B1D-8635FC172DF2}" type="slidenum">
               <a:rPr lang="pt-PT" smtClean="0"/>
               <a:pPr/>
-              <a:t>27</a:t>
+              <a:t>16</a:t>
             </a:fld>
             <a:endParaRPr lang="pt-PT"/>
           </a:p>
@@ -1022,10 +1093,14 @@
           <a:lstStyle/>
           <a:p>
             <a:r>
-              <a:rPr lang="pt-PT" dirty="0" smtClean="0"/>
-              <a:t>Uma das funcionalidades mais usadas da plataforma</a:t>
-            </a:r>
-            <a:endParaRPr lang="pt-PT" dirty="0"/>
+              <a:rPr lang="pt-PT" smtClean="0"/>
+              <a:t>Role-Object</a:t>
+            </a:r>
+            <a:r>
+              <a:rPr lang="pt-PT" baseline="0" smtClean="0"/>
+              <a:t> Pattern</a:t>
+            </a:r>
+            <a:endParaRPr lang="pt-PT"/>
           </a:p>
         </p:txBody>
       </p:sp>
@@ -1047,7 +1122,7 @@
             <a:fld id="{EE5867BE-386C-4D16-9B1D-8635FC172DF2}" type="slidenum">
               <a:rPr lang="pt-PT" smtClean="0"/>
               <a:pPr/>
-              <a:t>28</a:t>
+              <a:t>19</a:t>
             </a:fld>
             <a:endParaRPr lang="pt-PT"/>
           </a:p>
@@ -1107,61 +1182,9 @@
           </a:bodyPr>
           <a:lstStyle/>
           <a:p>
-            <a:pPr marL="0" marR="0" indent="0" algn="l" defTabSz="914400" rtl="0" eaLnBrk="1" fontAlgn="auto" latinLnBrk="0" hangingPunct="1">
-              <a:lnSpc>
-                <a:spcPct val="100000"/>
-              </a:lnSpc>
-              <a:spcBef>
-                <a:spcPts val="0"/>
-              </a:spcBef>
-              <a:spcAft>
-                <a:spcPts val="0"/>
-              </a:spcAft>
-              <a:buClrTx/>
-              <a:buSzTx/>
-              <a:buFontTx/>
-              <a:buNone/>
-              <a:tabLst/>
-              <a:defRPr/>
-            </a:pPr>
-            <a:r>
-              <a:rPr lang="pt-PT" smtClean="0"/>
-              <a:t>Na sua forma mais básica, um documento é composto</a:t>
-            </a:r>
-            <a:r>
-              <a:rPr lang="pt-PT" baseline="0" smtClean="0"/>
-              <a:t> por um título e uma série de blocos ordenáveis que podem conter diferentes tipos de conteúdos</a:t>
-            </a:r>
-            <a:endParaRPr lang="pt-PT" smtClean="0"/>
-          </a:p>
-          <a:p>
-            <a:endParaRPr lang="pt-PT" smtClean="0"/>
-          </a:p>
-          <a:p>
             <a:r>
               <a:rPr lang="pt-PT" dirty="0" smtClean="0"/>
-              <a:t>Iniciais:</a:t>
-            </a:r>
-          </a:p>
-          <a:p>
-            <a:endParaRPr lang="pt-PT" dirty="0" smtClean="0"/>
-          </a:p>
-          <a:p>
-            <a:r>
-              <a:rPr lang="pt-PT" baseline="0" dirty="0" smtClean="0"/>
-              <a:t>  * Paragraph</a:t>
-            </a:r>
-          </a:p>
-          <a:p>
-            <a:r>
-              <a:rPr lang="pt-PT" baseline="0" dirty="0" smtClean="0"/>
-              <a:t>  * Drawing</a:t>
-            </a:r>
-          </a:p>
-          <a:p>
-            <a:r>
-              <a:rPr lang="pt-PT" baseline="0" dirty="0" smtClean="0"/>
-              <a:t>  * ImageDocument</a:t>
+              <a:t>Ligações entre utilizadores, turmas, e escolas</a:t>
             </a:r>
             <a:endParaRPr lang="pt-PT" dirty="0"/>
           </a:p>
@@ -1185,7 +1208,7 @@
             <a:fld id="{EE5867BE-386C-4D16-9B1D-8635FC172DF2}" type="slidenum">
               <a:rPr lang="pt-PT" smtClean="0"/>
               <a:pPr/>
-              <a:t>29</a:t>
+              <a:t>23</a:t>
             </a:fld>
             <a:endParaRPr lang="pt-PT"/>
           </a:p>
@@ -1247,7 +1270,11 @@
           <a:p>
             <a:r>
               <a:rPr lang="pt-PT" dirty="0" smtClean="0"/>
-              <a:t>Property</a:t>
+              <a:t>1 – without any effort</a:t>
+            </a:r>
+            <a:r>
+              <a:rPr lang="pt-PT" baseline="0" dirty="0" smtClean="0"/>
+              <a:t> and without polluting the codebase with hardcoded exceptions</a:t>
             </a:r>
             <a:endParaRPr lang="pt-PT" dirty="0"/>
           </a:p>
@@ -1271,7 +1298,7 @@
             <a:fld id="{EE5867BE-386C-4D16-9B1D-8635FC172DF2}" type="slidenum">
               <a:rPr lang="pt-PT" smtClean="0"/>
               <a:pPr/>
-              <a:t>30</a:t>
+              <a:t>26</a:t>
             </a:fld>
             <a:endParaRPr lang="pt-PT"/>
           </a:p>
@@ -1333,9 +1360,30 @@
           <a:p>
             <a:r>
               <a:rPr lang="pt-PT" dirty="0" smtClean="0"/>
-              <a:t>System Memento</a:t>
-            </a:r>
-            <a:endParaRPr lang="pt-PT" dirty="0"/>
+              <a:t>Edge case: 715</a:t>
+            </a:r>
+            <a:r>
+              <a:rPr lang="pt-PT" baseline="0" dirty="0" smtClean="0"/>
+              <a:t> contacts = 5724 </a:t>
+            </a:r>
+            <a:r>
+              <a:rPr lang="pt-PT" baseline="0" dirty="0" smtClean="0"/>
+              <a:t>queries</a:t>
+            </a:r>
+          </a:p>
+          <a:p>
+            <a:endParaRPr lang="pt-PT" baseline="0" dirty="0" smtClean="0"/>
+          </a:p>
+          <a:p>
+            <a:r>
+              <a:rPr lang="pt-PT" baseline="0" dirty="0" smtClean="0"/>
+              <a:t>QUERIES PARA</a:t>
+            </a:r>
+            <a:r>
+              <a:rPr lang="pt-PT" sz="1600" b="1" baseline="0" dirty="0" smtClean="0"/>
+              <a:t> OBTER</a:t>
+            </a:r>
+            <a:endParaRPr lang="pt-PT" sz="1600" b="1" dirty="0"/>
           </a:p>
         </p:txBody>
       </p:sp>
@@ -1357,7 +1405,7 @@
             <a:fld id="{EE5867BE-386C-4D16-9B1D-8635FC172DF2}" type="slidenum">
               <a:rPr lang="pt-PT" smtClean="0"/>
               <a:pPr/>
-              <a:t>31</a:t>
+              <a:t>27</a:t>
             </a:fld>
             <a:endParaRPr lang="pt-PT"/>
           </a:p>
@@ -1417,6 +1465,626 @@
           </a:bodyPr>
           <a:lstStyle/>
           <a:p>
+            <a:r>
+              <a:rPr lang="pt-PT" dirty="0" smtClean="0"/>
+              <a:t>Uma das funcionalidades mais usadas da plataforma</a:t>
+            </a:r>
+            <a:endParaRPr lang="pt-PT" dirty="0"/>
+          </a:p>
+        </p:txBody>
+      </p:sp>
+      <p:sp>
+        <p:nvSpPr>
+          <p:cNvPr id="4" name="Slide Number Placeholder 3"/>
+          <p:cNvSpPr>
+            <a:spLocks noGrp="1"/>
+          </p:cNvSpPr>
+          <p:nvPr>
+            <p:ph type="sldNum" sz="quarter" idx="10"/>
+          </p:nvPr>
+        </p:nvSpPr>
+        <p:spPr/>
+        <p:txBody>
+          <a:bodyPr/>
+          <a:lstStyle/>
+          <a:p>
+            <a:fld id="{EE5867BE-386C-4D16-9B1D-8635FC172DF2}" type="slidenum">
+              <a:rPr lang="pt-PT" smtClean="0"/>
+              <a:pPr/>
+              <a:t>28</a:t>
+            </a:fld>
+            <a:endParaRPr lang="pt-PT"/>
+          </a:p>
+        </p:txBody>
+      </p:sp>
+    </p:spTree>
+  </p:cSld>
+  <p:clrMapOvr>
+    <a:masterClrMapping/>
+  </p:clrMapOvr>
+</p:notes>
+</file>
+
+<file path=ppt/notesSlides/notesSlide19.xml><?xml version="1.0" encoding="utf-8"?>
+<p:notes xmlns:a="http://schemas.openxmlformats.org/drawingml/2006/main" xmlns:r="http://schemas.openxmlformats.org/officeDocument/2006/relationships" xmlns:p="http://schemas.openxmlformats.org/presentationml/2006/main">
+  <p:cSld>
+    <p:spTree>
+      <p:nvGrpSpPr>
+        <p:cNvPr id="1" name=""/>
+        <p:cNvGrpSpPr/>
+        <p:nvPr/>
+      </p:nvGrpSpPr>
+      <p:grpSpPr>
+        <a:xfrm>
+          <a:off x="0" y="0"/>
+          <a:ext cx="0" cy="0"/>
+          <a:chOff x="0" y="0"/>
+          <a:chExt cx="0" cy="0"/>
+        </a:xfrm>
+      </p:grpSpPr>
+      <p:sp>
+        <p:nvSpPr>
+          <p:cNvPr id="2" name="Slide Image Placeholder 1"/>
+          <p:cNvSpPr>
+            <a:spLocks noGrp="1" noRot="1" noChangeAspect="1"/>
+          </p:cNvSpPr>
+          <p:nvPr>
+            <p:ph type="sldImg"/>
+          </p:nvPr>
+        </p:nvSpPr>
+        <p:spPr/>
+      </p:sp>
+      <p:sp>
+        <p:nvSpPr>
+          <p:cNvPr id="3" name="Notes Placeholder 2"/>
+          <p:cNvSpPr>
+            <a:spLocks noGrp="1"/>
+          </p:cNvSpPr>
+          <p:nvPr>
+            <p:ph type="body" idx="1"/>
+          </p:nvPr>
+        </p:nvSpPr>
+        <p:spPr/>
+        <p:txBody>
+          <a:bodyPr>
+            <a:normAutofit/>
+          </a:bodyPr>
+          <a:lstStyle/>
+          <a:p>
+            <a:pPr marL="0" marR="0" indent="0" algn="l" defTabSz="914400" rtl="0" eaLnBrk="1" fontAlgn="auto" latinLnBrk="0" hangingPunct="1">
+              <a:lnSpc>
+                <a:spcPct val="100000"/>
+              </a:lnSpc>
+              <a:spcBef>
+                <a:spcPts val="0"/>
+              </a:spcBef>
+              <a:spcAft>
+                <a:spcPts val="0"/>
+              </a:spcAft>
+              <a:buClrTx/>
+              <a:buSzTx/>
+              <a:buFontTx/>
+              <a:buNone/>
+              <a:tabLst/>
+              <a:defRPr/>
+            </a:pPr>
+            <a:r>
+              <a:rPr lang="pt-PT" dirty="0" smtClean="0"/>
+              <a:t>Na sua forma mais básica, um documento é composto</a:t>
+            </a:r>
+            <a:r>
+              <a:rPr lang="pt-PT" baseline="0" dirty="0" smtClean="0"/>
+              <a:t> por um título e uma série de blocos ordenáveis que podem conter diferentes tipos de conteúdos</a:t>
+            </a:r>
+            <a:endParaRPr lang="pt-PT" dirty="0" smtClean="0"/>
+          </a:p>
+          <a:p>
+            <a:endParaRPr lang="pt-PT" dirty="0" smtClean="0"/>
+          </a:p>
+          <a:p>
+            <a:r>
+              <a:rPr lang="pt-PT" dirty="0" smtClean="0"/>
+              <a:t>Iniciais:</a:t>
+            </a:r>
+          </a:p>
+          <a:p>
+            <a:endParaRPr lang="pt-PT" dirty="0" smtClean="0"/>
+          </a:p>
+          <a:p>
+            <a:r>
+              <a:rPr lang="pt-PT" baseline="0" dirty="0" smtClean="0"/>
+              <a:t>  * Paragraph</a:t>
+            </a:r>
+          </a:p>
+          <a:p>
+            <a:r>
+              <a:rPr lang="pt-PT" baseline="0" dirty="0" smtClean="0"/>
+              <a:t>  * Drawing</a:t>
+            </a:r>
+          </a:p>
+          <a:p>
+            <a:r>
+              <a:rPr lang="pt-PT" baseline="0" dirty="0" smtClean="0"/>
+              <a:t>  * ImageDocument</a:t>
+            </a:r>
+            <a:endParaRPr lang="pt-PT" dirty="0"/>
+          </a:p>
+        </p:txBody>
+      </p:sp>
+      <p:sp>
+        <p:nvSpPr>
+          <p:cNvPr id="4" name="Slide Number Placeholder 3"/>
+          <p:cNvSpPr>
+            <a:spLocks noGrp="1"/>
+          </p:cNvSpPr>
+          <p:nvPr>
+            <p:ph type="sldNum" sz="quarter" idx="10"/>
+          </p:nvPr>
+        </p:nvSpPr>
+        <p:spPr/>
+        <p:txBody>
+          <a:bodyPr/>
+          <a:lstStyle/>
+          <a:p>
+            <a:fld id="{EE5867BE-386C-4D16-9B1D-8635FC172DF2}" type="slidenum">
+              <a:rPr lang="pt-PT" smtClean="0"/>
+              <a:pPr/>
+              <a:t>29</a:t>
+            </a:fld>
+            <a:endParaRPr lang="pt-PT"/>
+          </a:p>
+        </p:txBody>
+      </p:sp>
+    </p:spTree>
+  </p:cSld>
+  <p:clrMapOvr>
+    <a:masterClrMapping/>
+  </p:clrMapOvr>
+</p:notes>
+</file>
+
+<file path=ppt/notesSlides/notesSlide2.xml><?xml version="1.0" encoding="utf-8"?>
+<p:notes xmlns:a="http://schemas.openxmlformats.org/drawingml/2006/main" xmlns:r="http://schemas.openxmlformats.org/officeDocument/2006/relationships" xmlns:p="http://schemas.openxmlformats.org/presentationml/2006/main">
+  <p:cSld>
+    <p:spTree>
+      <p:nvGrpSpPr>
+        <p:cNvPr id="1" name=""/>
+        <p:cNvGrpSpPr/>
+        <p:nvPr/>
+      </p:nvGrpSpPr>
+      <p:grpSpPr>
+        <a:xfrm>
+          <a:off x="0" y="0"/>
+          <a:ext cx="0" cy="0"/>
+          <a:chOff x="0" y="0"/>
+          <a:chExt cx="0" cy="0"/>
+        </a:xfrm>
+      </p:grpSpPr>
+      <p:sp>
+        <p:nvSpPr>
+          <p:cNvPr id="2" name="Slide Image Placeholder 1"/>
+          <p:cNvSpPr>
+            <a:spLocks noGrp="1" noRot="1" noChangeAspect="1"/>
+          </p:cNvSpPr>
+          <p:nvPr>
+            <p:ph type="sldImg"/>
+          </p:nvPr>
+        </p:nvSpPr>
+        <p:spPr/>
+      </p:sp>
+      <p:sp>
+        <p:nvSpPr>
+          <p:cNvPr id="3" name="Notes Placeholder 2"/>
+          <p:cNvSpPr>
+            <a:spLocks noGrp="1"/>
+          </p:cNvSpPr>
+          <p:nvPr>
+            <p:ph type="body" idx="1"/>
+          </p:nvPr>
+        </p:nvSpPr>
+        <p:spPr/>
+        <p:txBody>
+          <a:bodyPr>
+            <a:normAutofit/>
+          </a:bodyPr>
+          <a:lstStyle/>
+          <a:p>
+            <a:r>
+              <a:rPr lang="pt-PT" dirty="0" smtClean="0"/>
+              <a:t>Comçando então por expor o problema:</a:t>
+            </a:r>
+            <a:endParaRPr lang="pt-PT" dirty="0"/>
+          </a:p>
+        </p:txBody>
+      </p:sp>
+      <p:sp>
+        <p:nvSpPr>
+          <p:cNvPr id="4" name="Slide Number Placeholder 3"/>
+          <p:cNvSpPr>
+            <a:spLocks noGrp="1"/>
+          </p:cNvSpPr>
+          <p:nvPr>
+            <p:ph type="sldNum" sz="quarter" idx="10"/>
+          </p:nvPr>
+        </p:nvSpPr>
+        <p:spPr/>
+        <p:txBody>
+          <a:bodyPr/>
+          <a:lstStyle/>
+          <a:p>
+            <a:fld id="{EE5867BE-386C-4D16-9B1D-8635FC172DF2}" type="slidenum">
+              <a:rPr lang="pt-PT" smtClean="0"/>
+              <a:pPr/>
+              <a:t>2</a:t>
+            </a:fld>
+            <a:endParaRPr lang="pt-PT"/>
+          </a:p>
+        </p:txBody>
+      </p:sp>
+    </p:spTree>
+  </p:cSld>
+  <p:clrMapOvr>
+    <a:masterClrMapping/>
+  </p:clrMapOvr>
+</p:notes>
+</file>
+
+<file path=ppt/notesSlides/notesSlide20.xml><?xml version="1.0" encoding="utf-8"?>
+<p:notes xmlns:a="http://schemas.openxmlformats.org/drawingml/2006/main" xmlns:r="http://schemas.openxmlformats.org/officeDocument/2006/relationships" xmlns:p="http://schemas.openxmlformats.org/presentationml/2006/main">
+  <p:cSld>
+    <p:spTree>
+      <p:nvGrpSpPr>
+        <p:cNvPr id="1" name=""/>
+        <p:cNvGrpSpPr/>
+        <p:nvPr/>
+      </p:nvGrpSpPr>
+      <p:grpSpPr>
+        <a:xfrm>
+          <a:off x="0" y="0"/>
+          <a:ext cx="0" cy="0"/>
+          <a:chOff x="0" y="0"/>
+          <a:chExt cx="0" cy="0"/>
+        </a:xfrm>
+      </p:grpSpPr>
+      <p:sp>
+        <p:nvSpPr>
+          <p:cNvPr id="2" name="Slide Image Placeholder 1"/>
+          <p:cNvSpPr>
+            <a:spLocks noGrp="1" noRot="1" noChangeAspect="1"/>
+          </p:cNvSpPr>
+          <p:nvPr>
+            <p:ph type="sldImg"/>
+          </p:nvPr>
+        </p:nvSpPr>
+        <p:spPr/>
+      </p:sp>
+      <p:sp>
+        <p:nvSpPr>
+          <p:cNvPr id="3" name="Notes Placeholder 2"/>
+          <p:cNvSpPr>
+            <a:spLocks noGrp="1"/>
+          </p:cNvSpPr>
+          <p:nvPr>
+            <p:ph type="body" idx="1"/>
+          </p:nvPr>
+        </p:nvSpPr>
+        <p:spPr/>
+        <p:txBody>
+          <a:bodyPr>
+            <a:normAutofit/>
+          </a:bodyPr>
+          <a:lstStyle/>
+          <a:p>
+            <a:r>
+              <a:rPr lang="pt-PT" dirty="0" smtClean="0"/>
+              <a:t>Property</a:t>
+            </a:r>
+            <a:endParaRPr lang="pt-PT" dirty="0"/>
+          </a:p>
+        </p:txBody>
+      </p:sp>
+      <p:sp>
+        <p:nvSpPr>
+          <p:cNvPr id="4" name="Slide Number Placeholder 3"/>
+          <p:cNvSpPr>
+            <a:spLocks noGrp="1"/>
+          </p:cNvSpPr>
+          <p:nvPr>
+            <p:ph type="sldNum" sz="quarter" idx="10"/>
+          </p:nvPr>
+        </p:nvSpPr>
+        <p:spPr/>
+        <p:txBody>
+          <a:bodyPr/>
+          <a:lstStyle/>
+          <a:p>
+            <a:fld id="{EE5867BE-386C-4D16-9B1D-8635FC172DF2}" type="slidenum">
+              <a:rPr lang="pt-PT" smtClean="0"/>
+              <a:pPr/>
+              <a:t>30</a:t>
+            </a:fld>
+            <a:endParaRPr lang="pt-PT"/>
+          </a:p>
+        </p:txBody>
+      </p:sp>
+    </p:spTree>
+  </p:cSld>
+  <p:clrMapOvr>
+    <a:masterClrMapping/>
+  </p:clrMapOvr>
+</p:notes>
+</file>
+
+<file path=ppt/notesSlides/notesSlide21.xml><?xml version="1.0" encoding="utf-8"?>
+<p:notes xmlns:a="http://schemas.openxmlformats.org/drawingml/2006/main" xmlns:r="http://schemas.openxmlformats.org/officeDocument/2006/relationships" xmlns:p="http://schemas.openxmlformats.org/presentationml/2006/main">
+  <p:cSld>
+    <p:spTree>
+      <p:nvGrpSpPr>
+        <p:cNvPr id="1" name=""/>
+        <p:cNvGrpSpPr/>
+        <p:nvPr/>
+      </p:nvGrpSpPr>
+      <p:grpSpPr>
+        <a:xfrm>
+          <a:off x="0" y="0"/>
+          <a:ext cx="0" cy="0"/>
+          <a:chOff x="0" y="0"/>
+          <a:chExt cx="0" cy="0"/>
+        </a:xfrm>
+      </p:grpSpPr>
+      <p:sp>
+        <p:nvSpPr>
+          <p:cNvPr id="2" name="Slide Image Placeholder 1"/>
+          <p:cNvSpPr>
+            <a:spLocks noGrp="1" noRot="1" noChangeAspect="1"/>
+          </p:cNvSpPr>
+          <p:nvPr>
+            <p:ph type="sldImg"/>
+          </p:nvPr>
+        </p:nvSpPr>
+        <p:spPr/>
+      </p:sp>
+      <p:sp>
+        <p:nvSpPr>
+          <p:cNvPr id="3" name="Notes Placeholder 2"/>
+          <p:cNvSpPr>
+            <a:spLocks noGrp="1"/>
+          </p:cNvSpPr>
+          <p:nvPr>
+            <p:ph type="body" idx="1"/>
+          </p:nvPr>
+        </p:nvSpPr>
+        <p:spPr/>
+        <p:txBody>
+          <a:bodyPr>
+            <a:normAutofit/>
+          </a:bodyPr>
+          <a:lstStyle/>
+          <a:p>
+            <a:r>
+              <a:rPr lang="pt-PT" dirty="0" smtClean="0"/>
+              <a:t>System Memento</a:t>
+            </a:r>
+            <a:endParaRPr lang="pt-PT" dirty="0"/>
+          </a:p>
+        </p:txBody>
+      </p:sp>
+      <p:sp>
+        <p:nvSpPr>
+          <p:cNvPr id="4" name="Slide Number Placeholder 3"/>
+          <p:cNvSpPr>
+            <a:spLocks noGrp="1"/>
+          </p:cNvSpPr>
+          <p:nvPr>
+            <p:ph type="sldNum" sz="quarter" idx="10"/>
+          </p:nvPr>
+        </p:nvSpPr>
+        <p:spPr/>
+        <p:txBody>
+          <a:bodyPr/>
+          <a:lstStyle/>
+          <a:p>
+            <a:fld id="{EE5867BE-386C-4D16-9B1D-8635FC172DF2}" type="slidenum">
+              <a:rPr lang="pt-PT" smtClean="0"/>
+              <a:pPr/>
+              <a:t>31</a:t>
+            </a:fld>
+            <a:endParaRPr lang="pt-PT"/>
+          </a:p>
+        </p:txBody>
+      </p:sp>
+    </p:spTree>
+  </p:cSld>
+  <p:clrMapOvr>
+    <a:masterClrMapping/>
+  </p:clrMapOvr>
+</p:notes>
+</file>
+
+<file path=ppt/notesSlides/notesSlide22.xml><?xml version="1.0" encoding="utf-8"?>
+<p:notes xmlns:a="http://schemas.openxmlformats.org/drawingml/2006/main" xmlns:r="http://schemas.openxmlformats.org/officeDocument/2006/relationships" xmlns:p="http://schemas.openxmlformats.org/presentationml/2006/main">
+  <p:cSld>
+    <p:spTree>
+      <p:nvGrpSpPr>
+        <p:cNvPr id="1" name=""/>
+        <p:cNvGrpSpPr/>
+        <p:nvPr/>
+      </p:nvGrpSpPr>
+      <p:grpSpPr>
+        <a:xfrm>
+          <a:off x="0" y="0"/>
+          <a:ext cx="0" cy="0"/>
+          <a:chOff x="0" y="0"/>
+          <a:chExt cx="0" cy="0"/>
+        </a:xfrm>
+      </p:grpSpPr>
+      <p:sp>
+        <p:nvSpPr>
+          <p:cNvPr id="2" name="Slide Image Placeholder 1"/>
+          <p:cNvSpPr>
+            <a:spLocks noGrp="1" noRot="1" noChangeAspect="1"/>
+          </p:cNvSpPr>
+          <p:nvPr>
+            <p:ph type="sldImg"/>
+          </p:nvPr>
+        </p:nvSpPr>
+        <p:spPr/>
+      </p:sp>
+      <p:sp>
+        <p:nvSpPr>
+          <p:cNvPr id="3" name="Notes Placeholder 2"/>
+          <p:cNvSpPr>
+            <a:spLocks noGrp="1"/>
+          </p:cNvSpPr>
+          <p:nvPr>
+            <p:ph type="body" idx="1"/>
+          </p:nvPr>
+        </p:nvSpPr>
+        <p:spPr/>
+        <p:txBody>
+          <a:bodyPr>
+            <a:normAutofit/>
+          </a:bodyPr>
+          <a:lstStyle/>
+          <a:p>
+            <a:pPr marL="0" marR="0" indent="0" algn="l" defTabSz="914400" rtl="0" eaLnBrk="1" fontAlgn="auto" latinLnBrk="0" hangingPunct="1">
+              <a:lnSpc>
+                <a:spcPct val="100000"/>
+              </a:lnSpc>
+              <a:spcBef>
+                <a:spcPts val="0"/>
+              </a:spcBef>
+              <a:spcAft>
+                <a:spcPts val="0"/>
+              </a:spcAft>
+              <a:buClrTx/>
+              <a:buSzTx/>
+              <a:buFontTx/>
+              <a:buNone/>
+              <a:tabLst/>
+              <a:defRPr/>
+            </a:pPr>
+            <a:r>
+              <a:rPr lang="pt-PT" dirty="0" smtClean="0"/>
+              <a:t>Na sua forma mais básica, um documento é composto</a:t>
+            </a:r>
+            <a:r>
+              <a:rPr lang="pt-PT" baseline="0" dirty="0" smtClean="0"/>
+              <a:t> por um título e uma série de blocos ordenáveis que podem conter diferentes tipos de conteúdos</a:t>
+            </a:r>
+            <a:endParaRPr lang="pt-PT" dirty="0" smtClean="0"/>
+          </a:p>
+          <a:p>
+            <a:endParaRPr lang="pt-PT" dirty="0" smtClean="0"/>
+          </a:p>
+          <a:p>
+            <a:r>
+              <a:rPr lang="pt-PT" dirty="0" smtClean="0"/>
+              <a:t>Iniciais:</a:t>
+            </a:r>
+          </a:p>
+          <a:p>
+            <a:endParaRPr lang="pt-PT" dirty="0" smtClean="0"/>
+          </a:p>
+          <a:p>
+            <a:r>
+              <a:rPr lang="pt-PT" baseline="0" dirty="0" smtClean="0"/>
+              <a:t>  * Paragraph</a:t>
+            </a:r>
+          </a:p>
+          <a:p>
+            <a:r>
+              <a:rPr lang="pt-PT" baseline="0" dirty="0" smtClean="0"/>
+              <a:t>  * Drawing</a:t>
+            </a:r>
+          </a:p>
+          <a:p>
+            <a:r>
+              <a:rPr lang="pt-PT" baseline="0" dirty="0" smtClean="0"/>
+              <a:t>  * ImageDocument</a:t>
+            </a:r>
+            <a:endParaRPr lang="pt-PT" dirty="0"/>
+          </a:p>
+        </p:txBody>
+      </p:sp>
+      <p:sp>
+        <p:nvSpPr>
+          <p:cNvPr id="4" name="Slide Number Placeholder 3"/>
+          <p:cNvSpPr>
+            <a:spLocks noGrp="1"/>
+          </p:cNvSpPr>
+          <p:nvPr>
+            <p:ph type="sldNum" sz="quarter" idx="10"/>
+          </p:nvPr>
+        </p:nvSpPr>
+        <p:spPr/>
+        <p:txBody>
+          <a:bodyPr/>
+          <a:lstStyle/>
+          <a:p>
+            <a:fld id="{EE5867BE-386C-4D16-9B1D-8635FC172DF2}" type="slidenum">
+              <a:rPr lang="pt-PT" smtClean="0"/>
+              <a:pPr/>
+              <a:t>32</a:t>
+            </a:fld>
+            <a:endParaRPr lang="pt-PT"/>
+          </a:p>
+        </p:txBody>
+      </p:sp>
+    </p:spTree>
+  </p:cSld>
+  <p:clrMapOvr>
+    <a:masterClrMapping/>
+  </p:clrMapOvr>
+</p:notes>
+</file>
+
+<file path=ppt/notesSlides/notesSlide23.xml><?xml version="1.0" encoding="utf-8"?>
+<p:notes xmlns:a="http://schemas.openxmlformats.org/drawingml/2006/main" xmlns:r="http://schemas.openxmlformats.org/officeDocument/2006/relationships" xmlns:p="http://schemas.openxmlformats.org/presentationml/2006/main">
+  <p:cSld>
+    <p:spTree>
+      <p:nvGrpSpPr>
+        <p:cNvPr id="1" name=""/>
+        <p:cNvGrpSpPr/>
+        <p:nvPr/>
+      </p:nvGrpSpPr>
+      <p:grpSpPr>
+        <a:xfrm>
+          <a:off x="0" y="0"/>
+          <a:ext cx="0" cy="0"/>
+          <a:chOff x="0" y="0"/>
+          <a:chExt cx="0" cy="0"/>
+        </a:xfrm>
+      </p:grpSpPr>
+      <p:sp>
+        <p:nvSpPr>
+          <p:cNvPr id="2" name="Slide Image Placeholder 1"/>
+          <p:cNvSpPr>
+            <a:spLocks noGrp="1" noRot="1" noChangeAspect="1"/>
+          </p:cNvSpPr>
+          <p:nvPr>
+            <p:ph type="sldImg"/>
+          </p:nvPr>
+        </p:nvSpPr>
+        <p:spPr/>
+      </p:sp>
+      <p:sp>
+        <p:nvSpPr>
+          <p:cNvPr id="3" name="Notes Placeholder 2"/>
+          <p:cNvSpPr>
+            <a:spLocks noGrp="1"/>
+          </p:cNvSpPr>
+          <p:nvPr>
+            <p:ph type="body" idx="1"/>
+          </p:nvPr>
+        </p:nvSpPr>
+        <p:spPr/>
+        <p:txBody>
+          <a:bodyPr>
+            <a:normAutofit/>
+          </a:bodyPr>
+          <a:lstStyle/>
+          <a:p>
             <a:pPr marL="0" marR="0" indent="0" algn="l" defTabSz="914400" rtl="0" eaLnBrk="1" fontAlgn="auto" latinLnBrk="0" hangingPunct="1">
               <a:lnSpc>
                 <a:spcPct val="100000"/>
@@ -1522,7 +2190,7 @@
             <a:fld id="{EE5867BE-386C-4D16-9B1D-8635FC172DF2}" type="slidenum">
               <a:rPr lang="pt-PT" smtClean="0"/>
               <a:pPr/>
-              <a:t>33</a:t>
+              <a:t>34</a:t>
             </a:fld>
             <a:endParaRPr lang="pt-PT"/>
           </a:p>
@@ -1536,7 +2204,7 @@
 </p:notes>
 </file>
 
-<file path=ppt/notesSlides/notesSlide19.xml><?xml version="1.0" encoding="utf-8"?>
+<file path=ppt/notesSlides/notesSlide24.xml><?xml version="1.0" encoding="utf-8"?>
 <p:notes xmlns:a="http://schemas.openxmlformats.org/drawingml/2006/main" xmlns:r="http://schemas.openxmlformats.org/officeDocument/2006/relationships" xmlns:p="http://schemas.openxmlformats.org/presentationml/2006/main">
   <p:cSld>
     <p:spTree>
@@ -1629,7 +2297,7 @@
             <a:fld id="{EE5867BE-386C-4D16-9B1D-8635FC172DF2}" type="slidenum">
               <a:rPr lang="pt-PT" smtClean="0"/>
               <a:pPr/>
-              <a:t>34</a:t>
+              <a:t>35</a:t>
             </a:fld>
             <a:endParaRPr lang="pt-PT"/>
           </a:p>
@@ -1643,93 +2311,7 @@
 </p:notes>
 </file>
 
-<file path=ppt/notesSlides/notesSlide2.xml><?xml version="1.0" encoding="utf-8"?>
-<p:notes xmlns:a="http://schemas.openxmlformats.org/drawingml/2006/main" xmlns:r="http://schemas.openxmlformats.org/officeDocument/2006/relationships" xmlns:p="http://schemas.openxmlformats.org/presentationml/2006/main">
-  <p:cSld>
-    <p:spTree>
-      <p:nvGrpSpPr>
-        <p:cNvPr id="1" name=""/>
-        <p:cNvGrpSpPr/>
-        <p:nvPr/>
-      </p:nvGrpSpPr>
-      <p:grpSpPr>
-        <a:xfrm>
-          <a:off x="0" y="0"/>
-          <a:ext cx="0" cy="0"/>
-          <a:chOff x="0" y="0"/>
-          <a:chExt cx="0" cy="0"/>
-        </a:xfrm>
-      </p:grpSpPr>
-      <p:sp>
-        <p:nvSpPr>
-          <p:cNvPr id="2" name="Slide Image Placeholder 1"/>
-          <p:cNvSpPr>
-            <a:spLocks noGrp="1" noRot="1" noChangeAspect="1"/>
-          </p:cNvSpPr>
-          <p:nvPr>
-            <p:ph type="sldImg"/>
-          </p:nvPr>
-        </p:nvSpPr>
-        <p:spPr/>
-      </p:sp>
-      <p:sp>
-        <p:nvSpPr>
-          <p:cNvPr id="3" name="Notes Placeholder 2"/>
-          <p:cNvSpPr>
-            <a:spLocks noGrp="1"/>
-          </p:cNvSpPr>
-          <p:nvPr>
-            <p:ph type="body" idx="1"/>
-          </p:nvPr>
-        </p:nvSpPr>
-        <p:spPr/>
-        <p:txBody>
-          <a:bodyPr>
-            <a:normAutofit/>
-          </a:bodyPr>
-          <a:lstStyle/>
-          <a:p>
-            <a:r>
-              <a:rPr lang="pt-PT" dirty="0" smtClean="0"/>
-              <a:t>Comçando então por expor o problema:</a:t>
-            </a:r>
-            <a:endParaRPr lang="pt-PT" dirty="0"/>
-          </a:p>
-        </p:txBody>
-      </p:sp>
-      <p:sp>
-        <p:nvSpPr>
-          <p:cNvPr id="4" name="Slide Number Placeholder 3"/>
-          <p:cNvSpPr>
-            <a:spLocks noGrp="1"/>
-          </p:cNvSpPr>
-          <p:nvPr>
-            <p:ph type="sldNum" sz="quarter" idx="10"/>
-          </p:nvPr>
-        </p:nvSpPr>
-        <p:spPr/>
-        <p:txBody>
-          <a:bodyPr/>
-          <a:lstStyle/>
-          <a:p>
-            <a:fld id="{EE5867BE-386C-4D16-9B1D-8635FC172DF2}" type="slidenum">
-              <a:rPr lang="pt-PT" smtClean="0"/>
-              <a:pPr/>
-              <a:t>2</a:t>
-            </a:fld>
-            <a:endParaRPr lang="pt-PT"/>
-          </a:p>
-        </p:txBody>
-      </p:sp>
-    </p:spTree>
-  </p:cSld>
-  <p:clrMapOvr>
-    <a:masterClrMapping/>
-  </p:clrMapOvr>
-</p:notes>
-</file>
-
-<file path=ppt/notesSlides/notesSlide20.xml><?xml version="1.0" encoding="utf-8"?>
+<file path=ppt/notesSlides/notesSlide25.xml><?xml version="1.0" encoding="utf-8"?>
 <p:notes xmlns:a="http://schemas.openxmlformats.org/drawingml/2006/main" xmlns:r="http://schemas.openxmlformats.org/officeDocument/2006/relationships" xmlns:p="http://schemas.openxmlformats.org/presentationml/2006/main">
   <p:cSld>
     <p:spTree>
@@ -1822,465 +2404,7 @@
             <a:fld id="{EE5867BE-386C-4D16-9B1D-8635FC172DF2}" type="slidenum">
               <a:rPr lang="pt-PT" smtClean="0"/>
               <a:pPr/>
-              <a:t>35</a:t>
-            </a:fld>
-            <a:endParaRPr lang="pt-PT"/>
-          </a:p>
-        </p:txBody>
-      </p:sp>
-    </p:spTree>
-  </p:cSld>
-  <p:clrMapOvr>
-    <a:masterClrMapping/>
-  </p:clrMapOvr>
-</p:notes>
-</file>
-
-<file path=ppt/notesSlides/notesSlide21.xml><?xml version="1.0" encoding="utf-8"?>
-<p:notes xmlns:a="http://schemas.openxmlformats.org/drawingml/2006/main" xmlns:r="http://schemas.openxmlformats.org/officeDocument/2006/relationships" xmlns:p="http://schemas.openxmlformats.org/presentationml/2006/main">
-  <p:cSld>
-    <p:spTree>
-      <p:nvGrpSpPr>
-        <p:cNvPr id="1" name=""/>
-        <p:cNvGrpSpPr/>
-        <p:nvPr/>
-      </p:nvGrpSpPr>
-      <p:grpSpPr>
-        <a:xfrm>
-          <a:off x="0" y="0"/>
-          <a:ext cx="0" cy="0"/>
-          <a:chOff x="0" y="0"/>
-          <a:chExt cx="0" cy="0"/>
-        </a:xfrm>
-      </p:grpSpPr>
-      <p:sp>
-        <p:nvSpPr>
-          <p:cNvPr id="2" name="Slide Image Placeholder 1"/>
-          <p:cNvSpPr>
-            <a:spLocks noGrp="1" noRot="1" noChangeAspect="1"/>
-          </p:cNvSpPr>
-          <p:nvPr>
-            <p:ph type="sldImg"/>
-          </p:nvPr>
-        </p:nvSpPr>
-        <p:spPr/>
-      </p:sp>
-      <p:sp>
-        <p:nvSpPr>
-          <p:cNvPr id="3" name="Notes Placeholder 2"/>
-          <p:cNvSpPr>
-            <a:spLocks noGrp="1"/>
-          </p:cNvSpPr>
-          <p:nvPr>
-            <p:ph type="body" idx="1"/>
-          </p:nvPr>
-        </p:nvSpPr>
-        <p:spPr/>
-        <p:txBody>
-          <a:bodyPr>
-            <a:normAutofit/>
-          </a:bodyPr>
-          <a:lstStyle/>
-          <a:p>
-            <a:r>
-              <a:rPr lang="pt-PT" dirty="0" smtClean="0"/>
-              <a:t>O que é que é então possível concluir do trabalho efectuado?</a:t>
-            </a:r>
-            <a:endParaRPr lang="pt-PT" dirty="0"/>
-          </a:p>
-        </p:txBody>
-      </p:sp>
-      <p:sp>
-        <p:nvSpPr>
-          <p:cNvPr id="4" name="Slide Number Placeholder 3"/>
-          <p:cNvSpPr>
-            <a:spLocks noGrp="1"/>
-          </p:cNvSpPr>
-          <p:nvPr>
-            <p:ph type="sldNum" sz="quarter" idx="10"/>
-          </p:nvPr>
-        </p:nvSpPr>
-        <p:spPr/>
-        <p:txBody>
-          <a:bodyPr/>
-          <a:lstStyle/>
-          <a:p>
-            <a:fld id="{EE5867BE-386C-4D16-9B1D-8635FC172DF2}" type="slidenum">
-              <a:rPr lang="pt-PT" smtClean="0"/>
-              <a:pPr/>
-              <a:t>37</a:t>
-            </a:fld>
-            <a:endParaRPr lang="pt-PT"/>
-          </a:p>
-        </p:txBody>
-      </p:sp>
-    </p:spTree>
-  </p:cSld>
-  <p:clrMapOvr>
-    <a:masterClrMapping/>
-  </p:clrMapOvr>
-</p:notes>
-</file>
-
-<file path=ppt/notesSlides/notesSlide22.xml><?xml version="1.0" encoding="utf-8"?>
-<p:notes xmlns:a="http://schemas.openxmlformats.org/drawingml/2006/main" xmlns:r="http://schemas.openxmlformats.org/officeDocument/2006/relationships" xmlns:p="http://schemas.openxmlformats.org/presentationml/2006/main">
-  <p:cSld>
-    <p:spTree>
-      <p:nvGrpSpPr>
-        <p:cNvPr id="1" name=""/>
-        <p:cNvGrpSpPr/>
-        <p:nvPr/>
-      </p:nvGrpSpPr>
-      <p:grpSpPr>
-        <a:xfrm>
-          <a:off x="0" y="0"/>
-          <a:ext cx="0" cy="0"/>
-          <a:chOff x="0" y="0"/>
-          <a:chExt cx="0" cy="0"/>
-        </a:xfrm>
-      </p:grpSpPr>
-      <p:sp>
-        <p:nvSpPr>
-          <p:cNvPr id="2" name="Slide Image Placeholder 1"/>
-          <p:cNvSpPr>
-            <a:spLocks noGrp="1" noRot="1" noChangeAspect="1"/>
-          </p:cNvSpPr>
-          <p:nvPr>
-            <p:ph type="sldImg"/>
-          </p:nvPr>
-        </p:nvSpPr>
-        <p:spPr/>
-      </p:sp>
-      <p:sp>
-        <p:nvSpPr>
-          <p:cNvPr id="3" name="Notes Placeholder 2"/>
-          <p:cNvSpPr>
-            <a:spLocks noGrp="1"/>
-          </p:cNvSpPr>
-          <p:nvPr>
-            <p:ph type="body" idx="1"/>
-          </p:nvPr>
-        </p:nvSpPr>
-        <p:spPr/>
-        <p:txBody>
-          <a:bodyPr>
-            <a:normAutofit/>
-          </a:bodyPr>
-          <a:lstStyle/>
-          <a:p>
-            <a:r>
-              <a:rPr lang="pt-PT" dirty="0" smtClean="0"/>
-              <a:t>Arquitecturas</a:t>
-            </a:r>
-            <a:r>
-              <a:rPr lang="pt-PT" baseline="0" dirty="0" smtClean="0"/>
-              <a:t> </a:t>
-            </a:r>
-            <a:r>
-              <a:rPr lang="pt-PT" dirty="0" smtClean="0"/>
-              <a:t>AOM providenciam</a:t>
-            </a:r>
-            <a:r>
-              <a:rPr lang="pt-PT" baseline="0" dirty="0" smtClean="0"/>
-              <a:t> o melhor conjunto de ferramentas para a construção de sistemas altamente variáveis. Foram pensadas e desenhadas especificamente para esse propósito, pelo que são a melhor solução para este tipo de aplicações.</a:t>
-            </a:r>
-          </a:p>
-        </p:txBody>
-      </p:sp>
-      <p:sp>
-        <p:nvSpPr>
-          <p:cNvPr id="4" name="Slide Number Placeholder 3"/>
-          <p:cNvSpPr>
-            <a:spLocks noGrp="1"/>
-          </p:cNvSpPr>
-          <p:nvPr>
-            <p:ph type="sldNum" sz="quarter" idx="10"/>
-          </p:nvPr>
-        </p:nvSpPr>
-        <p:spPr/>
-        <p:txBody>
-          <a:bodyPr/>
-          <a:lstStyle/>
-          <a:p>
-            <a:fld id="{EE5867BE-386C-4D16-9B1D-8635FC172DF2}" type="slidenum">
-              <a:rPr lang="pt-PT" smtClean="0"/>
-              <a:pPr/>
-              <a:t>38</a:t>
-            </a:fld>
-            <a:endParaRPr lang="pt-PT"/>
-          </a:p>
-        </p:txBody>
-      </p:sp>
-    </p:spTree>
-  </p:cSld>
-  <p:clrMapOvr>
-    <a:masterClrMapping/>
-  </p:clrMapOvr>
-</p:notes>
-</file>
-
-<file path=ppt/notesSlides/notesSlide23.xml><?xml version="1.0" encoding="utf-8"?>
-<p:notes xmlns:a="http://schemas.openxmlformats.org/drawingml/2006/main" xmlns:r="http://schemas.openxmlformats.org/officeDocument/2006/relationships" xmlns:p="http://schemas.openxmlformats.org/presentationml/2006/main">
-  <p:cSld>
-    <p:spTree>
-      <p:nvGrpSpPr>
-        <p:cNvPr id="1" name=""/>
-        <p:cNvGrpSpPr/>
-        <p:nvPr/>
-      </p:nvGrpSpPr>
-      <p:grpSpPr>
-        <a:xfrm>
-          <a:off x="0" y="0"/>
-          <a:ext cx="0" cy="0"/>
-          <a:chOff x="0" y="0"/>
-          <a:chExt cx="0" cy="0"/>
-        </a:xfrm>
-      </p:grpSpPr>
-      <p:sp>
-        <p:nvSpPr>
-          <p:cNvPr id="2" name="Slide Image Placeholder 1"/>
-          <p:cNvSpPr>
-            <a:spLocks noGrp="1" noRot="1" noChangeAspect="1"/>
-          </p:cNvSpPr>
-          <p:nvPr>
-            <p:ph type="sldImg"/>
-          </p:nvPr>
-        </p:nvSpPr>
-        <p:spPr/>
-      </p:sp>
-      <p:sp>
-        <p:nvSpPr>
-          <p:cNvPr id="3" name="Notes Placeholder 2"/>
-          <p:cNvSpPr>
-            <a:spLocks noGrp="1"/>
-          </p:cNvSpPr>
-          <p:nvPr>
-            <p:ph type="body" idx="1"/>
-          </p:nvPr>
-        </p:nvSpPr>
-        <p:spPr/>
-        <p:txBody>
-          <a:bodyPr>
-            <a:normAutofit/>
-          </a:bodyPr>
-          <a:lstStyle/>
-          <a:p>
-            <a:r>
-              <a:rPr lang="pt-PT" dirty="0" smtClean="0"/>
-              <a:t>...</a:t>
-            </a:r>
-          </a:p>
-          <a:p>
-            <a:endParaRPr lang="pt-PT" dirty="0" smtClean="0"/>
-          </a:p>
-          <a:p>
-            <a:r>
-              <a:rPr lang="pt-PT" dirty="0" smtClean="0"/>
-              <a:t>Apesar</a:t>
-            </a:r>
-            <a:r>
-              <a:rPr lang="pt-PT" baseline="0" dirty="0" smtClean="0"/>
-              <a:t> do excelente conjunto de ferramentas providenciado pelo Rails, o uso de uma arquitectura MVC e as convenções usadas podem por vezes dificultar a criação de ambientes altamente variáveis – no entanto, na verdade, serão raras as vezes em que é preciso niveis tao extremos de variabilidade</a:t>
-            </a:r>
-            <a:endParaRPr lang="pt-PT" dirty="0" smtClean="0"/>
-          </a:p>
-        </p:txBody>
-      </p:sp>
-      <p:sp>
-        <p:nvSpPr>
-          <p:cNvPr id="4" name="Slide Number Placeholder 3"/>
-          <p:cNvSpPr>
-            <a:spLocks noGrp="1"/>
-          </p:cNvSpPr>
-          <p:nvPr>
-            <p:ph type="sldNum" sz="quarter" idx="10"/>
-          </p:nvPr>
-        </p:nvSpPr>
-        <p:spPr/>
-        <p:txBody>
-          <a:bodyPr/>
-          <a:lstStyle/>
-          <a:p>
-            <a:fld id="{EE5867BE-386C-4D16-9B1D-8635FC172DF2}" type="slidenum">
-              <a:rPr lang="pt-PT" smtClean="0"/>
-              <a:pPr/>
-              <a:t>39</a:t>
-            </a:fld>
-            <a:endParaRPr lang="pt-PT"/>
-          </a:p>
-        </p:txBody>
-      </p:sp>
-    </p:spTree>
-  </p:cSld>
-  <p:clrMapOvr>
-    <a:masterClrMapping/>
-  </p:clrMapOvr>
-</p:notes>
-</file>
-
-<file path=ppt/notesSlides/notesSlide24.xml><?xml version="1.0" encoding="utf-8"?>
-<p:notes xmlns:a="http://schemas.openxmlformats.org/drawingml/2006/main" xmlns:r="http://schemas.openxmlformats.org/officeDocument/2006/relationships" xmlns:p="http://schemas.openxmlformats.org/presentationml/2006/main">
-  <p:cSld>
-    <p:spTree>
-      <p:nvGrpSpPr>
-        <p:cNvPr id="1" name=""/>
-        <p:cNvGrpSpPr/>
-        <p:nvPr/>
-      </p:nvGrpSpPr>
-      <p:grpSpPr>
-        <a:xfrm>
-          <a:off x="0" y="0"/>
-          <a:ext cx="0" cy="0"/>
-          <a:chOff x="0" y="0"/>
-          <a:chExt cx="0" cy="0"/>
-        </a:xfrm>
-      </p:grpSpPr>
-      <p:sp>
-        <p:nvSpPr>
-          <p:cNvPr id="2" name="Slide Image Placeholder 1"/>
-          <p:cNvSpPr>
-            <a:spLocks noGrp="1" noRot="1" noChangeAspect="1"/>
-          </p:cNvSpPr>
-          <p:nvPr>
-            <p:ph type="sldImg"/>
-          </p:nvPr>
-        </p:nvSpPr>
-        <p:spPr/>
-      </p:sp>
-      <p:sp>
-        <p:nvSpPr>
-          <p:cNvPr id="3" name="Notes Placeholder 2"/>
-          <p:cNvSpPr>
-            <a:spLocks noGrp="1"/>
-          </p:cNvSpPr>
-          <p:nvPr>
-            <p:ph type="body" idx="1"/>
-          </p:nvPr>
-        </p:nvSpPr>
-        <p:spPr/>
-        <p:txBody>
-          <a:bodyPr>
-            <a:normAutofit/>
-          </a:bodyPr>
-          <a:lstStyle/>
-          <a:p>
-            <a:r>
-              <a:rPr lang="pt-PT" dirty="0" smtClean="0"/>
-              <a:t>Por si</a:t>
-            </a:r>
-            <a:r>
-              <a:rPr lang="pt-PT" baseline="0" dirty="0" smtClean="0"/>
-              <a:t> só, o Rails pode ser um entrave à construção destes sistemas: no entanto, tal como demonstrado pelo trabalho desenvolvido ...</a:t>
-            </a:r>
-            <a:endParaRPr lang="pt-PT" dirty="0"/>
-          </a:p>
-        </p:txBody>
-      </p:sp>
-      <p:sp>
-        <p:nvSpPr>
-          <p:cNvPr id="4" name="Slide Number Placeholder 3"/>
-          <p:cNvSpPr>
-            <a:spLocks noGrp="1"/>
-          </p:cNvSpPr>
-          <p:nvPr>
-            <p:ph type="sldNum" sz="quarter" idx="10"/>
-          </p:nvPr>
-        </p:nvSpPr>
-        <p:spPr/>
-        <p:txBody>
-          <a:bodyPr/>
-          <a:lstStyle/>
-          <a:p>
-            <a:fld id="{EE5867BE-386C-4D16-9B1D-8635FC172DF2}" type="slidenum">
-              <a:rPr lang="pt-PT" smtClean="0"/>
-              <a:pPr/>
-              <a:t>40</a:t>
-            </a:fld>
-            <a:endParaRPr lang="pt-PT"/>
-          </a:p>
-        </p:txBody>
-      </p:sp>
-    </p:spTree>
-  </p:cSld>
-  <p:clrMapOvr>
-    <a:masterClrMapping/>
-  </p:clrMapOvr>
-</p:notes>
-</file>
-
-<file path=ppt/notesSlides/notesSlide25.xml><?xml version="1.0" encoding="utf-8"?>
-<p:notes xmlns:a="http://schemas.openxmlformats.org/drawingml/2006/main" xmlns:r="http://schemas.openxmlformats.org/officeDocument/2006/relationships" xmlns:p="http://schemas.openxmlformats.org/presentationml/2006/main">
-  <p:cSld>
-    <p:spTree>
-      <p:nvGrpSpPr>
-        <p:cNvPr id="1" name=""/>
-        <p:cNvGrpSpPr/>
-        <p:nvPr/>
-      </p:nvGrpSpPr>
-      <p:grpSpPr>
-        <a:xfrm>
-          <a:off x="0" y="0"/>
-          <a:ext cx="0" cy="0"/>
-          <a:chOff x="0" y="0"/>
-          <a:chExt cx="0" cy="0"/>
-        </a:xfrm>
-      </p:grpSpPr>
-      <p:sp>
-        <p:nvSpPr>
-          <p:cNvPr id="2" name="Slide Image Placeholder 1"/>
-          <p:cNvSpPr>
-            <a:spLocks noGrp="1" noRot="1" noChangeAspect="1"/>
-          </p:cNvSpPr>
-          <p:nvPr>
-            <p:ph type="sldImg"/>
-          </p:nvPr>
-        </p:nvSpPr>
-        <p:spPr/>
-      </p:sp>
-      <p:sp>
-        <p:nvSpPr>
-          <p:cNvPr id="3" name="Notes Placeholder 2"/>
-          <p:cNvSpPr>
-            <a:spLocks noGrp="1"/>
-          </p:cNvSpPr>
-          <p:nvPr>
-            <p:ph type="body" idx="1"/>
-          </p:nvPr>
-        </p:nvSpPr>
-        <p:spPr/>
-        <p:txBody>
-          <a:bodyPr>
-            <a:normAutofit/>
-          </a:bodyPr>
-          <a:lstStyle/>
-          <a:p>
-            <a:r>
-              <a:rPr lang="pt-PT" dirty="0" smtClean="0"/>
-              <a:t>Performance increase is dependant on the previous design</a:t>
-            </a:r>
-            <a:endParaRPr lang="pt-PT" dirty="0"/>
-          </a:p>
-        </p:txBody>
-      </p:sp>
-      <p:sp>
-        <p:nvSpPr>
-          <p:cNvPr id="4" name="Slide Number Placeholder 3"/>
-          <p:cNvSpPr>
-            <a:spLocks noGrp="1"/>
-          </p:cNvSpPr>
-          <p:nvPr>
-            <p:ph type="sldNum" sz="quarter" idx="10"/>
-          </p:nvPr>
-        </p:nvSpPr>
-        <p:spPr/>
-        <p:txBody>
-          <a:bodyPr/>
-          <a:lstStyle/>
-          <a:p>
-            <a:fld id="{EE5867BE-386C-4D16-9B1D-8635FC172DF2}" type="slidenum">
-              <a:rPr lang="pt-PT" smtClean="0"/>
-              <a:pPr/>
-              <a:t>41</a:t>
+              <a:t>36</a:t>
             </a:fld>
             <a:endParaRPr lang="pt-PT"/>
           </a:p>
@@ -2340,7 +2464,11 @@
           </a:bodyPr>
           <a:lstStyle/>
           <a:p>
-            <a:endParaRPr lang="pt-PT" dirty="0"/>
+            <a:r>
+              <a:rPr lang="pt-PT" b="1" dirty="0" smtClean="0"/>
+              <a:t>OBTER</a:t>
+            </a:r>
+            <a:endParaRPr lang="pt-PT" b="1" dirty="0"/>
           </a:p>
         </p:txBody>
       </p:sp>
@@ -2362,7 +2490,7 @@
             <a:fld id="{EE5867BE-386C-4D16-9B1D-8635FC172DF2}" type="slidenum">
               <a:rPr lang="pt-PT" smtClean="0"/>
               <a:pPr/>
-              <a:t>42</a:t>
+              <a:t>37</a:t>
             </a:fld>
             <a:endParaRPr lang="pt-PT"/>
           </a:p>
@@ -2422,6 +2550,10 @@
           </a:bodyPr>
           <a:lstStyle/>
           <a:p>
+            <a:r>
+              <a:rPr lang="pt-PT" dirty="0" smtClean="0"/>
+              <a:t>O que é que é então possível concluir do trabalho efectuado?</a:t>
+            </a:r>
             <a:endParaRPr lang="pt-PT" dirty="0"/>
           </a:p>
         </p:txBody>
@@ -2444,7 +2576,7 @@
             <a:fld id="{EE5867BE-386C-4D16-9B1D-8635FC172DF2}" type="slidenum">
               <a:rPr lang="pt-PT" smtClean="0"/>
               <a:pPr/>
-              <a:t>44</a:t>
+              <a:t>38</a:t>
             </a:fld>
             <a:endParaRPr lang="pt-PT"/>
           </a:p>
@@ -2504,7 +2636,22 @@
           </a:bodyPr>
           <a:lstStyle/>
           <a:p>
-            <a:endParaRPr lang="pt-PT"/>
+            <a:r>
+              <a:rPr lang="pt-PT" dirty="0" smtClean="0"/>
+              <a:t>Arquitecturas</a:t>
+            </a:r>
+            <a:r>
+              <a:rPr lang="pt-PT" baseline="0" dirty="0" smtClean="0"/>
+              <a:t> </a:t>
+            </a:r>
+            <a:r>
+              <a:rPr lang="pt-PT" dirty="0" smtClean="0"/>
+              <a:t>AOM providenciam</a:t>
+            </a:r>
+            <a:r>
+              <a:rPr lang="pt-PT" baseline="0" dirty="0" smtClean="0"/>
+              <a:t> o melhor conjunto de ferramentas para a construção de sistemas altamente variáveis. Foram pensadas e desenhadas especificamente para esse propósito, pelo que são a melhor solução para este tipo de aplicações.</a:t>
+            </a:r>
           </a:p>
         </p:txBody>
       </p:sp>
@@ -2526,7 +2673,106 @@
             <a:fld id="{EE5867BE-386C-4D16-9B1D-8635FC172DF2}" type="slidenum">
               <a:rPr lang="pt-PT" smtClean="0"/>
               <a:pPr/>
-              <a:t>45</a:t>
+              <a:t>39</a:t>
+            </a:fld>
+            <a:endParaRPr lang="pt-PT"/>
+          </a:p>
+        </p:txBody>
+      </p:sp>
+    </p:spTree>
+  </p:cSld>
+  <p:clrMapOvr>
+    <a:masterClrMapping/>
+  </p:clrMapOvr>
+</p:notes>
+</file>
+
+<file path=ppt/notesSlides/notesSlide29.xml><?xml version="1.0" encoding="utf-8"?>
+<p:notes xmlns:a="http://schemas.openxmlformats.org/drawingml/2006/main" xmlns:r="http://schemas.openxmlformats.org/officeDocument/2006/relationships" xmlns:p="http://schemas.openxmlformats.org/presentationml/2006/main">
+  <p:cSld>
+    <p:spTree>
+      <p:nvGrpSpPr>
+        <p:cNvPr id="1" name=""/>
+        <p:cNvGrpSpPr/>
+        <p:nvPr/>
+      </p:nvGrpSpPr>
+      <p:grpSpPr>
+        <a:xfrm>
+          <a:off x="0" y="0"/>
+          <a:ext cx="0" cy="0"/>
+          <a:chOff x="0" y="0"/>
+          <a:chExt cx="0" cy="0"/>
+        </a:xfrm>
+      </p:grpSpPr>
+      <p:sp>
+        <p:nvSpPr>
+          <p:cNvPr id="2" name="Slide Image Placeholder 1"/>
+          <p:cNvSpPr>
+            <a:spLocks noGrp="1" noRot="1" noChangeAspect="1"/>
+          </p:cNvSpPr>
+          <p:nvPr>
+            <p:ph type="sldImg"/>
+          </p:nvPr>
+        </p:nvSpPr>
+        <p:spPr/>
+      </p:sp>
+      <p:sp>
+        <p:nvSpPr>
+          <p:cNvPr id="3" name="Notes Placeholder 2"/>
+          <p:cNvSpPr>
+            <a:spLocks noGrp="1"/>
+          </p:cNvSpPr>
+          <p:nvPr>
+            <p:ph type="body" idx="1"/>
+          </p:nvPr>
+        </p:nvSpPr>
+        <p:spPr/>
+        <p:txBody>
+          <a:bodyPr>
+            <a:normAutofit/>
+          </a:bodyPr>
+          <a:lstStyle/>
+          <a:p>
+            <a:r>
+              <a:rPr lang="pt-PT" dirty="0" smtClean="0"/>
+              <a:t>...</a:t>
+            </a:r>
+          </a:p>
+          <a:p>
+            <a:endParaRPr lang="pt-PT" dirty="0" smtClean="0"/>
+          </a:p>
+          <a:p>
+            <a:r>
+              <a:rPr lang="pt-PT" dirty="0" smtClean="0"/>
+              <a:t>Apesar</a:t>
+            </a:r>
+            <a:r>
+              <a:rPr lang="pt-PT" baseline="0" dirty="0" smtClean="0"/>
+              <a:t> do excelente conjunto de ferramentas providenciado pelo Rails, o uso de uma arquitectura MVC e as convenções usadas podem por vezes dificultar a criação de ambientes altamente variáveis – no entanto, na verdade, serão raras as vezes em que é preciso niveis tao extremos de variabilidade</a:t>
+            </a:r>
+            <a:endParaRPr lang="pt-PT" dirty="0" smtClean="0"/>
+          </a:p>
+        </p:txBody>
+      </p:sp>
+      <p:sp>
+        <p:nvSpPr>
+          <p:cNvPr id="4" name="Slide Number Placeholder 3"/>
+          <p:cNvSpPr>
+            <a:spLocks noGrp="1"/>
+          </p:cNvSpPr>
+          <p:nvPr>
+            <p:ph type="sldNum" sz="quarter" idx="10"/>
+          </p:nvPr>
+        </p:nvSpPr>
+        <p:spPr/>
+        <p:txBody>
+          <a:bodyPr/>
+          <a:lstStyle/>
+          <a:p>
+            <a:fld id="{EE5867BE-386C-4D16-9B1D-8635FC172DF2}" type="slidenum">
+              <a:rPr lang="pt-PT" smtClean="0"/>
+              <a:pPr/>
+              <a:t>40</a:t>
             </a:fld>
             <a:endParaRPr lang="pt-PT"/>
           </a:p>
@@ -2587,10 +2833,14 @@
           <a:lstStyle/>
           <a:p>
             <a:r>
-              <a:rPr lang="pt-PT" smtClean="0"/>
-              <a:t>Also mention MySQL usage constraints</a:t>
-            </a:r>
-            <a:endParaRPr lang="pt-PT"/>
+              <a:rPr lang="pt-PT" dirty="0" smtClean="0"/>
+              <a:t>A maior parte das aplicações</a:t>
+            </a:r>
+            <a:r>
+              <a:rPr lang="pt-PT" baseline="0" dirty="0" smtClean="0"/>
+              <a:t> existe em ambientes altamente variáveis</a:t>
+            </a:r>
+            <a:endParaRPr lang="pt-PT" dirty="0"/>
           </a:p>
         </p:txBody>
       </p:sp>
@@ -2612,7 +2862,429 @@
             <a:fld id="{EE5867BE-386C-4D16-9B1D-8635FC172DF2}" type="slidenum">
               <a:rPr lang="pt-PT" smtClean="0"/>
               <a:pPr/>
-              <a:t>6</a:t>
+              <a:t>3</a:t>
+            </a:fld>
+            <a:endParaRPr lang="pt-PT"/>
+          </a:p>
+        </p:txBody>
+      </p:sp>
+    </p:spTree>
+  </p:cSld>
+  <p:clrMapOvr>
+    <a:masterClrMapping/>
+  </p:clrMapOvr>
+</p:notes>
+</file>
+
+<file path=ppt/notesSlides/notesSlide30.xml><?xml version="1.0" encoding="utf-8"?>
+<p:notes xmlns:a="http://schemas.openxmlformats.org/drawingml/2006/main" xmlns:r="http://schemas.openxmlformats.org/officeDocument/2006/relationships" xmlns:p="http://schemas.openxmlformats.org/presentationml/2006/main">
+  <p:cSld>
+    <p:spTree>
+      <p:nvGrpSpPr>
+        <p:cNvPr id="1" name=""/>
+        <p:cNvGrpSpPr/>
+        <p:nvPr/>
+      </p:nvGrpSpPr>
+      <p:grpSpPr>
+        <a:xfrm>
+          <a:off x="0" y="0"/>
+          <a:ext cx="0" cy="0"/>
+          <a:chOff x="0" y="0"/>
+          <a:chExt cx="0" cy="0"/>
+        </a:xfrm>
+      </p:grpSpPr>
+      <p:sp>
+        <p:nvSpPr>
+          <p:cNvPr id="2" name="Slide Image Placeholder 1"/>
+          <p:cNvSpPr>
+            <a:spLocks noGrp="1" noRot="1" noChangeAspect="1"/>
+          </p:cNvSpPr>
+          <p:nvPr>
+            <p:ph type="sldImg"/>
+          </p:nvPr>
+        </p:nvSpPr>
+        <p:spPr/>
+      </p:sp>
+      <p:sp>
+        <p:nvSpPr>
+          <p:cNvPr id="3" name="Notes Placeholder 2"/>
+          <p:cNvSpPr>
+            <a:spLocks noGrp="1"/>
+          </p:cNvSpPr>
+          <p:nvPr>
+            <p:ph type="body" idx="1"/>
+          </p:nvPr>
+        </p:nvSpPr>
+        <p:spPr/>
+        <p:txBody>
+          <a:bodyPr>
+            <a:normAutofit/>
+          </a:bodyPr>
+          <a:lstStyle/>
+          <a:p>
+            <a:r>
+              <a:rPr lang="pt-PT" dirty="0" smtClean="0"/>
+              <a:t>Por si</a:t>
+            </a:r>
+            <a:r>
+              <a:rPr lang="pt-PT" baseline="0" dirty="0" smtClean="0"/>
+              <a:t> só, o Rails pode ser um entrave à construção destes sistemas: no entanto, tal como demonstrado pelo trabalho desenvolvido ...</a:t>
+            </a:r>
+            <a:endParaRPr lang="pt-PT" dirty="0"/>
+          </a:p>
+        </p:txBody>
+      </p:sp>
+      <p:sp>
+        <p:nvSpPr>
+          <p:cNvPr id="4" name="Slide Number Placeholder 3"/>
+          <p:cNvSpPr>
+            <a:spLocks noGrp="1"/>
+          </p:cNvSpPr>
+          <p:nvPr>
+            <p:ph type="sldNum" sz="quarter" idx="10"/>
+          </p:nvPr>
+        </p:nvSpPr>
+        <p:spPr/>
+        <p:txBody>
+          <a:bodyPr/>
+          <a:lstStyle/>
+          <a:p>
+            <a:fld id="{EE5867BE-386C-4D16-9B1D-8635FC172DF2}" type="slidenum">
+              <a:rPr lang="pt-PT" smtClean="0"/>
+              <a:pPr/>
+              <a:t>41</a:t>
+            </a:fld>
+            <a:endParaRPr lang="pt-PT"/>
+          </a:p>
+        </p:txBody>
+      </p:sp>
+    </p:spTree>
+  </p:cSld>
+  <p:clrMapOvr>
+    <a:masterClrMapping/>
+  </p:clrMapOvr>
+</p:notes>
+</file>
+
+<file path=ppt/notesSlides/notesSlide31.xml><?xml version="1.0" encoding="utf-8"?>
+<p:notes xmlns:a="http://schemas.openxmlformats.org/drawingml/2006/main" xmlns:r="http://schemas.openxmlformats.org/officeDocument/2006/relationships" xmlns:p="http://schemas.openxmlformats.org/presentationml/2006/main">
+  <p:cSld>
+    <p:spTree>
+      <p:nvGrpSpPr>
+        <p:cNvPr id="1" name=""/>
+        <p:cNvGrpSpPr/>
+        <p:nvPr/>
+      </p:nvGrpSpPr>
+      <p:grpSpPr>
+        <a:xfrm>
+          <a:off x="0" y="0"/>
+          <a:ext cx="0" cy="0"/>
+          <a:chOff x="0" y="0"/>
+          <a:chExt cx="0" cy="0"/>
+        </a:xfrm>
+      </p:grpSpPr>
+      <p:sp>
+        <p:nvSpPr>
+          <p:cNvPr id="2" name="Slide Image Placeholder 1"/>
+          <p:cNvSpPr>
+            <a:spLocks noGrp="1" noRot="1" noChangeAspect="1"/>
+          </p:cNvSpPr>
+          <p:nvPr>
+            <p:ph type="sldImg"/>
+          </p:nvPr>
+        </p:nvSpPr>
+        <p:spPr/>
+      </p:sp>
+      <p:sp>
+        <p:nvSpPr>
+          <p:cNvPr id="3" name="Notes Placeholder 2"/>
+          <p:cNvSpPr>
+            <a:spLocks noGrp="1"/>
+          </p:cNvSpPr>
+          <p:nvPr>
+            <p:ph type="body" idx="1"/>
+          </p:nvPr>
+        </p:nvSpPr>
+        <p:spPr/>
+        <p:txBody>
+          <a:bodyPr>
+            <a:normAutofit/>
+          </a:bodyPr>
+          <a:lstStyle/>
+          <a:p>
+            <a:r>
+              <a:rPr lang="pt-PT" dirty="0" smtClean="0"/>
+              <a:t>Performance increase is dependant on the previous design</a:t>
+            </a:r>
+            <a:endParaRPr lang="pt-PT" dirty="0"/>
+          </a:p>
+        </p:txBody>
+      </p:sp>
+      <p:sp>
+        <p:nvSpPr>
+          <p:cNvPr id="4" name="Slide Number Placeholder 3"/>
+          <p:cNvSpPr>
+            <a:spLocks noGrp="1"/>
+          </p:cNvSpPr>
+          <p:nvPr>
+            <p:ph type="sldNum" sz="quarter" idx="10"/>
+          </p:nvPr>
+        </p:nvSpPr>
+        <p:spPr/>
+        <p:txBody>
+          <a:bodyPr/>
+          <a:lstStyle/>
+          <a:p>
+            <a:fld id="{EE5867BE-386C-4D16-9B1D-8635FC172DF2}" type="slidenum">
+              <a:rPr lang="pt-PT" smtClean="0"/>
+              <a:pPr/>
+              <a:t>42</a:t>
+            </a:fld>
+            <a:endParaRPr lang="pt-PT"/>
+          </a:p>
+        </p:txBody>
+      </p:sp>
+    </p:spTree>
+  </p:cSld>
+  <p:clrMapOvr>
+    <a:masterClrMapping/>
+  </p:clrMapOvr>
+</p:notes>
+</file>
+
+<file path=ppt/notesSlides/notesSlide32.xml><?xml version="1.0" encoding="utf-8"?>
+<p:notes xmlns:a="http://schemas.openxmlformats.org/drawingml/2006/main" xmlns:r="http://schemas.openxmlformats.org/officeDocument/2006/relationships" xmlns:p="http://schemas.openxmlformats.org/presentationml/2006/main">
+  <p:cSld>
+    <p:spTree>
+      <p:nvGrpSpPr>
+        <p:cNvPr id="1" name=""/>
+        <p:cNvGrpSpPr/>
+        <p:nvPr/>
+      </p:nvGrpSpPr>
+      <p:grpSpPr>
+        <a:xfrm>
+          <a:off x="0" y="0"/>
+          <a:ext cx="0" cy="0"/>
+          <a:chOff x="0" y="0"/>
+          <a:chExt cx="0" cy="0"/>
+        </a:xfrm>
+      </p:grpSpPr>
+      <p:sp>
+        <p:nvSpPr>
+          <p:cNvPr id="2" name="Slide Image Placeholder 1"/>
+          <p:cNvSpPr>
+            <a:spLocks noGrp="1" noRot="1" noChangeAspect="1"/>
+          </p:cNvSpPr>
+          <p:nvPr>
+            <p:ph type="sldImg"/>
+          </p:nvPr>
+        </p:nvSpPr>
+        <p:spPr/>
+      </p:sp>
+      <p:sp>
+        <p:nvSpPr>
+          <p:cNvPr id="3" name="Notes Placeholder 2"/>
+          <p:cNvSpPr>
+            <a:spLocks noGrp="1"/>
+          </p:cNvSpPr>
+          <p:nvPr>
+            <p:ph type="body" idx="1"/>
+          </p:nvPr>
+        </p:nvSpPr>
+        <p:spPr/>
+        <p:txBody>
+          <a:bodyPr>
+            <a:normAutofit/>
+          </a:bodyPr>
+          <a:lstStyle/>
+          <a:p>
+            <a:endParaRPr lang="pt-PT" dirty="0"/>
+          </a:p>
+        </p:txBody>
+      </p:sp>
+      <p:sp>
+        <p:nvSpPr>
+          <p:cNvPr id="4" name="Slide Number Placeholder 3"/>
+          <p:cNvSpPr>
+            <a:spLocks noGrp="1"/>
+          </p:cNvSpPr>
+          <p:nvPr>
+            <p:ph type="sldNum" sz="quarter" idx="10"/>
+          </p:nvPr>
+        </p:nvSpPr>
+        <p:spPr/>
+        <p:txBody>
+          <a:bodyPr/>
+          <a:lstStyle/>
+          <a:p>
+            <a:fld id="{EE5867BE-386C-4D16-9B1D-8635FC172DF2}" type="slidenum">
+              <a:rPr lang="pt-PT" smtClean="0"/>
+              <a:pPr/>
+              <a:t>43</a:t>
+            </a:fld>
+            <a:endParaRPr lang="pt-PT"/>
+          </a:p>
+        </p:txBody>
+      </p:sp>
+    </p:spTree>
+  </p:cSld>
+  <p:clrMapOvr>
+    <a:masterClrMapping/>
+  </p:clrMapOvr>
+</p:notes>
+</file>
+
+<file path=ppt/notesSlides/notesSlide33.xml><?xml version="1.0" encoding="utf-8"?>
+<p:notes xmlns:a="http://schemas.openxmlformats.org/drawingml/2006/main" xmlns:r="http://schemas.openxmlformats.org/officeDocument/2006/relationships" xmlns:p="http://schemas.openxmlformats.org/presentationml/2006/main">
+  <p:cSld>
+    <p:spTree>
+      <p:nvGrpSpPr>
+        <p:cNvPr id="1" name=""/>
+        <p:cNvGrpSpPr/>
+        <p:nvPr/>
+      </p:nvGrpSpPr>
+      <p:grpSpPr>
+        <a:xfrm>
+          <a:off x="0" y="0"/>
+          <a:ext cx="0" cy="0"/>
+          <a:chOff x="0" y="0"/>
+          <a:chExt cx="0" cy="0"/>
+        </a:xfrm>
+      </p:grpSpPr>
+      <p:sp>
+        <p:nvSpPr>
+          <p:cNvPr id="2" name="Slide Image Placeholder 1"/>
+          <p:cNvSpPr>
+            <a:spLocks noGrp="1" noRot="1" noChangeAspect="1"/>
+          </p:cNvSpPr>
+          <p:nvPr>
+            <p:ph type="sldImg"/>
+          </p:nvPr>
+        </p:nvSpPr>
+        <p:spPr/>
+      </p:sp>
+      <p:sp>
+        <p:nvSpPr>
+          <p:cNvPr id="3" name="Notes Placeholder 2"/>
+          <p:cNvSpPr>
+            <a:spLocks noGrp="1"/>
+          </p:cNvSpPr>
+          <p:nvPr>
+            <p:ph type="body" idx="1"/>
+          </p:nvPr>
+        </p:nvSpPr>
+        <p:spPr/>
+        <p:txBody>
+          <a:bodyPr>
+            <a:normAutofit/>
+          </a:bodyPr>
+          <a:lstStyle/>
+          <a:p>
+            <a:endParaRPr lang="pt-PT" dirty="0"/>
+          </a:p>
+        </p:txBody>
+      </p:sp>
+      <p:sp>
+        <p:nvSpPr>
+          <p:cNvPr id="4" name="Slide Number Placeholder 3"/>
+          <p:cNvSpPr>
+            <a:spLocks noGrp="1"/>
+          </p:cNvSpPr>
+          <p:nvPr>
+            <p:ph type="sldNum" sz="quarter" idx="10"/>
+          </p:nvPr>
+        </p:nvSpPr>
+        <p:spPr/>
+        <p:txBody>
+          <a:bodyPr/>
+          <a:lstStyle/>
+          <a:p>
+            <a:fld id="{EE5867BE-386C-4D16-9B1D-8635FC172DF2}" type="slidenum">
+              <a:rPr lang="pt-PT" smtClean="0"/>
+              <a:pPr/>
+              <a:t>45</a:t>
+            </a:fld>
+            <a:endParaRPr lang="pt-PT"/>
+          </a:p>
+        </p:txBody>
+      </p:sp>
+    </p:spTree>
+  </p:cSld>
+  <p:clrMapOvr>
+    <a:masterClrMapping/>
+  </p:clrMapOvr>
+</p:notes>
+</file>
+
+<file path=ppt/notesSlides/notesSlide34.xml><?xml version="1.0" encoding="utf-8"?>
+<p:notes xmlns:a="http://schemas.openxmlformats.org/drawingml/2006/main" xmlns:r="http://schemas.openxmlformats.org/officeDocument/2006/relationships" xmlns:p="http://schemas.openxmlformats.org/presentationml/2006/main">
+  <p:cSld>
+    <p:spTree>
+      <p:nvGrpSpPr>
+        <p:cNvPr id="1" name=""/>
+        <p:cNvGrpSpPr/>
+        <p:nvPr/>
+      </p:nvGrpSpPr>
+      <p:grpSpPr>
+        <a:xfrm>
+          <a:off x="0" y="0"/>
+          <a:ext cx="0" cy="0"/>
+          <a:chOff x="0" y="0"/>
+          <a:chExt cx="0" cy="0"/>
+        </a:xfrm>
+      </p:grpSpPr>
+      <p:sp>
+        <p:nvSpPr>
+          <p:cNvPr id="2" name="Slide Image Placeholder 1"/>
+          <p:cNvSpPr>
+            <a:spLocks noGrp="1" noRot="1" noChangeAspect="1"/>
+          </p:cNvSpPr>
+          <p:nvPr>
+            <p:ph type="sldImg"/>
+          </p:nvPr>
+        </p:nvSpPr>
+        <p:spPr/>
+      </p:sp>
+      <p:sp>
+        <p:nvSpPr>
+          <p:cNvPr id="3" name="Notes Placeholder 2"/>
+          <p:cNvSpPr>
+            <a:spLocks noGrp="1"/>
+          </p:cNvSpPr>
+          <p:nvPr>
+            <p:ph type="body" idx="1"/>
+          </p:nvPr>
+        </p:nvSpPr>
+        <p:spPr/>
+        <p:txBody>
+          <a:bodyPr>
+            <a:normAutofit/>
+          </a:bodyPr>
+          <a:lstStyle/>
+          <a:p>
+            <a:endParaRPr lang="pt-PT"/>
+          </a:p>
+        </p:txBody>
+      </p:sp>
+      <p:sp>
+        <p:nvSpPr>
+          <p:cNvPr id="4" name="Slide Number Placeholder 3"/>
+          <p:cNvSpPr>
+            <a:spLocks noGrp="1"/>
+          </p:cNvSpPr>
+          <p:nvPr>
+            <p:ph type="sldNum" sz="quarter" idx="10"/>
+          </p:nvPr>
+        </p:nvSpPr>
+        <p:spPr/>
+        <p:txBody>
+          <a:bodyPr/>
+          <a:lstStyle/>
+          <a:p>
+            <a:fld id="{EE5867BE-386C-4D16-9B1D-8635FC172DF2}" type="slidenum">
+              <a:rPr lang="pt-PT" smtClean="0"/>
+              <a:pPr/>
+              <a:t>46</a:t>
             </a:fld>
             <a:endParaRPr lang="pt-PT"/>
           </a:p>
@@ -2674,11 +3346,11 @@
           <a:p>
             <a:r>
               <a:rPr lang="pt-PT" dirty="0" smtClean="0"/>
-              <a:t>Assim,</a:t>
+              <a:t>Os requisitos</a:t>
             </a:r>
             <a:r>
               <a:rPr lang="pt-PT" baseline="0" dirty="0" smtClean="0"/>
-              <a:t> é fundamental saber o que é que já foi feito e que estudos foram conduzidos para tentar resolver estes problemas? Existem diferentes abordagens, tanto ao nível do método como da técnica</a:t>
+              <a:t> mudam com muita frequência de modo a reflectir mudanças no meio ambiente e os desejos e necessidades de clientes e utilizadores</a:t>
             </a:r>
             <a:endParaRPr lang="pt-PT" dirty="0"/>
           </a:p>
@@ -2702,7 +3374,7 @@
             <a:fld id="{EE5867BE-386C-4D16-9B1D-8635FC172DF2}" type="slidenum">
               <a:rPr lang="pt-PT" smtClean="0"/>
               <a:pPr/>
-              <a:t>7</a:t>
+              <a:t>4</a:t>
             </a:fld>
             <a:endParaRPr lang="pt-PT"/>
           </a:p>
@@ -2764,11 +3436,11 @@
           <a:p>
             <a:r>
               <a:rPr lang="pt-PT" dirty="0" smtClean="0"/>
-              <a:t>O foco desta</a:t>
+              <a:t>No geral, modificar</a:t>
             </a:r>
             <a:r>
               <a:rPr lang="pt-PT" baseline="0" dirty="0" smtClean="0"/>
-              <a:t> dissertação é, no entanto, os padrões de desenho, especificamente os que fazem parte das arquitecturas</a:t>
+              <a:t> um sistema é um trabalho custoso, tanto em termos monetários como de tempo. Qual é então o objectivo deste trabalho?</a:t>
             </a:r>
             <a:endParaRPr lang="pt-PT" dirty="0"/>
           </a:p>
@@ -2792,7 +3464,7 @@
             <a:fld id="{EE5867BE-386C-4D16-9B1D-8635FC172DF2}" type="slidenum">
               <a:rPr lang="pt-PT" smtClean="0"/>
               <a:pPr/>
-              <a:t>12</a:t>
+              <a:t>5</a:t>
             </a:fld>
             <a:endParaRPr lang="pt-PT"/>
           </a:p>
@@ -2854,11 +3526,20 @@
           <a:p>
             <a:r>
               <a:rPr lang="pt-PT" dirty="0" smtClean="0"/>
-              <a:t>AOM,</a:t>
+              <a:t>Muito básicamente: adaptar metodologias</a:t>
             </a:r>
             <a:r>
               <a:rPr lang="pt-PT" baseline="0" dirty="0" smtClean="0"/>
-              <a:t> ou adaptive object models. Uma arquitectura; aliás, meta-arquitectura AOM é uma composição de padrões de desenho (tal como aqui exemplificado) especialmente concebidos para uma evolução constante dos sistemas a que servem de infra-estrutura</a:t>
+              <a:t> e técnicas presentes em meta-arquitecturas e em sistemas incompletos por natureza, com o objectivo de tornar o desenvolvimento em Ruby on Rails o mais possivel adaptavel à mudança</a:t>
+            </a:r>
+          </a:p>
+          <a:p>
+            <a:endParaRPr lang="pt-PT" baseline="0" dirty="0" smtClean="0"/>
+          </a:p>
+          <a:p>
+            <a:r>
+              <a:rPr lang="pt-PT" dirty="0" smtClean="0"/>
+              <a:t>Also mention MySQL usage constraints</a:t>
             </a:r>
             <a:endParaRPr lang="pt-PT" dirty="0"/>
           </a:p>
@@ -2882,7 +3563,7 @@
             <a:fld id="{EE5867BE-386C-4D16-9B1D-8635FC172DF2}" type="slidenum">
               <a:rPr lang="pt-PT" smtClean="0"/>
               <a:pPr/>
-              <a:t>13</a:t>
+              <a:t>6</a:t>
             </a:fld>
             <a:endParaRPr lang="pt-PT"/>
           </a:p>
@@ -2944,50 +3625,11 @@
           <a:p>
             <a:r>
               <a:rPr lang="pt-PT" dirty="0" smtClean="0"/>
-              <a:t>Este tipo de arquitecturas são normalmente desenhadas em 3 níveis,</a:t>
+              <a:t>Assim,</a:t>
             </a:r>
             <a:r>
               <a:rPr lang="pt-PT" baseline="0" dirty="0" smtClean="0"/>
-              <a:t> MO, M1 e M2 com um 4º nível opcional M3, caso a arquitectura esteja de acordo com o Meta Object Facility definida pelo Object Management Group. Esta especificação tem como objectivo definir uma arquitectura de metamodelação para modelos MOF e para o próprio UML, por exemplo.</a:t>
-            </a:r>
-          </a:p>
-          <a:p>
-            <a:endParaRPr lang="pt-PT" baseline="0" dirty="0" smtClean="0"/>
-          </a:p>
-          <a:p>
-            <a:r>
-              <a:rPr lang="pt-PT" baseline="0" dirty="0" smtClean="0"/>
-              <a:t>Explicar as associações em runtime, começando por M2</a:t>
-            </a:r>
-          </a:p>
-          <a:p>
-            <a:endParaRPr lang="pt-PT" baseline="0" dirty="0" smtClean="0"/>
-          </a:p>
-          <a:p>
-            <a:r>
-              <a:rPr lang="pt-PT" baseline="0" dirty="0" smtClean="0"/>
-              <a:t>M2 – infraestrutura</a:t>
-            </a:r>
-          </a:p>
-          <a:p>
-            <a:r>
-              <a:rPr lang="pt-PT" baseline="0" dirty="0" smtClean="0"/>
-              <a:t>M1 – definição do sistema</a:t>
-            </a:r>
-          </a:p>
-          <a:p>
-            <a:r>
-              <a:rPr lang="pt-PT" baseline="0" dirty="0" smtClean="0"/>
-              <a:t>M0 – dados, camada operacional</a:t>
-            </a:r>
-          </a:p>
-          <a:p>
-            <a:endParaRPr lang="pt-PT" baseline="0" dirty="0" smtClean="0"/>
-          </a:p>
-          <a:p>
-            <a:r>
-              <a:rPr lang="pt-PT" baseline="0" dirty="0" smtClean="0"/>
-              <a:t>Estabelecer uma analogia com ferramentas de programação visual / descrição de sistemas</a:t>
+              <a:t> é fundamental saber o que é que já foi feito e que estudos foram conduzidos para tentar resolver estes problemas? Existem diferentes abordagens, tanto ao nível do método como da técnica</a:t>
             </a:r>
             <a:endParaRPr lang="pt-PT" dirty="0"/>
           </a:p>
@@ -3011,7 +3653,7 @@
             <a:fld id="{EE5867BE-386C-4D16-9B1D-8635FC172DF2}" type="slidenum">
               <a:rPr lang="pt-PT" smtClean="0"/>
               <a:pPr/>
-              <a:t>14</a:t>
+              <a:t>7</a:t>
             </a:fld>
             <a:endParaRPr lang="pt-PT"/>
           </a:p>
@@ -3071,14 +3713,95 @@
           </a:bodyPr>
           <a:lstStyle/>
           <a:p>
-            <a:r>
-              <a:rPr lang="pt-PT" dirty="0" smtClean="0"/>
-              <a:t>Tendo estes conhecimentos e técnicas, vejamos o que é que foi então feito para atacar o problema e tornar o escolinhas o mais ágil e adaptavel à constante</a:t>
-            </a:r>
-            <a:r>
-              <a:rPr lang="pt-PT" baseline="0" dirty="0" smtClean="0"/>
-              <a:t> evolução que sofre.</a:t>
-            </a:r>
+            <a:pPr>
+              <a:buFont typeface="Arial" charset="0"/>
+              <a:buNone/>
+            </a:pPr>
+            <a:r>
+              <a:rPr lang="pt-PT" sz="1200" b="0" i="0" kern="1200" dirty="0" smtClean="0">
+                <a:solidFill>
+                  <a:schemeClr val="tx1"/>
+                </a:solidFill>
+                <a:latin typeface="+mn-lt"/>
+                <a:ea typeface="+mn-ea"/>
+                <a:cs typeface="+mn-cs"/>
+              </a:rPr>
+              <a:t>* As equipas responsaveis por projectos de software devem ter o seu foco principal no dominio do problema e na lógica inerente a esse domínio</a:t>
+            </a:r>
+          </a:p>
+          <a:p>
+            <a:pPr>
+              <a:buFont typeface="Arial" charset="0"/>
+              <a:buNone/>
+            </a:pPr>
+            <a:endParaRPr lang="pt-PT" sz="1200" b="0" i="0" kern="1200" dirty="0" smtClean="0">
+              <a:solidFill>
+                <a:schemeClr val="tx1"/>
+              </a:solidFill>
+              <a:latin typeface="+mn-lt"/>
+              <a:ea typeface="+mn-ea"/>
+              <a:cs typeface="+mn-cs"/>
+            </a:endParaRPr>
+          </a:p>
+          <a:p>
+            <a:pPr>
+              <a:buFont typeface="Arial" charset="0"/>
+              <a:buNone/>
+            </a:pPr>
+            <a:r>
+              <a:rPr lang="pt-PT" sz="1200" b="0" i="0" kern="1200" dirty="0" smtClean="0">
+                <a:solidFill>
+                  <a:schemeClr val="tx1"/>
+                </a:solidFill>
+                <a:latin typeface="+mn-lt"/>
+                <a:ea typeface="+mn-ea"/>
+                <a:cs typeface="+mn-cs"/>
+              </a:rPr>
+              <a:t>*</a:t>
+            </a:r>
+            <a:r>
+              <a:rPr lang="pt-PT" sz="1200" b="0" i="0" kern="1200" baseline="0" dirty="0" smtClean="0">
+                <a:solidFill>
+                  <a:schemeClr val="tx1"/>
+                </a:solidFill>
+                <a:latin typeface="+mn-lt"/>
+                <a:ea typeface="+mn-ea"/>
+                <a:cs typeface="+mn-cs"/>
+              </a:rPr>
+              <a:t> </a:t>
+            </a:r>
+            <a:r>
+              <a:rPr lang="pt-PT" sz="1200" b="0" i="0" kern="1200" dirty="0" smtClean="0">
+                <a:solidFill>
+                  <a:schemeClr val="tx1"/>
+                </a:solidFill>
+                <a:latin typeface="+mn-lt"/>
+                <a:ea typeface="+mn-ea"/>
+                <a:cs typeface="+mn-cs"/>
+              </a:rPr>
+              <a:t>Domínios cujo desenho</a:t>
+            </a:r>
+            <a:r>
+              <a:rPr lang="pt-PT" sz="1200" b="0" i="0" kern="1200" baseline="0" dirty="0" smtClean="0">
+                <a:solidFill>
+                  <a:schemeClr val="tx1"/>
+                </a:solidFill>
+                <a:latin typeface="+mn-lt"/>
+                <a:ea typeface="+mn-ea"/>
+                <a:cs typeface="+mn-cs"/>
+              </a:rPr>
+              <a:t> seja muito complexo devem ser baseados em modelos</a:t>
+            </a:r>
+            <a:endParaRPr lang="pt-PT" sz="1200" b="0" i="0" kern="1200" dirty="0" smtClean="0">
+              <a:solidFill>
+                <a:schemeClr val="tx1"/>
+              </a:solidFill>
+              <a:latin typeface="+mn-lt"/>
+              <a:ea typeface="+mn-ea"/>
+              <a:cs typeface="+mn-cs"/>
+            </a:endParaRPr>
+          </a:p>
+          <a:p>
             <a:endParaRPr lang="pt-PT" dirty="0"/>
           </a:p>
         </p:txBody>
@@ -3101,7 +3824,7 @@
             <a:fld id="{EE5867BE-386C-4D16-9B1D-8635FC172DF2}" type="slidenum">
               <a:rPr lang="pt-PT" smtClean="0"/>
               <a:pPr/>
-              <a:t>15</a:t>
+              <a:t>8</a:t>
             </a:fld>
             <a:endParaRPr lang="pt-PT"/>
           </a:p>
@@ -3163,46 +3886,19 @@
           <a:p>
             <a:r>
               <a:rPr lang="pt-PT" dirty="0" smtClean="0"/>
-              <a:t>Explicar o processo de estudo,</a:t>
+              <a:t>Tendo apresentado todas estas metodologias, o</a:t>
             </a:r>
             <a:r>
               <a:rPr lang="pt-PT" baseline="0" dirty="0" smtClean="0"/>
-              <a:t> como é que a plataforma foi estudada, etc</a:t>
-            </a:r>
-            <a:endParaRPr lang="pt-PT" dirty="0" smtClean="0"/>
-          </a:p>
-          <a:p>
-            <a:endParaRPr lang="pt-PT" dirty="0" smtClean="0"/>
-          </a:p>
-          <a:p>
+              <a:t> verdadeiro</a:t>
+            </a:r>
             <a:r>
               <a:rPr lang="pt-PT" dirty="0" smtClean="0"/>
-              <a:t>Foram então escolhidas</a:t>
+              <a:t> foco desta</a:t>
             </a:r>
             <a:r>
               <a:rPr lang="pt-PT" baseline="0" dirty="0" smtClean="0"/>
-              <a:t> 3 áreas:</a:t>
-            </a:r>
-          </a:p>
-          <a:p>
-            <a:endParaRPr lang="pt-PT" baseline="0" dirty="0" smtClean="0"/>
-          </a:p>
-          <a:p>
-            <a:r>
-              <a:rPr lang="pt-PT" baseline="0" dirty="0" smtClean="0"/>
-              <a:t>  * papeis de utilizadores</a:t>
-            </a:r>
-          </a:p>
-          <a:p>
-            <a:r>
-              <a:rPr lang="pt-PT" baseline="0" dirty="0" smtClean="0"/>
-              <a:t>  * rede social</a:t>
-            </a:r>
-          </a:p>
-          <a:p>
-            <a:r>
-              <a:rPr lang="pt-PT" baseline="0" dirty="0" smtClean="0"/>
-              <a:t>  * editor de documentos</a:t>
+              <a:t> dissertação é, no entanto, os padrões de desenho, especificamente os que fazem parte das arquitecturas</a:t>
             </a:r>
             <a:endParaRPr lang="pt-PT" dirty="0"/>
           </a:p>
@@ -3226,7 +3922,7 @@
             <a:fld id="{EE5867BE-386C-4D16-9B1D-8635FC172DF2}" type="slidenum">
               <a:rPr lang="pt-PT" smtClean="0"/>
               <a:pPr/>
-              <a:t>16</a:t>
+              <a:t>12</a:t>
             </a:fld>
             <a:endParaRPr lang="pt-PT"/>
           </a:p>
@@ -7425,7 +8121,7 @@
       </p:grpSpPr>
       <p:pic>
         <p:nvPicPr>
-          <p:cNvPr id="1026" name="Picture 2" descr="C:\Users\jgradim\Documents\thesis\presentations\images\aom_mof_levels.png"/>
+          <p:cNvPr id="1027" name="Picture 3" descr="C:\Users\jgradim\Documents\thesis\presentations\images\aom_mof_levels_cropped.png"/>
           <p:cNvPicPr>
             <a:picLocks noChangeAspect="1" noChangeArrowheads="1"/>
           </p:cNvPicPr>
@@ -7440,8 +8136,8 @@
         </p:blipFill>
         <p:spPr bwMode="auto">
           <a:xfrm>
-            <a:off x="919163" y="692696"/>
-            <a:ext cx="7305675" cy="5934075"/>
+            <a:off x="1240062" y="722615"/>
+            <a:ext cx="6663876" cy="5412770"/>
           </a:xfrm>
           <a:prstGeom prst="rect">
             <a:avLst/>
@@ -7848,49 +8544,6 @@
                 <a:latin typeface="MetaSerif-Book" pitchFamily="34" charset="0"/>
               </a:rPr>
               <a:t>Variability Analysis</a:t>
-            </a:r>
-          </a:p>
-          <a:p>
-            <a:pPr indent="0">
-              <a:lnSpc>
-                <a:spcPct val="110000"/>
-              </a:lnSpc>
-              <a:spcBef>
-                <a:spcPts val="0"/>
-              </a:spcBef>
-              <a:buNone/>
-            </a:pPr>
-            <a:endParaRPr lang="pt-PT" sz="3600" dirty="0" smtClean="0">
-              <a:solidFill>
-                <a:schemeClr val="tx1">
-                  <a:lumMod val="85000"/>
-                  <a:lumOff val="15000"/>
-                </a:schemeClr>
-              </a:solidFill>
-              <a:latin typeface="MetaSerif-Book" pitchFamily="34" charset="0"/>
-            </a:endParaRPr>
-          </a:p>
-          <a:p>
-            <a:pPr indent="0">
-              <a:lnSpc>
-                <a:spcPct val="110000"/>
-              </a:lnSpc>
-              <a:spcBef>
-                <a:spcPts val="0"/>
-              </a:spcBef>
-              <a:buNone/>
-            </a:pPr>
-            <a:r>
-              <a:rPr lang="pt-PT" sz="3600" dirty="0" smtClean="0">
-                <a:solidFill>
-                  <a:schemeClr val="tx1">
-                    <a:lumMod val="85000"/>
-                    <a:lumOff val="15000"/>
-                  </a:schemeClr>
-                </a:solidFill>
-                <a:latin typeface="MetaSerif-Book" pitchFamily="34" charset="0"/>
-              </a:rPr>
-              <a:t>Implementation &amp; Impact Analysis</a:t>
             </a:r>
           </a:p>
         </p:txBody>
@@ -10961,7 +11614,7 @@
                 </a:solidFill>
                 <a:latin typeface="League Gothic" pitchFamily="50" charset="0"/>
               </a:rPr>
-              <a:t>Document Editor – After</a:t>
+              <a:t>Document Editor – Before</a:t>
             </a:r>
             <a:endParaRPr lang="pt-PT" sz="1800" dirty="0">
               <a:solidFill>
@@ -10991,6 +11644,141 @@
               <a:rPr lang="pt-PT" smtClean="0"/>
               <a:pPr/>
               <a:t>32</a:t>
+            </a:fld>
+            <a:endParaRPr lang="pt-PT" dirty="0"/>
+          </a:p>
+        </p:txBody>
+      </p:sp>
+      <p:pic>
+        <p:nvPicPr>
+          <p:cNvPr id="4098" name="Picture 2" descr="C:\Users\jgradim\Documents\thesis\presentations\images\documents_current.png"/>
+          <p:cNvPicPr>
+            <a:picLocks noChangeAspect="1" noChangeArrowheads="1"/>
+          </p:cNvPicPr>
+          <p:nvPr/>
+        </p:nvPicPr>
+        <p:blipFill>
+          <a:blip r:embed="rId3" cstate="print"/>
+          <a:srcRect/>
+          <a:stretch>
+            <a:fillRect/>
+          </a:stretch>
+        </p:blipFill>
+        <p:spPr bwMode="auto">
+          <a:xfrm>
+            <a:off x="323528" y="1294624"/>
+            <a:ext cx="8496944" cy="4654656"/>
+          </a:xfrm>
+          <a:prstGeom prst="rect">
+            <a:avLst/>
+          </a:prstGeom>
+          <a:noFill/>
+          <a:effectLst>
+            <a:outerShdw blurRad="50800" dist="38100" dir="2700000" algn="tl" rotWithShape="0">
+              <a:prstClr val="black">
+                <a:alpha val="40000"/>
+              </a:prstClr>
+            </a:outerShdw>
+          </a:effectLst>
+        </p:spPr>
+      </p:pic>
+    </p:spTree>
+  </p:cSld>
+  <p:clrMapOvr>
+    <a:masterClrMapping/>
+  </p:clrMapOvr>
+  <p:timing>
+    <p:tnLst>
+      <p:par>
+        <p:cTn id="1" dur="indefinite" restart="never" nodeType="tmRoot"/>
+      </p:par>
+    </p:tnLst>
+  </p:timing>
+</p:sld>
+</file>
+
+<file path=ppt/slides/slide33.xml><?xml version="1.0" encoding="utf-8"?>
+<p:sld xmlns:a="http://schemas.openxmlformats.org/drawingml/2006/main" xmlns:r="http://schemas.openxmlformats.org/officeDocument/2006/relationships" xmlns:p="http://schemas.openxmlformats.org/presentationml/2006/main">
+  <p:cSld>
+    <p:spTree>
+      <p:nvGrpSpPr>
+        <p:cNvPr id="1" name=""/>
+        <p:cNvGrpSpPr/>
+        <p:nvPr/>
+      </p:nvGrpSpPr>
+      <p:grpSpPr>
+        <a:xfrm>
+          <a:off x="0" y="0"/>
+          <a:ext cx="0" cy="0"/>
+          <a:chOff x="0" y="0"/>
+          <a:chExt cx="0" cy="0"/>
+        </a:xfrm>
+      </p:grpSpPr>
+      <p:sp>
+        <p:nvSpPr>
+          <p:cNvPr id="2" name="Title 1"/>
+          <p:cNvSpPr>
+            <a:spLocks noGrp="1"/>
+          </p:cNvSpPr>
+          <p:nvPr>
+            <p:ph type="title"/>
+          </p:nvPr>
+        </p:nvSpPr>
+        <p:spPr>
+          <a:xfrm>
+            <a:off x="4464000" y="188640"/>
+            <a:ext cx="4680000" cy="706090"/>
+          </a:xfrm>
+          <a:solidFill>
+            <a:schemeClr val="tx1">
+              <a:alpha val="90000"/>
+            </a:schemeClr>
+          </a:solidFill>
+        </p:spPr>
+        <p:txBody>
+          <a:bodyPr rIns="144000">
+            <a:normAutofit/>
+          </a:bodyPr>
+          <a:lstStyle/>
+          <a:p>
+            <a:pPr algn="r"/>
+            <a:r>
+              <a:rPr lang="pt-PT" sz="3200" dirty="0" smtClean="0">
+                <a:solidFill>
+                  <a:schemeClr val="bg1"/>
+                </a:solidFill>
+                <a:latin typeface="League Gothic" pitchFamily="50" charset="0"/>
+              </a:rPr>
+              <a:t>Document Editor – After</a:t>
+            </a:r>
+            <a:endParaRPr lang="pt-PT" sz="1800" dirty="0">
+              <a:solidFill>
+                <a:schemeClr val="bg1"/>
+              </a:solidFill>
+              <a:latin typeface="League Gothic" pitchFamily="50" charset="0"/>
+            </a:endParaRPr>
+          </a:p>
+        </p:txBody>
+      </p:sp>
+      <p:sp>
+        <p:nvSpPr>
+          <p:cNvPr id="4" name="Slide Number Placeholder 3"/>
+          <p:cNvSpPr>
+            <a:spLocks noGrp="1"/>
+          </p:cNvSpPr>
+          <p:nvPr>
+            <p:ph type="sldNum" sz="quarter" idx="12"/>
+          </p:nvPr>
+        </p:nvSpPr>
+        <p:spPr/>
+        <p:txBody>
+          <a:bodyPr/>
+          <a:lstStyle/>
+          <a:p>
+            <a:fld id="{AF2DD60D-AE1E-4B35-90D2-0ABAEDD7A6F5}" type="slidenum">
+              <a:rPr lang="pt-PT" smtClean="0"/>
+              <a:pPr/>
+              <a:t>33</a:t>
             </a:fld>
             <a:endParaRPr lang="pt-PT" dirty="0"/>
           </a:p>
@@ -11044,7 +11832,7 @@
 </p:sld>
 </file>
 
-<file path=ppt/slides/slide33.xml><?xml version="1.0" encoding="utf-8"?>
+<file path=ppt/slides/slide34.xml><?xml version="1.0" encoding="utf-8"?>
 <p:sld xmlns:a="http://schemas.openxmlformats.org/drawingml/2006/main" xmlns:r="http://schemas.openxmlformats.org/officeDocument/2006/relationships" xmlns:p="http://schemas.openxmlformats.org/presentationml/2006/main">
   <p:cSld>
     <p:spTree>
@@ -11125,7 +11913,7 @@
             <a:fld id="{AF2DD60D-AE1E-4B35-90D2-0ABAEDD7A6F5}" type="slidenum">
               <a:rPr lang="pt-PT" smtClean="0"/>
               <a:pPr/>
-              <a:t>33</a:t>
+              <a:t>34</a:t>
             </a:fld>
             <a:endParaRPr lang="pt-PT" dirty="0"/>
           </a:p>
@@ -11285,7 +12073,7 @@
 </p:sld>
 </file>
 
-<file path=ppt/slides/slide34.xml><?xml version="1.0" encoding="utf-8"?>
+<file path=ppt/slides/slide35.xml><?xml version="1.0" encoding="utf-8"?>
 <p:sld xmlns:a="http://schemas.openxmlformats.org/drawingml/2006/main" xmlns:r="http://schemas.openxmlformats.org/officeDocument/2006/relationships" xmlns:p="http://schemas.openxmlformats.org/presentationml/2006/main">
   <p:cSld>
     <p:spTree>
@@ -11392,7 +12180,7 @@
             <a:fld id="{AF2DD60D-AE1E-4B35-90D2-0ABAEDD7A6F5}" type="slidenum">
               <a:rPr lang="pt-PT" smtClean="0"/>
               <a:pPr/>
-              <a:t>34</a:t>
+              <a:t>35</a:t>
             </a:fld>
             <a:endParaRPr lang="pt-PT" dirty="0"/>
           </a:p>
@@ -11413,7 +12201,7 @@
 </p:sld>
 </file>
 
-<file path=ppt/slides/slide35.xml><?xml version="1.0" encoding="utf-8"?>
+<file path=ppt/slides/slide36.xml><?xml version="1.0" encoding="utf-8"?>
 <p:sld xmlns:a="http://schemas.openxmlformats.org/drawingml/2006/main" xmlns:r="http://schemas.openxmlformats.org/officeDocument/2006/relationships" xmlns:p="http://schemas.openxmlformats.org/presentationml/2006/main">
   <p:cSld>
     <p:spTree>
@@ -11494,7 +12282,7 @@
             <a:fld id="{AF2DD60D-AE1E-4B35-90D2-0ABAEDD7A6F5}" type="slidenum">
               <a:rPr lang="pt-PT" smtClean="0"/>
               <a:pPr/>
-              <a:t>35</a:t>
+              <a:t>36</a:t>
             </a:fld>
             <a:endParaRPr lang="pt-PT" dirty="0"/>
           </a:p>
@@ -11541,7 +12329,7 @@
 </p:sld>
 </file>
 
-<file path=ppt/slides/slide36.xml><?xml version="1.0" encoding="utf-8"?>
+<file path=ppt/slides/slide37.xml><?xml version="1.0" encoding="utf-8"?>
 <p:sld xmlns:a="http://schemas.openxmlformats.org/drawingml/2006/main" xmlns:r="http://schemas.openxmlformats.org/officeDocument/2006/relationships" xmlns:p="http://schemas.openxmlformats.org/presentationml/2006/main">
   <p:cSld>
     <p:spTree>
@@ -11622,7 +12410,7 @@
             <a:fld id="{AF2DD60D-AE1E-4B35-90D2-0ABAEDD7A6F5}" type="slidenum">
               <a:rPr lang="pt-PT" smtClean="0"/>
               <a:pPr/>
-              <a:t>36</a:t>
+              <a:t>37</a:t>
             </a:fld>
             <a:endParaRPr lang="pt-PT" dirty="0"/>
           </a:p>
@@ -11637,7 +12425,7 @@
           <p:nvPr/>
         </p:nvPicPr>
         <p:blipFill>
-          <a:blip r:embed="rId2" cstate="print"/>
+          <a:blip r:embed="rId3" cstate="print"/>
           <a:srcRect/>
           <a:stretch>
             <a:fillRect/>
@@ -11669,7 +12457,7 @@
 </p:sld>
 </file>
 
-<file path=ppt/slides/slide37.xml><?xml version="1.0" encoding="utf-8"?>
+<file path=ppt/slides/slide38.xml><?xml version="1.0" encoding="utf-8"?>
 <p:sld xmlns:a="http://schemas.openxmlformats.org/drawingml/2006/main" xmlns:r="http://schemas.openxmlformats.org/officeDocument/2006/relationships" xmlns:p="http://schemas.openxmlformats.org/presentationml/2006/main">
   <p:cSld>
     <p:spTree>
@@ -11828,161 +12616,6 @@
 </p:sld>
 </file>
 
-<file path=ppt/slides/slide38.xml><?xml version="1.0" encoding="utf-8"?>
-<p:sld xmlns:a="http://schemas.openxmlformats.org/drawingml/2006/main" xmlns:r="http://schemas.openxmlformats.org/officeDocument/2006/relationships" xmlns:p="http://schemas.openxmlformats.org/presentationml/2006/main">
-  <p:cSld>
-    <p:spTree>
-      <p:nvGrpSpPr>
-        <p:cNvPr id="1" name=""/>
-        <p:cNvGrpSpPr/>
-        <p:nvPr/>
-      </p:nvGrpSpPr>
-      <p:grpSpPr>
-        <a:xfrm>
-          <a:off x="0" y="0"/>
-          <a:ext cx="0" cy="0"/>
-          <a:chOff x="0" y="0"/>
-          <a:chExt cx="0" cy="0"/>
-        </a:xfrm>
-      </p:grpSpPr>
-      <p:sp>
-        <p:nvSpPr>
-          <p:cNvPr id="2" name="Title 1"/>
-          <p:cNvSpPr>
-            <a:spLocks noGrp="1"/>
-          </p:cNvSpPr>
-          <p:nvPr>
-            <p:ph type="title"/>
-          </p:nvPr>
-        </p:nvSpPr>
-        <p:spPr>
-          <a:xfrm>
-            <a:off x="4464000" y="188640"/>
-            <a:ext cx="4680000" cy="706090"/>
-          </a:xfrm>
-          <a:solidFill>
-            <a:schemeClr val="tx1">
-              <a:alpha val="90000"/>
-            </a:schemeClr>
-          </a:solidFill>
-        </p:spPr>
-        <p:txBody>
-          <a:bodyPr rIns="144000">
-            <a:normAutofit/>
-          </a:bodyPr>
-          <a:lstStyle/>
-          <a:p>
-            <a:pPr algn="r"/>
-            <a:r>
-              <a:rPr lang="pt-PT" sz="3200" dirty="0" smtClean="0">
-                <a:solidFill>
-                  <a:schemeClr val="bg1"/>
-                </a:solidFill>
-                <a:latin typeface="League Gothic" pitchFamily="50" charset="0"/>
-              </a:rPr>
-              <a:t>AOMs</a:t>
-            </a:r>
-            <a:endParaRPr lang="pt-PT" sz="3200" dirty="0">
-              <a:solidFill>
-                <a:schemeClr val="bg1"/>
-              </a:solidFill>
-              <a:latin typeface="League Gothic" pitchFamily="50" charset="0"/>
-            </a:endParaRPr>
-          </a:p>
-        </p:txBody>
-      </p:sp>
-      <p:sp>
-        <p:nvSpPr>
-          <p:cNvPr id="3" name="Content Placeholder 2"/>
-          <p:cNvSpPr>
-            <a:spLocks noGrp="1"/>
-          </p:cNvSpPr>
-          <p:nvPr>
-            <p:ph idx="1"/>
-          </p:nvPr>
-        </p:nvSpPr>
-        <p:spPr>
-          <a:xfrm>
-            <a:off x="457200" y="1124744"/>
-            <a:ext cx="8229600" cy="5040560"/>
-          </a:xfrm>
-          <a:effectLst>
-            <a:outerShdw blurRad="50800" dist="25400" dir="2700000" algn="tl" rotWithShape="0">
-              <a:prstClr val="black">
-                <a:alpha val="15000"/>
-              </a:prstClr>
-            </a:outerShdw>
-          </a:effectLst>
-        </p:spPr>
-        <p:txBody>
-          <a:bodyPr vert="horz" anchor="ctr" anchorCtr="1">
-            <a:normAutofit/>
-          </a:bodyPr>
-          <a:lstStyle/>
-          <a:p>
-            <a:pPr indent="0">
-              <a:lnSpc>
-                <a:spcPct val="110000"/>
-              </a:lnSpc>
-              <a:spcBef>
-                <a:spcPts val="0"/>
-              </a:spcBef>
-              <a:buNone/>
-            </a:pPr>
-            <a:r>
-              <a:rPr lang="pt-PT" sz="3600" dirty="0" smtClean="0">
-                <a:solidFill>
-                  <a:schemeClr val="tx1">
-                    <a:lumMod val="85000"/>
-                    <a:lumOff val="15000"/>
-                  </a:schemeClr>
-                </a:solidFill>
-                <a:latin typeface="MetaSerif-Book" pitchFamily="34" charset="0"/>
-              </a:rPr>
-              <a:t>AOM architectures provide the best framework for building adaptable software systems</a:t>
-            </a:r>
-          </a:p>
-        </p:txBody>
-      </p:sp>
-      <p:sp>
-        <p:nvSpPr>
-          <p:cNvPr id="4" name="Slide Number Placeholder 3"/>
-          <p:cNvSpPr>
-            <a:spLocks noGrp="1"/>
-          </p:cNvSpPr>
-          <p:nvPr>
-            <p:ph type="sldNum" sz="quarter" idx="12"/>
-          </p:nvPr>
-        </p:nvSpPr>
-        <p:spPr/>
-        <p:txBody>
-          <a:bodyPr/>
-          <a:lstStyle/>
-          <a:p>
-            <a:fld id="{AF2DD60D-AE1E-4B35-90D2-0ABAEDD7A6F5}" type="slidenum">
-              <a:rPr lang="pt-PT" smtClean="0"/>
-              <a:pPr/>
-              <a:t>38</a:t>
-            </a:fld>
-            <a:endParaRPr lang="pt-PT" dirty="0"/>
-          </a:p>
-        </p:txBody>
-      </p:sp>
-    </p:spTree>
-  </p:cSld>
-  <p:clrMapOvr>
-    <a:masterClrMapping/>
-  </p:clrMapOvr>
-  <p:timing>
-    <p:tnLst>
-      <p:par>
-        <p:cTn id="1" dur="indefinite" restart="never" nodeType="tmRoot"/>
-      </p:par>
-    </p:tnLst>
-  </p:timing>
-</p:sld>
-</file>
-
 <file path=ppt/slides/slide39.xml><?xml version="1.0" encoding="utf-8"?>
 <p:sld xmlns:a="http://schemas.openxmlformats.org/drawingml/2006/main" xmlns:r="http://schemas.openxmlformats.org/officeDocument/2006/relationships" xmlns:p="http://schemas.openxmlformats.org/presentationml/2006/main">
   <p:cSld>
@@ -12035,7 +12668,7 @@
                 </a:solidFill>
                 <a:latin typeface="League Gothic" pitchFamily="50" charset="0"/>
               </a:rPr>
-              <a:t>Variability</a:t>
+              <a:t>AOMs</a:t>
             </a:r>
             <a:endParaRPr lang="pt-PT" sz="3200" dirty="0">
               <a:solidFill>
@@ -12048,45 +12681,19 @@
       </p:sp>
       <p:sp>
         <p:nvSpPr>
-          <p:cNvPr id="4" name="Slide Number Placeholder 3"/>
-          <p:cNvSpPr>
-            <a:spLocks noGrp="1"/>
-          </p:cNvSpPr>
-          <p:nvPr>
-            <p:ph type="sldNum" sz="quarter" idx="12"/>
-          </p:nvPr>
-        </p:nvSpPr>
-        <p:spPr/>
-        <p:txBody>
-          <a:bodyPr/>
-          <a:lstStyle/>
-          <a:p>
-            <a:fld id="{AF2DD60D-AE1E-4B35-90D2-0ABAEDD7A6F5}" type="slidenum">
-              <a:rPr lang="pt-PT" smtClean="0"/>
-              <a:pPr/>
-              <a:t>39</a:t>
-            </a:fld>
-            <a:endParaRPr lang="pt-PT" dirty="0"/>
-          </a:p>
-        </p:txBody>
-      </p:sp>
-      <p:sp>
-        <p:nvSpPr>
-          <p:cNvPr id="5" name="Content Placeholder 2"/>
-          <p:cNvSpPr txBox="1">
-            <a:spLocks/>
-          </p:cNvSpPr>
-          <p:nvPr/>
+          <p:cNvPr id="3" name="Content Placeholder 2"/>
+          <p:cNvSpPr>
+            <a:spLocks noGrp="1"/>
+          </p:cNvSpPr>
+          <p:nvPr>
+            <p:ph idx="1"/>
+          </p:nvPr>
         </p:nvSpPr>
         <p:spPr>
           <a:xfrm>
             <a:off x="457200" y="1124744"/>
             <a:ext cx="8229600" cy="5040560"/>
           </a:xfrm>
-          <a:prstGeom prst="rect">
-            <a:avLst/>
-          </a:prstGeom>
-          <a:noFill/>
           <a:effectLst>
             <a:outerShdw blurRad="50800" dist="25400" dir="2700000" algn="tl" rotWithShape="0">
               <a:prstClr val="black">
@@ -12096,95 +12703,19 @@
           </a:effectLst>
         </p:spPr>
         <p:txBody>
-          <a:bodyPr vert="horz" lIns="91440" tIns="45720" rIns="91440" bIns="45720" rtlCol="0" anchor="ctr" anchorCtr="1">
+          <a:bodyPr vert="horz" anchor="ctr" anchorCtr="1">
             <a:normAutofit/>
           </a:bodyPr>
           <a:lstStyle/>
           <a:p>
-            <a:pPr marL="342900" marR="0" lvl="0" indent="0" algn="l" defTabSz="914400" rtl="0" eaLnBrk="1" fontAlgn="auto" latinLnBrk="0" hangingPunct="1">
+            <a:pPr indent="0">
               <a:lnSpc>
                 <a:spcPct val="110000"/>
               </a:lnSpc>
               <a:spcBef>
                 <a:spcPts val="0"/>
               </a:spcBef>
-              <a:spcAft>
-                <a:spcPts val="0"/>
-              </a:spcAft>
-              <a:buClr>
-                <a:schemeClr val="bg1">
-                  <a:lumMod val="65000"/>
-                </a:schemeClr>
-              </a:buClr>
-              <a:buSzTx/>
-              <a:buFont typeface="Arial" pitchFamily="34" charset="0"/>
               <a:buNone/>
-              <a:tabLst/>
-              <a:defRPr/>
-            </a:pPr>
-            <a:r>
-              <a:rPr kumimoji="0" lang="pt-PT" sz="3600" b="0" i="0" u="none" strike="noStrike" kern="1200" cap="none" spc="0" normalizeH="0" baseline="0" noProof="0" dirty="0" smtClean="0">
-                <a:ln>
-                  <a:noFill/>
-                </a:ln>
-                <a:solidFill>
-                  <a:schemeClr val="tx1">
-                    <a:lumMod val="85000"/>
-                    <a:lumOff val="15000"/>
-                  </a:schemeClr>
-                </a:solidFill>
-                <a:effectLst/>
-                <a:uLnTx/>
-                <a:uFillTx/>
-                <a:latin typeface="MetaSerif-Book" pitchFamily="34" charset="0"/>
-                <a:ea typeface="+mn-ea"/>
-                <a:cs typeface="+mn-cs"/>
-              </a:rPr>
-              <a:t>Different degrees of variability achieved</a:t>
-            </a:r>
-          </a:p>
-          <a:p>
-            <a:pPr marL="342900" marR="0" lvl="0" indent="0" algn="l" defTabSz="914400" rtl="0" eaLnBrk="1" fontAlgn="auto" latinLnBrk="0" hangingPunct="1">
-              <a:lnSpc>
-                <a:spcPct val="110000"/>
-              </a:lnSpc>
-              <a:spcBef>
-                <a:spcPts val="0"/>
-              </a:spcBef>
-              <a:spcAft>
-                <a:spcPts val="0"/>
-              </a:spcAft>
-              <a:buClr>
-                <a:schemeClr val="bg1">
-                  <a:lumMod val="65000"/>
-                </a:schemeClr>
-              </a:buClr>
-              <a:buSzTx/>
-              <a:buFont typeface="Arial" pitchFamily="34" charset="0"/>
-              <a:buNone/>
-              <a:tabLst/>
-              <a:defRPr/>
-            </a:pPr>
-            <a:endParaRPr lang="pt-PT" sz="3600" dirty="0" smtClean="0">
-              <a:solidFill>
-                <a:schemeClr val="tx1">
-                  <a:lumMod val="85000"/>
-                  <a:lumOff val="15000"/>
-                </a:schemeClr>
-              </a:solidFill>
-              <a:latin typeface="MetaSerif-Book" pitchFamily="34" charset="0"/>
-            </a:endParaRPr>
-          </a:p>
-          <a:p>
-            <a:pPr marL="342900">
-              <a:lnSpc>
-                <a:spcPct val="110000"/>
-              </a:lnSpc>
-              <a:buClr>
-                <a:schemeClr val="bg1">
-                  <a:lumMod val="65000"/>
-                </a:schemeClr>
-              </a:buClr>
             </a:pPr>
             <a:r>
               <a:rPr lang="pt-PT" sz="3600" dirty="0" smtClean="0">
@@ -12196,25 +12727,32 @@
                 </a:solidFill>
                 <a:latin typeface="MetaSerif-Book" pitchFamily="34" charset="0"/>
               </a:rPr>
-              <a:t>Rails MVC architecture and conventions may be an obstacle to highly-variable systems</a:t>
-            </a:r>
-            <a:endParaRPr kumimoji="0" lang="pt-PT" sz="3600" b="0" i="0" u="none" strike="noStrike" kern="1200" cap="none" spc="0" normalizeH="0" baseline="0" noProof="0" dirty="0" smtClean="0">
-              <a:ln>
-                <a:noFill/>
-              </a:ln>
-              <a:solidFill>
-                <a:schemeClr val="tx1">
-                  <a:lumMod val="85000"/>
-                  <a:lumOff val="15000"/>
-                </a:schemeClr>
-              </a:solidFill>
-              <a:effectLst/>
-              <a:uLnTx/>
-              <a:uFillTx/>
-              <a:latin typeface="MetaSerif-Book" pitchFamily="34" charset="0"/>
-              <a:ea typeface="+mn-ea"/>
-              <a:cs typeface="+mn-cs"/>
-            </a:endParaRPr>
+              <a:t>AOM architectures provide the best framework for building adaptable software systems</a:t>
+            </a:r>
+          </a:p>
+        </p:txBody>
+      </p:sp>
+      <p:sp>
+        <p:nvSpPr>
+          <p:cNvPr id="4" name="Slide Number Placeholder 3"/>
+          <p:cNvSpPr>
+            <a:spLocks noGrp="1"/>
+          </p:cNvSpPr>
+          <p:nvPr>
+            <p:ph type="sldNum" sz="quarter" idx="12"/>
+          </p:nvPr>
+        </p:nvSpPr>
+        <p:spPr/>
+        <p:txBody>
+          <a:bodyPr/>
+          <a:lstStyle/>
+          <a:p>
+            <a:fld id="{AF2DD60D-AE1E-4B35-90D2-0ABAEDD7A6F5}" type="slidenum">
+              <a:rPr lang="pt-PT" smtClean="0"/>
+              <a:pPr/>
+              <a:t>39</a:t>
+            </a:fld>
+            <a:endParaRPr lang="pt-PT" dirty="0"/>
           </a:p>
         </p:txBody>
       </p:sp>
@@ -12437,7 +12975,7 @@
                 </a:solidFill>
                 <a:latin typeface="League Gothic" pitchFamily="50" charset="0"/>
               </a:rPr>
-              <a:t>Rails, MVC &amp; AOMs</a:t>
+              <a:t>Variability</a:t>
             </a:r>
             <a:endParaRPr lang="pt-PT" sz="3200" dirty="0">
               <a:solidFill>
@@ -12450,19 +12988,45 @@
       </p:sp>
       <p:sp>
         <p:nvSpPr>
-          <p:cNvPr id="3" name="Content Placeholder 2"/>
-          <p:cNvSpPr>
-            <a:spLocks noGrp="1"/>
-          </p:cNvSpPr>
-          <p:nvPr>
-            <p:ph idx="1"/>
-          </p:nvPr>
+          <p:cNvPr id="4" name="Slide Number Placeholder 3"/>
+          <p:cNvSpPr>
+            <a:spLocks noGrp="1"/>
+          </p:cNvSpPr>
+          <p:nvPr>
+            <p:ph type="sldNum" sz="quarter" idx="12"/>
+          </p:nvPr>
+        </p:nvSpPr>
+        <p:spPr/>
+        <p:txBody>
+          <a:bodyPr/>
+          <a:lstStyle/>
+          <a:p>
+            <a:fld id="{AF2DD60D-AE1E-4B35-90D2-0ABAEDD7A6F5}" type="slidenum">
+              <a:rPr lang="pt-PT" smtClean="0"/>
+              <a:pPr/>
+              <a:t>40</a:t>
+            </a:fld>
+            <a:endParaRPr lang="pt-PT" dirty="0"/>
+          </a:p>
+        </p:txBody>
+      </p:sp>
+      <p:sp>
+        <p:nvSpPr>
+          <p:cNvPr id="5" name="Content Placeholder 2"/>
+          <p:cNvSpPr txBox="1">
+            <a:spLocks/>
+          </p:cNvSpPr>
+          <p:nvPr/>
         </p:nvSpPr>
         <p:spPr>
           <a:xfrm>
             <a:off x="457200" y="1124744"/>
             <a:ext cx="8229600" cy="5040560"/>
           </a:xfrm>
+          <a:prstGeom prst="rect">
+            <a:avLst/>
+          </a:prstGeom>
+          <a:noFill/>
           <a:effectLst>
             <a:outerShdw blurRad="50800" dist="25400" dir="2700000" algn="tl" rotWithShape="0">
               <a:prstClr val="black">
@@ -12472,19 +13036,95 @@
           </a:effectLst>
         </p:spPr>
         <p:txBody>
-          <a:bodyPr anchor="ctr" anchorCtr="1">
+          <a:bodyPr vert="horz" lIns="91440" tIns="45720" rIns="91440" bIns="45720" rtlCol="0" anchor="ctr" anchorCtr="1">
             <a:normAutofit/>
           </a:bodyPr>
           <a:lstStyle/>
           <a:p>
-            <a:pPr indent="0">
+            <a:pPr marL="342900" marR="0" lvl="0" indent="0" algn="l" defTabSz="914400" rtl="0" eaLnBrk="1" fontAlgn="auto" latinLnBrk="0" hangingPunct="1">
               <a:lnSpc>
                 <a:spcPct val="110000"/>
               </a:lnSpc>
               <a:spcBef>
                 <a:spcPts val="0"/>
               </a:spcBef>
+              <a:spcAft>
+                <a:spcPts val="0"/>
+              </a:spcAft>
+              <a:buClr>
+                <a:schemeClr val="bg1">
+                  <a:lumMod val="65000"/>
+                </a:schemeClr>
+              </a:buClr>
+              <a:buSzTx/>
+              <a:buFont typeface="Arial" pitchFamily="34" charset="0"/>
               <a:buNone/>
+              <a:tabLst/>
+              <a:defRPr/>
+            </a:pPr>
+            <a:r>
+              <a:rPr kumimoji="0" lang="pt-PT" sz="3600" b="0" i="0" u="none" strike="noStrike" kern="1200" cap="none" spc="0" normalizeH="0" baseline="0" noProof="0" dirty="0" smtClean="0">
+                <a:ln>
+                  <a:noFill/>
+                </a:ln>
+                <a:solidFill>
+                  <a:schemeClr val="tx1">
+                    <a:lumMod val="85000"/>
+                    <a:lumOff val="15000"/>
+                  </a:schemeClr>
+                </a:solidFill>
+                <a:effectLst/>
+                <a:uLnTx/>
+                <a:uFillTx/>
+                <a:latin typeface="MetaSerif-Book" pitchFamily="34" charset="0"/>
+                <a:ea typeface="+mn-ea"/>
+                <a:cs typeface="+mn-cs"/>
+              </a:rPr>
+              <a:t>Different degrees of variability achieved</a:t>
+            </a:r>
+          </a:p>
+          <a:p>
+            <a:pPr marL="342900" marR="0" lvl="0" indent="0" algn="l" defTabSz="914400" rtl="0" eaLnBrk="1" fontAlgn="auto" latinLnBrk="0" hangingPunct="1">
+              <a:lnSpc>
+                <a:spcPct val="110000"/>
+              </a:lnSpc>
+              <a:spcBef>
+                <a:spcPts val="0"/>
+              </a:spcBef>
+              <a:spcAft>
+                <a:spcPts val="0"/>
+              </a:spcAft>
+              <a:buClr>
+                <a:schemeClr val="bg1">
+                  <a:lumMod val="65000"/>
+                </a:schemeClr>
+              </a:buClr>
+              <a:buSzTx/>
+              <a:buFont typeface="Arial" pitchFamily="34" charset="0"/>
+              <a:buNone/>
+              <a:tabLst/>
+              <a:defRPr/>
+            </a:pPr>
+            <a:endParaRPr lang="pt-PT" sz="3600" dirty="0" smtClean="0">
+              <a:solidFill>
+                <a:schemeClr val="tx1">
+                  <a:lumMod val="85000"/>
+                  <a:lumOff val="15000"/>
+                </a:schemeClr>
+              </a:solidFill>
+              <a:latin typeface="MetaSerif-Book" pitchFamily="34" charset="0"/>
+            </a:endParaRPr>
+          </a:p>
+          <a:p>
+            <a:pPr marL="342900">
+              <a:lnSpc>
+                <a:spcPct val="110000"/>
+              </a:lnSpc>
+              <a:buClr>
+                <a:schemeClr val="bg1">
+                  <a:lumMod val="65000"/>
+                </a:schemeClr>
+              </a:buClr>
             </a:pPr>
             <a:r>
               <a:rPr lang="pt-PT" sz="3600" dirty="0" smtClean="0">
@@ -12496,32 +13136,25 @@
                 </a:solidFill>
                 <a:latin typeface="MetaSerif-Book" pitchFamily="34" charset="0"/>
               </a:rPr>
-              <a:t>MVC architecture used by Rails can coexist harmoniously with AOM design patterns, especially with the AR engine</a:t>
-            </a:r>
-          </a:p>
-        </p:txBody>
-      </p:sp>
-      <p:sp>
-        <p:nvSpPr>
-          <p:cNvPr id="4" name="Slide Number Placeholder 3"/>
-          <p:cNvSpPr>
-            <a:spLocks noGrp="1"/>
-          </p:cNvSpPr>
-          <p:nvPr>
-            <p:ph type="sldNum" sz="quarter" idx="12"/>
-          </p:nvPr>
-        </p:nvSpPr>
-        <p:spPr/>
-        <p:txBody>
-          <a:bodyPr/>
-          <a:lstStyle/>
-          <a:p>
-            <a:fld id="{AF2DD60D-AE1E-4B35-90D2-0ABAEDD7A6F5}" type="slidenum">
-              <a:rPr lang="pt-PT" smtClean="0"/>
-              <a:pPr/>
-              <a:t>40</a:t>
-            </a:fld>
-            <a:endParaRPr lang="pt-PT" dirty="0"/>
+              <a:t>Rails MVC architecture and conventions may be an obstacle to highly-variable systems</a:t>
+            </a:r>
+            <a:endParaRPr kumimoji="0" lang="pt-PT" sz="3600" b="0" i="0" u="none" strike="noStrike" kern="1200" cap="none" spc="0" normalizeH="0" baseline="0" noProof="0" dirty="0" smtClean="0">
+              <a:ln>
+                <a:noFill/>
+              </a:ln>
+              <a:solidFill>
+                <a:schemeClr val="tx1">
+                  <a:lumMod val="85000"/>
+                  <a:lumOff val="15000"/>
+                </a:schemeClr>
+              </a:solidFill>
+              <a:effectLst/>
+              <a:uLnTx/>
+              <a:uFillTx/>
+              <a:latin typeface="MetaSerif-Book" pitchFamily="34" charset="0"/>
+              <a:ea typeface="+mn-ea"/>
+              <a:cs typeface="+mn-cs"/>
+            </a:endParaRPr>
           </a:p>
         </p:txBody>
       </p:sp>
@@ -12592,7 +13225,7 @@
                 </a:solidFill>
                 <a:latin typeface="League Gothic" pitchFamily="50" charset="0"/>
               </a:rPr>
-              <a:t>Performance</a:t>
+              <a:t>Rails, MVC &amp; AOMs</a:t>
             </a:r>
             <a:endParaRPr lang="pt-PT" sz="3200" dirty="0">
               <a:solidFill>
@@ -12651,7 +13284,7 @@
                 </a:solidFill>
                 <a:latin typeface="MetaSerif-Book" pitchFamily="34" charset="0"/>
               </a:rPr>
-              <a:t>Performance can be increased – depending on previous design</a:t>
+              <a:t>MVC architecture used by Rails can coexist harmoniously with AOM design patterns, especially with the AR engine</a:t>
             </a:r>
           </a:p>
         </p:txBody>
@@ -12696,6 +13329,161 @@
 </file>
 
 <file path=ppt/slides/slide42.xml><?xml version="1.0" encoding="utf-8"?>
+<p:sld xmlns:a="http://schemas.openxmlformats.org/drawingml/2006/main" xmlns:r="http://schemas.openxmlformats.org/officeDocument/2006/relationships" xmlns:p="http://schemas.openxmlformats.org/presentationml/2006/main">
+  <p:cSld>
+    <p:spTree>
+      <p:nvGrpSpPr>
+        <p:cNvPr id="1" name=""/>
+        <p:cNvGrpSpPr/>
+        <p:nvPr/>
+      </p:nvGrpSpPr>
+      <p:grpSpPr>
+        <a:xfrm>
+          <a:off x="0" y="0"/>
+          <a:ext cx="0" cy="0"/>
+          <a:chOff x="0" y="0"/>
+          <a:chExt cx="0" cy="0"/>
+        </a:xfrm>
+      </p:grpSpPr>
+      <p:sp>
+        <p:nvSpPr>
+          <p:cNvPr id="2" name="Title 1"/>
+          <p:cNvSpPr>
+            <a:spLocks noGrp="1"/>
+          </p:cNvSpPr>
+          <p:nvPr>
+            <p:ph type="title"/>
+          </p:nvPr>
+        </p:nvSpPr>
+        <p:spPr>
+          <a:xfrm>
+            <a:off x="4464000" y="188640"/>
+            <a:ext cx="4680000" cy="706090"/>
+          </a:xfrm>
+          <a:solidFill>
+            <a:schemeClr val="tx1">
+              <a:alpha val="90000"/>
+            </a:schemeClr>
+          </a:solidFill>
+        </p:spPr>
+        <p:txBody>
+          <a:bodyPr rIns="144000">
+            <a:normAutofit/>
+          </a:bodyPr>
+          <a:lstStyle/>
+          <a:p>
+            <a:pPr algn="r"/>
+            <a:r>
+              <a:rPr lang="pt-PT" sz="3200" dirty="0" smtClean="0">
+                <a:solidFill>
+                  <a:schemeClr val="bg1"/>
+                </a:solidFill>
+                <a:latin typeface="League Gothic" pitchFamily="50" charset="0"/>
+              </a:rPr>
+              <a:t>Performance</a:t>
+            </a:r>
+            <a:endParaRPr lang="pt-PT" sz="3200" dirty="0">
+              <a:solidFill>
+                <a:schemeClr val="bg1"/>
+              </a:solidFill>
+              <a:latin typeface="League Gothic" pitchFamily="50" charset="0"/>
+            </a:endParaRPr>
+          </a:p>
+        </p:txBody>
+      </p:sp>
+      <p:sp>
+        <p:nvSpPr>
+          <p:cNvPr id="3" name="Content Placeholder 2"/>
+          <p:cNvSpPr>
+            <a:spLocks noGrp="1"/>
+          </p:cNvSpPr>
+          <p:nvPr>
+            <p:ph idx="1"/>
+          </p:nvPr>
+        </p:nvSpPr>
+        <p:spPr>
+          <a:xfrm>
+            <a:off x="457200" y="1124744"/>
+            <a:ext cx="8229600" cy="5040560"/>
+          </a:xfrm>
+          <a:effectLst>
+            <a:outerShdw blurRad="50800" dist="25400" dir="2700000" algn="tl" rotWithShape="0">
+              <a:prstClr val="black">
+                <a:alpha val="15000"/>
+              </a:prstClr>
+            </a:outerShdw>
+          </a:effectLst>
+        </p:spPr>
+        <p:txBody>
+          <a:bodyPr anchor="ctr" anchorCtr="1">
+            <a:normAutofit/>
+          </a:bodyPr>
+          <a:lstStyle/>
+          <a:p>
+            <a:pPr indent="0">
+              <a:lnSpc>
+                <a:spcPct val="110000"/>
+              </a:lnSpc>
+              <a:spcBef>
+                <a:spcPts val="0"/>
+              </a:spcBef>
+              <a:buNone/>
+            </a:pPr>
+            <a:r>
+              <a:rPr lang="pt-PT" sz="3600" dirty="0" smtClean="0">
+                <a:solidFill>
+                  <a:schemeClr val="tx1">
+                    <a:lumMod val="85000"/>
+                    <a:lumOff val="15000"/>
+                  </a:schemeClr>
+                </a:solidFill>
+                <a:latin typeface="MetaSerif-Book" pitchFamily="34" charset="0"/>
+              </a:rPr>
+              <a:t>Performance can be increased – depending on previous design</a:t>
+            </a:r>
+          </a:p>
+        </p:txBody>
+      </p:sp>
+      <p:sp>
+        <p:nvSpPr>
+          <p:cNvPr id="4" name="Slide Number Placeholder 3"/>
+          <p:cNvSpPr>
+            <a:spLocks noGrp="1"/>
+          </p:cNvSpPr>
+          <p:nvPr>
+            <p:ph type="sldNum" sz="quarter" idx="12"/>
+          </p:nvPr>
+        </p:nvSpPr>
+        <p:spPr/>
+        <p:txBody>
+          <a:bodyPr/>
+          <a:lstStyle/>
+          <a:p>
+            <a:fld id="{AF2DD60D-AE1E-4B35-90D2-0ABAEDD7A6F5}" type="slidenum">
+              <a:rPr lang="pt-PT" smtClean="0"/>
+              <a:pPr/>
+              <a:t>42</a:t>
+            </a:fld>
+            <a:endParaRPr lang="pt-PT" dirty="0"/>
+          </a:p>
+        </p:txBody>
+      </p:sp>
+    </p:spTree>
+  </p:cSld>
+  <p:clrMapOvr>
+    <a:masterClrMapping/>
+  </p:clrMapOvr>
+  <p:timing>
+    <p:tnLst>
+      <p:par>
+        <p:cTn id="1" dur="indefinite" restart="never" nodeType="tmRoot"/>
+      </p:par>
+    </p:tnLst>
+  </p:timing>
+</p:sld>
+</file>
+
+<file path=ppt/slides/slide43.xml><?xml version="1.0" encoding="utf-8"?>
 <p:sld xmlns:a="http://schemas.openxmlformats.org/drawingml/2006/main" xmlns:r="http://schemas.openxmlformats.org/officeDocument/2006/relationships" xmlns:p="http://schemas.openxmlformats.org/presentationml/2006/main">
   <p:cSld>
     <p:spTree>
@@ -12799,7 +13587,7 @@
 </p:sld>
 </file>
 
-<file path=ppt/slides/slide43.xml><?xml version="1.0" encoding="utf-8"?>
+<file path=ppt/slides/slide44.xml><?xml version="1.0" encoding="utf-8"?>
 <p:sld xmlns:a="http://schemas.openxmlformats.org/drawingml/2006/main" xmlns:r="http://schemas.openxmlformats.org/officeDocument/2006/relationships" xmlns:p="http://schemas.openxmlformats.org/presentationml/2006/main">
   <p:cSld>
     <p:spTree>
@@ -12976,7 +13764,7 @@
             <a:fld id="{AF2DD60D-AE1E-4B35-90D2-0ABAEDD7A6F5}" type="slidenum">
               <a:rPr lang="pt-PT" smtClean="0"/>
               <a:pPr/>
-              <a:t>43</a:t>
+              <a:t>44</a:t>
             </a:fld>
             <a:endParaRPr lang="pt-PT" dirty="0"/>
           </a:p>
@@ -12997,7 +13785,7 @@
 </p:sld>
 </file>
 
-<file path=ppt/slides/slide44.xml><?xml version="1.0" encoding="utf-8"?>
+<file path=ppt/slides/slide45.xml><?xml version="1.0" encoding="utf-8"?>
 <p:sld xmlns:a="http://schemas.openxmlformats.org/drawingml/2006/main" xmlns:r="http://schemas.openxmlformats.org/officeDocument/2006/relationships" xmlns:p="http://schemas.openxmlformats.org/presentationml/2006/main">
   <p:cSld>
     <p:spTree>
@@ -13108,7 +13896,7 @@
                 </a:solidFill>
                 <a:latin typeface="MetaSerif-Book" pitchFamily="34" charset="0"/>
               </a:rPr>
-              <a:t>Keep all accountabilities in memory</a:t>
+              <a:t>Optimize queries used to retrieve connections between entities (SQL)</a:t>
             </a:r>
           </a:p>
           <a:p>
@@ -13151,7 +13939,7 @@
                 </a:solidFill>
                 <a:latin typeface="MetaSerif-Book" pitchFamily="34" charset="0"/>
               </a:rPr>
-              <a:t>Optimize queries used to retrieve connections between entities (SQL)</a:t>
+              <a:t>Keep all accountabilities in memory</a:t>
             </a:r>
           </a:p>
         </p:txBody>
@@ -13174,7 +13962,7 @@
             <a:fld id="{AF2DD60D-AE1E-4B35-90D2-0ABAEDD7A6F5}" type="slidenum">
               <a:rPr lang="pt-PT" smtClean="0"/>
               <a:pPr/>
-              <a:t>44</a:t>
+              <a:t>45</a:t>
             </a:fld>
             <a:endParaRPr lang="pt-PT" dirty="0"/>
           </a:p>
@@ -13195,7 +13983,7 @@
 </p:sld>
 </file>
 
-<file path=ppt/slides/slide45.xml><?xml version="1.0" encoding="utf-8"?>
+<file path=ppt/slides/slide46.xml><?xml version="1.0" encoding="utf-8"?>
 <p:sld xmlns:a="http://schemas.openxmlformats.org/drawingml/2006/main" xmlns:r="http://schemas.openxmlformats.org/officeDocument/2006/relationships" xmlns:p="http://schemas.openxmlformats.org/presentationml/2006/main">
   <p:cSld>
     <p:spTree>

</xml_diff>

<commit_message>
Removed slides, simplified conclusions
</commit_message>
<xml_diff>
--- a/presentations/jgradim-presentation.pptx
+++ b/presentations/jgradim-presentation.pptx
@@ -5,7 +5,7 @@
     <p:sldMasterId id="2147483648" r:id="rId1"/>
   </p:sldMasterIdLst>
   <p:notesMasterIdLst>
-    <p:notesMasterId r:id="rId48"/>
+    <p:notesMasterId r:id="rId47"/>
   </p:notesMasterIdLst>
   <p:sldIdLst>
     <p:sldId id="256" r:id="rId2"/>
@@ -46,14 +46,13 @@
     <p:sldId id="296" r:id="rId37"/>
     <p:sldId id="294" r:id="rId38"/>
     <p:sldId id="259" r:id="rId39"/>
-    <p:sldId id="279" r:id="rId40"/>
-    <p:sldId id="269" r:id="rId41"/>
-    <p:sldId id="264" r:id="rId42"/>
-    <p:sldId id="270" r:id="rId43"/>
-    <p:sldId id="266" r:id="rId44"/>
-    <p:sldId id="267" r:id="rId45"/>
-    <p:sldId id="268" r:id="rId46"/>
-    <p:sldId id="297" r:id="rId47"/>
+    <p:sldId id="269" r:id="rId40"/>
+    <p:sldId id="264" r:id="rId41"/>
+    <p:sldId id="270" r:id="rId42"/>
+    <p:sldId id="266" r:id="rId43"/>
+    <p:sldId id="267" r:id="rId44"/>
+    <p:sldId id="268" r:id="rId45"/>
+    <p:sldId id="297" r:id="rId46"/>
   </p:sldIdLst>
   <p:sldSz cx="9144000" cy="6858000" type="screen4x3"/>
   <p:notesSz cx="6858000" cy="9144000"/>
@@ -1274,7 +1273,20 @@
             </a:r>
             <a:r>
               <a:rPr lang="pt-PT" baseline="0" dirty="0" smtClean="0"/>
-              <a:t> and without polluting the codebase with hardcoded exceptions</a:t>
+              <a:t> and without polluting the codebase with hardcoded </a:t>
+            </a:r>
+            <a:r>
+              <a:rPr lang="pt-PT" baseline="0" dirty="0" smtClean="0"/>
+              <a:t>exceptions</a:t>
+            </a:r>
+          </a:p>
+          <a:p>
+            <a:endParaRPr lang="pt-PT" baseline="0" dirty="0" smtClean="0"/>
+          </a:p>
+          <a:p>
+            <a:r>
+              <a:rPr lang="pt-PT" baseline="0" dirty="0" smtClean="0"/>
+              <a:t>Efeito secundário</a:t>
             </a:r>
             <a:endParaRPr lang="pt-PT" dirty="0"/>
           </a:p>
@@ -1364,11 +1376,7 @@
             </a:r>
             <a:r>
               <a:rPr lang="pt-PT" baseline="0" dirty="0" smtClean="0"/>
-              <a:t> contacts = 5724 </a:t>
-            </a:r>
-            <a:r>
-              <a:rPr lang="pt-PT" baseline="0" dirty="0" smtClean="0"/>
-              <a:t>queries</a:t>
+              <a:t> contacts = 5724 queries</a:t>
             </a:r>
           </a:p>
           <a:p>
@@ -2638,20 +2646,22 @@
           <a:p>
             <a:r>
               <a:rPr lang="pt-PT" dirty="0" smtClean="0"/>
-              <a:t>Arquitecturas</a:t>
+              <a:t>...</a:t>
+            </a:r>
+          </a:p>
+          <a:p>
+            <a:endParaRPr lang="pt-PT" dirty="0" smtClean="0"/>
+          </a:p>
+          <a:p>
+            <a:r>
+              <a:rPr lang="pt-PT" dirty="0" smtClean="0"/>
+              <a:t>Apesar</a:t>
             </a:r>
             <a:r>
               <a:rPr lang="pt-PT" baseline="0" dirty="0" smtClean="0"/>
-              <a:t> </a:t>
-            </a:r>
-            <a:r>
-              <a:rPr lang="pt-PT" dirty="0" smtClean="0"/>
-              <a:t>AOM providenciam</a:t>
-            </a:r>
-            <a:r>
-              <a:rPr lang="pt-PT" baseline="0" dirty="0" smtClean="0"/>
-              <a:t> o melhor conjunto de ferramentas para a construção de sistemas altamente variáveis. Foram pensadas e desenhadas especificamente para esse propósito, pelo que são a melhor solução para este tipo de aplicações.</a:t>
-            </a:r>
+              <a:t> do excelente conjunto de ferramentas providenciado pelo Rails, o uso de uma arquitectura MVC e as convenções usadas podem por vezes dificultar a criação de ambientes altamente variáveis – no entanto, na verdade, serão raras as vezes em que é preciso niveis tao extremos de variabilidade</a:t>
+            </a:r>
+            <a:endParaRPr lang="pt-PT" dirty="0" smtClean="0"/>
           </a:p>
         </p:txBody>
       </p:sp>
@@ -2735,22 +2745,13 @@
           <a:p>
             <a:r>
               <a:rPr lang="pt-PT" dirty="0" smtClean="0"/>
-              <a:t>...</a:t>
-            </a:r>
-          </a:p>
-          <a:p>
-            <a:endParaRPr lang="pt-PT" dirty="0" smtClean="0"/>
-          </a:p>
-          <a:p>
-            <a:r>
-              <a:rPr lang="pt-PT" dirty="0" smtClean="0"/>
-              <a:t>Apesar</a:t>
+              <a:t>Por si</a:t>
             </a:r>
             <a:r>
               <a:rPr lang="pt-PT" baseline="0" dirty="0" smtClean="0"/>
-              <a:t> do excelente conjunto de ferramentas providenciado pelo Rails, o uso de uma arquitectura MVC e as convenções usadas podem por vezes dificultar a criação de ambientes altamente variáveis – no entanto, na verdade, serão raras as vezes em que é preciso niveis tao extremos de variabilidade</a:t>
-            </a:r>
-            <a:endParaRPr lang="pt-PT" dirty="0" smtClean="0"/>
+              <a:t> só, o Rails pode ser um entrave à construção destes sistemas: no entanto, tal como demonstrado pelo trabalho desenvolvido ...</a:t>
+            </a:r>
+            <a:endParaRPr lang="pt-PT" dirty="0"/>
           </a:p>
         </p:txBody>
       </p:sp>
@@ -2924,11 +2925,7 @@
           <a:p>
             <a:r>
               <a:rPr lang="pt-PT" dirty="0" smtClean="0"/>
-              <a:t>Por si</a:t>
-            </a:r>
-            <a:r>
-              <a:rPr lang="pt-PT" baseline="0" dirty="0" smtClean="0"/>
-              <a:t> só, o Rails pode ser um entrave à construção destes sistemas: no entanto, tal como demonstrado pelo trabalho desenvolvido ...</a:t>
+              <a:t>Performance increase is dependant on the previous design</a:t>
             </a:r>
             <a:endParaRPr lang="pt-PT" dirty="0"/>
           </a:p>
@@ -3012,10 +3009,6 @@
           </a:bodyPr>
           <a:lstStyle/>
           <a:p>
-            <a:r>
-              <a:rPr lang="pt-PT" dirty="0" smtClean="0"/>
-              <a:t>Performance increase is dependant on the previous design</a:t>
-            </a:r>
             <a:endParaRPr lang="pt-PT" dirty="0"/>
           </a:p>
         </p:txBody>
@@ -3120,7 +3113,7 @@
             <a:fld id="{EE5867BE-386C-4D16-9B1D-8635FC172DF2}" type="slidenum">
               <a:rPr lang="pt-PT" smtClean="0"/>
               <a:pPr/>
-              <a:t>43</a:t>
+              <a:t>44</a:t>
             </a:fld>
             <a:endParaRPr lang="pt-PT"/>
           </a:p>
@@ -3180,7 +3173,7 @@
           </a:bodyPr>
           <a:lstStyle/>
           <a:p>
-            <a:endParaRPr lang="pt-PT" dirty="0"/>
+            <a:endParaRPr lang="pt-PT"/>
           </a:p>
         </p:txBody>
       </p:sp>
@@ -3203,88 +3196,6 @@
               <a:rPr lang="pt-PT" smtClean="0"/>
               <a:pPr/>
               <a:t>45</a:t>
-            </a:fld>
-            <a:endParaRPr lang="pt-PT"/>
-          </a:p>
-        </p:txBody>
-      </p:sp>
-    </p:spTree>
-  </p:cSld>
-  <p:clrMapOvr>
-    <a:masterClrMapping/>
-  </p:clrMapOvr>
-</p:notes>
-</file>
-
-<file path=ppt/notesSlides/notesSlide34.xml><?xml version="1.0" encoding="utf-8"?>
-<p:notes xmlns:a="http://schemas.openxmlformats.org/drawingml/2006/main" xmlns:r="http://schemas.openxmlformats.org/officeDocument/2006/relationships" xmlns:p="http://schemas.openxmlformats.org/presentationml/2006/main">
-  <p:cSld>
-    <p:spTree>
-      <p:nvGrpSpPr>
-        <p:cNvPr id="1" name=""/>
-        <p:cNvGrpSpPr/>
-        <p:nvPr/>
-      </p:nvGrpSpPr>
-      <p:grpSpPr>
-        <a:xfrm>
-          <a:off x="0" y="0"/>
-          <a:ext cx="0" cy="0"/>
-          <a:chOff x="0" y="0"/>
-          <a:chExt cx="0" cy="0"/>
-        </a:xfrm>
-      </p:grpSpPr>
-      <p:sp>
-        <p:nvSpPr>
-          <p:cNvPr id="2" name="Slide Image Placeholder 1"/>
-          <p:cNvSpPr>
-            <a:spLocks noGrp="1" noRot="1" noChangeAspect="1"/>
-          </p:cNvSpPr>
-          <p:nvPr>
-            <p:ph type="sldImg"/>
-          </p:nvPr>
-        </p:nvSpPr>
-        <p:spPr/>
-      </p:sp>
-      <p:sp>
-        <p:nvSpPr>
-          <p:cNvPr id="3" name="Notes Placeholder 2"/>
-          <p:cNvSpPr>
-            <a:spLocks noGrp="1"/>
-          </p:cNvSpPr>
-          <p:nvPr>
-            <p:ph type="body" idx="1"/>
-          </p:nvPr>
-        </p:nvSpPr>
-        <p:spPr/>
-        <p:txBody>
-          <a:bodyPr>
-            <a:normAutofit/>
-          </a:bodyPr>
-          <a:lstStyle/>
-          <a:p>
-            <a:endParaRPr lang="pt-PT"/>
-          </a:p>
-        </p:txBody>
-      </p:sp>
-      <p:sp>
-        <p:nvSpPr>
-          <p:cNvPr id="4" name="Slide Number Placeholder 3"/>
-          <p:cNvSpPr>
-            <a:spLocks noGrp="1"/>
-          </p:cNvSpPr>
-          <p:nvPr>
-            <p:ph type="sldNum" sz="quarter" idx="10"/>
-          </p:nvPr>
-        </p:nvSpPr>
-        <p:spPr/>
-        <p:txBody>
-          <a:bodyPr/>
-          <a:lstStyle/>
-          <a:p>
-            <a:fld id="{EE5867BE-386C-4D16-9B1D-8635FC172DF2}" type="slidenum">
-              <a:rPr lang="pt-PT" smtClean="0"/>
-              <a:pPr/>
-              <a:t>46</a:t>
             </a:fld>
             <a:endParaRPr lang="pt-PT"/>
           </a:p>
@@ -12668,7 +12579,7 @@
                 </a:solidFill>
                 <a:latin typeface="League Gothic" pitchFamily="50" charset="0"/>
               </a:rPr>
-              <a:t>AOMs</a:t>
+              <a:t>Variability</a:t>
             </a:r>
             <a:endParaRPr lang="pt-PT" sz="3200" dirty="0">
               <a:solidFill>
@@ -12681,19 +12592,45 @@
       </p:sp>
       <p:sp>
         <p:nvSpPr>
-          <p:cNvPr id="3" name="Content Placeholder 2"/>
-          <p:cNvSpPr>
-            <a:spLocks noGrp="1"/>
-          </p:cNvSpPr>
-          <p:nvPr>
-            <p:ph idx="1"/>
-          </p:nvPr>
+          <p:cNvPr id="4" name="Slide Number Placeholder 3"/>
+          <p:cNvSpPr>
+            <a:spLocks noGrp="1"/>
+          </p:cNvSpPr>
+          <p:nvPr>
+            <p:ph type="sldNum" sz="quarter" idx="12"/>
+          </p:nvPr>
+        </p:nvSpPr>
+        <p:spPr/>
+        <p:txBody>
+          <a:bodyPr/>
+          <a:lstStyle/>
+          <a:p>
+            <a:fld id="{AF2DD60D-AE1E-4B35-90D2-0ABAEDD7A6F5}" type="slidenum">
+              <a:rPr lang="pt-PT" smtClean="0"/>
+              <a:pPr/>
+              <a:t>39</a:t>
+            </a:fld>
+            <a:endParaRPr lang="pt-PT" dirty="0"/>
+          </a:p>
+        </p:txBody>
+      </p:sp>
+      <p:sp>
+        <p:nvSpPr>
+          <p:cNvPr id="5" name="Content Placeholder 2"/>
+          <p:cNvSpPr txBox="1">
+            <a:spLocks/>
+          </p:cNvSpPr>
+          <p:nvPr/>
         </p:nvSpPr>
         <p:spPr>
           <a:xfrm>
             <a:off x="457200" y="1124744"/>
             <a:ext cx="8229600" cy="5040560"/>
           </a:xfrm>
+          <a:prstGeom prst="rect">
+            <a:avLst/>
+          </a:prstGeom>
+          <a:noFill/>
           <a:effectLst>
             <a:outerShdw blurRad="50800" dist="25400" dir="2700000" algn="tl" rotWithShape="0">
               <a:prstClr val="black">
@@ -12703,19 +12640,20 @@
           </a:effectLst>
         </p:spPr>
         <p:txBody>
-          <a:bodyPr vert="horz" anchor="ctr" anchorCtr="1">
+          <a:bodyPr vert="horz" lIns="91440" tIns="45720" rIns="91440" bIns="45720" rtlCol="0" anchor="ctr" anchorCtr="1">
             <a:normAutofit/>
           </a:bodyPr>
           <a:lstStyle/>
           <a:p>
-            <a:pPr indent="0">
+            <a:pPr marL="342900">
               <a:lnSpc>
                 <a:spcPct val="110000"/>
               </a:lnSpc>
-              <a:spcBef>
-                <a:spcPts val="0"/>
-              </a:spcBef>
-              <a:buNone/>
+              <a:buClr>
+                <a:schemeClr val="bg1">
+                  <a:lumMod val="65000"/>
+                </a:schemeClr>
+              </a:buClr>
             </a:pPr>
             <a:r>
               <a:rPr lang="pt-PT" sz="3600" dirty="0" smtClean="0">
@@ -12727,32 +12665,37 @@
                 </a:solidFill>
                 <a:latin typeface="MetaSerif-Book" pitchFamily="34" charset="0"/>
               </a:rPr>
-              <a:t>AOM architectures provide the best framework for building adaptable software systems</a:t>
-            </a:r>
-          </a:p>
-        </p:txBody>
-      </p:sp>
-      <p:sp>
-        <p:nvSpPr>
-          <p:cNvPr id="4" name="Slide Number Placeholder 3"/>
-          <p:cNvSpPr>
-            <a:spLocks noGrp="1"/>
-          </p:cNvSpPr>
-          <p:nvPr>
-            <p:ph type="sldNum" sz="quarter" idx="12"/>
-          </p:nvPr>
-        </p:nvSpPr>
-        <p:spPr/>
-        <p:txBody>
-          <a:bodyPr/>
-          <a:lstStyle/>
-          <a:p>
-            <a:fld id="{AF2DD60D-AE1E-4B35-90D2-0ABAEDD7A6F5}" type="slidenum">
-              <a:rPr lang="pt-PT" smtClean="0"/>
-              <a:pPr/>
-              <a:t>39</a:t>
-            </a:fld>
-            <a:endParaRPr lang="pt-PT" dirty="0"/>
+              <a:t>Rails </a:t>
+            </a:r>
+            <a:r>
+              <a:rPr lang="pt-PT" sz="3600" dirty="0" smtClean="0">
+                <a:solidFill>
+                  <a:schemeClr val="tx1">
+                    <a:lumMod val="85000"/>
+                    <a:lumOff val="15000"/>
+                  </a:schemeClr>
+                </a:solidFill>
+                <a:latin typeface="MetaSerif-Book" pitchFamily="34" charset="0"/>
+              </a:rPr>
+              <a:t>MVC architecture and conventions may be an obstacle to highly-variable systems</a:t>
+            </a:r>
+            <a:endParaRPr kumimoji="0" lang="pt-PT" sz="3600" b="0" i="0" u="none" strike="noStrike" kern="1200" cap="none" spc="0" normalizeH="0" baseline="0" noProof="0" dirty="0" smtClean="0">
+              <a:ln>
+                <a:noFill/>
+              </a:ln>
+              <a:solidFill>
+                <a:schemeClr val="tx1">
+                  <a:lumMod val="85000"/>
+                  <a:lumOff val="15000"/>
+                </a:schemeClr>
+              </a:solidFill>
+              <a:effectLst/>
+              <a:uLnTx/>
+              <a:uFillTx/>
+              <a:latin typeface="MetaSerif-Book" pitchFamily="34" charset="0"/>
+              <a:ea typeface="+mn-ea"/>
+              <a:cs typeface="+mn-cs"/>
+            </a:endParaRPr>
           </a:p>
         </p:txBody>
       </p:sp>
@@ -12975,7 +12918,7 @@
                 </a:solidFill>
                 <a:latin typeface="League Gothic" pitchFamily="50" charset="0"/>
               </a:rPr>
-              <a:t>Variability</a:t>
+              <a:t>Rails, MVC &amp; AOMs</a:t>
             </a:r>
             <a:endParaRPr lang="pt-PT" sz="3200" dirty="0">
               <a:solidFill>
@@ -12988,45 +12931,19 @@
       </p:sp>
       <p:sp>
         <p:nvSpPr>
-          <p:cNvPr id="4" name="Slide Number Placeholder 3"/>
-          <p:cNvSpPr>
-            <a:spLocks noGrp="1"/>
-          </p:cNvSpPr>
-          <p:nvPr>
-            <p:ph type="sldNum" sz="quarter" idx="12"/>
-          </p:nvPr>
-        </p:nvSpPr>
-        <p:spPr/>
-        <p:txBody>
-          <a:bodyPr/>
-          <a:lstStyle/>
-          <a:p>
-            <a:fld id="{AF2DD60D-AE1E-4B35-90D2-0ABAEDD7A6F5}" type="slidenum">
-              <a:rPr lang="pt-PT" smtClean="0"/>
-              <a:pPr/>
-              <a:t>40</a:t>
-            </a:fld>
-            <a:endParaRPr lang="pt-PT" dirty="0"/>
-          </a:p>
-        </p:txBody>
-      </p:sp>
-      <p:sp>
-        <p:nvSpPr>
-          <p:cNvPr id="5" name="Content Placeholder 2"/>
-          <p:cNvSpPr txBox="1">
-            <a:spLocks/>
-          </p:cNvSpPr>
-          <p:nvPr/>
+          <p:cNvPr id="3" name="Content Placeholder 2"/>
+          <p:cNvSpPr>
+            <a:spLocks noGrp="1"/>
+          </p:cNvSpPr>
+          <p:nvPr>
+            <p:ph idx="1"/>
+          </p:nvPr>
         </p:nvSpPr>
         <p:spPr>
           <a:xfrm>
             <a:off x="457200" y="1124744"/>
             <a:ext cx="8229600" cy="5040560"/>
           </a:xfrm>
-          <a:prstGeom prst="rect">
-            <a:avLst/>
-          </a:prstGeom>
-          <a:noFill/>
           <a:effectLst>
             <a:outerShdw blurRad="50800" dist="25400" dir="2700000" algn="tl" rotWithShape="0">
               <a:prstClr val="black">
@@ -13036,95 +12953,19 @@
           </a:effectLst>
         </p:spPr>
         <p:txBody>
-          <a:bodyPr vert="horz" lIns="91440" tIns="45720" rIns="91440" bIns="45720" rtlCol="0" anchor="ctr" anchorCtr="1">
+          <a:bodyPr anchor="ctr" anchorCtr="1">
             <a:normAutofit/>
           </a:bodyPr>
           <a:lstStyle/>
           <a:p>
-            <a:pPr marL="342900" marR="0" lvl="0" indent="0" algn="l" defTabSz="914400" rtl="0" eaLnBrk="1" fontAlgn="auto" latinLnBrk="0" hangingPunct="1">
+            <a:pPr indent="0">
               <a:lnSpc>
                 <a:spcPct val="110000"/>
               </a:lnSpc>
               <a:spcBef>
                 <a:spcPts val="0"/>
               </a:spcBef>
-              <a:spcAft>
-                <a:spcPts val="0"/>
-              </a:spcAft>
-              <a:buClr>
-                <a:schemeClr val="bg1">
-                  <a:lumMod val="65000"/>
-                </a:schemeClr>
-              </a:buClr>
-              <a:buSzTx/>
-              <a:buFont typeface="Arial" pitchFamily="34" charset="0"/>
               <a:buNone/>
-              <a:tabLst/>
-              <a:defRPr/>
-            </a:pPr>
-            <a:r>
-              <a:rPr kumimoji="0" lang="pt-PT" sz="3600" b="0" i="0" u="none" strike="noStrike" kern="1200" cap="none" spc="0" normalizeH="0" baseline="0" noProof="0" dirty="0" smtClean="0">
-                <a:ln>
-                  <a:noFill/>
-                </a:ln>
-                <a:solidFill>
-                  <a:schemeClr val="tx1">
-                    <a:lumMod val="85000"/>
-                    <a:lumOff val="15000"/>
-                  </a:schemeClr>
-                </a:solidFill>
-                <a:effectLst/>
-                <a:uLnTx/>
-                <a:uFillTx/>
-                <a:latin typeface="MetaSerif-Book" pitchFamily="34" charset="0"/>
-                <a:ea typeface="+mn-ea"/>
-                <a:cs typeface="+mn-cs"/>
-              </a:rPr>
-              <a:t>Different degrees of variability achieved</a:t>
-            </a:r>
-          </a:p>
-          <a:p>
-            <a:pPr marL="342900" marR="0" lvl="0" indent="0" algn="l" defTabSz="914400" rtl="0" eaLnBrk="1" fontAlgn="auto" latinLnBrk="0" hangingPunct="1">
-              <a:lnSpc>
-                <a:spcPct val="110000"/>
-              </a:lnSpc>
-              <a:spcBef>
-                <a:spcPts val="0"/>
-              </a:spcBef>
-              <a:spcAft>
-                <a:spcPts val="0"/>
-              </a:spcAft>
-              <a:buClr>
-                <a:schemeClr val="bg1">
-                  <a:lumMod val="65000"/>
-                </a:schemeClr>
-              </a:buClr>
-              <a:buSzTx/>
-              <a:buFont typeface="Arial" pitchFamily="34" charset="0"/>
-              <a:buNone/>
-              <a:tabLst/>
-              <a:defRPr/>
-            </a:pPr>
-            <a:endParaRPr lang="pt-PT" sz="3600" dirty="0" smtClean="0">
-              <a:solidFill>
-                <a:schemeClr val="tx1">
-                  <a:lumMod val="85000"/>
-                  <a:lumOff val="15000"/>
-                </a:schemeClr>
-              </a:solidFill>
-              <a:latin typeface="MetaSerif-Book" pitchFamily="34" charset="0"/>
-            </a:endParaRPr>
-          </a:p>
-          <a:p>
-            <a:pPr marL="342900">
-              <a:lnSpc>
-                <a:spcPct val="110000"/>
-              </a:lnSpc>
-              <a:buClr>
-                <a:schemeClr val="bg1">
-                  <a:lumMod val="65000"/>
-                </a:schemeClr>
-              </a:buClr>
             </a:pPr>
             <a:r>
               <a:rPr lang="pt-PT" sz="3600" dirty="0" smtClean="0">
@@ -13136,25 +12977,32 @@
                 </a:solidFill>
                 <a:latin typeface="MetaSerif-Book" pitchFamily="34" charset="0"/>
               </a:rPr>
-              <a:t>Rails MVC architecture and conventions may be an obstacle to highly-variable systems</a:t>
-            </a:r>
-            <a:endParaRPr kumimoji="0" lang="pt-PT" sz="3600" b="0" i="0" u="none" strike="noStrike" kern="1200" cap="none" spc="0" normalizeH="0" baseline="0" noProof="0" dirty="0" smtClean="0">
-              <a:ln>
-                <a:noFill/>
-              </a:ln>
-              <a:solidFill>
-                <a:schemeClr val="tx1">
-                  <a:lumMod val="85000"/>
-                  <a:lumOff val="15000"/>
-                </a:schemeClr>
-              </a:solidFill>
-              <a:effectLst/>
-              <a:uLnTx/>
-              <a:uFillTx/>
-              <a:latin typeface="MetaSerif-Book" pitchFamily="34" charset="0"/>
-              <a:ea typeface="+mn-ea"/>
-              <a:cs typeface="+mn-cs"/>
-            </a:endParaRPr>
+              <a:t>MVC architecture used by Rails can coexist harmoniously with AOM design patterns, especially with the AR engine</a:t>
+            </a:r>
+          </a:p>
+        </p:txBody>
+      </p:sp>
+      <p:sp>
+        <p:nvSpPr>
+          <p:cNvPr id="4" name="Slide Number Placeholder 3"/>
+          <p:cNvSpPr>
+            <a:spLocks noGrp="1"/>
+          </p:cNvSpPr>
+          <p:nvPr>
+            <p:ph type="sldNum" sz="quarter" idx="12"/>
+          </p:nvPr>
+        </p:nvSpPr>
+        <p:spPr/>
+        <p:txBody>
+          <a:bodyPr/>
+          <a:lstStyle/>
+          <a:p>
+            <a:fld id="{AF2DD60D-AE1E-4B35-90D2-0ABAEDD7A6F5}" type="slidenum">
+              <a:rPr lang="pt-PT" smtClean="0"/>
+              <a:pPr/>
+              <a:t>40</a:t>
+            </a:fld>
+            <a:endParaRPr lang="pt-PT" dirty="0"/>
           </a:p>
         </p:txBody>
       </p:sp>
@@ -13225,7 +13073,7 @@
                 </a:solidFill>
                 <a:latin typeface="League Gothic" pitchFamily="50" charset="0"/>
               </a:rPr>
-              <a:t>Rails, MVC &amp; AOMs</a:t>
+              <a:t>Performance</a:t>
             </a:r>
             <a:endParaRPr lang="pt-PT" sz="3200" dirty="0">
               <a:solidFill>
@@ -13284,7 +13132,7 @@
                 </a:solidFill>
                 <a:latin typeface="MetaSerif-Book" pitchFamily="34" charset="0"/>
               </a:rPr>
-              <a:t>MVC architecture used by Rails can coexist harmoniously with AOM design patterns, especially with the AR engine</a:t>
+              <a:t>Performance can be increased – depending on previous design</a:t>
             </a:r>
           </a:p>
         </p:txBody>
@@ -13329,161 +13177,6 @@
 </file>
 
 <file path=ppt/slides/slide42.xml><?xml version="1.0" encoding="utf-8"?>
-<p:sld xmlns:a="http://schemas.openxmlformats.org/drawingml/2006/main" xmlns:r="http://schemas.openxmlformats.org/officeDocument/2006/relationships" xmlns:p="http://schemas.openxmlformats.org/presentationml/2006/main">
-  <p:cSld>
-    <p:spTree>
-      <p:nvGrpSpPr>
-        <p:cNvPr id="1" name=""/>
-        <p:cNvGrpSpPr/>
-        <p:nvPr/>
-      </p:nvGrpSpPr>
-      <p:grpSpPr>
-        <a:xfrm>
-          <a:off x="0" y="0"/>
-          <a:ext cx="0" cy="0"/>
-          <a:chOff x="0" y="0"/>
-          <a:chExt cx="0" cy="0"/>
-        </a:xfrm>
-      </p:grpSpPr>
-      <p:sp>
-        <p:nvSpPr>
-          <p:cNvPr id="2" name="Title 1"/>
-          <p:cNvSpPr>
-            <a:spLocks noGrp="1"/>
-          </p:cNvSpPr>
-          <p:nvPr>
-            <p:ph type="title"/>
-          </p:nvPr>
-        </p:nvSpPr>
-        <p:spPr>
-          <a:xfrm>
-            <a:off x="4464000" y="188640"/>
-            <a:ext cx="4680000" cy="706090"/>
-          </a:xfrm>
-          <a:solidFill>
-            <a:schemeClr val="tx1">
-              <a:alpha val="90000"/>
-            </a:schemeClr>
-          </a:solidFill>
-        </p:spPr>
-        <p:txBody>
-          <a:bodyPr rIns="144000">
-            <a:normAutofit/>
-          </a:bodyPr>
-          <a:lstStyle/>
-          <a:p>
-            <a:pPr algn="r"/>
-            <a:r>
-              <a:rPr lang="pt-PT" sz="3200" dirty="0" smtClean="0">
-                <a:solidFill>
-                  <a:schemeClr val="bg1"/>
-                </a:solidFill>
-                <a:latin typeface="League Gothic" pitchFamily="50" charset="0"/>
-              </a:rPr>
-              <a:t>Performance</a:t>
-            </a:r>
-            <a:endParaRPr lang="pt-PT" sz="3200" dirty="0">
-              <a:solidFill>
-                <a:schemeClr val="bg1"/>
-              </a:solidFill>
-              <a:latin typeface="League Gothic" pitchFamily="50" charset="0"/>
-            </a:endParaRPr>
-          </a:p>
-        </p:txBody>
-      </p:sp>
-      <p:sp>
-        <p:nvSpPr>
-          <p:cNvPr id="3" name="Content Placeholder 2"/>
-          <p:cNvSpPr>
-            <a:spLocks noGrp="1"/>
-          </p:cNvSpPr>
-          <p:nvPr>
-            <p:ph idx="1"/>
-          </p:nvPr>
-        </p:nvSpPr>
-        <p:spPr>
-          <a:xfrm>
-            <a:off x="457200" y="1124744"/>
-            <a:ext cx="8229600" cy="5040560"/>
-          </a:xfrm>
-          <a:effectLst>
-            <a:outerShdw blurRad="50800" dist="25400" dir="2700000" algn="tl" rotWithShape="0">
-              <a:prstClr val="black">
-                <a:alpha val="15000"/>
-              </a:prstClr>
-            </a:outerShdw>
-          </a:effectLst>
-        </p:spPr>
-        <p:txBody>
-          <a:bodyPr anchor="ctr" anchorCtr="1">
-            <a:normAutofit/>
-          </a:bodyPr>
-          <a:lstStyle/>
-          <a:p>
-            <a:pPr indent="0">
-              <a:lnSpc>
-                <a:spcPct val="110000"/>
-              </a:lnSpc>
-              <a:spcBef>
-                <a:spcPts val="0"/>
-              </a:spcBef>
-              <a:buNone/>
-            </a:pPr>
-            <a:r>
-              <a:rPr lang="pt-PT" sz="3600" dirty="0" smtClean="0">
-                <a:solidFill>
-                  <a:schemeClr val="tx1">
-                    <a:lumMod val="85000"/>
-                    <a:lumOff val="15000"/>
-                  </a:schemeClr>
-                </a:solidFill>
-                <a:latin typeface="MetaSerif-Book" pitchFamily="34" charset="0"/>
-              </a:rPr>
-              <a:t>Performance can be increased – depending on previous design</a:t>
-            </a:r>
-          </a:p>
-        </p:txBody>
-      </p:sp>
-      <p:sp>
-        <p:nvSpPr>
-          <p:cNvPr id="4" name="Slide Number Placeholder 3"/>
-          <p:cNvSpPr>
-            <a:spLocks noGrp="1"/>
-          </p:cNvSpPr>
-          <p:nvPr>
-            <p:ph type="sldNum" sz="quarter" idx="12"/>
-          </p:nvPr>
-        </p:nvSpPr>
-        <p:spPr/>
-        <p:txBody>
-          <a:bodyPr/>
-          <a:lstStyle/>
-          <a:p>
-            <a:fld id="{AF2DD60D-AE1E-4B35-90D2-0ABAEDD7A6F5}" type="slidenum">
-              <a:rPr lang="pt-PT" smtClean="0"/>
-              <a:pPr/>
-              <a:t>42</a:t>
-            </a:fld>
-            <a:endParaRPr lang="pt-PT" dirty="0"/>
-          </a:p>
-        </p:txBody>
-      </p:sp>
-    </p:spTree>
-  </p:cSld>
-  <p:clrMapOvr>
-    <a:masterClrMapping/>
-  </p:clrMapOvr>
-  <p:timing>
-    <p:tnLst>
-      <p:par>
-        <p:cTn id="1" dur="indefinite" restart="never" nodeType="tmRoot"/>
-      </p:par>
-    </p:tnLst>
-  </p:timing>
-</p:sld>
-</file>
-
-<file path=ppt/slides/slide43.xml><?xml version="1.0" encoding="utf-8"?>
 <p:sld xmlns:a="http://schemas.openxmlformats.org/drawingml/2006/main" xmlns:r="http://schemas.openxmlformats.org/officeDocument/2006/relationships" xmlns:p="http://schemas.openxmlformats.org/presentationml/2006/main">
   <p:cSld>
     <p:spTree>
@@ -13587,7 +13280,7 @@
 </p:sld>
 </file>
 
-<file path=ppt/slides/slide44.xml><?xml version="1.0" encoding="utf-8"?>
+<file path=ppt/slides/slide43.xml><?xml version="1.0" encoding="utf-8"?>
 <p:sld xmlns:a="http://schemas.openxmlformats.org/drawingml/2006/main" xmlns:r="http://schemas.openxmlformats.org/officeDocument/2006/relationships" xmlns:p="http://schemas.openxmlformats.org/presentationml/2006/main">
   <p:cSld>
     <p:spTree>
@@ -13764,7 +13457,7 @@
             <a:fld id="{AF2DD60D-AE1E-4B35-90D2-0ABAEDD7A6F5}" type="slidenum">
               <a:rPr lang="pt-PT" smtClean="0"/>
               <a:pPr/>
-              <a:t>44</a:t>
+              <a:t>43</a:t>
             </a:fld>
             <a:endParaRPr lang="pt-PT" dirty="0"/>
           </a:p>
@@ -13785,7 +13478,7 @@
 </p:sld>
 </file>
 
-<file path=ppt/slides/slide45.xml><?xml version="1.0" encoding="utf-8"?>
+<file path=ppt/slides/slide44.xml><?xml version="1.0" encoding="utf-8"?>
 <p:sld xmlns:a="http://schemas.openxmlformats.org/drawingml/2006/main" xmlns:r="http://schemas.openxmlformats.org/officeDocument/2006/relationships" xmlns:p="http://schemas.openxmlformats.org/presentationml/2006/main">
   <p:cSld>
     <p:spTree>
@@ -13962,7 +13655,7 @@
             <a:fld id="{AF2DD60D-AE1E-4B35-90D2-0ABAEDD7A6F5}" type="slidenum">
               <a:rPr lang="pt-PT" smtClean="0"/>
               <a:pPr/>
-              <a:t>45</a:t>
+              <a:t>44</a:t>
             </a:fld>
             <a:endParaRPr lang="pt-PT" dirty="0"/>
           </a:p>
@@ -13983,7 +13676,7 @@
 </p:sld>
 </file>
 
-<file path=ppt/slides/slide46.xml><?xml version="1.0" encoding="utf-8"?>
+<file path=ppt/slides/slide45.xml><?xml version="1.0" encoding="utf-8"?>
 <p:sld xmlns:a="http://schemas.openxmlformats.org/drawingml/2006/main" xmlns:r="http://schemas.openxmlformats.org/officeDocument/2006/relationships" xmlns:p="http://schemas.openxmlformats.org/presentationml/2006/main">
   <p:cSld>
     <p:spTree>

</xml_diff>